<commit_message>
Adding changes to ppt and SFD
</commit_message>
<xml_diff>
--- a/specifications/deliv3/SOS Deliverable Final Presentation.pptx
+++ b/specifications/deliv3/SOS Deliverable Final Presentation.pptx
@@ -5,7 +5,7 @@
     <p:sldMasterId id="2147483660" r:id="rId1"/>
   </p:sldMasterIdLst>
   <p:notesMasterIdLst>
-    <p:notesMasterId r:id="rId19"/>
+    <p:notesMasterId r:id="rId20"/>
   </p:notesMasterIdLst>
   <p:sldIdLst>
     <p:sldId id="256" r:id="rId2"/>
@@ -21,10 +21,11 @@
     <p:sldId id="274" r:id="rId12"/>
     <p:sldId id="275" r:id="rId13"/>
     <p:sldId id="266" r:id="rId14"/>
-    <p:sldId id="268" r:id="rId15"/>
-    <p:sldId id="269" r:id="rId16"/>
-    <p:sldId id="270" r:id="rId17"/>
-    <p:sldId id="276" r:id="rId18"/>
+    <p:sldId id="277" r:id="rId15"/>
+    <p:sldId id="268" r:id="rId16"/>
+    <p:sldId id="269" r:id="rId17"/>
+    <p:sldId id="270" r:id="rId18"/>
+    <p:sldId id="276" r:id="rId19"/>
   </p:sldIdLst>
   <p:sldSz cx="12192000" cy="6858000"/>
   <p:notesSz cx="6858000" cy="9144000"/>
@@ -134,13 +135,154 @@
 <file path=ppt/revisionInfo.xml><?xml version="1.0" encoding="utf-8"?>
 <p1510:revInfo xmlns:a="http://schemas.openxmlformats.org/drawingml/2006/main" xmlns:r="http://schemas.openxmlformats.org/officeDocument/2006/relationships" xmlns:p1510="http://schemas.microsoft.com/office/powerpoint/2015/10/main">
   <p1510:revLst>
-    <p1510:client id="{1E119CE9-B343-4265-9F4A-0864581E65E7}" v="24" dt="2019-12-01T23:02:47.038"/>
+    <p1510:client id="{1E119CE9-B343-4265-9F4A-0864581E65E7}" v="31" dt="2019-12-02T00:02:11.319"/>
   </p1510:revLst>
 </p1510:revInfo>
 </file>
 
 <file path=ppt/changesInfos/changesInfo1.xml><?xml version="1.0" encoding="utf-8"?>
 <pc:chgInfo xmlns:a="http://schemas.openxmlformats.org/drawingml/2006/main" xmlns:r="http://schemas.openxmlformats.org/officeDocument/2006/relationships" xmlns:ac="http://schemas.microsoft.com/office/drawing/2013/main/command" xmlns:pc="http://schemas.microsoft.com/office/powerpoint/2013/main/command">
+  <pc:docChgLst>
+    <pc:chgData name="Anthony Sanchez-Ayra" userId="6745e27f37c7945b" providerId="LiveId" clId="{1E119CE9-B343-4265-9F4A-0864581E65E7}"/>
+    <pc:docChg chg="undo custSel addSld modSld">
+      <pc:chgData name="Anthony Sanchez-Ayra" userId="6745e27f37c7945b" providerId="LiveId" clId="{1E119CE9-B343-4265-9F4A-0864581E65E7}" dt="2019-12-02T00:04:24.122" v="731" actId="1076"/>
+      <pc:docMkLst>
+        <pc:docMk/>
+      </pc:docMkLst>
+      <pc:sldChg chg="delSp modSp">
+        <pc:chgData name="Anthony Sanchez-Ayra" userId="6745e27f37c7945b" providerId="LiveId" clId="{1E119CE9-B343-4265-9F4A-0864581E65E7}" dt="2019-12-02T00:01:01.531" v="679" actId="1076"/>
+        <pc:sldMkLst>
+          <pc:docMk/>
+          <pc:sldMk cId="499540092" sldId="268"/>
+        </pc:sldMkLst>
+        <pc:spChg chg="mod">
+          <ac:chgData name="Anthony Sanchez-Ayra" userId="6745e27f37c7945b" providerId="LiveId" clId="{1E119CE9-B343-4265-9F4A-0864581E65E7}" dt="2019-12-01T23:51:15.746" v="100" actId="20577"/>
+          <ac:spMkLst>
+            <pc:docMk/>
+            <pc:sldMk cId="499540092" sldId="268"/>
+            <ac:spMk id="2" creationId="{5C80EEB8-5622-4702-AD82-5EEE0379B31E}"/>
+          </ac:spMkLst>
+        </pc:spChg>
+        <pc:spChg chg="mod">
+          <ac:chgData name="Anthony Sanchez-Ayra" userId="6745e27f37c7945b" providerId="LiveId" clId="{1E119CE9-B343-4265-9F4A-0864581E65E7}" dt="2019-12-02T00:01:01.531" v="679" actId="1076"/>
+          <ac:spMkLst>
+            <pc:docMk/>
+            <pc:sldMk cId="499540092" sldId="268"/>
+            <ac:spMk id="5" creationId="{4EDCAB97-38A8-4D96-8012-A3D8C87B9F15}"/>
+          </ac:spMkLst>
+        </pc:spChg>
+        <pc:spChg chg="del">
+          <ac:chgData name="Anthony Sanchez-Ayra" userId="6745e27f37c7945b" providerId="LiveId" clId="{1E119CE9-B343-4265-9F4A-0864581E65E7}" dt="2019-12-01T23:51:44.752" v="106" actId="478"/>
+          <ac:spMkLst>
+            <pc:docMk/>
+            <pc:sldMk cId="499540092" sldId="268"/>
+            <ac:spMk id="6" creationId="{C29C722A-B56B-42DB-8D41-2B60CEC7321C}"/>
+          </ac:spMkLst>
+        </pc:spChg>
+        <pc:spChg chg="mod">
+          <ac:chgData name="Anthony Sanchez-Ayra" userId="6745e27f37c7945b" providerId="LiveId" clId="{1E119CE9-B343-4265-9F4A-0864581E65E7}" dt="2019-12-01T23:51:53.266" v="107" actId="1076"/>
+          <ac:spMkLst>
+            <pc:docMk/>
+            <pc:sldMk cId="499540092" sldId="268"/>
+            <ac:spMk id="7" creationId="{D0874340-2D7A-48CC-B203-7ED7D9920ABA}"/>
+          </ac:spMkLst>
+        </pc:spChg>
+      </pc:sldChg>
+      <pc:sldChg chg="delSp modSp modNotesTx">
+        <pc:chgData name="Anthony Sanchez-Ayra" userId="6745e27f37c7945b" providerId="LiveId" clId="{1E119CE9-B343-4265-9F4A-0864581E65E7}" dt="2019-12-02T00:04:24.122" v="731" actId="1076"/>
+        <pc:sldMkLst>
+          <pc:docMk/>
+          <pc:sldMk cId="3606661239" sldId="269"/>
+        </pc:sldMkLst>
+        <pc:spChg chg="mod">
+          <ac:chgData name="Anthony Sanchez-Ayra" userId="6745e27f37c7945b" providerId="LiveId" clId="{1E119CE9-B343-4265-9F4A-0864581E65E7}" dt="2019-12-02T00:01:14.266" v="690" actId="20577"/>
+          <ac:spMkLst>
+            <pc:docMk/>
+            <pc:sldMk cId="3606661239" sldId="269"/>
+            <ac:spMk id="2" creationId="{5FB8B40E-E978-4CA5-A7F8-8ECDF16ED7B8}"/>
+          </ac:spMkLst>
+        </pc:spChg>
+        <pc:spChg chg="mod">
+          <ac:chgData name="Anthony Sanchez-Ayra" userId="6745e27f37c7945b" providerId="LiveId" clId="{1E119CE9-B343-4265-9F4A-0864581E65E7}" dt="2019-12-02T00:04:24.122" v="731" actId="1076"/>
+          <ac:spMkLst>
+            <pc:docMk/>
+            <pc:sldMk cId="3606661239" sldId="269"/>
+            <ac:spMk id="4" creationId="{C0FE504E-29EC-4DEB-B0E6-E6B15FCFE32E}"/>
+          </ac:spMkLst>
+        </pc:spChg>
+        <pc:spChg chg="del">
+          <ac:chgData name="Anthony Sanchez-Ayra" userId="6745e27f37c7945b" providerId="LiveId" clId="{1E119CE9-B343-4265-9F4A-0864581E65E7}" dt="2019-12-02T00:02:29.906" v="695" actId="478"/>
+          <ac:spMkLst>
+            <pc:docMk/>
+            <pc:sldMk cId="3606661239" sldId="269"/>
+            <ac:spMk id="5" creationId="{0C6E4AAC-AF50-421A-8D37-CC72E4FDCFEF}"/>
+          </ac:spMkLst>
+        </pc:spChg>
+        <pc:spChg chg="mod">
+          <ac:chgData name="Anthony Sanchez-Ayra" userId="6745e27f37c7945b" providerId="LiveId" clId="{1E119CE9-B343-4265-9F4A-0864581E65E7}" dt="2019-12-02T00:04:17.937" v="730" actId="1076"/>
+          <ac:spMkLst>
+            <pc:docMk/>
+            <pc:sldMk cId="3606661239" sldId="269"/>
+            <ac:spMk id="6" creationId="{83D7B75E-CD89-4451-AA61-D4A5221E0C74}"/>
+          </ac:spMkLst>
+        </pc:spChg>
+      </pc:sldChg>
+      <pc:sldChg chg="modNotesTx">
+        <pc:chgData name="Anthony Sanchez-Ayra" userId="6745e27f37c7945b" providerId="LiveId" clId="{1E119CE9-B343-4265-9F4A-0864581E65E7}" dt="2019-12-01T23:40:09.142" v="66" actId="20577"/>
+        <pc:sldMkLst>
+          <pc:docMk/>
+          <pc:sldMk cId="2311186588" sldId="270"/>
+        </pc:sldMkLst>
+      </pc:sldChg>
+      <pc:sldChg chg="addSp delSp modSp add">
+        <pc:chgData name="Anthony Sanchez-Ayra" userId="6745e27f37c7945b" providerId="LiveId" clId="{1E119CE9-B343-4265-9F4A-0864581E65E7}" dt="2019-12-01T23:37:32.048" v="65" actId="14100"/>
+        <pc:sldMkLst>
+          <pc:docMk/>
+          <pc:sldMk cId="1414546480" sldId="277"/>
+        </pc:sldMkLst>
+        <pc:spChg chg="mod">
+          <ac:chgData name="Anthony Sanchez-Ayra" userId="6745e27f37c7945b" providerId="LiveId" clId="{1E119CE9-B343-4265-9F4A-0864581E65E7}" dt="2019-12-01T23:37:15.371" v="61" actId="1076"/>
+          <ac:spMkLst>
+            <pc:docMk/>
+            <pc:sldMk cId="1414546480" sldId="277"/>
+            <ac:spMk id="2" creationId="{24506EE9-C6AC-4515-BC77-CE2567B122D7}"/>
+          </ac:spMkLst>
+        </pc:spChg>
+        <pc:spChg chg="del">
+          <ac:chgData name="Anthony Sanchez-Ayra" userId="6745e27f37c7945b" providerId="LiveId" clId="{1E119CE9-B343-4265-9F4A-0864581E65E7}" dt="2019-12-01T23:35:47.531" v="1"/>
+          <ac:spMkLst>
+            <pc:docMk/>
+            <pc:sldMk cId="1414546480" sldId="277"/>
+            <ac:spMk id="3" creationId="{B30A3E89-0AF3-4A57-BE9E-4481F96E992E}"/>
+          </ac:spMkLst>
+        </pc:spChg>
+        <pc:spChg chg="del">
+          <ac:chgData name="Anthony Sanchez-Ayra" userId="6745e27f37c7945b" providerId="LiveId" clId="{1E119CE9-B343-4265-9F4A-0864581E65E7}" dt="2019-12-01T23:35:55.367" v="3" actId="478"/>
+          <ac:spMkLst>
+            <pc:docMk/>
+            <pc:sldMk cId="1414546480" sldId="277"/>
+            <ac:spMk id="4" creationId="{A8F9FCD9-B63C-4271-B3B4-404824175966}"/>
+          </ac:spMkLst>
+        </pc:spChg>
+        <pc:spChg chg="mod">
+          <ac:chgData name="Anthony Sanchez-Ayra" userId="6745e27f37c7945b" providerId="LiveId" clId="{1E119CE9-B343-4265-9F4A-0864581E65E7}" dt="2019-12-01T23:37:27.320" v="64" actId="1076"/>
+          <ac:spMkLst>
+            <pc:docMk/>
+            <pc:sldMk cId="1414546480" sldId="277"/>
+            <ac:spMk id="5" creationId="{C23ED126-4AA0-4E76-A80C-7761A03046FE}"/>
+          </ac:spMkLst>
+        </pc:spChg>
+        <pc:picChg chg="add mod">
+          <ac:chgData name="Anthony Sanchez-Ayra" userId="6745e27f37c7945b" providerId="LiveId" clId="{1E119CE9-B343-4265-9F4A-0864581E65E7}" dt="2019-12-01T23:37:32.048" v="65" actId="14100"/>
+          <ac:picMkLst>
+            <pc:docMk/>
+            <pc:sldMk cId="1414546480" sldId="277"/>
+            <ac:picMk id="6" creationId="{F33A5BF8-303C-4A6B-9885-04B49A1AEB1F}"/>
+          </ac:picMkLst>
+        </pc:picChg>
+      </pc:sldChg>
+    </pc:docChg>
+  </pc:docChgLst>
   <pc:docChgLst>
     <pc:chgData name="Anthony Sanchez-Ayra" userId="6745e27f37c7945b" providerId="LiveId" clId="{4BF0C6D9-51C4-404C-BB48-9084BA665C24}"/>
     <pc:docChg chg="undo custSel mod addSld delSld modSld">
@@ -1438,12 +1580,6 @@
           <a:bodyPr/>
           <a:lstStyle/>
           <a:p>
-            <a:r>
-              <a:rPr lang="en-US" dirty="0"/>
-              <a:t>Change object diagram</a:t>
-            </a:r>
-          </a:p>
-          <a:p>
             <a:endParaRPr lang="en-US" dirty="0"/>
           </a:p>
         </p:txBody>
@@ -1474,7 +1610,7 @@
     </p:spTree>
     <p:extLst>
       <p:ext uri="{BB962C8B-B14F-4D97-AF65-F5344CB8AC3E}">
-        <p14:creationId xmlns:p14="http://schemas.microsoft.com/office/powerpoint/2010/main" val="1083633083"/>
+        <p14:creationId xmlns:p14="http://schemas.microsoft.com/office/powerpoint/2010/main" val="3792363433"/>
       </p:ext>
     </p:extLst>
   </p:cSld>
@@ -1528,10 +1664,7 @@
           <a:bodyPr/>
           <a:lstStyle/>
           <a:p>
-            <a:r>
-              <a:rPr lang="en-US" dirty="0"/>
-              <a:t>Change class diagram</a:t>
-            </a:r>
+            <a:endParaRPr lang="en-US" dirty="0"/>
           </a:p>
         </p:txBody>
       </p:sp>
@@ -1553,6 +1686,90 @@
             <a:fld id="{EF0E9F11-5378-4ADA-BF65-D7EDB1D950CD}" type="slidenum">
               <a:rPr lang="en-US" smtClean="0"/>
               <a:t>16</a:t>
+            </a:fld>
+            <a:endParaRPr lang="en-US"/>
+          </a:p>
+        </p:txBody>
+      </p:sp>
+    </p:spTree>
+    <p:extLst>
+      <p:ext uri="{BB962C8B-B14F-4D97-AF65-F5344CB8AC3E}">
+        <p14:creationId xmlns:p14="http://schemas.microsoft.com/office/powerpoint/2010/main" val="1083633083"/>
+      </p:ext>
+    </p:extLst>
+  </p:cSld>
+  <p:clrMapOvr>
+    <a:masterClrMapping/>
+  </p:clrMapOvr>
+</p:notes>
+</file>
+
+<file path=ppt/notesSlides/notesSlide6.xml><?xml version="1.0" encoding="utf-8"?>
+<p:notes xmlns:a="http://schemas.openxmlformats.org/drawingml/2006/main" xmlns:r="http://schemas.openxmlformats.org/officeDocument/2006/relationships" xmlns:p="http://schemas.openxmlformats.org/presentationml/2006/main">
+  <p:cSld>
+    <p:spTree>
+      <p:nvGrpSpPr>
+        <p:cNvPr id="1" name=""/>
+        <p:cNvGrpSpPr/>
+        <p:nvPr/>
+      </p:nvGrpSpPr>
+      <p:grpSpPr>
+        <a:xfrm>
+          <a:off x="0" y="0"/>
+          <a:ext cx="0" cy="0"/>
+          <a:chOff x="0" y="0"/>
+          <a:chExt cx="0" cy="0"/>
+        </a:xfrm>
+      </p:grpSpPr>
+      <p:sp>
+        <p:nvSpPr>
+          <p:cNvPr id="2" name="Slide Image Placeholder 1"/>
+          <p:cNvSpPr>
+            <a:spLocks noGrp="1" noRot="1" noChangeAspect="1"/>
+          </p:cNvSpPr>
+          <p:nvPr>
+            <p:ph type="sldImg"/>
+          </p:nvPr>
+        </p:nvSpPr>
+        <p:spPr/>
+      </p:sp>
+      <p:sp>
+        <p:nvSpPr>
+          <p:cNvPr id="3" name="Notes Placeholder 2"/>
+          <p:cNvSpPr>
+            <a:spLocks noGrp="1"/>
+          </p:cNvSpPr>
+          <p:nvPr>
+            <p:ph type="body" idx="1"/>
+          </p:nvPr>
+        </p:nvSpPr>
+        <p:spPr/>
+        <p:txBody>
+          <a:bodyPr/>
+          <a:lstStyle/>
+          <a:p>
+            <a:endParaRPr lang="en-US" dirty="0"/>
+          </a:p>
+        </p:txBody>
+      </p:sp>
+      <p:sp>
+        <p:nvSpPr>
+          <p:cNvPr id="4" name="Slide Number Placeholder 3"/>
+          <p:cNvSpPr>
+            <a:spLocks noGrp="1"/>
+          </p:cNvSpPr>
+          <p:nvPr>
+            <p:ph type="sldNum" sz="quarter" idx="5"/>
+          </p:nvPr>
+        </p:nvSpPr>
+        <p:spPr/>
+        <p:txBody>
+          <a:bodyPr/>
+          <a:lstStyle/>
+          <a:p>
+            <a:fld id="{EF0E9F11-5378-4ADA-BF65-D7EDB1D950CD}" type="slidenum">
+              <a:rPr lang="en-US" smtClean="0"/>
+              <a:t>17</a:t>
             </a:fld>
             <a:endParaRPr lang="en-US"/>
           </a:p>
@@ -8314,14 +8531,6 @@
 <file path=ppt/slides/slide14.xml><?xml version="1.0" encoding="utf-8"?>
 <p:sld xmlns:a="http://schemas.openxmlformats.org/drawingml/2006/main" xmlns:r="http://schemas.openxmlformats.org/officeDocument/2006/relationships" xmlns:p="http://schemas.openxmlformats.org/presentationml/2006/main">
   <p:cSld>
-    <p:bg>
-      <p:bgPr>
-        <a:solidFill>
-          <a:schemeClr val="bg1"/>
-        </a:solidFill>
-        <a:effectLst/>
-      </p:bgPr>
-    </p:bg>
     <p:spTree>
       <p:nvGrpSpPr>
         <p:cNvPr id="1" name=""/>
@@ -8341,7 +8550,7 @@
           <p:cNvPr id="2" name="Title 1">
             <a:extLst>
               <a:ext uri="{FF2B5EF4-FFF2-40B4-BE49-F238E27FC236}">
-                <a16:creationId xmlns:a16="http://schemas.microsoft.com/office/drawing/2014/main" id="{5C80EEB8-5622-4702-AD82-5EEE0379B31E}"/>
+                <a16:creationId xmlns:a16="http://schemas.microsoft.com/office/drawing/2014/main" id="{24506EE9-C6AC-4515-BC77-CE2567B122D7}"/>
               </a:ext>
             </a:extLst>
           </p:cNvPr>
@@ -8354,28 +8563,27 @@
         </p:nvSpPr>
         <p:spPr>
           <a:xfrm>
-            <a:off x="787893" y="-310032"/>
-            <a:ext cx="10515600" cy="1325563"/>
+            <a:off x="919119" y="-288758"/>
+            <a:ext cx="10353762" cy="970450"/>
           </a:xfrm>
         </p:spPr>
         <p:txBody>
           <a:bodyPr/>
           <a:lstStyle/>
           <a:p>
-            <a:pPr algn="ctr"/>
             <a:r>
               <a:rPr lang="en-US" dirty="0"/>
-              <a:t>Test Case *** Sunny Day</a:t>
-            </a:r>
-          </a:p>
-        </p:txBody>
-      </p:sp>
-      <p:sp>
-        <p:nvSpPr>
-          <p:cNvPr id="6" name="Footer Placeholder 5">
+              <a:t>Sequence Diagram SOS16 Create Organization</a:t>
+            </a:r>
+          </a:p>
+        </p:txBody>
+      </p:sp>
+      <p:sp>
+        <p:nvSpPr>
+          <p:cNvPr id="5" name="Slide Number Placeholder 4">
             <a:extLst>
               <a:ext uri="{FF2B5EF4-FFF2-40B4-BE49-F238E27FC236}">
-                <a16:creationId xmlns:a16="http://schemas.microsoft.com/office/drawing/2014/main" id="{C29C722A-B56B-42DB-8D41-2B60CEC7321C}"/>
+                <a16:creationId xmlns:a16="http://schemas.microsoft.com/office/drawing/2014/main" id="{C23ED126-4AA0-4E76-A80C-7761A03046FE}"/>
               </a:ext>
             </a:extLst>
           </p:cNvPr>
@@ -8383,38 +8591,15 @@
             <a:spLocks noGrp="1"/>
           </p:cNvSpPr>
           <p:nvPr>
-            <p:ph type="ftr" sz="quarter" idx="11"/>
-          </p:nvPr>
-        </p:nvSpPr>
-        <p:spPr/>
-        <p:txBody>
-          <a:bodyPr/>
-          <a:lstStyle/>
-          <a:p>
-            <a:r>
-              <a:rPr lang="en-US"/>
-              <a:t>Student Organization System - Software Requirements Document</a:t>
-            </a:r>
-          </a:p>
-        </p:txBody>
-      </p:sp>
-      <p:sp>
-        <p:nvSpPr>
-          <p:cNvPr id="7" name="Slide Number Placeholder 6">
-            <a:extLst>
-              <a:ext uri="{FF2B5EF4-FFF2-40B4-BE49-F238E27FC236}">
-                <a16:creationId xmlns:a16="http://schemas.microsoft.com/office/drawing/2014/main" id="{D0874340-2D7A-48CC-B203-7ED7D9920ABA}"/>
-              </a:ext>
-            </a:extLst>
-          </p:cNvPr>
-          <p:cNvSpPr>
-            <a:spLocks noGrp="1"/>
-          </p:cNvSpPr>
-          <p:nvPr>
             <p:ph type="sldNum" sz="quarter" idx="12"/>
           </p:nvPr>
         </p:nvSpPr>
-        <p:spPr/>
+        <p:spPr>
+          <a:xfrm>
+            <a:off x="11438455" y="6549022"/>
+            <a:ext cx="753545" cy="365125"/>
+          </a:xfrm>
+        </p:spPr>
         <p:txBody>
           <a:bodyPr/>
           <a:lstStyle/>
@@ -8423,39 +8608,46 @@
               <a:rPr lang="en-US" smtClean="0"/>
               <a:t>14</a:t>
             </a:fld>
-            <a:endParaRPr lang="en-US"/>
-          </a:p>
-        </p:txBody>
-      </p:sp>
-      <p:sp>
-        <p:nvSpPr>
-          <p:cNvPr id="5" name="Content Placeholder 4">
+            <a:endParaRPr lang="en-US" dirty="0"/>
+          </a:p>
+        </p:txBody>
+      </p:sp>
+      <p:pic>
+        <p:nvPicPr>
+          <p:cNvPr id="6" name="Content Placeholder 5">
             <a:extLst>
               <a:ext uri="{FF2B5EF4-FFF2-40B4-BE49-F238E27FC236}">
-                <a16:creationId xmlns:a16="http://schemas.microsoft.com/office/drawing/2014/main" id="{4EDCAB97-38A8-4D96-8012-A3D8C87B9F15}"/>
+                <a16:creationId xmlns:a16="http://schemas.microsoft.com/office/drawing/2014/main" id="{F33A5BF8-303C-4A6B-9885-04B49A1AEB1F}"/>
               </a:ext>
             </a:extLst>
           </p:cNvPr>
-          <p:cNvSpPr>
-            <a:spLocks noGrp="1"/>
-          </p:cNvSpPr>
+          <p:cNvPicPr>
+            <a:picLocks noGrp="1"/>
+          </p:cNvPicPr>
           <p:nvPr>
             <p:ph idx="1"/>
           </p:nvPr>
-        </p:nvSpPr>
-        <p:spPr/>
-        <p:txBody>
-          <a:bodyPr/>
-          <a:lstStyle/>
-          <a:p>
-            <a:endParaRPr lang="en-US"/>
-          </a:p>
-        </p:txBody>
-      </p:sp>
+        </p:nvPicPr>
+        <p:blipFill>
+          <a:blip r:embed="rId2"/>
+          <a:stretch>
+            <a:fillRect/>
+          </a:stretch>
+        </p:blipFill>
+        <p:spPr>
+          <a:xfrm>
+            <a:off x="0" y="561473"/>
+            <a:ext cx="12192000" cy="6112043"/>
+          </a:xfrm>
+          <a:prstGeom prst="rect">
+            <a:avLst/>
+          </a:prstGeom>
+        </p:spPr>
+      </p:pic>
     </p:spTree>
     <p:extLst>
       <p:ext uri="{BB962C8B-B14F-4D97-AF65-F5344CB8AC3E}">
-        <p14:creationId xmlns:p14="http://schemas.microsoft.com/office/powerpoint/2010/main" val="499540092"/>
+        <p14:creationId xmlns:p14="http://schemas.microsoft.com/office/powerpoint/2010/main" val="1414546480"/>
       </p:ext>
     </p:extLst>
   </p:cSld>
@@ -8495,7 +8687,7 @@
           <p:cNvPr id="2" name="Title 1">
             <a:extLst>
               <a:ext uri="{FF2B5EF4-FFF2-40B4-BE49-F238E27FC236}">
-                <a16:creationId xmlns:a16="http://schemas.microsoft.com/office/drawing/2014/main" id="{5FB8B40E-E978-4CA5-A7F8-8ECDF16ED7B8}"/>
+                <a16:creationId xmlns:a16="http://schemas.microsoft.com/office/drawing/2014/main" id="{5C80EEB8-5622-4702-AD82-5EEE0379B31E}"/>
               </a:ext>
             </a:extLst>
           </p:cNvPr>
@@ -8508,7 +8700,7 @@
         </p:nvSpPr>
         <p:spPr>
           <a:xfrm>
-            <a:off x="751956" y="0"/>
+            <a:off x="787893" y="-310032"/>
             <a:ext cx="10515600" cy="1325563"/>
           </a:xfrm>
         </p:spPr>
@@ -8519,17 +8711,17 @@
             <a:pPr algn="ctr"/>
             <a:r>
               <a:rPr lang="en-US" dirty="0"/>
-              <a:t>Test Case *** Rainy Day</a:t>
-            </a:r>
-          </a:p>
-        </p:txBody>
-      </p:sp>
-      <p:sp>
-        <p:nvSpPr>
-          <p:cNvPr id="5" name="Footer Placeholder 4">
+              <a:t>Test Case: SOS04-System-**-Sunny**</a:t>
+            </a:r>
+          </a:p>
+        </p:txBody>
+      </p:sp>
+      <p:sp>
+        <p:nvSpPr>
+          <p:cNvPr id="7" name="Slide Number Placeholder 6">
             <a:extLst>
               <a:ext uri="{FF2B5EF4-FFF2-40B4-BE49-F238E27FC236}">
-                <a16:creationId xmlns:a16="http://schemas.microsoft.com/office/drawing/2014/main" id="{0C6E4AAC-AF50-421A-8D37-CC72E4FDCFEF}"/>
+                <a16:creationId xmlns:a16="http://schemas.microsoft.com/office/drawing/2014/main" id="{D0874340-2D7A-48CC-B203-7ED7D9920ABA}"/>
               </a:ext>
             </a:extLst>
           </p:cNvPr>
@@ -8537,38 +8729,15 @@
             <a:spLocks noGrp="1"/>
           </p:cNvSpPr>
           <p:nvPr>
-            <p:ph type="ftr" sz="quarter" idx="11"/>
-          </p:nvPr>
-        </p:nvSpPr>
-        <p:spPr/>
-        <p:txBody>
-          <a:bodyPr/>
-          <a:lstStyle/>
-          <a:p>
-            <a:r>
-              <a:rPr lang="en-US"/>
-              <a:t>Student Organization System - Software Requirements Document</a:t>
-            </a:r>
-          </a:p>
-        </p:txBody>
-      </p:sp>
-      <p:sp>
-        <p:nvSpPr>
-          <p:cNvPr id="6" name="Slide Number Placeholder 5">
-            <a:extLst>
-              <a:ext uri="{FF2B5EF4-FFF2-40B4-BE49-F238E27FC236}">
-                <a16:creationId xmlns:a16="http://schemas.microsoft.com/office/drawing/2014/main" id="{83D7B75E-CD89-4451-AA61-D4A5221E0C74}"/>
-              </a:ext>
-            </a:extLst>
-          </p:cNvPr>
-          <p:cNvSpPr>
-            <a:spLocks noGrp="1"/>
-          </p:cNvSpPr>
-          <p:nvPr>
             <p:ph type="sldNum" sz="quarter" idx="12"/>
           </p:nvPr>
         </p:nvSpPr>
-        <p:spPr/>
+        <p:spPr>
+          <a:xfrm>
+            <a:off x="11171739" y="6392779"/>
+            <a:ext cx="753545" cy="365125"/>
+          </a:xfrm>
+        </p:spPr>
         <p:txBody>
           <a:bodyPr/>
           <a:lstStyle/>
@@ -8577,16 +8746,16 @@
               <a:rPr lang="en-US" smtClean="0"/>
               <a:t>15</a:t>
             </a:fld>
-            <a:endParaRPr lang="en-US"/>
-          </a:p>
-        </p:txBody>
-      </p:sp>
-      <p:sp>
-        <p:nvSpPr>
-          <p:cNvPr id="4" name="Content Placeholder 3">
+            <a:endParaRPr lang="en-US" dirty="0"/>
+          </a:p>
+        </p:txBody>
+      </p:sp>
+      <p:sp>
+        <p:nvSpPr>
+          <p:cNvPr id="5" name="Content Placeholder 4">
             <a:extLst>
               <a:ext uri="{FF2B5EF4-FFF2-40B4-BE49-F238E27FC236}">
-                <a16:creationId xmlns:a16="http://schemas.microsoft.com/office/drawing/2014/main" id="{C0FE504E-29EC-4DEB-B0E6-E6B15FCFE32E}"/>
+                <a16:creationId xmlns:a16="http://schemas.microsoft.com/office/drawing/2014/main" id="{4EDCAB97-38A8-4D96-8012-A3D8C87B9F15}"/>
               </a:ext>
             </a:extLst>
           </p:cNvPr>
@@ -8597,19 +8766,129 @@
             <p:ph idx="1"/>
           </p:nvPr>
         </p:nvSpPr>
-        <p:spPr/>
-        <p:txBody>
-          <a:bodyPr/>
-          <a:lstStyle/>
-          <a:p>
-            <a:endParaRPr lang="en-US"/>
+        <p:spPr>
+          <a:xfrm>
+            <a:off x="0" y="952247"/>
+            <a:ext cx="12192001" cy="5805657"/>
+          </a:xfrm>
+        </p:spPr>
+        <p:txBody>
+          <a:bodyPr>
+            <a:normAutofit/>
+          </a:bodyPr>
+          <a:lstStyle/>
+          <a:p>
+            <a:r>
+              <a:rPr lang="en-US" sz="2200" b="1" dirty="0">
+                <a:effectLst/>
+              </a:rPr>
+              <a:t>Purpose</a:t>
+            </a:r>
+            <a:r>
+              <a:rPr lang="en-US" sz="2200" dirty="0">
+                <a:effectLst/>
+              </a:rPr>
+              <a:t>: Ensure that a Profile that exists in SOS is able to have its email address changed.</a:t>
+            </a:r>
+          </a:p>
+          <a:p>
+            <a:r>
+              <a:rPr lang="en-US" sz="2200" b="1" dirty="0">
+                <a:effectLst/>
+              </a:rPr>
+              <a:t>Test set-up</a:t>
+            </a:r>
+            <a:r>
+              <a:rPr lang="en-US" sz="2200" dirty="0">
+                <a:effectLst/>
+              </a:rPr>
+              <a:t>: There is already a user who has made a profile within the system. </a:t>
+            </a:r>
+          </a:p>
+          <a:p>
+            <a:r>
+              <a:rPr lang="en-US" sz="2200" b="1" dirty="0">
+                <a:effectLst/>
+              </a:rPr>
+              <a:t>Input:</a:t>
+            </a:r>
+          </a:p>
+          <a:p>
+            <a:pPr marL="494100" indent="-457200">
+              <a:buAutoNum type="arabicPeriod"/>
+            </a:pPr>
+            <a:r>
+              <a:rPr lang="en-US" sz="2200" dirty="0">
+                <a:effectLst/>
+              </a:rPr>
+              <a:t>From profile page the user will click on the ‘edit profile’ button. </a:t>
+            </a:r>
+          </a:p>
+          <a:p>
+            <a:pPr marL="494100" indent="-457200">
+              <a:buAutoNum type="arabicPeriod"/>
+            </a:pPr>
+            <a:r>
+              <a:rPr lang="en-US" sz="2200" dirty="0">
+                <a:effectLst/>
+              </a:rPr>
+              <a:t>Then a form will pop up that has information she had already inserted before.</a:t>
+            </a:r>
+          </a:p>
+          <a:p>
+            <a:pPr marL="494100" indent="-457200">
+              <a:buAutoNum type="arabicPeriod"/>
+            </a:pPr>
+            <a:r>
+              <a:rPr lang="en-US" sz="2200" dirty="0">
+                <a:effectLst/>
+              </a:rPr>
+              <a:t>She inserts the change into the email field, erasing style@hotmail.com and typing in fab@gmail.com</a:t>
+            </a:r>
+          </a:p>
+          <a:p>
+            <a:pPr marL="494100" indent="-457200">
+              <a:buAutoNum type="arabicPeriod"/>
+            </a:pPr>
+            <a:r>
+              <a:rPr lang="en-US" sz="2200" dirty="0">
+                <a:effectLst/>
+              </a:rPr>
+              <a:t>She will click the “submit” button.</a:t>
+            </a:r>
+          </a:p>
+          <a:p>
+            <a:pPr marL="494100" indent="-457200">
+              <a:buAutoNum type="arabicPeriod"/>
+            </a:pPr>
+            <a:r>
+              <a:rPr lang="en-US" sz="2200" dirty="0">
+                <a:effectLst/>
+              </a:rPr>
+              <a:t>She will enter her password.</a:t>
+            </a:r>
+          </a:p>
+          <a:p>
+            <a:r>
+              <a:rPr lang="en-US" sz="2200" b="1" dirty="0">
+                <a:effectLst/>
+              </a:rPr>
+              <a:t>Expected Output</a:t>
+            </a:r>
+            <a:r>
+              <a:rPr lang="en-US" sz="2200" dirty="0">
+                <a:effectLst/>
+              </a:rPr>
+              <a:t>: The SOS system display a success pop-up and displays the new email to the user.</a:t>
+            </a:r>
+            <a:endParaRPr lang="en-US" sz="2200" dirty="0"/>
           </a:p>
         </p:txBody>
       </p:sp>
     </p:spTree>
     <p:extLst>
       <p:ext uri="{BB962C8B-B14F-4D97-AF65-F5344CB8AC3E}">
-        <p14:creationId xmlns:p14="http://schemas.microsoft.com/office/powerpoint/2010/main" val="3606661239"/>
+        <p14:creationId xmlns:p14="http://schemas.microsoft.com/office/powerpoint/2010/main" val="499540092"/>
       </p:ext>
     </p:extLst>
   </p:cSld>
@@ -8622,6 +8901,14 @@
 <file path=ppt/slides/slide16.xml><?xml version="1.0" encoding="utf-8"?>
 <p:sld xmlns:a="http://schemas.openxmlformats.org/drawingml/2006/main" xmlns:r="http://schemas.openxmlformats.org/officeDocument/2006/relationships" xmlns:p="http://schemas.openxmlformats.org/presentationml/2006/main">
   <p:cSld>
+    <p:bg>
+      <p:bgPr>
+        <a:solidFill>
+          <a:schemeClr val="bg1"/>
+        </a:solidFill>
+        <a:effectLst/>
+      </p:bgPr>
+    </p:bg>
     <p:spTree>
       <p:nvGrpSpPr>
         <p:cNvPr id="1" name=""/>
@@ -8641,7 +8928,7 @@
           <p:cNvPr id="2" name="Title 1">
             <a:extLst>
               <a:ext uri="{FF2B5EF4-FFF2-40B4-BE49-F238E27FC236}">
-                <a16:creationId xmlns:a16="http://schemas.microsoft.com/office/drawing/2014/main" id="{13E81D7D-0FCE-41E5-A10E-4D37B63C5AEA}"/>
+                <a16:creationId xmlns:a16="http://schemas.microsoft.com/office/drawing/2014/main" id="{5FB8B40E-E978-4CA5-A7F8-8ECDF16ED7B8}"/>
               </a:ext>
             </a:extLst>
           </p:cNvPr>
@@ -8654,7 +8941,7 @@
         </p:nvSpPr>
         <p:spPr>
           <a:xfrm>
-            <a:off x="838200" y="-160421"/>
+            <a:off x="751956" y="0"/>
             <a:ext cx="10515600" cy="1325563"/>
           </a:xfrm>
         </p:spPr>
@@ -8662,11 +8949,44 @@
           <a:bodyPr/>
           <a:lstStyle/>
           <a:p>
-            <a:pPr algn="ctr"/>
             <a:r>
               <a:rPr lang="en-US" dirty="0"/>
-              <a:t>Test Case *** Sunny Day</a:t>
-            </a:r>
+              <a:t>Test Case: SOS04-System-**-Rainy**</a:t>
+            </a:r>
+          </a:p>
+        </p:txBody>
+      </p:sp>
+      <p:sp>
+        <p:nvSpPr>
+          <p:cNvPr id="6" name="Slide Number Placeholder 5">
+            <a:extLst>
+              <a:ext uri="{FF2B5EF4-FFF2-40B4-BE49-F238E27FC236}">
+                <a16:creationId xmlns:a16="http://schemas.microsoft.com/office/drawing/2014/main" id="{83D7B75E-CD89-4451-AA61-D4A5221E0C74}"/>
+              </a:ext>
+            </a:extLst>
+          </p:cNvPr>
+          <p:cNvSpPr>
+            <a:spLocks noGrp="1"/>
+          </p:cNvSpPr>
+          <p:nvPr>
+            <p:ph type="sldNum" sz="quarter" idx="12"/>
+          </p:nvPr>
+        </p:nvSpPr>
+        <p:spPr>
+          <a:xfrm>
+            <a:off x="10806974" y="6108006"/>
+            <a:ext cx="753545" cy="365125"/>
+          </a:xfrm>
+        </p:spPr>
+        <p:txBody>
+          <a:bodyPr/>
+          <a:lstStyle/>
+          <a:p>
+            <a:fld id="{5FB0F42B-CAA9-4D4F-86CF-07230423CC99}" type="slidenum">
+              <a:rPr lang="en-US" smtClean="0"/>
+              <a:t>16</a:t>
+            </a:fld>
+            <a:endParaRPr lang="en-US" dirty="0"/>
           </a:p>
         </p:txBody>
       </p:sp>
@@ -8675,7 +8995,7 @@
           <p:cNvPr id="4" name="Content Placeholder 3">
             <a:extLst>
               <a:ext uri="{FF2B5EF4-FFF2-40B4-BE49-F238E27FC236}">
-                <a16:creationId xmlns:a16="http://schemas.microsoft.com/office/drawing/2014/main" id="{BFC6A109-35D1-40A0-A541-34831739E181}"/>
+                <a16:creationId xmlns:a16="http://schemas.microsoft.com/office/drawing/2014/main" id="{C0FE504E-29EC-4DEB-B0E6-E6B15FCFE32E}"/>
               </a:ext>
             </a:extLst>
           </p:cNvPr>
@@ -8686,19 +9006,123 @@
             <p:ph idx="1"/>
           </p:nvPr>
         </p:nvSpPr>
-        <p:spPr/>
-        <p:txBody>
-          <a:bodyPr/>
-          <a:lstStyle/>
-          <a:p>
-            <a:endParaRPr lang="en-US"/>
+        <p:spPr>
+          <a:xfrm>
+            <a:off x="192349" y="1256930"/>
+            <a:ext cx="11807301" cy="5033638"/>
+          </a:xfrm>
+        </p:spPr>
+        <p:txBody>
+          <a:bodyPr>
+            <a:normAutofit/>
+          </a:bodyPr>
+          <a:lstStyle/>
+          <a:p>
+            <a:r>
+              <a:rPr lang="en-US" sz="2200" b="1" dirty="0">
+                <a:effectLst/>
+              </a:rPr>
+              <a:t>Purpose: </a:t>
+            </a:r>
+            <a:r>
+              <a:rPr lang="en-US" sz="2200" dirty="0">
+                <a:effectLst/>
+              </a:rPr>
+              <a:t>Test how the system will react to user attempting to edit their profile but instead cancels from the form.</a:t>
+            </a:r>
+          </a:p>
+          <a:p>
+            <a:r>
+              <a:rPr lang="en-US" sz="2200" b="1" dirty="0">
+                <a:effectLst/>
+              </a:rPr>
+              <a:t>Test set-up:</a:t>
+            </a:r>
+            <a:r>
+              <a:rPr lang="en-US" sz="2200" dirty="0">
+                <a:effectLst/>
+              </a:rPr>
+              <a:t> User already has a profile on the account. </a:t>
+            </a:r>
+          </a:p>
+          <a:p>
+            <a:r>
+              <a:rPr lang="en-US" sz="2200" b="1" dirty="0">
+                <a:effectLst/>
+              </a:rPr>
+              <a:t>Input:</a:t>
+            </a:r>
+            <a:endParaRPr lang="en-US" sz="2200" dirty="0">
+              <a:effectLst/>
+            </a:endParaRPr>
+          </a:p>
+          <a:p>
+            <a:pPr marL="36900" lvl="0" indent="0">
+              <a:buNone/>
+            </a:pPr>
+            <a:r>
+              <a:rPr lang="en-US" sz="2200" dirty="0">
+                <a:effectLst/>
+              </a:rPr>
+              <a:t>1. Clicks on “edit profile” button.</a:t>
+            </a:r>
+          </a:p>
+          <a:p>
+            <a:pPr marL="36900" lvl="0" indent="0">
+              <a:buNone/>
+            </a:pPr>
+            <a:r>
+              <a:rPr lang="en-US" sz="2200" dirty="0">
+                <a:effectLst/>
+              </a:rPr>
+              <a:t>2. Form pops up to shown information that has been inserted before.</a:t>
+            </a:r>
+          </a:p>
+          <a:p>
+            <a:pPr marL="36900" lvl="0" indent="0">
+              <a:buNone/>
+            </a:pPr>
+            <a:r>
+              <a:rPr lang="en-US" sz="2200" dirty="0">
+                <a:effectLst/>
+              </a:rPr>
+              <a:t>3. User realizes that there is actually no mistake and he did enter his number correctly.</a:t>
+            </a:r>
+          </a:p>
+          <a:p>
+            <a:pPr marL="36900" lvl="0" indent="0">
+              <a:buNone/>
+            </a:pPr>
+            <a:r>
+              <a:rPr lang="en-US" sz="2200" dirty="0">
+                <a:effectLst/>
+              </a:rPr>
+              <a:t>4. He presses the “x” button at the upper right corner of the form to close it.</a:t>
+            </a:r>
+          </a:p>
+          <a:p>
+            <a:r>
+              <a:rPr lang="en-US" sz="2200" b="1" dirty="0">
+                <a:effectLst/>
+              </a:rPr>
+              <a:t>Expected Output:</a:t>
+            </a:r>
+            <a:r>
+              <a:rPr lang="en-US" sz="2200" dirty="0">
+                <a:effectLst/>
+              </a:rPr>
+              <a:t> No changes have occurred to profile information. User is back on profile page.</a:t>
+            </a:r>
+          </a:p>
+          <a:p>
+            <a:endParaRPr lang="en-US" sz="2200" dirty="0"/>
           </a:p>
         </p:txBody>
       </p:sp>
     </p:spTree>
     <p:extLst>
       <p:ext uri="{BB962C8B-B14F-4D97-AF65-F5344CB8AC3E}">
-        <p14:creationId xmlns:p14="http://schemas.microsoft.com/office/powerpoint/2010/main" val="2311186588"/>
+        <p14:creationId xmlns:p14="http://schemas.microsoft.com/office/powerpoint/2010/main" val="3606661239"/>
       </p:ext>
     </p:extLst>
   </p:cSld>
@@ -8730,6 +9154,95 @@
           <p:cNvPr id="2" name="Title 1">
             <a:extLst>
               <a:ext uri="{FF2B5EF4-FFF2-40B4-BE49-F238E27FC236}">
+                <a16:creationId xmlns:a16="http://schemas.microsoft.com/office/drawing/2014/main" id="{13E81D7D-0FCE-41E5-A10E-4D37B63C5AEA}"/>
+              </a:ext>
+            </a:extLst>
+          </p:cNvPr>
+          <p:cNvSpPr>
+            <a:spLocks noGrp="1"/>
+          </p:cNvSpPr>
+          <p:nvPr>
+            <p:ph type="title"/>
+          </p:nvPr>
+        </p:nvSpPr>
+        <p:spPr>
+          <a:xfrm>
+            <a:off x="838200" y="-160421"/>
+            <a:ext cx="10515600" cy="1325563"/>
+          </a:xfrm>
+        </p:spPr>
+        <p:txBody>
+          <a:bodyPr/>
+          <a:lstStyle/>
+          <a:p>
+            <a:pPr algn="ctr"/>
+            <a:r>
+              <a:rPr lang="en-US" dirty="0"/>
+              <a:t>Test Case *** Sunny Day</a:t>
+            </a:r>
+          </a:p>
+        </p:txBody>
+      </p:sp>
+      <p:sp>
+        <p:nvSpPr>
+          <p:cNvPr id="4" name="Content Placeholder 3">
+            <a:extLst>
+              <a:ext uri="{FF2B5EF4-FFF2-40B4-BE49-F238E27FC236}">
+                <a16:creationId xmlns:a16="http://schemas.microsoft.com/office/drawing/2014/main" id="{BFC6A109-35D1-40A0-A541-34831739E181}"/>
+              </a:ext>
+            </a:extLst>
+          </p:cNvPr>
+          <p:cNvSpPr>
+            <a:spLocks noGrp="1"/>
+          </p:cNvSpPr>
+          <p:nvPr>
+            <p:ph idx="1"/>
+          </p:nvPr>
+        </p:nvSpPr>
+        <p:spPr/>
+        <p:txBody>
+          <a:bodyPr/>
+          <a:lstStyle/>
+          <a:p>
+            <a:endParaRPr lang="en-US"/>
+          </a:p>
+        </p:txBody>
+      </p:sp>
+    </p:spTree>
+    <p:extLst>
+      <p:ext uri="{BB962C8B-B14F-4D97-AF65-F5344CB8AC3E}">
+        <p14:creationId xmlns:p14="http://schemas.microsoft.com/office/powerpoint/2010/main" val="2311186588"/>
+      </p:ext>
+    </p:extLst>
+  </p:cSld>
+  <p:clrMapOvr>
+    <a:masterClrMapping/>
+  </p:clrMapOvr>
+</p:sld>
+</file>
+
+<file path=ppt/slides/slide18.xml><?xml version="1.0" encoding="utf-8"?>
+<p:sld xmlns:a="http://schemas.openxmlformats.org/drawingml/2006/main" xmlns:r="http://schemas.openxmlformats.org/officeDocument/2006/relationships" xmlns:p="http://schemas.openxmlformats.org/presentationml/2006/main">
+  <p:cSld>
+    <p:spTree>
+      <p:nvGrpSpPr>
+        <p:cNvPr id="1" name=""/>
+        <p:cNvGrpSpPr/>
+        <p:nvPr/>
+      </p:nvGrpSpPr>
+      <p:grpSpPr>
+        <a:xfrm>
+          <a:off x="0" y="0"/>
+          <a:ext cx="0" cy="0"/>
+          <a:chOff x="0" y="0"/>
+          <a:chExt cx="0" cy="0"/>
+        </a:xfrm>
+      </p:grpSpPr>
+      <p:sp>
+        <p:nvSpPr>
+          <p:cNvPr id="2" name="Title 1">
+            <a:extLst>
+              <a:ext uri="{FF2B5EF4-FFF2-40B4-BE49-F238E27FC236}">
                 <a16:creationId xmlns:a16="http://schemas.microsoft.com/office/drawing/2014/main" id="{FFFE89ED-01E5-4E1B-9201-12C93870AD80}"/>
               </a:ext>
             </a:extLst>
@@ -8834,7 +9347,7 @@
           <a:p>
             <a:fld id="{5FB0F42B-CAA9-4D4F-86CF-07230423CC99}" type="slidenum">
               <a:rPr lang="en-US" smtClean="0"/>
-              <a:t>17</a:t>
+              <a:t>18</a:t>
             </a:fld>
             <a:endParaRPr lang="en-US"/>
           </a:p>

</xml_diff>

<commit_message>
Adding changes to ppt presentation.
</commit_message>
<xml_diff>
--- a/specifications/deliv3/SOS Deliverable Final Presentation.pptx
+++ b/specifications/deliv3/SOS Deliverable Final Presentation.pptx
@@ -135,7 +135,7 @@
 <file path=ppt/revisionInfo.xml><?xml version="1.0" encoding="utf-8"?>
 <p1510:revInfo xmlns:a="http://schemas.openxmlformats.org/drawingml/2006/main" xmlns:r="http://schemas.openxmlformats.org/officeDocument/2006/relationships" xmlns:p1510="http://schemas.microsoft.com/office/powerpoint/2015/10/main">
   <p1510:revLst>
-    <p1510:client id="{1E119CE9-B343-4265-9F4A-0864581E65E7}" v="31" dt="2019-12-02T00:02:11.319"/>
+    <p1510:client id="{1E119CE9-B343-4265-9F4A-0864581E65E7}" v="39" dt="2019-12-02T03:47:03.506"/>
   </p1510:revLst>
 </p1510:revInfo>
 </file>
@@ -144,19 +144,75 @@
 <pc:chgInfo xmlns:a="http://schemas.openxmlformats.org/drawingml/2006/main" xmlns:r="http://schemas.openxmlformats.org/officeDocument/2006/relationships" xmlns:ac="http://schemas.microsoft.com/office/drawing/2013/main/command" xmlns:pc="http://schemas.microsoft.com/office/powerpoint/2013/main/command">
   <pc:docChgLst>
     <pc:chgData name="Anthony Sanchez-Ayra" userId="6745e27f37c7945b" providerId="LiveId" clId="{1E119CE9-B343-4265-9F4A-0864581E65E7}"/>
-    <pc:docChg chg="undo custSel addSld modSld">
-      <pc:chgData name="Anthony Sanchez-Ayra" userId="6745e27f37c7945b" providerId="LiveId" clId="{1E119CE9-B343-4265-9F4A-0864581E65E7}" dt="2019-12-02T00:04:24.122" v="731" actId="1076"/>
+    <pc:docChg chg="undo custSel addSld modSld sldOrd">
+      <pc:chgData name="Anthony Sanchez-Ayra" userId="6745e27f37c7945b" providerId="LiveId" clId="{1E119CE9-B343-4265-9F4A-0864581E65E7}" dt="2019-12-02T04:27:49.236" v="1470" actId="20577"/>
       <pc:docMkLst>
         <pc:docMk/>
       </pc:docMkLst>
-      <pc:sldChg chg="delSp modSp">
-        <pc:chgData name="Anthony Sanchez-Ayra" userId="6745e27f37c7945b" providerId="LiveId" clId="{1E119CE9-B343-4265-9F4A-0864581E65E7}" dt="2019-12-02T00:01:01.531" v="679" actId="1076"/>
+      <pc:sldChg chg="modNotesTx">
+        <pc:chgData name="Anthony Sanchez-Ayra" userId="6745e27f37c7945b" providerId="LiveId" clId="{1E119CE9-B343-4265-9F4A-0864581E65E7}" dt="2019-12-02T04:26:19.199" v="1396" actId="20577"/>
+        <pc:sldMkLst>
+          <pc:docMk/>
+          <pc:sldMk cId="1723716897" sldId="256"/>
+        </pc:sldMkLst>
+      </pc:sldChg>
+      <pc:sldChg chg="modNotesTx">
+        <pc:chgData name="Anthony Sanchez-Ayra" userId="6745e27f37c7945b" providerId="LiveId" clId="{1E119CE9-B343-4265-9F4A-0864581E65E7}" dt="2019-12-02T04:26:13.755" v="1390" actId="20577"/>
+        <pc:sldMkLst>
+          <pc:docMk/>
+          <pc:sldMk cId="621416271" sldId="257"/>
+        </pc:sldMkLst>
+      </pc:sldChg>
+      <pc:sldChg chg="modNotesTx">
+        <pc:chgData name="Anthony Sanchez-Ayra" userId="6745e27f37c7945b" providerId="LiveId" clId="{1E119CE9-B343-4265-9F4A-0864581E65E7}" dt="2019-12-02T04:25:54.702" v="1383" actId="20577"/>
+        <pc:sldMkLst>
+          <pc:docMk/>
+          <pc:sldMk cId="2482113156" sldId="258"/>
+        </pc:sldMkLst>
+      </pc:sldChg>
+      <pc:sldChg chg="modNotesTx">
+        <pc:chgData name="Anthony Sanchez-Ayra" userId="6745e27f37c7945b" providerId="LiveId" clId="{1E119CE9-B343-4265-9F4A-0864581E65E7}" dt="2019-12-02T04:26:41.268" v="1420" actId="20577"/>
+        <pc:sldMkLst>
+          <pc:docMk/>
+          <pc:sldMk cId="1481197021" sldId="260"/>
+        </pc:sldMkLst>
+      </pc:sldChg>
+      <pc:sldChg chg="modNotesTx">
+        <pc:chgData name="Anthony Sanchez-Ayra" userId="6745e27f37c7945b" providerId="LiveId" clId="{1E119CE9-B343-4265-9F4A-0864581E65E7}" dt="2019-12-02T04:27:00.460" v="1431" actId="20577"/>
+        <pc:sldMkLst>
+          <pc:docMk/>
+          <pc:sldMk cId="2534513081" sldId="261"/>
+        </pc:sldMkLst>
+      </pc:sldChg>
+      <pc:sldChg chg="modNotesTx">
+        <pc:chgData name="Anthony Sanchez-Ayra" userId="6745e27f37c7945b" providerId="LiveId" clId="{1E119CE9-B343-4265-9F4A-0864581E65E7}" dt="2019-12-02T04:26:29.862" v="1400" actId="20577"/>
+        <pc:sldMkLst>
+          <pc:docMk/>
+          <pc:sldMk cId="385957599" sldId="262"/>
+        </pc:sldMkLst>
+      </pc:sldChg>
+      <pc:sldChg chg="modNotesTx">
+        <pc:chgData name="Anthony Sanchez-Ayra" userId="6745e27f37c7945b" providerId="LiveId" clId="{1E119CE9-B343-4265-9F4A-0864581E65E7}" dt="2019-12-02T04:26:32.866" v="1404" actId="20577"/>
+        <pc:sldMkLst>
+          <pc:docMk/>
+          <pc:sldMk cId="241253761" sldId="263"/>
+        </pc:sldMkLst>
+      </pc:sldChg>
+      <pc:sldChg chg="modNotesTx">
+        <pc:chgData name="Anthony Sanchez-Ayra" userId="6745e27f37c7945b" providerId="LiveId" clId="{1E119CE9-B343-4265-9F4A-0864581E65E7}" dt="2019-12-02T04:27:19.392" v="1441" actId="20577"/>
+        <pc:sldMkLst>
+          <pc:docMk/>
+          <pc:sldMk cId="2325763583" sldId="266"/>
+        </pc:sldMkLst>
+      </pc:sldChg>
+      <pc:sldChg chg="delSp modSp modNotesTx">
+        <pc:chgData name="Anthony Sanchez-Ayra" userId="6745e27f37c7945b" providerId="LiveId" clId="{1E119CE9-B343-4265-9F4A-0864581E65E7}" dt="2019-12-02T04:27:36.626" v="1455" actId="20577"/>
         <pc:sldMkLst>
           <pc:docMk/>
           <pc:sldMk cId="499540092" sldId="268"/>
         </pc:sldMkLst>
         <pc:spChg chg="mod">
-          <ac:chgData name="Anthony Sanchez-Ayra" userId="6745e27f37c7945b" providerId="LiveId" clId="{1E119CE9-B343-4265-9F4A-0864581E65E7}" dt="2019-12-01T23:51:15.746" v="100" actId="20577"/>
+          <ac:chgData name="Anthony Sanchez-Ayra" userId="6745e27f37c7945b" providerId="LiveId" clId="{1E119CE9-B343-4265-9F4A-0864581E65E7}" dt="2019-12-02T03:37:46.789" v="1292" actId="20577"/>
           <ac:spMkLst>
             <pc:docMk/>
             <pc:sldMk cId="499540092" sldId="268"/>
@@ -189,13 +245,13 @@
         </pc:spChg>
       </pc:sldChg>
       <pc:sldChg chg="delSp modSp modNotesTx">
-        <pc:chgData name="Anthony Sanchez-Ayra" userId="6745e27f37c7945b" providerId="LiveId" clId="{1E119CE9-B343-4265-9F4A-0864581E65E7}" dt="2019-12-02T00:04:24.122" v="731" actId="1076"/>
+        <pc:chgData name="Anthony Sanchez-Ayra" userId="6745e27f37c7945b" providerId="LiveId" clId="{1E119CE9-B343-4265-9F4A-0864581E65E7}" dt="2019-12-02T04:27:43.499" v="1460" actId="20577"/>
         <pc:sldMkLst>
           <pc:docMk/>
           <pc:sldMk cId="3606661239" sldId="269"/>
         </pc:sldMkLst>
         <pc:spChg chg="mod">
-          <ac:chgData name="Anthony Sanchez-Ayra" userId="6745e27f37c7945b" providerId="LiveId" clId="{1E119CE9-B343-4265-9F4A-0864581E65E7}" dt="2019-12-02T00:01:14.266" v="690" actId="20577"/>
+          <ac:chgData name="Anthony Sanchez-Ayra" userId="6745e27f37c7945b" providerId="LiveId" clId="{1E119CE9-B343-4265-9F4A-0864581E65E7}" dt="2019-12-02T03:37:52.217" v="1295" actId="1076"/>
           <ac:spMkLst>
             <pc:docMk/>
             <pc:sldMk cId="3606661239" sldId="269"/>
@@ -203,7 +259,7 @@
           </ac:spMkLst>
         </pc:spChg>
         <pc:spChg chg="mod">
-          <ac:chgData name="Anthony Sanchez-Ayra" userId="6745e27f37c7945b" providerId="LiveId" clId="{1E119CE9-B343-4265-9F4A-0864581E65E7}" dt="2019-12-02T00:04:24.122" v="731" actId="1076"/>
+          <ac:chgData name="Anthony Sanchez-Ayra" userId="6745e27f37c7945b" providerId="LiveId" clId="{1E119CE9-B343-4265-9F4A-0864581E65E7}" dt="2019-12-02T03:38:40.012" v="1299" actId="403"/>
           <ac:spMkLst>
             <pc:docMk/>
             <pc:sldMk cId="3606661239" sldId="269"/>
@@ -227,15 +283,99 @@
           </ac:spMkLst>
         </pc:spChg>
       </pc:sldChg>
-      <pc:sldChg chg="modNotesTx">
-        <pc:chgData name="Anthony Sanchez-Ayra" userId="6745e27f37c7945b" providerId="LiveId" clId="{1E119CE9-B343-4265-9F4A-0864581E65E7}" dt="2019-12-01T23:40:09.142" v="66" actId="20577"/>
+      <pc:sldChg chg="addSp modSp ord modNotesTx">
+        <pc:chgData name="Anthony Sanchez-Ayra" userId="6745e27f37c7945b" providerId="LiveId" clId="{1E119CE9-B343-4265-9F4A-0864581E65E7}" dt="2019-12-02T04:27:46.306" v="1465" actId="20577"/>
         <pc:sldMkLst>
           <pc:docMk/>
           <pc:sldMk cId="2311186588" sldId="270"/>
         </pc:sldMkLst>
+        <pc:spChg chg="mod">
+          <ac:chgData name="Anthony Sanchez-Ayra" userId="6745e27f37c7945b" providerId="LiveId" clId="{1E119CE9-B343-4265-9F4A-0864581E65E7}" dt="2019-12-02T03:45:05.850" v="1307" actId="20577"/>
+          <ac:spMkLst>
+            <pc:docMk/>
+            <pc:sldMk cId="2311186588" sldId="270"/>
+            <ac:spMk id="2" creationId="{13E81D7D-0FCE-41E5-A10E-4D37B63C5AEA}"/>
+          </ac:spMkLst>
+        </pc:spChg>
+        <pc:spChg chg="mod">
+          <ac:chgData name="Anthony Sanchez-Ayra" userId="6745e27f37c7945b" providerId="LiveId" clId="{1E119CE9-B343-4265-9F4A-0864581E65E7}" dt="2019-12-02T03:26:54.337" v="895" actId="14100"/>
+          <ac:spMkLst>
+            <pc:docMk/>
+            <pc:sldMk cId="2311186588" sldId="270"/>
+            <ac:spMk id="4" creationId="{BFC6A109-35D1-40A0-A541-34831739E181}"/>
+          </ac:spMkLst>
+        </pc:spChg>
+        <pc:spChg chg="add">
+          <ac:chgData name="Anthony Sanchez-Ayra" userId="6745e27f37c7945b" providerId="LiveId" clId="{1E119CE9-B343-4265-9F4A-0864581E65E7}" dt="2019-12-02T03:41:43.141" v="1300"/>
+          <ac:spMkLst>
+            <pc:docMk/>
+            <pc:sldMk cId="2311186588" sldId="270"/>
+            <ac:spMk id="5" creationId="{933B5355-0805-432D-94DE-96121B93A1C4}"/>
+          </ac:spMkLst>
+        </pc:spChg>
       </pc:sldChg>
-      <pc:sldChg chg="addSp delSp modSp add">
-        <pc:chgData name="Anthony Sanchez-Ayra" userId="6745e27f37c7945b" providerId="LiveId" clId="{1E119CE9-B343-4265-9F4A-0864581E65E7}" dt="2019-12-01T23:37:32.048" v="65" actId="14100"/>
+      <pc:sldChg chg="modNotesTx">
+        <pc:chgData name="Anthony Sanchez-Ayra" userId="6745e27f37c7945b" providerId="LiveId" clId="{1E119CE9-B343-4265-9F4A-0864581E65E7}" dt="2019-12-02T04:26:37.591" v="1413" actId="20577"/>
+        <pc:sldMkLst>
+          <pc:docMk/>
+          <pc:sldMk cId="1364555815" sldId="272"/>
+        </pc:sldMkLst>
+      </pc:sldChg>
+      <pc:sldChg chg="modNotesTx">
+        <pc:chgData name="Anthony Sanchez-Ayra" userId="6745e27f37c7945b" providerId="LiveId" clId="{1E119CE9-B343-4265-9F4A-0864581E65E7}" dt="2019-12-02T04:25:44.478" v="1374" actId="20577"/>
+        <pc:sldMkLst>
+          <pc:docMk/>
+          <pc:sldMk cId="766670131" sldId="274"/>
+        </pc:sldMkLst>
+      </pc:sldChg>
+      <pc:sldChg chg="modNotesTx">
+        <pc:chgData name="Anthony Sanchez-Ayra" userId="6745e27f37c7945b" providerId="LiveId" clId="{1E119CE9-B343-4265-9F4A-0864581E65E7}" dt="2019-12-02T04:25:39.849" v="1367" actId="20577"/>
+        <pc:sldMkLst>
+          <pc:docMk/>
+          <pc:sldMk cId="1525650455" sldId="275"/>
+        </pc:sldMkLst>
+      </pc:sldChg>
+      <pc:sldChg chg="delSp modSp modNotesTx">
+        <pc:chgData name="Anthony Sanchez-Ayra" userId="6745e27f37c7945b" providerId="LiveId" clId="{1E119CE9-B343-4265-9F4A-0864581E65E7}" dt="2019-12-02T04:27:49.236" v="1470" actId="20577"/>
+        <pc:sldMkLst>
+          <pc:docMk/>
+          <pc:sldMk cId="1439157380" sldId="276"/>
+        </pc:sldMkLst>
+        <pc:spChg chg="mod">
+          <ac:chgData name="Anthony Sanchez-Ayra" userId="6745e27f37c7945b" providerId="LiveId" clId="{1E119CE9-B343-4265-9F4A-0864581E65E7}" dt="2019-12-02T03:46:23.412" v="1318" actId="20577"/>
+          <ac:spMkLst>
+            <pc:docMk/>
+            <pc:sldMk cId="1439157380" sldId="276"/>
+            <ac:spMk id="2" creationId="{FFFE89ED-01E5-4E1B-9201-12C93870AD80}"/>
+          </ac:spMkLst>
+        </pc:spChg>
+        <pc:spChg chg="mod">
+          <ac:chgData name="Anthony Sanchez-Ayra" userId="6745e27f37c7945b" providerId="LiveId" clId="{1E119CE9-B343-4265-9F4A-0864581E65E7}" dt="2019-12-02T03:32:44.743" v="1290" actId="20577"/>
+          <ac:spMkLst>
+            <pc:docMk/>
+            <pc:sldMk cId="1439157380" sldId="276"/>
+            <ac:spMk id="3" creationId="{5B079968-7DBE-46BE-A3D1-03B350494655}"/>
+          </ac:spMkLst>
+        </pc:spChg>
+        <pc:spChg chg="del">
+          <ac:chgData name="Anthony Sanchez-Ayra" userId="6745e27f37c7945b" providerId="LiveId" clId="{1E119CE9-B343-4265-9F4A-0864581E65E7}" dt="2019-12-02T03:27:52.975" v="912" actId="478"/>
+          <ac:spMkLst>
+            <pc:docMk/>
+            <pc:sldMk cId="1439157380" sldId="276"/>
+            <ac:spMk id="4" creationId="{C4A5E8AD-809C-46EF-BE25-2008705C0571}"/>
+          </ac:spMkLst>
+        </pc:spChg>
+        <pc:spChg chg="mod">
+          <ac:chgData name="Anthony Sanchez-Ayra" userId="6745e27f37c7945b" providerId="LiveId" clId="{1E119CE9-B343-4265-9F4A-0864581E65E7}" dt="2019-12-02T03:28:35.238" v="931" actId="1076"/>
+          <ac:spMkLst>
+            <pc:docMk/>
+            <pc:sldMk cId="1439157380" sldId="276"/>
+            <ac:spMk id="5" creationId="{CC43888F-7DBD-48AA-91C4-3F819CF03126}"/>
+          </ac:spMkLst>
+        </pc:spChg>
+      </pc:sldChg>
+      <pc:sldChg chg="addSp delSp modSp add modNotesTx">
+        <pc:chgData name="Anthony Sanchez-Ayra" userId="6745e27f37c7945b" providerId="LiveId" clId="{1E119CE9-B343-4265-9F4A-0864581E65E7}" dt="2019-12-02T04:27:23.544" v="1449" actId="20577"/>
         <pc:sldMkLst>
           <pc:docMk/>
           <pc:sldMk cId="1414546480" sldId="277"/>
@@ -1325,7 +1465,10 @@
           <a:bodyPr/>
           <a:lstStyle/>
           <a:p>
-            <a:endParaRPr lang="en-US" dirty="0"/>
+            <a:r>
+              <a:rPr lang="en-US" dirty="0"/>
+              <a:t>Kian</a:t>
+            </a:r>
           </a:p>
         </p:txBody>
       </p:sp>
@@ -1346,7 +1489,7 @@
           <a:p>
             <a:fld id="{EF0E9F11-5378-4ADA-BF65-D7EDB1D950CD}" type="slidenum">
               <a:rPr lang="en-US" smtClean="0"/>
-              <a:t>4</a:t>
+              <a:t>1</a:t>
             </a:fld>
             <a:endParaRPr lang="en-US"/>
           </a:p>
@@ -1355,7 +1498,630 @@
     </p:spTree>
     <p:extLst>
       <p:ext uri="{BB962C8B-B14F-4D97-AF65-F5344CB8AC3E}">
-        <p14:creationId xmlns:p14="http://schemas.microsoft.com/office/powerpoint/2010/main" val="3586693593"/>
+        <p14:creationId xmlns:p14="http://schemas.microsoft.com/office/powerpoint/2010/main" val="2564477559"/>
+      </p:ext>
+    </p:extLst>
+  </p:cSld>
+  <p:clrMapOvr>
+    <a:masterClrMapping/>
+  </p:clrMapOvr>
+</p:notes>
+</file>
+
+<file path=ppt/notesSlides/notesSlide10.xml><?xml version="1.0" encoding="utf-8"?>
+<p:notes xmlns:a="http://schemas.openxmlformats.org/drawingml/2006/main" xmlns:r="http://schemas.openxmlformats.org/officeDocument/2006/relationships" xmlns:p="http://schemas.openxmlformats.org/presentationml/2006/main">
+  <p:cSld>
+    <p:spTree>
+      <p:nvGrpSpPr>
+        <p:cNvPr id="1" name=""/>
+        <p:cNvGrpSpPr/>
+        <p:nvPr/>
+      </p:nvGrpSpPr>
+      <p:grpSpPr>
+        <a:xfrm>
+          <a:off x="0" y="0"/>
+          <a:ext cx="0" cy="0"/>
+          <a:chOff x="0" y="0"/>
+          <a:chExt cx="0" cy="0"/>
+        </a:xfrm>
+      </p:grpSpPr>
+      <p:sp>
+        <p:nvSpPr>
+          <p:cNvPr id="2" name="Slide Image Placeholder 1"/>
+          <p:cNvSpPr>
+            <a:spLocks noGrp="1" noRot="1" noChangeAspect="1"/>
+          </p:cNvSpPr>
+          <p:nvPr>
+            <p:ph type="sldImg"/>
+          </p:nvPr>
+        </p:nvSpPr>
+        <p:spPr/>
+      </p:sp>
+      <p:sp>
+        <p:nvSpPr>
+          <p:cNvPr id="3" name="Notes Placeholder 2"/>
+          <p:cNvSpPr>
+            <a:spLocks noGrp="1"/>
+          </p:cNvSpPr>
+          <p:nvPr>
+            <p:ph type="body" idx="1"/>
+          </p:nvPr>
+        </p:nvSpPr>
+        <p:spPr/>
+        <p:txBody>
+          <a:bodyPr/>
+          <a:lstStyle/>
+          <a:p>
+            <a:r>
+              <a:rPr lang="en-US" dirty="0"/>
+              <a:t>Armando</a:t>
+            </a:r>
+          </a:p>
+        </p:txBody>
+      </p:sp>
+      <p:sp>
+        <p:nvSpPr>
+          <p:cNvPr id="4" name="Slide Number Placeholder 3"/>
+          <p:cNvSpPr>
+            <a:spLocks noGrp="1"/>
+          </p:cNvSpPr>
+          <p:nvPr>
+            <p:ph type="sldNum" sz="quarter" idx="5"/>
+          </p:nvPr>
+        </p:nvSpPr>
+        <p:spPr/>
+        <p:txBody>
+          <a:bodyPr/>
+          <a:lstStyle/>
+          <a:p>
+            <a:fld id="{EF0E9F11-5378-4ADA-BF65-D7EDB1D950CD}" type="slidenum">
+              <a:rPr lang="en-US" smtClean="0"/>
+              <a:t>12</a:t>
+            </a:fld>
+            <a:endParaRPr lang="en-US"/>
+          </a:p>
+        </p:txBody>
+      </p:sp>
+    </p:spTree>
+    <p:extLst>
+      <p:ext uri="{BB962C8B-B14F-4D97-AF65-F5344CB8AC3E}">
+        <p14:creationId xmlns:p14="http://schemas.microsoft.com/office/powerpoint/2010/main" val="2477238698"/>
+      </p:ext>
+    </p:extLst>
+  </p:cSld>
+  <p:clrMapOvr>
+    <a:masterClrMapping/>
+  </p:clrMapOvr>
+</p:notes>
+</file>
+
+<file path=ppt/notesSlides/notesSlide11.xml><?xml version="1.0" encoding="utf-8"?>
+<p:notes xmlns:a="http://schemas.openxmlformats.org/drawingml/2006/main" xmlns:r="http://schemas.openxmlformats.org/officeDocument/2006/relationships" xmlns:p="http://schemas.openxmlformats.org/presentationml/2006/main">
+  <p:cSld>
+    <p:spTree>
+      <p:nvGrpSpPr>
+        <p:cNvPr id="1" name=""/>
+        <p:cNvGrpSpPr/>
+        <p:nvPr/>
+      </p:nvGrpSpPr>
+      <p:grpSpPr>
+        <a:xfrm>
+          <a:off x="0" y="0"/>
+          <a:ext cx="0" cy="0"/>
+          <a:chOff x="0" y="0"/>
+          <a:chExt cx="0" cy="0"/>
+        </a:xfrm>
+      </p:grpSpPr>
+      <p:sp>
+        <p:nvSpPr>
+          <p:cNvPr id="2" name="Slide Image Placeholder 1"/>
+          <p:cNvSpPr>
+            <a:spLocks noGrp="1" noRot="1" noChangeAspect="1"/>
+          </p:cNvSpPr>
+          <p:nvPr>
+            <p:ph type="sldImg"/>
+          </p:nvPr>
+        </p:nvSpPr>
+        <p:spPr/>
+      </p:sp>
+      <p:sp>
+        <p:nvSpPr>
+          <p:cNvPr id="3" name="Notes Placeholder 2"/>
+          <p:cNvSpPr>
+            <a:spLocks noGrp="1"/>
+          </p:cNvSpPr>
+          <p:nvPr>
+            <p:ph type="body" idx="1"/>
+          </p:nvPr>
+        </p:nvSpPr>
+        <p:spPr/>
+        <p:txBody>
+          <a:bodyPr/>
+          <a:lstStyle/>
+          <a:p>
+            <a:r>
+              <a:rPr lang="en-US" dirty="0"/>
+              <a:t>Needs to be updated</a:t>
+            </a:r>
+          </a:p>
+          <a:p>
+            <a:r>
+              <a:rPr lang="en-US" dirty="0"/>
+              <a:t>Anthony</a:t>
+            </a:r>
+          </a:p>
+        </p:txBody>
+      </p:sp>
+      <p:sp>
+        <p:nvSpPr>
+          <p:cNvPr id="4" name="Slide Number Placeholder 3"/>
+          <p:cNvSpPr>
+            <a:spLocks noGrp="1"/>
+          </p:cNvSpPr>
+          <p:nvPr>
+            <p:ph type="sldNum" sz="quarter" idx="5"/>
+          </p:nvPr>
+        </p:nvSpPr>
+        <p:spPr/>
+        <p:txBody>
+          <a:bodyPr/>
+          <a:lstStyle/>
+          <a:p>
+            <a:fld id="{EF0E9F11-5378-4ADA-BF65-D7EDB1D950CD}" type="slidenum">
+              <a:rPr lang="en-US" smtClean="0"/>
+              <a:t>13</a:t>
+            </a:fld>
+            <a:endParaRPr lang="en-US"/>
+          </a:p>
+        </p:txBody>
+      </p:sp>
+    </p:spTree>
+    <p:extLst>
+      <p:ext uri="{BB962C8B-B14F-4D97-AF65-F5344CB8AC3E}">
+        <p14:creationId xmlns:p14="http://schemas.microsoft.com/office/powerpoint/2010/main" val="2033806104"/>
+      </p:ext>
+    </p:extLst>
+  </p:cSld>
+  <p:clrMapOvr>
+    <a:masterClrMapping/>
+  </p:clrMapOvr>
+</p:notes>
+</file>
+
+<file path=ppt/notesSlides/notesSlide12.xml><?xml version="1.0" encoding="utf-8"?>
+<p:notes xmlns:a="http://schemas.openxmlformats.org/drawingml/2006/main" xmlns:r="http://schemas.openxmlformats.org/officeDocument/2006/relationships" xmlns:p="http://schemas.openxmlformats.org/presentationml/2006/main">
+  <p:cSld>
+    <p:spTree>
+      <p:nvGrpSpPr>
+        <p:cNvPr id="1" name=""/>
+        <p:cNvGrpSpPr/>
+        <p:nvPr/>
+      </p:nvGrpSpPr>
+      <p:grpSpPr>
+        <a:xfrm>
+          <a:off x="0" y="0"/>
+          <a:ext cx="0" cy="0"/>
+          <a:chOff x="0" y="0"/>
+          <a:chExt cx="0" cy="0"/>
+        </a:xfrm>
+      </p:grpSpPr>
+      <p:sp>
+        <p:nvSpPr>
+          <p:cNvPr id="2" name="Slide Image Placeholder 1"/>
+          <p:cNvSpPr>
+            <a:spLocks noGrp="1" noRot="1" noChangeAspect="1"/>
+          </p:cNvSpPr>
+          <p:nvPr>
+            <p:ph type="sldImg"/>
+          </p:nvPr>
+        </p:nvSpPr>
+        <p:spPr/>
+      </p:sp>
+      <p:sp>
+        <p:nvSpPr>
+          <p:cNvPr id="3" name="Notes Placeholder 2"/>
+          <p:cNvSpPr>
+            <a:spLocks noGrp="1"/>
+          </p:cNvSpPr>
+          <p:nvPr>
+            <p:ph type="body" idx="1"/>
+          </p:nvPr>
+        </p:nvSpPr>
+        <p:spPr/>
+        <p:txBody>
+          <a:bodyPr/>
+          <a:lstStyle/>
+          <a:p>
+            <a:r>
+              <a:rPr lang="en-US" dirty="0"/>
+              <a:t>Needs to be updated</a:t>
+            </a:r>
+          </a:p>
+          <a:p>
+            <a:r>
+              <a:rPr lang="en-US" dirty="0"/>
+              <a:t>Anthony</a:t>
+            </a:r>
+          </a:p>
+        </p:txBody>
+      </p:sp>
+      <p:sp>
+        <p:nvSpPr>
+          <p:cNvPr id="4" name="Slide Number Placeholder 3"/>
+          <p:cNvSpPr>
+            <a:spLocks noGrp="1"/>
+          </p:cNvSpPr>
+          <p:nvPr>
+            <p:ph type="sldNum" sz="quarter" idx="5"/>
+          </p:nvPr>
+        </p:nvSpPr>
+        <p:spPr/>
+        <p:txBody>
+          <a:bodyPr/>
+          <a:lstStyle/>
+          <a:p>
+            <a:fld id="{EF0E9F11-5378-4ADA-BF65-D7EDB1D950CD}" type="slidenum">
+              <a:rPr lang="en-US" smtClean="0"/>
+              <a:t>14</a:t>
+            </a:fld>
+            <a:endParaRPr lang="en-US"/>
+          </a:p>
+        </p:txBody>
+      </p:sp>
+    </p:spTree>
+    <p:extLst>
+      <p:ext uri="{BB962C8B-B14F-4D97-AF65-F5344CB8AC3E}">
+        <p14:creationId xmlns:p14="http://schemas.microsoft.com/office/powerpoint/2010/main" val="3485556174"/>
+      </p:ext>
+    </p:extLst>
+  </p:cSld>
+  <p:clrMapOvr>
+    <a:masterClrMapping/>
+  </p:clrMapOvr>
+</p:notes>
+</file>
+
+<file path=ppt/notesSlides/notesSlide13.xml><?xml version="1.0" encoding="utf-8"?>
+<p:notes xmlns:a="http://schemas.openxmlformats.org/drawingml/2006/main" xmlns:r="http://schemas.openxmlformats.org/officeDocument/2006/relationships" xmlns:p="http://schemas.openxmlformats.org/presentationml/2006/main">
+  <p:cSld>
+    <p:spTree>
+      <p:nvGrpSpPr>
+        <p:cNvPr id="1" name=""/>
+        <p:cNvGrpSpPr/>
+        <p:nvPr/>
+      </p:nvGrpSpPr>
+      <p:grpSpPr>
+        <a:xfrm>
+          <a:off x="0" y="0"/>
+          <a:ext cx="0" cy="0"/>
+          <a:chOff x="0" y="0"/>
+          <a:chExt cx="0" cy="0"/>
+        </a:xfrm>
+      </p:grpSpPr>
+      <p:sp>
+        <p:nvSpPr>
+          <p:cNvPr id="2" name="Slide Image Placeholder 1"/>
+          <p:cNvSpPr>
+            <a:spLocks noGrp="1" noRot="1" noChangeAspect="1"/>
+          </p:cNvSpPr>
+          <p:nvPr>
+            <p:ph type="sldImg"/>
+          </p:nvPr>
+        </p:nvSpPr>
+        <p:spPr/>
+      </p:sp>
+      <p:sp>
+        <p:nvSpPr>
+          <p:cNvPr id="3" name="Notes Placeholder 2"/>
+          <p:cNvSpPr>
+            <a:spLocks noGrp="1"/>
+          </p:cNvSpPr>
+          <p:nvPr>
+            <p:ph type="body" idx="1"/>
+          </p:nvPr>
+        </p:nvSpPr>
+        <p:spPr/>
+        <p:txBody>
+          <a:bodyPr/>
+          <a:lstStyle/>
+          <a:p>
+            <a:r>
+              <a:rPr lang="en-US" dirty="0"/>
+              <a:t>Kian</a:t>
+            </a:r>
+          </a:p>
+        </p:txBody>
+      </p:sp>
+      <p:sp>
+        <p:nvSpPr>
+          <p:cNvPr id="4" name="Slide Number Placeholder 3"/>
+          <p:cNvSpPr>
+            <a:spLocks noGrp="1"/>
+          </p:cNvSpPr>
+          <p:nvPr>
+            <p:ph type="sldNum" sz="quarter" idx="5"/>
+          </p:nvPr>
+        </p:nvSpPr>
+        <p:spPr/>
+        <p:txBody>
+          <a:bodyPr/>
+          <a:lstStyle/>
+          <a:p>
+            <a:fld id="{EF0E9F11-5378-4ADA-BF65-D7EDB1D950CD}" type="slidenum">
+              <a:rPr lang="en-US" smtClean="0"/>
+              <a:t>15</a:t>
+            </a:fld>
+            <a:endParaRPr lang="en-US"/>
+          </a:p>
+        </p:txBody>
+      </p:sp>
+    </p:spTree>
+    <p:extLst>
+      <p:ext uri="{BB962C8B-B14F-4D97-AF65-F5344CB8AC3E}">
+        <p14:creationId xmlns:p14="http://schemas.microsoft.com/office/powerpoint/2010/main" val="3792363433"/>
+      </p:ext>
+    </p:extLst>
+  </p:cSld>
+  <p:clrMapOvr>
+    <a:masterClrMapping/>
+  </p:clrMapOvr>
+</p:notes>
+</file>
+
+<file path=ppt/notesSlides/notesSlide14.xml><?xml version="1.0" encoding="utf-8"?>
+<p:notes xmlns:a="http://schemas.openxmlformats.org/drawingml/2006/main" xmlns:r="http://schemas.openxmlformats.org/officeDocument/2006/relationships" xmlns:p="http://schemas.openxmlformats.org/presentationml/2006/main">
+  <p:cSld>
+    <p:spTree>
+      <p:nvGrpSpPr>
+        <p:cNvPr id="1" name=""/>
+        <p:cNvGrpSpPr/>
+        <p:nvPr/>
+      </p:nvGrpSpPr>
+      <p:grpSpPr>
+        <a:xfrm>
+          <a:off x="0" y="0"/>
+          <a:ext cx="0" cy="0"/>
+          <a:chOff x="0" y="0"/>
+          <a:chExt cx="0" cy="0"/>
+        </a:xfrm>
+      </p:grpSpPr>
+      <p:sp>
+        <p:nvSpPr>
+          <p:cNvPr id="2" name="Slide Image Placeholder 1"/>
+          <p:cNvSpPr>
+            <a:spLocks noGrp="1" noRot="1" noChangeAspect="1"/>
+          </p:cNvSpPr>
+          <p:nvPr>
+            <p:ph type="sldImg"/>
+          </p:nvPr>
+        </p:nvSpPr>
+        <p:spPr/>
+      </p:sp>
+      <p:sp>
+        <p:nvSpPr>
+          <p:cNvPr id="3" name="Notes Placeholder 2"/>
+          <p:cNvSpPr>
+            <a:spLocks noGrp="1"/>
+          </p:cNvSpPr>
+          <p:nvPr>
+            <p:ph type="body" idx="1"/>
+          </p:nvPr>
+        </p:nvSpPr>
+        <p:spPr/>
+        <p:txBody>
+          <a:bodyPr/>
+          <a:lstStyle/>
+          <a:p>
+            <a:r>
+              <a:rPr lang="en-US" dirty="0" err="1"/>
+              <a:t>Teriq</a:t>
+            </a:r>
+            <a:endParaRPr lang="en-US" dirty="0"/>
+          </a:p>
+        </p:txBody>
+      </p:sp>
+      <p:sp>
+        <p:nvSpPr>
+          <p:cNvPr id="4" name="Slide Number Placeholder 3"/>
+          <p:cNvSpPr>
+            <a:spLocks noGrp="1"/>
+          </p:cNvSpPr>
+          <p:nvPr>
+            <p:ph type="sldNum" sz="quarter" idx="5"/>
+          </p:nvPr>
+        </p:nvSpPr>
+        <p:spPr/>
+        <p:txBody>
+          <a:bodyPr/>
+          <a:lstStyle/>
+          <a:p>
+            <a:fld id="{EF0E9F11-5378-4ADA-BF65-D7EDB1D950CD}" type="slidenum">
+              <a:rPr lang="en-US" smtClean="0"/>
+              <a:t>16</a:t>
+            </a:fld>
+            <a:endParaRPr lang="en-US"/>
+          </a:p>
+        </p:txBody>
+      </p:sp>
+    </p:spTree>
+    <p:extLst>
+      <p:ext uri="{BB962C8B-B14F-4D97-AF65-F5344CB8AC3E}">
+        <p14:creationId xmlns:p14="http://schemas.microsoft.com/office/powerpoint/2010/main" val="1083633083"/>
+      </p:ext>
+    </p:extLst>
+  </p:cSld>
+  <p:clrMapOvr>
+    <a:masterClrMapping/>
+  </p:clrMapOvr>
+</p:notes>
+</file>
+
+<file path=ppt/notesSlides/notesSlide15.xml><?xml version="1.0" encoding="utf-8"?>
+<p:notes xmlns:a="http://schemas.openxmlformats.org/drawingml/2006/main" xmlns:r="http://schemas.openxmlformats.org/officeDocument/2006/relationships" xmlns:p="http://schemas.openxmlformats.org/presentationml/2006/main">
+  <p:cSld>
+    <p:spTree>
+      <p:nvGrpSpPr>
+        <p:cNvPr id="1" name=""/>
+        <p:cNvGrpSpPr/>
+        <p:nvPr/>
+      </p:nvGrpSpPr>
+      <p:grpSpPr>
+        <a:xfrm>
+          <a:off x="0" y="0"/>
+          <a:ext cx="0" cy="0"/>
+          <a:chOff x="0" y="0"/>
+          <a:chExt cx="0" cy="0"/>
+        </a:xfrm>
+      </p:grpSpPr>
+      <p:sp>
+        <p:nvSpPr>
+          <p:cNvPr id="2" name="Slide Image Placeholder 1"/>
+          <p:cNvSpPr>
+            <a:spLocks noGrp="1" noRot="1" noChangeAspect="1"/>
+          </p:cNvSpPr>
+          <p:nvPr>
+            <p:ph type="sldImg"/>
+          </p:nvPr>
+        </p:nvSpPr>
+        <p:spPr/>
+      </p:sp>
+      <p:sp>
+        <p:nvSpPr>
+          <p:cNvPr id="3" name="Notes Placeholder 2"/>
+          <p:cNvSpPr>
+            <a:spLocks noGrp="1"/>
+          </p:cNvSpPr>
+          <p:nvPr>
+            <p:ph type="body" idx="1"/>
+          </p:nvPr>
+        </p:nvSpPr>
+        <p:spPr/>
+        <p:txBody>
+          <a:bodyPr/>
+          <a:lstStyle/>
+          <a:p>
+            <a:r>
+              <a:rPr lang="en-US" dirty="0" err="1"/>
+              <a:t>Teriq</a:t>
+            </a:r>
+            <a:endParaRPr lang="en-US" dirty="0"/>
+          </a:p>
+        </p:txBody>
+      </p:sp>
+      <p:sp>
+        <p:nvSpPr>
+          <p:cNvPr id="4" name="Slide Number Placeholder 3"/>
+          <p:cNvSpPr>
+            <a:spLocks noGrp="1"/>
+          </p:cNvSpPr>
+          <p:nvPr>
+            <p:ph type="sldNum" sz="quarter" idx="5"/>
+          </p:nvPr>
+        </p:nvSpPr>
+        <p:spPr/>
+        <p:txBody>
+          <a:bodyPr/>
+          <a:lstStyle/>
+          <a:p>
+            <a:fld id="{EF0E9F11-5378-4ADA-BF65-D7EDB1D950CD}" type="slidenum">
+              <a:rPr lang="en-US" smtClean="0"/>
+              <a:t>17</a:t>
+            </a:fld>
+            <a:endParaRPr lang="en-US"/>
+          </a:p>
+        </p:txBody>
+      </p:sp>
+    </p:spTree>
+    <p:extLst>
+      <p:ext uri="{BB962C8B-B14F-4D97-AF65-F5344CB8AC3E}">
+        <p14:creationId xmlns:p14="http://schemas.microsoft.com/office/powerpoint/2010/main" val="485442747"/>
+      </p:ext>
+    </p:extLst>
+  </p:cSld>
+  <p:clrMapOvr>
+    <a:masterClrMapping/>
+  </p:clrMapOvr>
+</p:notes>
+</file>
+
+<file path=ppt/notesSlides/notesSlide16.xml><?xml version="1.0" encoding="utf-8"?>
+<p:notes xmlns:a="http://schemas.openxmlformats.org/drawingml/2006/main" xmlns:r="http://schemas.openxmlformats.org/officeDocument/2006/relationships" xmlns:p="http://schemas.openxmlformats.org/presentationml/2006/main">
+  <p:cSld>
+    <p:spTree>
+      <p:nvGrpSpPr>
+        <p:cNvPr id="1" name=""/>
+        <p:cNvGrpSpPr/>
+        <p:nvPr/>
+      </p:nvGrpSpPr>
+      <p:grpSpPr>
+        <a:xfrm>
+          <a:off x="0" y="0"/>
+          <a:ext cx="0" cy="0"/>
+          <a:chOff x="0" y="0"/>
+          <a:chExt cx="0" cy="0"/>
+        </a:xfrm>
+      </p:grpSpPr>
+      <p:sp>
+        <p:nvSpPr>
+          <p:cNvPr id="2" name="Slide Image Placeholder 1"/>
+          <p:cNvSpPr>
+            <a:spLocks noGrp="1" noRot="1" noChangeAspect="1"/>
+          </p:cNvSpPr>
+          <p:nvPr>
+            <p:ph type="sldImg"/>
+          </p:nvPr>
+        </p:nvSpPr>
+        <p:spPr/>
+      </p:sp>
+      <p:sp>
+        <p:nvSpPr>
+          <p:cNvPr id="3" name="Notes Placeholder 2"/>
+          <p:cNvSpPr>
+            <a:spLocks noGrp="1"/>
+          </p:cNvSpPr>
+          <p:nvPr>
+            <p:ph type="body" idx="1"/>
+          </p:nvPr>
+        </p:nvSpPr>
+        <p:spPr/>
+        <p:txBody>
+          <a:bodyPr/>
+          <a:lstStyle/>
+          <a:p>
+            <a:r>
+              <a:rPr lang="en-US"/>
+              <a:t>Teriq</a:t>
+            </a:r>
+          </a:p>
+        </p:txBody>
+      </p:sp>
+      <p:sp>
+        <p:nvSpPr>
+          <p:cNvPr id="4" name="Slide Number Placeholder 3"/>
+          <p:cNvSpPr>
+            <a:spLocks noGrp="1"/>
+          </p:cNvSpPr>
+          <p:nvPr>
+            <p:ph type="sldNum" sz="quarter" idx="5"/>
+          </p:nvPr>
+        </p:nvSpPr>
+        <p:spPr/>
+        <p:txBody>
+          <a:bodyPr/>
+          <a:lstStyle/>
+          <a:p>
+            <a:fld id="{EF0E9F11-5378-4ADA-BF65-D7EDB1D950CD}" type="slidenum">
+              <a:rPr lang="en-US" smtClean="0"/>
+              <a:t>18</a:t>
+            </a:fld>
+            <a:endParaRPr lang="en-US"/>
+          </a:p>
+        </p:txBody>
+      </p:sp>
+    </p:spTree>
+    <p:extLst>
+      <p:ext uri="{BB962C8B-B14F-4D97-AF65-F5344CB8AC3E}">
+        <p14:creationId xmlns:p14="http://schemas.microsoft.com/office/powerpoint/2010/main" val="3623266170"/>
       </p:ext>
     </p:extLst>
   </p:cSld>
@@ -1411,7 +2177,7 @@
           <a:p>
             <a:r>
               <a:rPr lang="en-US" dirty="0"/>
-              <a:t>Risk to implement is medium since it requires web-based technology.</a:t>
+              <a:t>Armando</a:t>
             </a:r>
           </a:p>
         </p:txBody>
@@ -1433,7 +2199,7 @@
           <a:p>
             <a:fld id="{EF0E9F11-5378-4ADA-BF65-D7EDB1D950CD}" type="slidenum">
               <a:rPr lang="en-US" smtClean="0"/>
-              <a:t>6</a:t>
+              <a:t>2</a:t>
             </a:fld>
             <a:endParaRPr lang="en-US"/>
           </a:p>
@@ -1442,7 +2208,7 @@
     </p:spTree>
     <p:extLst>
       <p:ext uri="{BB962C8B-B14F-4D97-AF65-F5344CB8AC3E}">
-        <p14:creationId xmlns:p14="http://schemas.microsoft.com/office/powerpoint/2010/main" val="675250389"/>
+        <p14:creationId xmlns:p14="http://schemas.microsoft.com/office/powerpoint/2010/main" val="951982814"/>
       </p:ext>
     </p:extLst>
   </p:cSld>
@@ -1496,7 +2262,10 @@
           <a:bodyPr/>
           <a:lstStyle/>
           <a:p>
-            <a:endParaRPr lang="en-US" dirty="0"/>
+            <a:r>
+              <a:rPr lang="en-US" dirty="0"/>
+              <a:t>Armando</a:t>
+            </a:r>
           </a:p>
         </p:txBody>
       </p:sp>
@@ -1517,7 +2286,7 @@
           <a:p>
             <a:fld id="{EF0E9F11-5378-4ADA-BF65-D7EDB1D950CD}" type="slidenum">
               <a:rPr lang="en-US" smtClean="0"/>
-              <a:t>12</a:t>
+              <a:t>3</a:t>
             </a:fld>
             <a:endParaRPr lang="en-US"/>
           </a:p>
@@ -1526,7 +2295,7 @@
     </p:spTree>
     <p:extLst>
       <p:ext uri="{BB962C8B-B14F-4D97-AF65-F5344CB8AC3E}">
-        <p14:creationId xmlns:p14="http://schemas.microsoft.com/office/powerpoint/2010/main" val="2477238698"/>
+        <p14:creationId xmlns:p14="http://schemas.microsoft.com/office/powerpoint/2010/main" val="3631451433"/>
       </p:ext>
     </p:extLst>
   </p:cSld>
@@ -1580,6 +2349,10 @@
           <a:bodyPr/>
           <a:lstStyle/>
           <a:p>
+            <a:r>
+              <a:rPr lang="en-US" dirty="0" err="1"/>
+              <a:t>Yovanni</a:t>
+            </a:r>
             <a:endParaRPr lang="en-US" dirty="0"/>
           </a:p>
         </p:txBody>
@@ -1601,7 +2374,7 @@
           <a:p>
             <a:fld id="{EF0E9F11-5378-4ADA-BF65-D7EDB1D950CD}" type="slidenum">
               <a:rPr lang="en-US" smtClean="0"/>
-              <a:t>15</a:t>
+              <a:t>4</a:t>
             </a:fld>
             <a:endParaRPr lang="en-US"/>
           </a:p>
@@ -1610,7 +2383,7 @@
     </p:spTree>
     <p:extLst>
       <p:ext uri="{BB962C8B-B14F-4D97-AF65-F5344CB8AC3E}">
-        <p14:creationId xmlns:p14="http://schemas.microsoft.com/office/powerpoint/2010/main" val="3792363433"/>
+        <p14:creationId xmlns:p14="http://schemas.microsoft.com/office/powerpoint/2010/main" val="3586693593"/>
       </p:ext>
     </p:extLst>
   </p:cSld>
@@ -1664,6 +2437,10 @@
           <a:bodyPr/>
           <a:lstStyle/>
           <a:p>
+            <a:r>
+              <a:rPr lang="en-US" dirty="0" err="1"/>
+              <a:t>Yovanni</a:t>
+            </a:r>
             <a:endParaRPr lang="en-US" dirty="0"/>
           </a:p>
         </p:txBody>
@@ -1685,7 +2462,7 @@
           <a:p>
             <a:fld id="{EF0E9F11-5378-4ADA-BF65-D7EDB1D950CD}" type="slidenum">
               <a:rPr lang="en-US" smtClean="0"/>
-              <a:t>16</a:t>
+              <a:t>5</a:t>
             </a:fld>
             <a:endParaRPr lang="en-US"/>
           </a:p>
@@ -1694,7 +2471,7 @@
     </p:spTree>
     <p:extLst>
       <p:ext uri="{BB962C8B-B14F-4D97-AF65-F5344CB8AC3E}">
-        <p14:creationId xmlns:p14="http://schemas.microsoft.com/office/powerpoint/2010/main" val="1083633083"/>
+        <p14:creationId xmlns:p14="http://schemas.microsoft.com/office/powerpoint/2010/main" val="896183165"/>
       </p:ext>
     </p:extLst>
   </p:cSld>
@@ -1748,6 +2525,10 @@
           <a:bodyPr/>
           <a:lstStyle/>
           <a:p>
+            <a:r>
+              <a:rPr lang="en-US" dirty="0" err="1"/>
+              <a:t>Yovanni</a:t>
+            </a:r>
             <a:endParaRPr lang="en-US" dirty="0"/>
           </a:p>
         </p:txBody>
@@ -1769,7 +2550,7 @@
           <a:p>
             <a:fld id="{EF0E9F11-5378-4ADA-BF65-D7EDB1D950CD}" type="slidenum">
               <a:rPr lang="en-US" smtClean="0"/>
-              <a:t>17</a:t>
+              <a:t>6</a:t>
             </a:fld>
             <a:endParaRPr lang="en-US"/>
           </a:p>
@@ -1778,7 +2559,268 @@
     </p:spTree>
     <p:extLst>
       <p:ext uri="{BB962C8B-B14F-4D97-AF65-F5344CB8AC3E}">
-        <p14:creationId xmlns:p14="http://schemas.microsoft.com/office/powerpoint/2010/main" val="485442747"/>
+        <p14:creationId xmlns:p14="http://schemas.microsoft.com/office/powerpoint/2010/main" val="675250389"/>
+      </p:ext>
+    </p:extLst>
+  </p:cSld>
+  <p:clrMapOvr>
+    <a:masterClrMapping/>
+  </p:clrMapOvr>
+</p:notes>
+</file>
+
+<file path=ppt/notesSlides/notesSlide7.xml><?xml version="1.0" encoding="utf-8"?>
+<p:notes xmlns:a="http://schemas.openxmlformats.org/drawingml/2006/main" xmlns:r="http://schemas.openxmlformats.org/officeDocument/2006/relationships" xmlns:p="http://schemas.openxmlformats.org/presentationml/2006/main">
+  <p:cSld>
+    <p:spTree>
+      <p:nvGrpSpPr>
+        <p:cNvPr id="1" name=""/>
+        <p:cNvGrpSpPr/>
+        <p:nvPr/>
+      </p:nvGrpSpPr>
+      <p:grpSpPr>
+        <a:xfrm>
+          <a:off x="0" y="0"/>
+          <a:ext cx="0" cy="0"/>
+          <a:chOff x="0" y="0"/>
+          <a:chExt cx="0" cy="0"/>
+        </a:xfrm>
+      </p:grpSpPr>
+      <p:sp>
+        <p:nvSpPr>
+          <p:cNvPr id="2" name="Slide Image Placeholder 1"/>
+          <p:cNvSpPr>
+            <a:spLocks noGrp="1" noRot="1" noChangeAspect="1"/>
+          </p:cNvSpPr>
+          <p:nvPr>
+            <p:ph type="sldImg"/>
+          </p:nvPr>
+        </p:nvSpPr>
+        <p:spPr/>
+      </p:sp>
+      <p:sp>
+        <p:nvSpPr>
+          <p:cNvPr id="3" name="Notes Placeholder 2"/>
+          <p:cNvSpPr>
+            <a:spLocks noGrp="1"/>
+          </p:cNvSpPr>
+          <p:nvPr>
+            <p:ph type="body" idx="1"/>
+          </p:nvPr>
+        </p:nvSpPr>
+        <p:spPr/>
+        <p:txBody>
+          <a:bodyPr/>
+          <a:lstStyle/>
+          <a:p>
+            <a:r>
+              <a:rPr lang="en-US" dirty="0"/>
+              <a:t>Kian</a:t>
+            </a:r>
+          </a:p>
+        </p:txBody>
+      </p:sp>
+      <p:sp>
+        <p:nvSpPr>
+          <p:cNvPr id="4" name="Slide Number Placeholder 3"/>
+          <p:cNvSpPr>
+            <a:spLocks noGrp="1"/>
+          </p:cNvSpPr>
+          <p:nvPr>
+            <p:ph type="sldNum" sz="quarter" idx="5"/>
+          </p:nvPr>
+        </p:nvSpPr>
+        <p:spPr/>
+        <p:txBody>
+          <a:bodyPr/>
+          <a:lstStyle/>
+          <a:p>
+            <a:fld id="{EF0E9F11-5378-4ADA-BF65-D7EDB1D950CD}" type="slidenum">
+              <a:rPr lang="en-US" smtClean="0"/>
+              <a:t>7</a:t>
+            </a:fld>
+            <a:endParaRPr lang="en-US"/>
+          </a:p>
+        </p:txBody>
+      </p:sp>
+    </p:spTree>
+    <p:extLst>
+      <p:ext uri="{BB962C8B-B14F-4D97-AF65-F5344CB8AC3E}">
+        <p14:creationId xmlns:p14="http://schemas.microsoft.com/office/powerpoint/2010/main" val="1820067475"/>
+      </p:ext>
+    </p:extLst>
+  </p:cSld>
+  <p:clrMapOvr>
+    <a:masterClrMapping/>
+  </p:clrMapOvr>
+</p:notes>
+</file>
+
+<file path=ppt/notesSlides/notesSlide8.xml><?xml version="1.0" encoding="utf-8"?>
+<p:notes xmlns:a="http://schemas.openxmlformats.org/drawingml/2006/main" xmlns:r="http://schemas.openxmlformats.org/officeDocument/2006/relationships" xmlns:p="http://schemas.openxmlformats.org/presentationml/2006/main">
+  <p:cSld>
+    <p:spTree>
+      <p:nvGrpSpPr>
+        <p:cNvPr id="1" name=""/>
+        <p:cNvGrpSpPr/>
+        <p:nvPr/>
+      </p:nvGrpSpPr>
+      <p:grpSpPr>
+        <a:xfrm>
+          <a:off x="0" y="0"/>
+          <a:ext cx="0" cy="0"/>
+          <a:chOff x="0" y="0"/>
+          <a:chExt cx="0" cy="0"/>
+        </a:xfrm>
+      </p:grpSpPr>
+      <p:sp>
+        <p:nvSpPr>
+          <p:cNvPr id="2" name="Slide Image Placeholder 1"/>
+          <p:cNvSpPr>
+            <a:spLocks noGrp="1" noRot="1" noChangeAspect="1"/>
+          </p:cNvSpPr>
+          <p:nvPr>
+            <p:ph type="sldImg"/>
+          </p:nvPr>
+        </p:nvSpPr>
+        <p:spPr/>
+      </p:sp>
+      <p:sp>
+        <p:nvSpPr>
+          <p:cNvPr id="3" name="Notes Placeholder 2"/>
+          <p:cNvSpPr>
+            <a:spLocks noGrp="1"/>
+          </p:cNvSpPr>
+          <p:nvPr>
+            <p:ph type="body" idx="1"/>
+          </p:nvPr>
+        </p:nvSpPr>
+        <p:spPr/>
+        <p:txBody>
+          <a:bodyPr/>
+          <a:lstStyle/>
+          <a:p>
+            <a:r>
+              <a:rPr lang="en-US" dirty="0"/>
+              <a:t>Kian</a:t>
+            </a:r>
+          </a:p>
+        </p:txBody>
+      </p:sp>
+      <p:sp>
+        <p:nvSpPr>
+          <p:cNvPr id="4" name="Slide Number Placeholder 3"/>
+          <p:cNvSpPr>
+            <a:spLocks noGrp="1"/>
+          </p:cNvSpPr>
+          <p:nvPr>
+            <p:ph type="sldNum" sz="quarter" idx="5"/>
+          </p:nvPr>
+        </p:nvSpPr>
+        <p:spPr/>
+        <p:txBody>
+          <a:bodyPr/>
+          <a:lstStyle/>
+          <a:p>
+            <a:fld id="{EF0E9F11-5378-4ADA-BF65-D7EDB1D950CD}" type="slidenum">
+              <a:rPr lang="en-US" smtClean="0"/>
+              <a:t>8</a:t>
+            </a:fld>
+            <a:endParaRPr lang="en-US"/>
+          </a:p>
+        </p:txBody>
+      </p:sp>
+    </p:spTree>
+    <p:extLst>
+      <p:ext uri="{BB962C8B-B14F-4D97-AF65-F5344CB8AC3E}">
+        <p14:creationId xmlns:p14="http://schemas.microsoft.com/office/powerpoint/2010/main" val="2411025345"/>
+      </p:ext>
+    </p:extLst>
+  </p:cSld>
+  <p:clrMapOvr>
+    <a:masterClrMapping/>
+  </p:clrMapOvr>
+</p:notes>
+</file>
+
+<file path=ppt/notesSlides/notesSlide9.xml><?xml version="1.0" encoding="utf-8"?>
+<p:notes xmlns:a="http://schemas.openxmlformats.org/drawingml/2006/main" xmlns:r="http://schemas.openxmlformats.org/officeDocument/2006/relationships" xmlns:p="http://schemas.openxmlformats.org/presentationml/2006/main">
+  <p:cSld>
+    <p:spTree>
+      <p:nvGrpSpPr>
+        <p:cNvPr id="1" name=""/>
+        <p:cNvGrpSpPr/>
+        <p:nvPr/>
+      </p:nvGrpSpPr>
+      <p:grpSpPr>
+        <a:xfrm>
+          <a:off x="0" y="0"/>
+          <a:ext cx="0" cy="0"/>
+          <a:chOff x="0" y="0"/>
+          <a:chExt cx="0" cy="0"/>
+        </a:xfrm>
+      </p:grpSpPr>
+      <p:sp>
+        <p:nvSpPr>
+          <p:cNvPr id="2" name="Slide Image Placeholder 1"/>
+          <p:cNvSpPr>
+            <a:spLocks noGrp="1" noRot="1" noChangeAspect="1"/>
+          </p:cNvSpPr>
+          <p:nvPr>
+            <p:ph type="sldImg"/>
+          </p:nvPr>
+        </p:nvSpPr>
+        <p:spPr/>
+      </p:sp>
+      <p:sp>
+        <p:nvSpPr>
+          <p:cNvPr id="3" name="Notes Placeholder 2"/>
+          <p:cNvSpPr>
+            <a:spLocks noGrp="1"/>
+          </p:cNvSpPr>
+          <p:nvPr>
+            <p:ph type="body" idx="1"/>
+          </p:nvPr>
+        </p:nvSpPr>
+        <p:spPr/>
+        <p:txBody>
+          <a:bodyPr/>
+          <a:lstStyle/>
+          <a:p>
+            <a:r>
+              <a:rPr lang="en-US" dirty="0"/>
+              <a:t>Armando</a:t>
+            </a:r>
+          </a:p>
+        </p:txBody>
+      </p:sp>
+      <p:sp>
+        <p:nvSpPr>
+          <p:cNvPr id="4" name="Slide Number Placeholder 3"/>
+          <p:cNvSpPr>
+            <a:spLocks noGrp="1"/>
+          </p:cNvSpPr>
+          <p:nvPr>
+            <p:ph type="sldNum" sz="quarter" idx="5"/>
+          </p:nvPr>
+        </p:nvSpPr>
+        <p:spPr/>
+        <p:txBody>
+          <a:bodyPr/>
+          <a:lstStyle/>
+          <a:p>
+            <a:fld id="{EF0E9F11-5378-4ADA-BF65-D7EDB1D950CD}" type="slidenum">
+              <a:rPr lang="en-US" smtClean="0"/>
+              <a:t>11</a:t>
+            </a:fld>
+            <a:endParaRPr lang="en-US"/>
+          </a:p>
+        </p:txBody>
+      </p:sp>
+    </p:spTree>
+    <p:extLst>
+      <p:ext uri="{BB962C8B-B14F-4D97-AF65-F5344CB8AC3E}">
+        <p14:creationId xmlns:p14="http://schemas.microsoft.com/office/powerpoint/2010/main" val="2833046197"/>
       </p:ext>
     </p:extLst>
   </p:cSld>
@@ -7739,7 +8781,7 @@
     <p:bg>
       <p:bgPr>
         <a:blipFill rotWithShape="1">
-          <a:blip r:embed="rId2">
+          <a:blip r:embed="rId3">
             <a:duotone>
               <a:schemeClr val="bg2">
                 <a:shade val="80000"/>
@@ -8120,7 +9162,7 @@
           </p:nvPr>
         </p:nvPicPr>
         <p:blipFill>
-          <a:blip r:embed="rId2"/>
+          <a:blip r:embed="rId3"/>
           <a:stretch>
             <a:fillRect/>
           </a:stretch>
@@ -8629,7 +9671,7 @@
           </p:nvPr>
         </p:nvPicPr>
         <p:blipFill>
-          <a:blip r:embed="rId2"/>
+          <a:blip r:embed="rId3"/>
           <a:stretch>
             <a:fillRect/>
           </a:stretch>
@@ -8711,7 +9753,7 @@
             <a:pPr algn="ctr"/>
             <a:r>
               <a:rPr lang="en-US" dirty="0"/>
-              <a:t>Test Case: SOS04-System-**-Sunny**</a:t>
+              <a:t>Test Case: SOS07-System-**-Sunny**</a:t>
             </a:r>
           </a:p>
         </p:txBody>
@@ -8941,7 +9983,7 @@
         </p:nvSpPr>
         <p:spPr>
           <a:xfrm>
-            <a:off x="751956" y="0"/>
+            <a:off x="838199" y="-251196"/>
             <a:ext cx="10515600" cy="1325563"/>
           </a:xfrm>
         </p:spPr>
@@ -8951,7 +9993,7 @@
           <a:p>
             <a:r>
               <a:rPr lang="en-US" dirty="0"/>
-              <a:t>Test Case: SOS04-System-**-Rainy**</a:t>
+              <a:t>Test Case: SOS07-System-**-Rainy**</a:t>
             </a:r>
           </a:p>
         </p:txBody>
@@ -9008,8 +10050,8 @@
         </p:nvSpPr>
         <p:spPr>
           <a:xfrm>
-            <a:off x="192349" y="1256930"/>
-            <a:ext cx="11807301" cy="5033638"/>
+            <a:off x="192349" y="1256929"/>
+            <a:ext cx="11694851" cy="5216201"/>
           </a:xfrm>
         </p:spPr>
         <p:txBody>
@@ -9097,7 +10139,7 @@
               <a:rPr lang="en-US" sz="2200" dirty="0">
                 <a:effectLst/>
               </a:rPr>
-              <a:t>4. He presses the “x” button at the upper right corner of the form to close it.</a:t>
+              <a:t>4. they presses the “x” button at the upper right corner of the form to close it.</a:t>
             </a:r>
           </a:p>
           <a:p>
@@ -9175,11 +10217,17 @@
           <a:bodyPr/>
           <a:lstStyle/>
           <a:p>
-            <a:pPr algn="ctr"/>
             <a:r>
               <a:rPr lang="en-US" dirty="0"/>
-              <a:t>Test Case *** Sunny Day</a:t>
-            </a:r>
+              <a:t>Test Case: </a:t>
+            </a:r>
+            <a:r>
+              <a:rPr lang="en-US" dirty="0">
+                <a:effectLst/>
+              </a:rPr>
+              <a:t>SOS16-System-**-Sunny**</a:t>
+            </a:r>
+            <a:endParaRPr lang="en-US" dirty="0"/>
           </a:p>
         </p:txBody>
       </p:sp>
@@ -9199,12 +10247,160 @@
             <p:ph idx="1"/>
           </p:nvPr>
         </p:nvSpPr>
-        <p:spPr/>
+        <p:spPr>
+          <a:xfrm>
+            <a:off x="0" y="937590"/>
+            <a:ext cx="12192000" cy="5635487"/>
+          </a:xfrm>
+        </p:spPr>
+        <p:txBody>
+          <a:bodyPr>
+            <a:noAutofit/>
+          </a:bodyPr>
+          <a:lstStyle/>
+          <a:p>
+            <a:pPr marL="36900" indent="0">
+              <a:buNone/>
+            </a:pPr>
+            <a:r>
+              <a:rPr lang="en-US" sz="2200" b="1" dirty="0">
+                <a:effectLst/>
+              </a:rPr>
+              <a:t>Purpose</a:t>
+            </a:r>
+            <a:r>
+              <a:rPr lang="en-US" sz="2200" dirty="0">
+                <a:effectLst/>
+              </a:rPr>
+              <a:t>: Ensure that a user can successfully create an organization on the website</a:t>
+            </a:r>
+          </a:p>
+          <a:p>
+            <a:pPr marL="36900" indent="0">
+              <a:buNone/>
+            </a:pPr>
+            <a:r>
+              <a:rPr lang="en-US" sz="2200" b="1" dirty="0">
+                <a:effectLst/>
+              </a:rPr>
+              <a:t>Test set-up</a:t>
+            </a:r>
+            <a:r>
+              <a:rPr lang="en-US" sz="2200" dirty="0">
+                <a:effectLst/>
+              </a:rPr>
+              <a:t>: User is logged into her account.</a:t>
+            </a:r>
+          </a:p>
+          <a:p>
+            <a:pPr marL="36900" indent="0">
+              <a:buNone/>
+            </a:pPr>
+            <a:r>
+              <a:rPr lang="en-US" sz="2200" b="1" dirty="0">
+                <a:effectLst/>
+              </a:rPr>
+              <a:t>Input</a:t>
+            </a:r>
+            <a:r>
+              <a:rPr lang="en-US" sz="2200" dirty="0">
+                <a:effectLst/>
+              </a:rPr>
+              <a:t>:</a:t>
+            </a:r>
+          </a:p>
+          <a:p>
+            <a:pPr marL="36900" lvl="0" indent="0">
+              <a:buNone/>
+            </a:pPr>
+            <a:r>
+              <a:rPr lang="en-US" sz="2200" dirty="0">
+                <a:effectLst/>
+              </a:rPr>
+              <a:t>1. User clicks on “Create Organization” button</a:t>
+            </a:r>
+          </a:p>
+          <a:p>
+            <a:pPr marL="36900" lvl="0" indent="0">
+              <a:buNone/>
+            </a:pPr>
+            <a:r>
+              <a:rPr lang="en-US" sz="2200" dirty="0">
+                <a:effectLst/>
+              </a:rPr>
+              <a:t>2. A form will pop up in front of the screen to enter information</a:t>
+            </a:r>
+          </a:p>
+          <a:p>
+            <a:pPr marL="36900" lvl="0" indent="0">
+              <a:buNone/>
+            </a:pPr>
+            <a:r>
+              <a:rPr lang="en-US" sz="2200" dirty="0">
+                <a:effectLst/>
+              </a:rPr>
+              <a:t>3. User enters data in respective fields: Organization Name = “QRT” ; Description = “Lets study” ; Requirements for Joining = none ; Privacy = “public”</a:t>
+            </a:r>
+          </a:p>
+          <a:p>
+            <a:pPr marL="36900" lvl="0" indent="0">
+              <a:buNone/>
+            </a:pPr>
+            <a:r>
+              <a:rPr lang="en-US" sz="2200" dirty="0">
+                <a:effectLst/>
+              </a:rPr>
+              <a:t>4. She then clicks on the “submit” button</a:t>
+            </a:r>
+          </a:p>
+          <a:p>
+            <a:r>
+              <a:rPr lang="en-US" sz="2200" b="1" dirty="0">
+                <a:effectLst/>
+              </a:rPr>
+              <a:t>Expected Output</a:t>
+            </a:r>
+            <a:r>
+              <a:rPr lang="en-US" sz="2200" dirty="0">
+                <a:effectLst/>
+              </a:rPr>
+              <a:t>: The request is submitted and a pop up about the Organization will appear before the user. </a:t>
+            </a:r>
+            <a:endParaRPr lang="en-US" sz="2200" dirty="0"/>
+          </a:p>
+        </p:txBody>
+      </p:sp>
+      <p:sp>
+        <p:nvSpPr>
+          <p:cNvPr id="5" name="Slide Number Placeholder 4">
+            <a:extLst>
+              <a:ext uri="{FF2B5EF4-FFF2-40B4-BE49-F238E27FC236}">
+                <a16:creationId xmlns:a16="http://schemas.microsoft.com/office/drawing/2014/main" id="{933B5355-0805-432D-94DE-96121B93A1C4}"/>
+              </a:ext>
+            </a:extLst>
+          </p:cNvPr>
+          <p:cNvSpPr>
+            <a:spLocks noGrp="1"/>
+          </p:cNvSpPr>
+          <p:nvPr>
+            <p:ph type="sldNum" sz="quarter" idx="12"/>
+          </p:nvPr>
+        </p:nvSpPr>
+        <p:spPr>
+          <a:xfrm>
+            <a:off x="10779055" y="6132717"/>
+            <a:ext cx="753545" cy="365125"/>
+          </a:xfrm>
+        </p:spPr>
         <p:txBody>
           <a:bodyPr/>
           <a:lstStyle/>
           <a:p>
-            <a:endParaRPr lang="en-US"/>
+            <a:fld id="{5FB0F42B-CAA9-4D4F-86CF-07230423CC99}" type="slidenum">
+              <a:rPr lang="en-US" smtClean="0"/>
+              <a:t>17</a:t>
+            </a:fld>
+            <a:endParaRPr lang="en-US" dirty="0"/>
           </a:p>
         </p:txBody>
       </p:sp>
@@ -9256,18 +10452,32 @@
         </p:nvSpPr>
         <p:spPr>
           <a:xfrm>
-            <a:off x="913795" y="32551"/>
+            <a:off x="919119" y="98812"/>
             <a:ext cx="10353762" cy="970450"/>
           </a:xfrm>
         </p:spPr>
         <p:txBody>
-          <a:bodyPr/>
+          <a:bodyPr>
+            <a:normAutofit fontScale="90000"/>
+          </a:bodyPr>
           <a:lstStyle/>
           <a:p>
             <a:r>
               <a:rPr lang="en-US" dirty="0"/>
-              <a:t>Test Case *** Rainy Day</a:t>
-            </a:r>
+              <a:t>Test Case: </a:t>
+            </a:r>
+            <a:r>
+              <a:rPr lang="en-US" dirty="0">
+                <a:effectLst/>
+              </a:rPr>
+              <a:t>SOS16-System-**-Rainy**</a:t>
+            </a:r>
+            <a:br>
+              <a:rPr lang="en-US" dirty="0">
+                <a:effectLst/>
+              </a:rPr>
+            </a:br>
+            <a:endParaRPr lang="en-US" dirty="0"/>
           </a:p>
         </p:txBody>
       </p:sp>
@@ -9287,40 +10497,117 @@
             <p:ph idx="1"/>
           </p:nvPr>
         </p:nvSpPr>
-        <p:spPr/>
-        <p:txBody>
-          <a:bodyPr/>
-          <a:lstStyle/>
-          <a:p>
-            <a:endParaRPr lang="en-US"/>
-          </a:p>
-        </p:txBody>
-      </p:sp>
-      <p:sp>
-        <p:nvSpPr>
-          <p:cNvPr id="4" name="Footer Placeholder 3">
-            <a:extLst>
-              <a:ext uri="{FF2B5EF4-FFF2-40B4-BE49-F238E27FC236}">
-                <a16:creationId xmlns:a16="http://schemas.microsoft.com/office/drawing/2014/main" id="{C4A5E8AD-809C-46EF-BE25-2008705C0571}"/>
-              </a:ext>
-            </a:extLst>
-          </p:cNvPr>
-          <p:cNvSpPr>
-            <a:spLocks noGrp="1"/>
-          </p:cNvSpPr>
-          <p:nvPr>
-            <p:ph type="ftr" sz="quarter" idx="11"/>
-          </p:nvPr>
-        </p:nvSpPr>
-        <p:spPr/>
-        <p:txBody>
-          <a:bodyPr/>
-          <a:lstStyle/>
-          <a:p>
-            <a:r>
-              <a:rPr lang="en-US"/>
-              <a:t>Student Organization System - Software Requirements Document</a:t>
-            </a:r>
+        <p:spPr>
+          <a:xfrm>
+            <a:off x="0" y="725283"/>
+            <a:ext cx="12192000" cy="5741778"/>
+          </a:xfrm>
+        </p:spPr>
+        <p:txBody>
+          <a:bodyPr>
+            <a:normAutofit/>
+          </a:bodyPr>
+          <a:lstStyle/>
+          <a:p>
+            <a:r>
+              <a:rPr lang="en-US" sz="2400" b="1" dirty="0">
+                <a:effectLst/>
+              </a:rPr>
+              <a:t>Purpose</a:t>
+            </a:r>
+            <a:r>
+              <a:rPr lang="en-US" sz="2400" dirty="0">
+                <a:effectLst/>
+              </a:rPr>
+              <a:t>: Test to ensure that all Organization details must be filled out to be stored in SOS.</a:t>
+            </a:r>
+          </a:p>
+          <a:p>
+            <a:r>
+              <a:rPr lang="en-US" sz="2400" b="1" dirty="0">
+                <a:effectLst/>
+              </a:rPr>
+              <a:t>Test set-up</a:t>
+            </a:r>
+            <a:r>
+              <a:rPr lang="en-US" sz="2400" dirty="0">
+                <a:effectLst/>
+              </a:rPr>
+              <a:t>: User has an account and is on the organization page.</a:t>
+            </a:r>
+          </a:p>
+          <a:p>
+            <a:r>
+              <a:rPr lang="en-US" sz="2400" b="1" dirty="0">
+                <a:effectLst/>
+              </a:rPr>
+              <a:t>Input</a:t>
+            </a:r>
+            <a:r>
+              <a:rPr lang="en-US" sz="2400" dirty="0">
+                <a:effectLst/>
+              </a:rPr>
+              <a:t>:</a:t>
+            </a:r>
+          </a:p>
+          <a:p>
+            <a:pPr marL="36900" lvl="0" indent="0">
+              <a:buNone/>
+            </a:pPr>
+            <a:r>
+              <a:rPr lang="en-US" sz="2400" dirty="0">
+                <a:effectLst/>
+              </a:rPr>
+              <a:t>1. They click on the “Create Organization” button</a:t>
+            </a:r>
+          </a:p>
+          <a:p>
+            <a:pPr marL="36900" lvl="0" indent="0">
+              <a:buNone/>
+            </a:pPr>
+            <a:r>
+              <a:rPr lang="en-US" sz="2400" dirty="0">
+                <a:effectLst/>
+              </a:rPr>
+              <a:t>2. A form pops up to fill out required information</a:t>
+            </a:r>
+          </a:p>
+          <a:p>
+            <a:pPr marL="36900" lvl="0" indent="0">
+              <a:buNone/>
+            </a:pPr>
+            <a:r>
+              <a:rPr lang="en-US" sz="2400" dirty="0">
+                <a:effectLst/>
+              </a:rPr>
+              <a:t>3. She enters the following data: Organization Name = “My special club”</a:t>
+            </a:r>
+          </a:p>
+          <a:p>
+            <a:pPr marL="36900" lvl="0" indent="0">
+              <a:buNone/>
+            </a:pPr>
+            <a:r>
+              <a:rPr lang="en-US" sz="2400" dirty="0">
+                <a:effectLst/>
+              </a:rPr>
+              <a:t>4. Then she clicks the “submit” button</a:t>
+            </a:r>
+          </a:p>
+          <a:p>
+            <a:r>
+              <a:rPr lang="en-US" sz="2400" b="1" dirty="0">
+                <a:effectLst/>
+              </a:rPr>
+              <a:t>Expected Output</a:t>
+            </a:r>
+            <a:r>
+              <a:rPr lang="en-US" sz="2400" dirty="0">
+                <a:effectLst/>
+              </a:rPr>
+              <a:t>: A pop up message will appear in front of the user saying that some of the required fields have not been filled out. </a:t>
+            </a:r>
+            <a:endParaRPr lang="en-US" sz="1800" dirty="0"/>
           </a:p>
         </p:txBody>
       </p:sp>
@@ -9340,7 +10627,12 @@
             <p:ph type="sldNum" sz="quarter" idx="12"/>
           </p:nvPr>
         </p:nvSpPr>
-        <p:spPr/>
+        <p:spPr>
+          <a:xfrm>
+            <a:off x="10779055" y="6132717"/>
+            <a:ext cx="753545" cy="365125"/>
+          </a:xfrm>
+        </p:spPr>
         <p:txBody>
           <a:bodyPr/>
           <a:lstStyle/>
@@ -9349,7 +10641,7 @@
               <a:rPr lang="en-US" smtClean="0"/>
               <a:t>18</a:t>
             </a:fld>
-            <a:endParaRPr lang="en-US"/>
+            <a:endParaRPr lang="en-US" dirty="0"/>
           </a:p>
         </p:txBody>
       </p:sp>
@@ -9372,7 +10664,7 @@
     <p:bg>
       <p:bgPr>
         <a:blipFill rotWithShape="1">
-          <a:blip r:embed="rId2">
+          <a:blip r:embed="rId3">
             <a:duotone>
               <a:schemeClr val="bg2">
                 <a:shade val="80000"/>
@@ -9840,7 +11132,7 @@
           </p:nvPr>
         </p:nvPicPr>
         <p:blipFill>
-          <a:blip r:embed="rId2">
+          <a:blip r:embed="rId3">
             <a:extLst>
               <a:ext uri="{28A0092B-C50C-407E-A947-70E740481C1C}">
                 <a14:useLocalDpi xmlns:a14="http://schemas.microsoft.com/office/drawing/2010/main" val="0"/>
@@ -9881,7 +11173,7 @@
           <p:nvPr/>
         </p:nvPicPr>
         <p:blipFill>
-          <a:blip r:embed="rId3"/>
+          <a:blip r:embed="rId4"/>
           <a:stretch>
             <a:fillRect/>
           </a:stretch>
@@ -10262,7 +11554,7 @@
     <p:bg>
       <p:bgPr>
         <a:blipFill rotWithShape="1">
-          <a:blip r:embed="rId2">
+          <a:blip r:embed="rId3">
             <a:duotone>
               <a:schemeClr val="bg2">
                 <a:shade val="80000"/>
@@ -11049,7 +12341,7 @@
     <p:bg>
       <p:bgPr>
         <a:blipFill rotWithShape="1">
-          <a:blip r:embed="rId2">
+          <a:blip r:embed="rId3">
             <a:duotone>
               <a:schemeClr val="bg2">
                 <a:shade val="80000"/>
@@ -11464,7 +12756,7 @@
     <p:bg>
       <p:bgPr>
         <a:blipFill rotWithShape="1">
-          <a:blip r:embed="rId2">
+          <a:blip r:embed="rId3">
             <a:duotone>
               <a:schemeClr val="bg2">
                 <a:shade val="80000"/>

</xml_diff>

<commit_message>
Pushing in new changes to ppt and FSD (added images for class diagrams.
</commit_message>
<xml_diff>
--- a/specifications/deliv3/SOS Deliverable Final Presentation.pptx
+++ b/specifications/deliv3/SOS Deliverable Final Presentation.pptx
@@ -5,7 +5,7 @@
     <p:sldMasterId id="2147483660" r:id="rId1"/>
   </p:sldMasterIdLst>
   <p:notesMasterIdLst>
-    <p:notesMasterId r:id="rId20"/>
+    <p:notesMasterId r:id="rId19"/>
   </p:notesMasterIdLst>
   <p:sldIdLst>
     <p:sldId id="256" r:id="rId2"/>
@@ -17,15 +17,14 @@
     <p:sldId id="262" r:id="rId8"/>
     <p:sldId id="263" r:id="rId9"/>
     <p:sldId id="271" r:id="rId10"/>
-    <p:sldId id="273" r:id="rId11"/>
-    <p:sldId id="274" r:id="rId12"/>
-    <p:sldId id="275" r:id="rId13"/>
-    <p:sldId id="266" r:id="rId14"/>
-    <p:sldId id="277" r:id="rId15"/>
-    <p:sldId id="268" r:id="rId16"/>
-    <p:sldId id="269" r:id="rId17"/>
-    <p:sldId id="270" r:id="rId18"/>
-    <p:sldId id="276" r:id="rId19"/>
+    <p:sldId id="274" r:id="rId11"/>
+    <p:sldId id="275" r:id="rId12"/>
+    <p:sldId id="266" r:id="rId13"/>
+    <p:sldId id="277" r:id="rId14"/>
+    <p:sldId id="268" r:id="rId15"/>
+    <p:sldId id="269" r:id="rId16"/>
+    <p:sldId id="270" r:id="rId17"/>
+    <p:sldId id="276" r:id="rId18"/>
   </p:sldIdLst>
   <p:sldSz cx="12192000" cy="6858000"/>
   <p:notesSz cx="6858000" cy="9144000"/>
@@ -144,8 +143,8 @@
 <pc:chgInfo xmlns:a="http://schemas.openxmlformats.org/drawingml/2006/main" xmlns:r="http://schemas.openxmlformats.org/officeDocument/2006/relationships" xmlns:ac="http://schemas.microsoft.com/office/drawing/2013/main/command" xmlns:pc="http://schemas.microsoft.com/office/powerpoint/2013/main/command">
   <pc:docChgLst>
     <pc:chgData name="Anthony Sanchez-Ayra" userId="6745e27f37c7945b" providerId="LiveId" clId="{1E119CE9-B343-4265-9F4A-0864581E65E7}"/>
-    <pc:docChg chg="undo custSel addSld modSld sldOrd">
-      <pc:chgData name="Anthony Sanchez-Ayra" userId="6745e27f37c7945b" providerId="LiveId" clId="{1E119CE9-B343-4265-9F4A-0864581E65E7}" dt="2019-12-02T04:27:49.236" v="1470" actId="20577"/>
+    <pc:docChg chg="undo custSel addSld delSld modSld sldOrd">
+      <pc:chgData name="Anthony Sanchez-Ayra" userId="6745e27f37c7945b" providerId="LiveId" clId="{1E119CE9-B343-4265-9F4A-0864581E65E7}" dt="2019-12-03T00:53:24.982" v="1471" actId="2696"/>
       <pc:docMkLst>
         <pc:docMk/>
       </pc:docMkLst>
@@ -319,6 +318,13 @@
         <pc:sldMkLst>
           <pc:docMk/>
           <pc:sldMk cId="1364555815" sldId="272"/>
+        </pc:sldMkLst>
+      </pc:sldChg>
+      <pc:sldChg chg="del">
+        <pc:chgData name="Anthony Sanchez-Ayra" userId="6745e27f37c7945b" providerId="LiveId" clId="{1E119CE9-B343-4265-9F4A-0864581E65E7}" dt="2019-12-03T00:53:24.982" v="1471" actId="2696"/>
+        <pc:sldMkLst>
+          <pc:docMk/>
+          <pc:sldMk cId="3310205035" sldId="273"/>
         </pc:sldMkLst>
       </pc:sldChg>
       <pc:sldChg chg="modNotesTx">
@@ -631,13 +637,6 @@
           </ac:spMkLst>
         </pc:spChg>
       </pc:sldChg>
-      <pc:sldChg chg="del">
-        <pc:chgData name="Anthony Sanchez-Ayra" userId="6745e27f37c7945b" providerId="LiveId" clId="{4BF0C6D9-51C4-404C-BB48-9084BA665C24}" dt="2019-12-01T23:17:24.663" v="1122" actId="2696"/>
-        <pc:sldMkLst>
-          <pc:docMk/>
-          <pc:sldMk cId="1879802128" sldId="264"/>
-        </pc:sldMkLst>
-      </pc:sldChg>
       <pc:sldChg chg="delSp modSp">
         <pc:chgData name="Anthony Sanchez-Ayra" userId="6745e27f37c7945b" providerId="LiveId" clId="{4BF0C6D9-51C4-404C-BB48-9084BA665C24}" dt="2019-12-01T22:41:57.174" v="133" actId="20577"/>
         <pc:sldMkLst>
@@ -660,29 +659,6 @@
             <ac:graphicFrameMk id="5" creationId="{9B33FCE2-4568-4CD6-954C-D0AF098A8A03}"/>
           </ac:graphicFrameMkLst>
         </pc:graphicFrameChg>
-      </pc:sldChg>
-      <pc:sldChg chg="delSp modSp del">
-        <pc:chgData name="Anthony Sanchez-Ayra" userId="6745e27f37c7945b" providerId="LiveId" clId="{4BF0C6D9-51C4-404C-BB48-9084BA665C24}" dt="2019-12-01T22:42:44.575" v="181" actId="2696"/>
-        <pc:sldMkLst>
-          <pc:docMk/>
-          <pc:sldMk cId="1826114473" sldId="267"/>
-        </pc:sldMkLst>
-        <pc:spChg chg="mod">
-          <ac:chgData name="Anthony Sanchez-Ayra" userId="6745e27f37c7945b" providerId="LiveId" clId="{4BF0C6D9-51C4-404C-BB48-9084BA665C24}" dt="2019-12-01T22:42:32.220" v="180" actId="20577"/>
-          <ac:spMkLst>
-            <pc:docMk/>
-            <pc:sldMk cId="1826114473" sldId="267"/>
-            <ac:spMk id="2" creationId="{57616B16-0F75-4133-BE39-ECCE179500D5}"/>
-          </ac:spMkLst>
-        </pc:spChg>
-        <pc:grpChg chg="del">
-          <ac:chgData name="Anthony Sanchez-Ayra" userId="6745e27f37c7945b" providerId="LiveId" clId="{4BF0C6D9-51C4-404C-BB48-9084BA665C24}" dt="2019-12-01T22:42:03.260" v="134" actId="478"/>
-          <ac:grpSpMkLst>
-            <pc:docMk/>
-            <pc:sldMk cId="1826114473" sldId="267"/>
-            <ac:grpSpMk id="9" creationId="{ACB3DD74-B981-428E-A535-D376FBA2D635}"/>
-          </ac:grpSpMkLst>
-        </pc:grpChg>
       </pc:sldChg>
       <pc:sldChg chg="addSp delSp modSp">
         <pc:chgData name="Anthony Sanchez-Ayra" userId="6745e27f37c7945b" providerId="LiveId" clId="{4BF0C6D9-51C4-404C-BB48-9084BA665C24}" dt="2019-12-01T23:02:18.864" v="422" actId="20577"/>
@@ -896,53 +872,6 @@
         </pc:picChg>
       </pc:sldChg>
       <pc:sldChg chg="addSp delSp modSp add">
-        <pc:chgData name="Anthony Sanchez-Ayra" userId="6745e27f37c7945b" providerId="LiveId" clId="{4BF0C6D9-51C4-404C-BB48-9084BA665C24}" dt="2019-12-01T23:17:42.899" v="1125" actId="478"/>
-        <pc:sldMkLst>
-          <pc:docMk/>
-          <pc:sldMk cId="3310205035" sldId="273"/>
-        </pc:sldMkLst>
-        <pc:spChg chg="mod">
-          <ac:chgData name="Anthony Sanchez-Ayra" userId="6745e27f37c7945b" providerId="LiveId" clId="{4BF0C6D9-51C4-404C-BB48-9084BA665C24}" dt="2019-12-01T22:40:10.692" v="93" actId="20577"/>
-          <ac:spMkLst>
-            <pc:docMk/>
-            <pc:sldMk cId="3310205035" sldId="273"/>
-            <ac:spMk id="2" creationId="{8D397110-BE50-4148-BFB4-F9EE98F3FCF1}"/>
-          </ac:spMkLst>
-        </pc:spChg>
-        <pc:spChg chg="add del">
-          <ac:chgData name="Anthony Sanchez-Ayra" userId="6745e27f37c7945b" providerId="LiveId" clId="{4BF0C6D9-51C4-404C-BB48-9084BA665C24}" dt="2019-12-01T22:45:17.834" v="241"/>
-          <ac:spMkLst>
-            <pc:docMk/>
-            <pc:sldMk cId="3310205035" sldId="273"/>
-            <ac:spMk id="3" creationId="{03716F63-CA80-4ABF-B0B4-0B59C79B3723}"/>
-          </ac:spMkLst>
-        </pc:spChg>
-        <pc:spChg chg="del">
-          <ac:chgData name="Anthony Sanchez-Ayra" userId="6745e27f37c7945b" providerId="LiveId" clId="{4BF0C6D9-51C4-404C-BB48-9084BA665C24}" dt="2019-12-01T23:17:42.899" v="1125" actId="478"/>
-          <ac:spMkLst>
-            <pc:docMk/>
-            <pc:sldMk cId="3310205035" sldId="273"/>
-            <ac:spMk id="4" creationId="{164A2C2F-3AE9-4C3B-8D82-B2CF4EFC49F3}"/>
-          </ac:spMkLst>
-        </pc:spChg>
-        <pc:picChg chg="add del">
-          <ac:chgData name="Anthony Sanchez-Ayra" userId="6745e27f37c7945b" providerId="LiveId" clId="{4BF0C6D9-51C4-404C-BB48-9084BA665C24}" dt="2019-12-01T22:44:51.024" v="239"/>
-          <ac:picMkLst>
-            <pc:docMk/>
-            <pc:sldMk cId="3310205035" sldId="273"/>
-            <ac:picMk id="6" creationId="{C5A672DD-4AC9-4321-8491-395D6802B4CE}"/>
-          </ac:picMkLst>
-        </pc:picChg>
-        <pc:picChg chg="add del mod">
-          <ac:chgData name="Anthony Sanchez-Ayra" userId="6745e27f37c7945b" providerId="LiveId" clId="{4BF0C6D9-51C4-404C-BB48-9084BA665C24}" dt="2019-12-01T22:45:17.834" v="241"/>
-          <ac:picMkLst>
-            <pc:docMk/>
-            <pc:sldMk cId="3310205035" sldId="273"/>
-            <ac:picMk id="7" creationId="{18D381F8-0476-43F2-A87E-31BE34F3BFB1}"/>
-          </ac:picMkLst>
-        </pc:picChg>
-      </pc:sldChg>
-      <pc:sldChg chg="addSp delSp modSp add">
         <pc:chgData name="Anthony Sanchez-Ayra" userId="6745e27f37c7945b" providerId="LiveId" clId="{4BF0C6D9-51C4-404C-BB48-9084BA665C24}" dt="2019-12-01T22:46:32.444" v="309" actId="1076"/>
         <pc:sldMkLst>
           <pc:docMk/>
@@ -1154,7 +1083,7 @@
           <a:p>
             <a:fld id="{25C7B18B-C095-4AA5-9AE6-44437B9B539E}" type="datetimeFigureOut">
               <a:rPr lang="en-US" smtClean="0"/>
-              <a:t>12/1/2019</a:t>
+              <a:t>12/2/2019</a:t>
             </a:fld>
             <a:endParaRPr lang="en-US"/>
           </a:p>
@@ -1576,7 +1505,7 @@
           <a:p>
             <a:fld id="{EF0E9F11-5378-4ADA-BF65-D7EDB1D950CD}" type="slidenum">
               <a:rPr lang="en-US" smtClean="0"/>
-              <a:t>12</a:t>
+              <a:t>11</a:t>
             </a:fld>
             <a:endParaRPr lang="en-US"/>
           </a:p>
@@ -1669,7 +1598,7 @@
           <a:p>
             <a:fld id="{EF0E9F11-5378-4ADA-BF65-D7EDB1D950CD}" type="slidenum">
               <a:rPr lang="en-US" smtClean="0"/>
-              <a:t>13</a:t>
+              <a:t>12</a:t>
             </a:fld>
             <a:endParaRPr lang="en-US"/>
           </a:p>
@@ -1762,7 +1691,7 @@
           <a:p>
             <a:fld id="{EF0E9F11-5378-4ADA-BF65-D7EDB1D950CD}" type="slidenum">
               <a:rPr lang="en-US" smtClean="0"/>
-              <a:t>14</a:t>
+              <a:t>13</a:t>
             </a:fld>
             <a:endParaRPr lang="en-US"/>
           </a:p>
@@ -1849,7 +1778,7 @@
           <a:p>
             <a:fld id="{EF0E9F11-5378-4ADA-BF65-D7EDB1D950CD}" type="slidenum">
               <a:rPr lang="en-US" smtClean="0"/>
-              <a:t>15</a:t>
+              <a:t>14</a:t>
             </a:fld>
             <a:endParaRPr lang="en-US"/>
           </a:p>
@@ -1937,7 +1866,7 @@
           <a:p>
             <a:fld id="{EF0E9F11-5378-4ADA-BF65-D7EDB1D950CD}" type="slidenum">
               <a:rPr lang="en-US" smtClean="0"/>
-              <a:t>16</a:t>
+              <a:t>15</a:t>
             </a:fld>
             <a:endParaRPr lang="en-US"/>
           </a:p>
@@ -2025,7 +1954,7 @@
           <a:p>
             <a:fld id="{EF0E9F11-5378-4ADA-BF65-D7EDB1D950CD}" type="slidenum">
               <a:rPr lang="en-US" smtClean="0"/>
-              <a:t>17</a:t>
+              <a:t>16</a:t>
             </a:fld>
             <a:endParaRPr lang="en-US"/>
           </a:p>
@@ -2112,7 +2041,7 @@
           <a:p>
             <a:fld id="{EF0E9F11-5378-4ADA-BF65-D7EDB1D950CD}" type="slidenum">
               <a:rPr lang="en-US" smtClean="0"/>
-              <a:t>18</a:t>
+              <a:t>17</a:t>
             </a:fld>
             <a:endParaRPr lang="en-US"/>
           </a:p>
@@ -2811,7 +2740,7 @@
           <a:p>
             <a:fld id="{EF0E9F11-5378-4ADA-BF65-D7EDB1D950CD}" type="slidenum">
               <a:rPr lang="en-US" smtClean="0"/>
-              <a:t>11</a:t>
+              <a:t>10</a:t>
             </a:fld>
             <a:endParaRPr lang="en-US"/>
           </a:p>
@@ -3015,7 +2944,7 @@
           <a:p>
             <a:fld id="{33345273-357A-44F9-B829-B72290E01AB2}" type="datetime1">
               <a:rPr lang="en-US" smtClean="0"/>
-              <a:t>12/1/2019</a:t>
+              <a:t>12/2/2019</a:t>
             </a:fld>
             <a:endParaRPr lang="en-US"/>
           </a:p>
@@ -3316,7 +3245,7 @@
           <a:p>
             <a:fld id="{7F0CB7CC-F537-4FCF-8EE3-2660B59E7D7E}" type="datetime1">
               <a:rPr lang="en-US" smtClean="0"/>
-              <a:t>12/1/2019</a:t>
+              <a:t>12/2/2019</a:t>
             </a:fld>
             <a:endParaRPr lang="en-US"/>
           </a:p>
@@ -3511,7 +3440,7 @@
           <a:p>
             <a:fld id="{94D2ACA3-977D-484D-828B-64C3DA8A0D1F}" type="datetime1">
               <a:rPr lang="en-US" smtClean="0"/>
-              <a:t>12/1/2019</a:t>
+              <a:t>12/2/2019</a:t>
             </a:fld>
             <a:endParaRPr lang="en-US"/>
           </a:p>
@@ -3775,7 +3704,7 @@
           <a:p>
             <a:fld id="{3821FBE7-B412-4AB0-8661-9FC4C96AC7B4}" type="datetime1">
               <a:rPr lang="en-US" smtClean="0"/>
-              <a:t>12/1/2019</a:t>
+              <a:t>12/2/2019</a:t>
             </a:fld>
             <a:endParaRPr lang="en-US"/>
           </a:p>
@@ -4202,7 +4131,7 @@
           <a:p>
             <a:fld id="{E8F5201A-42EB-4D41-955A-8EFA9E91AF8B}" type="datetime1">
               <a:rPr lang="en-US" smtClean="0"/>
-              <a:t>12/1/2019</a:t>
+              <a:t>12/2/2019</a:t>
             </a:fld>
             <a:endParaRPr lang="en-US"/>
           </a:p>
@@ -4742,7 +4671,7 @@
           <a:p>
             <a:fld id="{72A3D8B7-B83B-4324-865E-70934BC03FCF}" type="datetime1">
               <a:rPr lang="en-US" smtClean="0"/>
-              <a:t>12/1/2019</a:t>
+              <a:t>12/2/2019</a:t>
             </a:fld>
             <a:endParaRPr lang="en-US"/>
           </a:p>
@@ -5609,7 +5538,7 @@
           <a:p>
             <a:fld id="{4052AA9B-C75E-4791-8567-4EDE615B769D}" type="datetime1">
               <a:rPr lang="en-US" smtClean="0"/>
-              <a:t>12/1/2019</a:t>
+              <a:t>12/2/2019</a:t>
             </a:fld>
             <a:endParaRPr lang="en-US"/>
           </a:p>
@@ -5782,7 +5711,7 @@
           <a:p>
             <a:fld id="{344A012C-49AE-4989-B2FD-51A0AC9516E3}" type="datetime1">
               <a:rPr lang="en-US" smtClean="0"/>
-              <a:t>12/1/2019</a:t>
+              <a:t>12/2/2019</a:t>
             </a:fld>
             <a:endParaRPr lang="en-US"/>
           </a:p>
@@ -5969,7 +5898,7 @@
           <a:p>
             <a:fld id="{CBD5F2A9-CE86-4D42-82B1-47CB1757B2B3}" type="datetime1">
               <a:rPr lang="en-US" smtClean="0"/>
-              <a:t>12/1/2019</a:t>
+              <a:t>12/2/2019</a:t>
             </a:fld>
             <a:endParaRPr lang="en-US"/>
           </a:p>
@@ -6142,7 +6071,7 @@
           <a:p>
             <a:fld id="{F86D78C3-82B7-4DE0-B1B3-D1939DFFF1F4}" type="datetime1">
               <a:rPr lang="en-US" smtClean="0"/>
-              <a:t>12/1/2019</a:t>
+              <a:t>12/2/2019</a:t>
             </a:fld>
             <a:endParaRPr lang="en-US"/>
           </a:p>
@@ -6389,7 +6318,7 @@
           <a:p>
             <a:fld id="{4BE43EF6-EB37-44C6-92F7-AC45C74D32BC}" type="datetime1">
               <a:rPr lang="en-US" smtClean="0"/>
-              <a:t>12/1/2019</a:t>
+              <a:t>12/2/2019</a:t>
             </a:fld>
             <a:endParaRPr lang="en-US"/>
           </a:p>
@@ -6628,7 +6557,7 @@
           <a:p>
             <a:fld id="{648C393F-9384-45D4-805C-1CB7173B9356}" type="datetime1">
               <a:rPr lang="en-US" smtClean="0"/>
-              <a:t>12/1/2019</a:t>
+              <a:t>12/2/2019</a:t>
             </a:fld>
             <a:endParaRPr lang="en-US"/>
           </a:p>
@@ -7097,7 +7026,7 @@
           <a:p>
             <a:fld id="{DCC6C747-2714-4C59-95F8-D2ADB42E4758}" type="datetime1">
               <a:rPr lang="en-US" smtClean="0"/>
-              <a:t>12/1/2019</a:t>
+              <a:t>12/2/2019</a:t>
             </a:fld>
             <a:endParaRPr lang="en-US"/>
           </a:p>
@@ -7218,7 +7147,7 @@
           <a:p>
             <a:fld id="{AB6F47D7-5DC3-4299-85C9-582A2E817B7A}" type="datetime1">
               <a:rPr lang="en-US" smtClean="0"/>
-              <a:t>12/1/2019</a:t>
+              <a:t>12/2/2019</a:t>
             </a:fld>
             <a:endParaRPr lang="en-US"/>
           </a:p>
@@ -7316,7 +7245,7 @@
           <a:p>
             <a:fld id="{B3B8CD37-62FF-42A3-A691-171206154C73}" type="datetime1">
               <a:rPr lang="en-US" smtClean="0"/>
-              <a:t>12/1/2019</a:t>
+              <a:t>12/2/2019</a:t>
             </a:fld>
             <a:endParaRPr lang="en-US"/>
           </a:p>
@@ -7574,7 +7503,7 @@
           <a:p>
             <a:fld id="{1754C931-F50A-4573-B734-FF52839C32AE}" type="datetime1">
               <a:rPr lang="en-US" smtClean="0"/>
-              <a:t>12/1/2019</a:t>
+              <a:t>12/2/2019</a:t>
             </a:fld>
             <a:endParaRPr lang="en-US"/>
           </a:p>
@@ -7877,7 +7806,7 @@
           <a:p>
             <a:fld id="{0352B9FF-F800-40E0-9194-0C193CB23E31}" type="datetime1">
               <a:rPr lang="en-US" smtClean="0"/>
-              <a:t>12/1/2019</a:t>
+              <a:t>12/2/2019</a:t>
             </a:fld>
             <a:endParaRPr lang="en-US"/>
           </a:p>
@@ -8114,7 +8043,7 @@
           <a:p>
             <a:fld id="{66A336FE-01EE-4B21-B377-78359BC384C2}" type="datetime1">
               <a:rPr lang="en-US" smtClean="0"/>
-              <a:t>12/1/2019</a:t>
+              <a:t>12/2/2019</a:t>
             </a:fld>
             <a:endParaRPr lang="en-US"/>
           </a:p>
@@ -9005,7 +8934,7 @@
           <p:cNvPr id="2" name="Title 1">
             <a:extLst>
               <a:ext uri="{FF2B5EF4-FFF2-40B4-BE49-F238E27FC236}">
-                <a16:creationId xmlns:a16="http://schemas.microsoft.com/office/drawing/2014/main" id="{8D397110-BE50-4148-BFB4-F9EE98F3FCF1}"/>
+                <a16:creationId xmlns:a16="http://schemas.microsoft.com/office/drawing/2014/main" id="{6A730A49-2834-464E-9401-DACC558915EA}"/>
               </a:ext>
             </a:extLst>
           </p:cNvPr>
@@ -9016,40 +8945,80 @@
             <p:ph type="title"/>
           </p:nvPr>
         </p:nvSpPr>
-        <p:spPr/>
+        <p:spPr>
+          <a:xfrm>
+            <a:off x="913794" y="264368"/>
+            <a:ext cx="10353762" cy="970450"/>
+          </a:xfrm>
+        </p:spPr>
         <p:txBody>
           <a:bodyPr/>
           <a:lstStyle/>
           <a:p>
             <a:r>
               <a:rPr lang="en-US" dirty="0"/>
-              <a:t>Data Management ??</a:t>
-            </a:r>
-          </a:p>
-        </p:txBody>
-      </p:sp>
-      <p:sp>
-        <p:nvSpPr>
-          <p:cNvPr id="3" name="Content Placeholder 2">
+              <a:t>Security &amp; Privacy: Data Management</a:t>
+            </a:r>
+          </a:p>
+        </p:txBody>
+      </p:sp>
+      <p:pic>
+        <p:nvPicPr>
+          <p:cNvPr id="7" name="Content Placeholder 6">
             <a:extLst>
               <a:ext uri="{FF2B5EF4-FFF2-40B4-BE49-F238E27FC236}">
-                <a16:creationId xmlns:a16="http://schemas.microsoft.com/office/drawing/2014/main" id="{03716F63-CA80-4ABF-B0B4-0B59C79B3723}"/>
+                <a16:creationId xmlns:a16="http://schemas.microsoft.com/office/drawing/2014/main" id="{E1294EA0-CC45-40BA-AB9F-3D0652C2BFC2}"/>
               </a:ext>
             </a:extLst>
           </p:cNvPr>
-          <p:cNvSpPr>
-            <a:spLocks noGrp="1"/>
-          </p:cNvSpPr>
+          <p:cNvPicPr>
+            <a:picLocks noGrp="1" noChangeAspect="1"/>
+          </p:cNvPicPr>
           <p:nvPr>
             <p:ph idx="1"/>
           </p:nvPr>
+        </p:nvPicPr>
+        <p:blipFill>
+          <a:blip r:embed="rId3"/>
+          <a:stretch>
+            <a:fillRect/>
+          </a:stretch>
+        </p:blipFill>
+        <p:spPr>
+          <a:xfrm>
+            <a:off x="73157" y="1345589"/>
+            <a:ext cx="12035037" cy="4537686"/>
+          </a:xfrm>
+          <a:prstGeom prst="rect">
+            <a:avLst/>
+          </a:prstGeom>
+        </p:spPr>
+      </p:pic>
+      <p:sp>
+        <p:nvSpPr>
+          <p:cNvPr id="4" name="Footer Placeholder 3">
+            <a:extLst>
+              <a:ext uri="{FF2B5EF4-FFF2-40B4-BE49-F238E27FC236}">
+                <a16:creationId xmlns:a16="http://schemas.microsoft.com/office/drawing/2014/main" id="{4A4170B1-2ADA-4E5B-BBCE-3CE911870308}"/>
+              </a:ext>
+            </a:extLst>
+          </p:cNvPr>
+          <p:cNvSpPr>
+            <a:spLocks noGrp="1"/>
+          </p:cNvSpPr>
+          <p:nvPr>
+            <p:ph type="ftr" sz="quarter" idx="11"/>
+          </p:nvPr>
         </p:nvSpPr>
         <p:spPr/>
         <p:txBody>
           <a:bodyPr/>
           <a:lstStyle/>
           <a:p>
-            <a:endParaRPr lang="en-US" dirty="0"/>
+            <a:r>
+              <a:rPr lang="en-US" dirty="0"/>
+              <a:t>Student Organization System -  Final Systems Document</a:t>
+            </a:r>
           </a:p>
         </p:txBody>
       </p:sp>
@@ -9058,7 +9027,7 @@
           <p:cNvPr id="5" name="Slide Number Placeholder 4">
             <a:extLst>
               <a:ext uri="{FF2B5EF4-FFF2-40B4-BE49-F238E27FC236}">
-                <a16:creationId xmlns:a16="http://schemas.microsoft.com/office/drawing/2014/main" id="{6C0D16BC-F7AF-49E8-8DA4-102101BBDEA8}"/>
+                <a16:creationId xmlns:a16="http://schemas.microsoft.com/office/drawing/2014/main" id="{B2F92FC2-0601-4851-8E18-9944D6CB44B0}"/>
               </a:ext>
             </a:extLst>
           </p:cNvPr>
@@ -9085,7 +9054,7 @@
     </p:spTree>
     <p:extLst>
       <p:ext uri="{BB962C8B-B14F-4D97-AF65-F5344CB8AC3E}">
-        <p14:creationId xmlns:p14="http://schemas.microsoft.com/office/powerpoint/2010/main" val="3310205035"/>
+        <p14:creationId xmlns:p14="http://schemas.microsoft.com/office/powerpoint/2010/main" val="766670131"/>
       </p:ext>
     </p:extLst>
   </p:cSld>
@@ -9117,158 +9086,6 @@
           <p:cNvPr id="2" name="Title 1">
             <a:extLst>
               <a:ext uri="{FF2B5EF4-FFF2-40B4-BE49-F238E27FC236}">
-                <a16:creationId xmlns:a16="http://schemas.microsoft.com/office/drawing/2014/main" id="{6A730A49-2834-464E-9401-DACC558915EA}"/>
-              </a:ext>
-            </a:extLst>
-          </p:cNvPr>
-          <p:cNvSpPr>
-            <a:spLocks noGrp="1"/>
-          </p:cNvSpPr>
-          <p:nvPr>
-            <p:ph type="title"/>
-          </p:nvPr>
-        </p:nvSpPr>
-        <p:spPr>
-          <a:xfrm>
-            <a:off x="913794" y="264368"/>
-            <a:ext cx="10353762" cy="970450"/>
-          </a:xfrm>
-        </p:spPr>
-        <p:txBody>
-          <a:bodyPr/>
-          <a:lstStyle/>
-          <a:p>
-            <a:r>
-              <a:rPr lang="en-US" dirty="0"/>
-              <a:t>Security &amp; Privacy: Data Management</a:t>
-            </a:r>
-          </a:p>
-        </p:txBody>
-      </p:sp>
-      <p:pic>
-        <p:nvPicPr>
-          <p:cNvPr id="7" name="Content Placeholder 6">
-            <a:extLst>
-              <a:ext uri="{FF2B5EF4-FFF2-40B4-BE49-F238E27FC236}">
-                <a16:creationId xmlns:a16="http://schemas.microsoft.com/office/drawing/2014/main" id="{E1294EA0-CC45-40BA-AB9F-3D0652C2BFC2}"/>
-              </a:ext>
-            </a:extLst>
-          </p:cNvPr>
-          <p:cNvPicPr>
-            <a:picLocks noGrp="1" noChangeAspect="1"/>
-          </p:cNvPicPr>
-          <p:nvPr>
-            <p:ph idx="1"/>
-          </p:nvPr>
-        </p:nvPicPr>
-        <p:blipFill>
-          <a:blip r:embed="rId3"/>
-          <a:stretch>
-            <a:fillRect/>
-          </a:stretch>
-        </p:blipFill>
-        <p:spPr>
-          <a:xfrm>
-            <a:off x="73157" y="1345589"/>
-            <a:ext cx="12035037" cy="4537686"/>
-          </a:xfrm>
-          <a:prstGeom prst="rect">
-            <a:avLst/>
-          </a:prstGeom>
-        </p:spPr>
-      </p:pic>
-      <p:sp>
-        <p:nvSpPr>
-          <p:cNvPr id="4" name="Footer Placeholder 3">
-            <a:extLst>
-              <a:ext uri="{FF2B5EF4-FFF2-40B4-BE49-F238E27FC236}">
-                <a16:creationId xmlns:a16="http://schemas.microsoft.com/office/drawing/2014/main" id="{4A4170B1-2ADA-4E5B-BBCE-3CE911870308}"/>
-              </a:ext>
-            </a:extLst>
-          </p:cNvPr>
-          <p:cNvSpPr>
-            <a:spLocks noGrp="1"/>
-          </p:cNvSpPr>
-          <p:nvPr>
-            <p:ph type="ftr" sz="quarter" idx="11"/>
-          </p:nvPr>
-        </p:nvSpPr>
-        <p:spPr/>
-        <p:txBody>
-          <a:bodyPr/>
-          <a:lstStyle/>
-          <a:p>
-            <a:r>
-              <a:rPr lang="en-US" dirty="0"/>
-              <a:t>Student Organization System -  Final Systems Document</a:t>
-            </a:r>
-          </a:p>
-        </p:txBody>
-      </p:sp>
-      <p:sp>
-        <p:nvSpPr>
-          <p:cNvPr id="5" name="Slide Number Placeholder 4">
-            <a:extLst>
-              <a:ext uri="{FF2B5EF4-FFF2-40B4-BE49-F238E27FC236}">
-                <a16:creationId xmlns:a16="http://schemas.microsoft.com/office/drawing/2014/main" id="{B2F92FC2-0601-4851-8E18-9944D6CB44B0}"/>
-              </a:ext>
-            </a:extLst>
-          </p:cNvPr>
-          <p:cNvSpPr>
-            <a:spLocks noGrp="1"/>
-          </p:cNvSpPr>
-          <p:nvPr>
-            <p:ph type="sldNum" sz="quarter" idx="12"/>
-          </p:nvPr>
-        </p:nvSpPr>
-        <p:spPr/>
-        <p:txBody>
-          <a:bodyPr/>
-          <a:lstStyle/>
-          <a:p>
-            <a:fld id="{5FB0F42B-CAA9-4D4F-86CF-07230423CC99}" type="slidenum">
-              <a:rPr lang="en-US" smtClean="0"/>
-              <a:t>11</a:t>
-            </a:fld>
-            <a:endParaRPr lang="en-US"/>
-          </a:p>
-        </p:txBody>
-      </p:sp>
-    </p:spTree>
-    <p:extLst>
-      <p:ext uri="{BB962C8B-B14F-4D97-AF65-F5344CB8AC3E}">
-        <p14:creationId xmlns:p14="http://schemas.microsoft.com/office/powerpoint/2010/main" val="766670131"/>
-      </p:ext>
-    </p:extLst>
-  </p:cSld>
-  <p:clrMapOvr>
-    <a:masterClrMapping/>
-  </p:clrMapOvr>
-</p:sld>
-</file>
-
-<file path=ppt/slides/slide12.xml><?xml version="1.0" encoding="utf-8"?>
-<p:sld xmlns:a="http://schemas.openxmlformats.org/drawingml/2006/main" xmlns:r="http://schemas.openxmlformats.org/officeDocument/2006/relationships" xmlns:p="http://schemas.openxmlformats.org/presentationml/2006/main">
-  <p:cSld>
-    <p:spTree>
-      <p:nvGrpSpPr>
-        <p:cNvPr id="1" name=""/>
-        <p:cNvGrpSpPr/>
-        <p:nvPr/>
-      </p:nvGrpSpPr>
-      <p:grpSpPr>
-        <a:xfrm>
-          <a:off x="0" y="0"/>
-          <a:ext cx="0" cy="0"/>
-          <a:chOff x="0" y="0"/>
-          <a:chExt cx="0" cy="0"/>
-        </a:xfrm>
-      </p:grpSpPr>
-      <p:sp>
-        <p:nvSpPr>
-          <p:cNvPr id="2" name="Title 1">
-            <a:extLst>
-              <a:ext uri="{FF2B5EF4-FFF2-40B4-BE49-F238E27FC236}">
                 <a16:creationId xmlns:a16="http://schemas.microsoft.com/office/drawing/2014/main" id="{717D8471-15FC-4996-8A4C-889387E36703}"/>
               </a:ext>
             </a:extLst>
@@ -9390,7 +9207,7 @@
           <a:p>
             <a:fld id="{5FB0F42B-CAA9-4D4F-86CF-07230423CC99}" type="slidenum">
               <a:rPr lang="en-US" smtClean="0"/>
-              <a:t>12</a:t>
+              <a:t>11</a:t>
             </a:fld>
             <a:endParaRPr lang="en-US" dirty="0"/>
           </a:p>
@@ -9409,7 +9226,7 @@
 </p:sld>
 </file>
 
-<file path=ppt/slides/slide13.xml><?xml version="1.0" encoding="utf-8"?>
+<file path=ppt/slides/slide12.xml><?xml version="1.0" encoding="utf-8"?>
 <p:sld xmlns:a="http://schemas.openxmlformats.org/drawingml/2006/main" xmlns:r="http://schemas.openxmlformats.org/officeDocument/2006/relationships" xmlns:p="http://schemas.openxmlformats.org/presentationml/2006/main">
   <p:cSld>
     <p:bg>
@@ -9551,7 +9368,7 @@
           <a:p>
             <a:fld id="{5FB0F42B-CAA9-4D4F-86CF-07230423CC99}" type="slidenum">
               <a:rPr lang="en-US" smtClean="0"/>
-              <a:t>13</a:t>
+              <a:t>12</a:t>
             </a:fld>
             <a:endParaRPr lang="en-US"/>
           </a:p>
@@ -9570,7 +9387,7 @@
 </p:sld>
 </file>
 
-<file path=ppt/slides/slide14.xml><?xml version="1.0" encoding="utf-8"?>
+<file path=ppt/slides/slide13.xml><?xml version="1.0" encoding="utf-8"?>
 <p:sld xmlns:a="http://schemas.openxmlformats.org/drawingml/2006/main" xmlns:r="http://schemas.openxmlformats.org/officeDocument/2006/relationships" xmlns:p="http://schemas.openxmlformats.org/presentationml/2006/main">
   <p:cSld>
     <p:spTree>
@@ -9648,7 +9465,7 @@
           <a:p>
             <a:fld id="{5FB0F42B-CAA9-4D4F-86CF-07230423CC99}" type="slidenum">
               <a:rPr lang="en-US" smtClean="0"/>
-              <a:t>14</a:t>
+              <a:t>13</a:t>
             </a:fld>
             <a:endParaRPr lang="en-US" dirty="0"/>
           </a:p>
@@ -9690,6 +9507,247 @@
     <p:extLst>
       <p:ext uri="{BB962C8B-B14F-4D97-AF65-F5344CB8AC3E}">
         <p14:creationId xmlns:p14="http://schemas.microsoft.com/office/powerpoint/2010/main" val="1414546480"/>
+      </p:ext>
+    </p:extLst>
+  </p:cSld>
+  <p:clrMapOvr>
+    <a:masterClrMapping/>
+  </p:clrMapOvr>
+</p:sld>
+</file>
+
+<file path=ppt/slides/slide14.xml><?xml version="1.0" encoding="utf-8"?>
+<p:sld xmlns:a="http://schemas.openxmlformats.org/drawingml/2006/main" xmlns:r="http://schemas.openxmlformats.org/officeDocument/2006/relationships" xmlns:p="http://schemas.openxmlformats.org/presentationml/2006/main">
+  <p:cSld>
+    <p:bg>
+      <p:bgPr>
+        <a:solidFill>
+          <a:schemeClr val="bg1"/>
+        </a:solidFill>
+        <a:effectLst/>
+      </p:bgPr>
+    </p:bg>
+    <p:spTree>
+      <p:nvGrpSpPr>
+        <p:cNvPr id="1" name=""/>
+        <p:cNvGrpSpPr/>
+        <p:nvPr/>
+      </p:nvGrpSpPr>
+      <p:grpSpPr>
+        <a:xfrm>
+          <a:off x="0" y="0"/>
+          <a:ext cx="0" cy="0"/>
+          <a:chOff x="0" y="0"/>
+          <a:chExt cx="0" cy="0"/>
+        </a:xfrm>
+      </p:grpSpPr>
+      <p:sp>
+        <p:nvSpPr>
+          <p:cNvPr id="2" name="Title 1">
+            <a:extLst>
+              <a:ext uri="{FF2B5EF4-FFF2-40B4-BE49-F238E27FC236}">
+                <a16:creationId xmlns:a16="http://schemas.microsoft.com/office/drawing/2014/main" id="{5C80EEB8-5622-4702-AD82-5EEE0379B31E}"/>
+              </a:ext>
+            </a:extLst>
+          </p:cNvPr>
+          <p:cNvSpPr>
+            <a:spLocks noGrp="1"/>
+          </p:cNvSpPr>
+          <p:nvPr>
+            <p:ph type="title"/>
+          </p:nvPr>
+        </p:nvSpPr>
+        <p:spPr>
+          <a:xfrm>
+            <a:off x="787893" y="-310032"/>
+            <a:ext cx="10515600" cy="1325563"/>
+          </a:xfrm>
+        </p:spPr>
+        <p:txBody>
+          <a:bodyPr/>
+          <a:lstStyle/>
+          <a:p>
+            <a:pPr algn="ctr"/>
+            <a:r>
+              <a:rPr lang="en-US" dirty="0"/>
+              <a:t>Test Case: SOS07-System-**-Sunny**</a:t>
+            </a:r>
+          </a:p>
+        </p:txBody>
+      </p:sp>
+      <p:sp>
+        <p:nvSpPr>
+          <p:cNvPr id="7" name="Slide Number Placeholder 6">
+            <a:extLst>
+              <a:ext uri="{FF2B5EF4-FFF2-40B4-BE49-F238E27FC236}">
+                <a16:creationId xmlns:a16="http://schemas.microsoft.com/office/drawing/2014/main" id="{D0874340-2D7A-48CC-B203-7ED7D9920ABA}"/>
+              </a:ext>
+            </a:extLst>
+          </p:cNvPr>
+          <p:cNvSpPr>
+            <a:spLocks noGrp="1"/>
+          </p:cNvSpPr>
+          <p:nvPr>
+            <p:ph type="sldNum" sz="quarter" idx="12"/>
+          </p:nvPr>
+        </p:nvSpPr>
+        <p:spPr>
+          <a:xfrm>
+            <a:off x="11171739" y="6392779"/>
+            <a:ext cx="753545" cy="365125"/>
+          </a:xfrm>
+        </p:spPr>
+        <p:txBody>
+          <a:bodyPr/>
+          <a:lstStyle/>
+          <a:p>
+            <a:fld id="{5FB0F42B-CAA9-4D4F-86CF-07230423CC99}" type="slidenum">
+              <a:rPr lang="en-US" smtClean="0"/>
+              <a:t>14</a:t>
+            </a:fld>
+            <a:endParaRPr lang="en-US" dirty="0"/>
+          </a:p>
+        </p:txBody>
+      </p:sp>
+      <p:sp>
+        <p:nvSpPr>
+          <p:cNvPr id="5" name="Content Placeholder 4">
+            <a:extLst>
+              <a:ext uri="{FF2B5EF4-FFF2-40B4-BE49-F238E27FC236}">
+                <a16:creationId xmlns:a16="http://schemas.microsoft.com/office/drawing/2014/main" id="{4EDCAB97-38A8-4D96-8012-A3D8C87B9F15}"/>
+              </a:ext>
+            </a:extLst>
+          </p:cNvPr>
+          <p:cNvSpPr>
+            <a:spLocks noGrp="1"/>
+          </p:cNvSpPr>
+          <p:nvPr>
+            <p:ph idx="1"/>
+          </p:nvPr>
+        </p:nvSpPr>
+        <p:spPr>
+          <a:xfrm>
+            <a:off x="0" y="952247"/>
+            <a:ext cx="12192001" cy="5805657"/>
+          </a:xfrm>
+        </p:spPr>
+        <p:txBody>
+          <a:bodyPr>
+            <a:normAutofit/>
+          </a:bodyPr>
+          <a:lstStyle/>
+          <a:p>
+            <a:r>
+              <a:rPr lang="en-US" sz="2200" b="1" dirty="0">
+                <a:effectLst/>
+              </a:rPr>
+              <a:t>Purpose</a:t>
+            </a:r>
+            <a:r>
+              <a:rPr lang="en-US" sz="2200" dirty="0">
+                <a:effectLst/>
+              </a:rPr>
+              <a:t>: Ensure that a Profile that exists in SOS is able to have its email address changed.</a:t>
+            </a:r>
+          </a:p>
+          <a:p>
+            <a:r>
+              <a:rPr lang="en-US" sz="2200" b="1" dirty="0">
+                <a:effectLst/>
+              </a:rPr>
+              <a:t>Test set-up</a:t>
+            </a:r>
+            <a:r>
+              <a:rPr lang="en-US" sz="2200" dirty="0">
+                <a:effectLst/>
+              </a:rPr>
+              <a:t>: There is already a user who has made a profile within the system. </a:t>
+            </a:r>
+          </a:p>
+          <a:p>
+            <a:r>
+              <a:rPr lang="en-US" sz="2200" b="1" dirty="0">
+                <a:effectLst/>
+              </a:rPr>
+              <a:t>Input:</a:t>
+            </a:r>
+          </a:p>
+          <a:p>
+            <a:pPr marL="494100" indent="-457200">
+              <a:buAutoNum type="arabicPeriod"/>
+            </a:pPr>
+            <a:r>
+              <a:rPr lang="en-US" sz="2200" dirty="0">
+                <a:effectLst/>
+              </a:rPr>
+              <a:t>From profile page the user will click on the ‘edit profile’ button. </a:t>
+            </a:r>
+          </a:p>
+          <a:p>
+            <a:pPr marL="494100" indent="-457200">
+              <a:buAutoNum type="arabicPeriod"/>
+            </a:pPr>
+            <a:r>
+              <a:rPr lang="en-US" sz="2200" dirty="0">
+                <a:effectLst/>
+              </a:rPr>
+              <a:t>Then a form will pop up that has information she had already inserted before.</a:t>
+            </a:r>
+          </a:p>
+          <a:p>
+            <a:pPr marL="494100" indent="-457200">
+              <a:buAutoNum type="arabicPeriod"/>
+            </a:pPr>
+            <a:r>
+              <a:rPr lang="en-US" sz="2200" dirty="0">
+                <a:effectLst/>
+              </a:rPr>
+              <a:t>She inserts the change into the email field, erasing style@hotmail.com and typing in fab@gmail.com</a:t>
+            </a:r>
+          </a:p>
+          <a:p>
+            <a:pPr marL="494100" indent="-457200">
+              <a:buAutoNum type="arabicPeriod"/>
+            </a:pPr>
+            <a:r>
+              <a:rPr lang="en-US" sz="2200" dirty="0">
+                <a:effectLst/>
+              </a:rPr>
+              <a:t>She will click the “submit” button.</a:t>
+            </a:r>
+          </a:p>
+          <a:p>
+            <a:pPr marL="494100" indent="-457200">
+              <a:buAutoNum type="arabicPeriod"/>
+            </a:pPr>
+            <a:r>
+              <a:rPr lang="en-US" sz="2200" dirty="0">
+                <a:effectLst/>
+              </a:rPr>
+              <a:t>She will enter her password.</a:t>
+            </a:r>
+          </a:p>
+          <a:p>
+            <a:r>
+              <a:rPr lang="en-US" sz="2200" b="1" dirty="0">
+                <a:effectLst/>
+              </a:rPr>
+              <a:t>Expected Output</a:t>
+            </a:r>
+            <a:r>
+              <a:rPr lang="en-US" sz="2200" dirty="0">
+                <a:effectLst/>
+              </a:rPr>
+              <a:t>: The SOS system display a success pop-up and displays the new email to the user.</a:t>
+            </a:r>
+            <a:endParaRPr lang="en-US" sz="2200" dirty="0"/>
+          </a:p>
+        </p:txBody>
+      </p:sp>
+    </p:spTree>
+    <p:extLst>
+      <p:ext uri="{BB962C8B-B14F-4D97-AF65-F5344CB8AC3E}">
+        <p14:creationId xmlns:p14="http://schemas.microsoft.com/office/powerpoint/2010/main" val="499540092"/>
       </p:ext>
     </p:extLst>
   </p:cSld>
@@ -9729,7 +9787,7 @@
           <p:cNvPr id="2" name="Title 1">
             <a:extLst>
               <a:ext uri="{FF2B5EF4-FFF2-40B4-BE49-F238E27FC236}">
-                <a16:creationId xmlns:a16="http://schemas.microsoft.com/office/drawing/2014/main" id="{5C80EEB8-5622-4702-AD82-5EEE0379B31E}"/>
+                <a16:creationId xmlns:a16="http://schemas.microsoft.com/office/drawing/2014/main" id="{5FB8B40E-E978-4CA5-A7F8-8ECDF16ED7B8}"/>
               </a:ext>
             </a:extLst>
           </p:cNvPr>
@@ -9742,7 +9800,7 @@
         </p:nvSpPr>
         <p:spPr>
           <a:xfrm>
-            <a:off x="787893" y="-310032"/>
+            <a:off x="838199" y="-251196"/>
             <a:ext cx="10515600" cy="1325563"/>
           </a:xfrm>
         </p:spPr>
@@ -9750,20 +9808,19 @@
           <a:bodyPr/>
           <a:lstStyle/>
           <a:p>
-            <a:pPr algn="ctr"/>
             <a:r>
               <a:rPr lang="en-US" dirty="0"/>
-              <a:t>Test Case: SOS07-System-**-Sunny**</a:t>
-            </a:r>
-          </a:p>
-        </p:txBody>
-      </p:sp>
-      <p:sp>
-        <p:nvSpPr>
-          <p:cNvPr id="7" name="Slide Number Placeholder 6">
+              <a:t>Test Case: SOS07-System-**-Rainy**</a:t>
+            </a:r>
+          </a:p>
+        </p:txBody>
+      </p:sp>
+      <p:sp>
+        <p:nvSpPr>
+          <p:cNvPr id="6" name="Slide Number Placeholder 5">
             <a:extLst>
               <a:ext uri="{FF2B5EF4-FFF2-40B4-BE49-F238E27FC236}">
-                <a16:creationId xmlns:a16="http://schemas.microsoft.com/office/drawing/2014/main" id="{D0874340-2D7A-48CC-B203-7ED7D9920ABA}"/>
+                <a16:creationId xmlns:a16="http://schemas.microsoft.com/office/drawing/2014/main" id="{83D7B75E-CD89-4451-AA61-D4A5221E0C74}"/>
               </a:ext>
             </a:extLst>
           </p:cNvPr>
@@ -9776,7 +9833,7 @@
         </p:nvSpPr>
         <p:spPr>
           <a:xfrm>
-            <a:off x="11171739" y="6392779"/>
+            <a:off x="10806974" y="6108006"/>
             <a:ext cx="753545" cy="365125"/>
           </a:xfrm>
         </p:spPr>
@@ -9794,10 +9851,10 @@
       </p:sp>
       <p:sp>
         <p:nvSpPr>
-          <p:cNvPr id="5" name="Content Placeholder 4">
+          <p:cNvPr id="4" name="Content Placeholder 3">
             <a:extLst>
               <a:ext uri="{FF2B5EF4-FFF2-40B4-BE49-F238E27FC236}">
-                <a16:creationId xmlns:a16="http://schemas.microsoft.com/office/drawing/2014/main" id="{4EDCAB97-38A8-4D96-8012-A3D8C87B9F15}"/>
+                <a16:creationId xmlns:a16="http://schemas.microsoft.com/office/drawing/2014/main" id="{C0FE504E-29EC-4DEB-B0E6-E6B15FCFE32E}"/>
               </a:ext>
             </a:extLst>
           </p:cNvPr>
@@ -9810,8 +9867,8 @@
         </p:nvSpPr>
         <p:spPr>
           <a:xfrm>
-            <a:off x="0" y="952247"/>
-            <a:ext cx="12192001" cy="5805657"/>
+            <a:off x="192349" y="1256929"/>
+            <a:ext cx="11694851" cy="5216201"/>
           </a:xfrm>
         </p:spPr>
         <p:txBody>
@@ -9824,13 +9881,13 @@
               <a:rPr lang="en-US" sz="2200" b="1" dirty="0">
                 <a:effectLst/>
               </a:rPr>
-              <a:t>Purpose</a:t>
+              <a:t>Purpose: </a:t>
             </a:r>
             <a:r>
               <a:rPr lang="en-US" sz="2200" dirty="0">
                 <a:effectLst/>
               </a:rPr>
-              <a:t>: Ensure that a Profile that exists in SOS is able to have its email address changed.</a:t>
+              <a:t>Test how the system will react to user attempting to edit their profile but instead cancels from the form.</a:t>
             </a:r>
           </a:p>
           <a:p>
@@ -9838,13 +9895,13 @@
               <a:rPr lang="en-US" sz="2200" b="1" dirty="0">
                 <a:effectLst/>
               </a:rPr>
-              <a:t>Test set-up</a:t>
+              <a:t>Test set-up:</a:t>
             </a:r>
             <a:r>
               <a:rPr lang="en-US" sz="2200" dirty="0">
                 <a:effectLst/>
               </a:rPr>
-              <a:t>: There is already a user who has made a profile within the system. </a:t>
+              <a:t> User already has a profile on the account. </a:t>
             </a:r>
           </a:p>
           <a:p>
@@ -9854,75 +9911,69 @@
               </a:rPr>
               <a:t>Input:</a:t>
             </a:r>
-          </a:p>
-          <a:p>
-            <a:pPr marL="494100" indent="-457200">
-              <a:buAutoNum type="arabicPeriod"/>
+            <a:endParaRPr lang="en-US" sz="2200" dirty="0">
+              <a:effectLst/>
+            </a:endParaRPr>
+          </a:p>
+          <a:p>
+            <a:pPr marL="36900" lvl="0" indent="0">
+              <a:buNone/>
             </a:pPr>
             <a:r>
               <a:rPr lang="en-US" sz="2200" dirty="0">
                 <a:effectLst/>
               </a:rPr>
-              <a:t>From profile page the user will click on the ‘edit profile’ button. </a:t>
-            </a:r>
-          </a:p>
-          <a:p>
-            <a:pPr marL="494100" indent="-457200">
-              <a:buAutoNum type="arabicPeriod"/>
+              <a:t>1. Clicks on “edit profile” button.</a:t>
+            </a:r>
+          </a:p>
+          <a:p>
+            <a:pPr marL="36900" lvl="0" indent="0">
+              <a:buNone/>
             </a:pPr>
             <a:r>
               <a:rPr lang="en-US" sz="2200" dirty="0">
                 <a:effectLst/>
               </a:rPr>
-              <a:t>Then a form will pop up that has information she had already inserted before.</a:t>
-            </a:r>
-          </a:p>
-          <a:p>
-            <a:pPr marL="494100" indent="-457200">
-              <a:buAutoNum type="arabicPeriod"/>
+              <a:t>2. Form pops up to shown information that has been inserted before.</a:t>
+            </a:r>
+          </a:p>
+          <a:p>
+            <a:pPr marL="36900" lvl="0" indent="0">
+              <a:buNone/>
             </a:pPr>
             <a:r>
               <a:rPr lang="en-US" sz="2200" dirty="0">
                 <a:effectLst/>
               </a:rPr>
-              <a:t>She inserts the change into the email field, erasing style@hotmail.com and typing in fab@gmail.com</a:t>
-            </a:r>
-          </a:p>
-          <a:p>
-            <a:pPr marL="494100" indent="-457200">
-              <a:buAutoNum type="arabicPeriod"/>
+              <a:t>3. User realizes that there is actually no mistake and he did enter his number correctly.</a:t>
+            </a:r>
+          </a:p>
+          <a:p>
+            <a:pPr marL="36900" lvl="0" indent="0">
+              <a:buNone/>
             </a:pPr>
             <a:r>
               <a:rPr lang="en-US" sz="2200" dirty="0">
                 <a:effectLst/>
               </a:rPr>
-              <a:t>She will click the “submit” button.</a:t>
-            </a:r>
-          </a:p>
-          <a:p>
-            <a:pPr marL="494100" indent="-457200">
-              <a:buAutoNum type="arabicPeriod"/>
-            </a:pPr>
+              <a:t>4. they presses the “x” button at the upper right corner of the form to close it.</a:t>
+            </a:r>
+          </a:p>
+          <a:p>
+            <a:r>
+              <a:rPr lang="en-US" sz="2200" b="1" dirty="0">
+                <a:effectLst/>
+              </a:rPr>
+              <a:t>Expected Output:</a:t>
+            </a:r>
             <a:r>
               <a:rPr lang="en-US" sz="2200" dirty="0">
                 <a:effectLst/>
               </a:rPr>
-              <a:t>She will enter her password.</a:t>
-            </a:r>
-          </a:p>
-          <a:p>
-            <a:r>
-              <a:rPr lang="en-US" sz="2200" b="1" dirty="0">
-                <a:effectLst/>
-              </a:rPr>
-              <a:t>Expected Output</a:t>
-            </a:r>
-            <a:r>
-              <a:rPr lang="en-US" sz="2200" dirty="0">
-                <a:effectLst/>
-              </a:rPr>
-              <a:t>: The SOS system display a success pop-up and displays the new email to the user.</a:t>
-            </a:r>
+              <a:t> No changes have occurred to profile information. User is back on profile page.</a:t>
+            </a:r>
+          </a:p>
+          <a:p>
             <a:endParaRPr lang="en-US" sz="2200" dirty="0"/>
           </a:p>
         </p:txBody>
@@ -9930,7 +9981,7 @@
     </p:spTree>
     <p:extLst>
       <p:ext uri="{BB962C8B-B14F-4D97-AF65-F5344CB8AC3E}">
-        <p14:creationId xmlns:p14="http://schemas.microsoft.com/office/powerpoint/2010/main" val="499540092"/>
+        <p14:creationId xmlns:p14="http://schemas.microsoft.com/office/powerpoint/2010/main" val="3606661239"/>
       </p:ext>
     </p:extLst>
   </p:cSld>
@@ -9943,14 +9994,6 @@
 <file path=ppt/slides/slide16.xml><?xml version="1.0" encoding="utf-8"?>
 <p:sld xmlns:a="http://schemas.openxmlformats.org/drawingml/2006/main" xmlns:r="http://schemas.openxmlformats.org/officeDocument/2006/relationships" xmlns:p="http://schemas.openxmlformats.org/presentationml/2006/main">
   <p:cSld>
-    <p:bg>
-      <p:bgPr>
-        <a:solidFill>
-          <a:schemeClr val="bg1"/>
-        </a:solidFill>
-        <a:effectLst/>
-      </p:bgPr>
-    </p:bg>
     <p:spTree>
       <p:nvGrpSpPr>
         <p:cNvPr id="1" name=""/>
@@ -9970,7 +10013,7 @@
           <p:cNvPr id="2" name="Title 1">
             <a:extLst>
               <a:ext uri="{FF2B5EF4-FFF2-40B4-BE49-F238E27FC236}">
-                <a16:creationId xmlns:a16="http://schemas.microsoft.com/office/drawing/2014/main" id="{5FB8B40E-E978-4CA5-A7F8-8ECDF16ED7B8}"/>
+                <a16:creationId xmlns:a16="http://schemas.microsoft.com/office/drawing/2014/main" id="{13E81D7D-0FCE-41E5-A10E-4D37B63C5AEA}"/>
               </a:ext>
             </a:extLst>
           </p:cNvPr>
@@ -9983,7 +10026,7 @@
         </p:nvSpPr>
         <p:spPr>
           <a:xfrm>
-            <a:off x="838199" y="-251196"/>
+            <a:off x="838200" y="-160421"/>
             <a:ext cx="10515600" cy="1325563"/>
           </a:xfrm>
         </p:spPr>
@@ -9993,17 +10036,24 @@
           <a:p>
             <a:r>
               <a:rPr lang="en-US" dirty="0"/>
-              <a:t>Test Case: SOS07-System-**-Rainy**</a:t>
-            </a:r>
-          </a:p>
-        </p:txBody>
-      </p:sp>
-      <p:sp>
-        <p:nvSpPr>
-          <p:cNvPr id="6" name="Slide Number Placeholder 5">
+              <a:t>Test Case: </a:t>
+            </a:r>
+            <a:r>
+              <a:rPr lang="en-US" dirty="0">
+                <a:effectLst/>
+              </a:rPr>
+              <a:t>SOS16-System-**-Sunny**</a:t>
+            </a:r>
+            <a:endParaRPr lang="en-US" dirty="0"/>
+          </a:p>
+        </p:txBody>
+      </p:sp>
+      <p:sp>
+        <p:nvSpPr>
+          <p:cNvPr id="4" name="Content Placeholder 3">
             <a:extLst>
               <a:ext uri="{FF2B5EF4-FFF2-40B4-BE49-F238E27FC236}">
-                <a16:creationId xmlns:a16="http://schemas.microsoft.com/office/drawing/2014/main" id="{83D7B75E-CD89-4451-AA61-D4A5221E0C74}"/>
+                <a16:creationId xmlns:a16="http://schemas.microsoft.com/office/drawing/2014/main" id="{BFC6A109-35D1-40A0-A541-34831739E181}"/>
               </a:ext>
             </a:extLst>
           </p:cNvPr>
@@ -10011,12 +10061,151 @@
             <a:spLocks noGrp="1"/>
           </p:cNvSpPr>
           <p:nvPr>
-            <p:ph type="sldNum" sz="quarter" idx="12"/>
+            <p:ph idx="1"/>
           </p:nvPr>
         </p:nvSpPr>
         <p:spPr>
           <a:xfrm>
-            <a:off x="10806974" y="6108006"/>
+            <a:off x="0" y="937590"/>
+            <a:ext cx="12192000" cy="5635487"/>
+          </a:xfrm>
+        </p:spPr>
+        <p:txBody>
+          <a:bodyPr>
+            <a:noAutofit/>
+          </a:bodyPr>
+          <a:lstStyle/>
+          <a:p>
+            <a:pPr marL="36900" indent="0">
+              <a:buNone/>
+            </a:pPr>
+            <a:r>
+              <a:rPr lang="en-US" sz="2200" b="1" dirty="0">
+                <a:effectLst/>
+              </a:rPr>
+              <a:t>Purpose</a:t>
+            </a:r>
+            <a:r>
+              <a:rPr lang="en-US" sz="2200" dirty="0">
+                <a:effectLst/>
+              </a:rPr>
+              <a:t>: Ensure that a user can successfully create an organization on the website</a:t>
+            </a:r>
+          </a:p>
+          <a:p>
+            <a:pPr marL="36900" indent="0">
+              <a:buNone/>
+            </a:pPr>
+            <a:r>
+              <a:rPr lang="en-US" sz="2200" b="1" dirty="0">
+                <a:effectLst/>
+              </a:rPr>
+              <a:t>Test set-up</a:t>
+            </a:r>
+            <a:r>
+              <a:rPr lang="en-US" sz="2200" dirty="0">
+                <a:effectLst/>
+              </a:rPr>
+              <a:t>: User is logged into her account.</a:t>
+            </a:r>
+          </a:p>
+          <a:p>
+            <a:pPr marL="36900" indent="0">
+              <a:buNone/>
+            </a:pPr>
+            <a:r>
+              <a:rPr lang="en-US" sz="2200" b="1" dirty="0">
+                <a:effectLst/>
+              </a:rPr>
+              <a:t>Input</a:t>
+            </a:r>
+            <a:r>
+              <a:rPr lang="en-US" sz="2200" dirty="0">
+                <a:effectLst/>
+              </a:rPr>
+              <a:t>:</a:t>
+            </a:r>
+          </a:p>
+          <a:p>
+            <a:pPr marL="36900" lvl="0" indent="0">
+              <a:buNone/>
+            </a:pPr>
+            <a:r>
+              <a:rPr lang="en-US" sz="2200" dirty="0">
+                <a:effectLst/>
+              </a:rPr>
+              <a:t>1. User clicks on “Create Organization” button</a:t>
+            </a:r>
+          </a:p>
+          <a:p>
+            <a:pPr marL="36900" lvl="0" indent="0">
+              <a:buNone/>
+            </a:pPr>
+            <a:r>
+              <a:rPr lang="en-US" sz="2200" dirty="0">
+                <a:effectLst/>
+              </a:rPr>
+              <a:t>2. A form will pop up in front of the screen to enter information</a:t>
+            </a:r>
+          </a:p>
+          <a:p>
+            <a:pPr marL="36900" lvl="0" indent="0">
+              <a:buNone/>
+            </a:pPr>
+            <a:r>
+              <a:rPr lang="en-US" sz="2200" dirty="0">
+                <a:effectLst/>
+              </a:rPr>
+              <a:t>3. User enters data in respective fields: Organization Name = “QRT” ; Description = “Lets study” ; Requirements for Joining = none ; Privacy = “public”</a:t>
+            </a:r>
+          </a:p>
+          <a:p>
+            <a:pPr marL="36900" lvl="0" indent="0">
+              <a:buNone/>
+            </a:pPr>
+            <a:r>
+              <a:rPr lang="en-US" sz="2200" dirty="0">
+                <a:effectLst/>
+              </a:rPr>
+              <a:t>4. She then clicks on the “submit” button</a:t>
+            </a:r>
+          </a:p>
+          <a:p>
+            <a:r>
+              <a:rPr lang="en-US" sz="2200" b="1" dirty="0">
+                <a:effectLst/>
+              </a:rPr>
+              <a:t>Expected Output</a:t>
+            </a:r>
+            <a:r>
+              <a:rPr lang="en-US" sz="2200" dirty="0">
+                <a:effectLst/>
+              </a:rPr>
+              <a:t>: The request is submitted and a pop up about the Organization will appear before the user. </a:t>
+            </a:r>
+            <a:endParaRPr lang="en-US" sz="2200" dirty="0"/>
+          </a:p>
+        </p:txBody>
+      </p:sp>
+      <p:sp>
+        <p:nvSpPr>
+          <p:cNvPr id="5" name="Slide Number Placeholder 4">
+            <a:extLst>
+              <a:ext uri="{FF2B5EF4-FFF2-40B4-BE49-F238E27FC236}">
+                <a16:creationId xmlns:a16="http://schemas.microsoft.com/office/drawing/2014/main" id="{933B5355-0805-432D-94DE-96121B93A1C4}"/>
+              </a:ext>
+            </a:extLst>
+          </p:cNvPr>
+          <p:cNvSpPr>
+            <a:spLocks noGrp="1"/>
+          </p:cNvSpPr>
+          <p:nvPr>
+            <p:ph type="sldNum" sz="quarter" idx="12"/>
+          </p:nvPr>
+        </p:nvSpPr>
+        <p:spPr>
+          <a:xfrm>
+            <a:off x="10779055" y="6132717"/>
             <a:ext cx="753545" cy="365125"/>
           </a:xfrm>
         </p:spPr>
@@ -10032,139 +10221,10 @@
           </a:p>
         </p:txBody>
       </p:sp>
-      <p:sp>
-        <p:nvSpPr>
-          <p:cNvPr id="4" name="Content Placeholder 3">
-            <a:extLst>
-              <a:ext uri="{FF2B5EF4-FFF2-40B4-BE49-F238E27FC236}">
-                <a16:creationId xmlns:a16="http://schemas.microsoft.com/office/drawing/2014/main" id="{C0FE504E-29EC-4DEB-B0E6-E6B15FCFE32E}"/>
-              </a:ext>
-            </a:extLst>
-          </p:cNvPr>
-          <p:cNvSpPr>
-            <a:spLocks noGrp="1"/>
-          </p:cNvSpPr>
-          <p:nvPr>
-            <p:ph idx="1"/>
-          </p:nvPr>
-        </p:nvSpPr>
-        <p:spPr>
-          <a:xfrm>
-            <a:off x="192349" y="1256929"/>
-            <a:ext cx="11694851" cy="5216201"/>
-          </a:xfrm>
-        </p:spPr>
-        <p:txBody>
-          <a:bodyPr>
-            <a:normAutofit/>
-          </a:bodyPr>
-          <a:lstStyle/>
-          <a:p>
-            <a:r>
-              <a:rPr lang="en-US" sz="2200" b="1" dirty="0">
-                <a:effectLst/>
-              </a:rPr>
-              <a:t>Purpose: </a:t>
-            </a:r>
-            <a:r>
-              <a:rPr lang="en-US" sz="2200" dirty="0">
-                <a:effectLst/>
-              </a:rPr>
-              <a:t>Test how the system will react to user attempting to edit their profile but instead cancels from the form.</a:t>
-            </a:r>
-          </a:p>
-          <a:p>
-            <a:r>
-              <a:rPr lang="en-US" sz="2200" b="1" dirty="0">
-                <a:effectLst/>
-              </a:rPr>
-              <a:t>Test set-up:</a:t>
-            </a:r>
-            <a:r>
-              <a:rPr lang="en-US" sz="2200" dirty="0">
-                <a:effectLst/>
-              </a:rPr>
-              <a:t> User already has a profile on the account. </a:t>
-            </a:r>
-          </a:p>
-          <a:p>
-            <a:r>
-              <a:rPr lang="en-US" sz="2200" b="1" dirty="0">
-                <a:effectLst/>
-              </a:rPr>
-              <a:t>Input:</a:t>
-            </a:r>
-            <a:endParaRPr lang="en-US" sz="2200" dirty="0">
-              <a:effectLst/>
-            </a:endParaRPr>
-          </a:p>
-          <a:p>
-            <a:pPr marL="36900" lvl="0" indent="0">
-              <a:buNone/>
-            </a:pPr>
-            <a:r>
-              <a:rPr lang="en-US" sz="2200" dirty="0">
-                <a:effectLst/>
-              </a:rPr>
-              <a:t>1. Clicks on “edit profile” button.</a:t>
-            </a:r>
-          </a:p>
-          <a:p>
-            <a:pPr marL="36900" lvl="0" indent="0">
-              <a:buNone/>
-            </a:pPr>
-            <a:r>
-              <a:rPr lang="en-US" sz="2200" dirty="0">
-                <a:effectLst/>
-              </a:rPr>
-              <a:t>2. Form pops up to shown information that has been inserted before.</a:t>
-            </a:r>
-          </a:p>
-          <a:p>
-            <a:pPr marL="36900" lvl="0" indent="0">
-              <a:buNone/>
-            </a:pPr>
-            <a:r>
-              <a:rPr lang="en-US" sz="2200" dirty="0">
-                <a:effectLst/>
-              </a:rPr>
-              <a:t>3. User realizes that there is actually no mistake and he did enter his number correctly.</a:t>
-            </a:r>
-          </a:p>
-          <a:p>
-            <a:pPr marL="36900" lvl="0" indent="0">
-              <a:buNone/>
-            </a:pPr>
-            <a:r>
-              <a:rPr lang="en-US" sz="2200" dirty="0">
-                <a:effectLst/>
-              </a:rPr>
-              <a:t>4. they presses the “x” button at the upper right corner of the form to close it.</a:t>
-            </a:r>
-          </a:p>
-          <a:p>
-            <a:r>
-              <a:rPr lang="en-US" sz="2200" b="1" dirty="0">
-                <a:effectLst/>
-              </a:rPr>
-              <a:t>Expected Output:</a:t>
-            </a:r>
-            <a:r>
-              <a:rPr lang="en-US" sz="2200" dirty="0">
-                <a:effectLst/>
-              </a:rPr>
-              <a:t> No changes have occurred to profile information. User is back on profile page.</a:t>
-            </a:r>
-          </a:p>
-          <a:p>
-            <a:endParaRPr lang="en-US" sz="2200" dirty="0"/>
-          </a:p>
-        </p:txBody>
-      </p:sp>
     </p:spTree>
     <p:extLst>
       <p:ext uri="{BB962C8B-B14F-4D97-AF65-F5344CB8AC3E}">
-        <p14:creationId xmlns:p14="http://schemas.microsoft.com/office/powerpoint/2010/main" val="3606661239"/>
+        <p14:creationId xmlns:p14="http://schemas.microsoft.com/office/powerpoint/2010/main" val="2311186588"/>
       </p:ext>
     </p:extLst>
   </p:cSld>
@@ -10196,249 +10256,6 @@
           <p:cNvPr id="2" name="Title 1">
             <a:extLst>
               <a:ext uri="{FF2B5EF4-FFF2-40B4-BE49-F238E27FC236}">
-                <a16:creationId xmlns:a16="http://schemas.microsoft.com/office/drawing/2014/main" id="{13E81D7D-0FCE-41E5-A10E-4D37B63C5AEA}"/>
-              </a:ext>
-            </a:extLst>
-          </p:cNvPr>
-          <p:cNvSpPr>
-            <a:spLocks noGrp="1"/>
-          </p:cNvSpPr>
-          <p:nvPr>
-            <p:ph type="title"/>
-          </p:nvPr>
-        </p:nvSpPr>
-        <p:spPr>
-          <a:xfrm>
-            <a:off x="838200" y="-160421"/>
-            <a:ext cx="10515600" cy="1325563"/>
-          </a:xfrm>
-        </p:spPr>
-        <p:txBody>
-          <a:bodyPr/>
-          <a:lstStyle/>
-          <a:p>
-            <a:r>
-              <a:rPr lang="en-US" dirty="0"/>
-              <a:t>Test Case: </a:t>
-            </a:r>
-            <a:r>
-              <a:rPr lang="en-US" dirty="0">
-                <a:effectLst/>
-              </a:rPr>
-              <a:t>SOS16-System-**-Sunny**</a:t>
-            </a:r>
-            <a:endParaRPr lang="en-US" dirty="0"/>
-          </a:p>
-        </p:txBody>
-      </p:sp>
-      <p:sp>
-        <p:nvSpPr>
-          <p:cNvPr id="4" name="Content Placeholder 3">
-            <a:extLst>
-              <a:ext uri="{FF2B5EF4-FFF2-40B4-BE49-F238E27FC236}">
-                <a16:creationId xmlns:a16="http://schemas.microsoft.com/office/drawing/2014/main" id="{BFC6A109-35D1-40A0-A541-34831739E181}"/>
-              </a:ext>
-            </a:extLst>
-          </p:cNvPr>
-          <p:cNvSpPr>
-            <a:spLocks noGrp="1"/>
-          </p:cNvSpPr>
-          <p:nvPr>
-            <p:ph idx="1"/>
-          </p:nvPr>
-        </p:nvSpPr>
-        <p:spPr>
-          <a:xfrm>
-            <a:off x="0" y="937590"/>
-            <a:ext cx="12192000" cy="5635487"/>
-          </a:xfrm>
-        </p:spPr>
-        <p:txBody>
-          <a:bodyPr>
-            <a:noAutofit/>
-          </a:bodyPr>
-          <a:lstStyle/>
-          <a:p>
-            <a:pPr marL="36900" indent="0">
-              <a:buNone/>
-            </a:pPr>
-            <a:r>
-              <a:rPr lang="en-US" sz="2200" b="1" dirty="0">
-                <a:effectLst/>
-              </a:rPr>
-              <a:t>Purpose</a:t>
-            </a:r>
-            <a:r>
-              <a:rPr lang="en-US" sz="2200" dirty="0">
-                <a:effectLst/>
-              </a:rPr>
-              <a:t>: Ensure that a user can successfully create an organization on the website</a:t>
-            </a:r>
-          </a:p>
-          <a:p>
-            <a:pPr marL="36900" indent="0">
-              <a:buNone/>
-            </a:pPr>
-            <a:r>
-              <a:rPr lang="en-US" sz="2200" b="1" dirty="0">
-                <a:effectLst/>
-              </a:rPr>
-              <a:t>Test set-up</a:t>
-            </a:r>
-            <a:r>
-              <a:rPr lang="en-US" sz="2200" dirty="0">
-                <a:effectLst/>
-              </a:rPr>
-              <a:t>: User is logged into her account.</a:t>
-            </a:r>
-          </a:p>
-          <a:p>
-            <a:pPr marL="36900" indent="0">
-              <a:buNone/>
-            </a:pPr>
-            <a:r>
-              <a:rPr lang="en-US" sz="2200" b="1" dirty="0">
-                <a:effectLst/>
-              </a:rPr>
-              <a:t>Input</a:t>
-            </a:r>
-            <a:r>
-              <a:rPr lang="en-US" sz="2200" dirty="0">
-                <a:effectLst/>
-              </a:rPr>
-              <a:t>:</a:t>
-            </a:r>
-          </a:p>
-          <a:p>
-            <a:pPr marL="36900" lvl="0" indent="0">
-              <a:buNone/>
-            </a:pPr>
-            <a:r>
-              <a:rPr lang="en-US" sz="2200" dirty="0">
-                <a:effectLst/>
-              </a:rPr>
-              <a:t>1. User clicks on “Create Organization” button</a:t>
-            </a:r>
-          </a:p>
-          <a:p>
-            <a:pPr marL="36900" lvl="0" indent="0">
-              <a:buNone/>
-            </a:pPr>
-            <a:r>
-              <a:rPr lang="en-US" sz="2200" dirty="0">
-                <a:effectLst/>
-              </a:rPr>
-              <a:t>2. A form will pop up in front of the screen to enter information</a:t>
-            </a:r>
-          </a:p>
-          <a:p>
-            <a:pPr marL="36900" lvl="0" indent="0">
-              <a:buNone/>
-            </a:pPr>
-            <a:r>
-              <a:rPr lang="en-US" sz="2200" dirty="0">
-                <a:effectLst/>
-              </a:rPr>
-              <a:t>3. User enters data in respective fields: Organization Name = “QRT” ; Description = “Lets study” ; Requirements for Joining = none ; Privacy = “public”</a:t>
-            </a:r>
-          </a:p>
-          <a:p>
-            <a:pPr marL="36900" lvl="0" indent="0">
-              <a:buNone/>
-            </a:pPr>
-            <a:r>
-              <a:rPr lang="en-US" sz="2200" dirty="0">
-                <a:effectLst/>
-              </a:rPr>
-              <a:t>4. She then clicks on the “submit” button</a:t>
-            </a:r>
-          </a:p>
-          <a:p>
-            <a:r>
-              <a:rPr lang="en-US" sz="2200" b="1" dirty="0">
-                <a:effectLst/>
-              </a:rPr>
-              <a:t>Expected Output</a:t>
-            </a:r>
-            <a:r>
-              <a:rPr lang="en-US" sz="2200" dirty="0">
-                <a:effectLst/>
-              </a:rPr>
-              <a:t>: The request is submitted and a pop up about the Organization will appear before the user. </a:t>
-            </a:r>
-            <a:endParaRPr lang="en-US" sz="2200" dirty="0"/>
-          </a:p>
-        </p:txBody>
-      </p:sp>
-      <p:sp>
-        <p:nvSpPr>
-          <p:cNvPr id="5" name="Slide Number Placeholder 4">
-            <a:extLst>
-              <a:ext uri="{FF2B5EF4-FFF2-40B4-BE49-F238E27FC236}">
-                <a16:creationId xmlns:a16="http://schemas.microsoft.com/office/drawing/2014/main" id="{933B5355-0805-432D-94DE-96121B93A1C4}"/>
-              </a:ext>
-            </a:extLst>
-          </p:cNvPr>
-          <p:cNvSpPr>
-            <a:spLocks noGrp="1"/>
-          </p:cNvSpPr>
-          <p:nvPr>
-            <p:ph type="sldNum" sz="quarter" idx="12"/>
-          </p:nvPr>
-        </p:nvSpPr>
-        <p:spPr>
-          <a:xfrm>
-            <a:off x="10779055" y="6132717"/>
-            <a:ext cx="753545" cy="365125"/>
-          </a:xfrm>
-        </p:spPr>
-        <p:txBody>
-          <a:bodyPr/>
-          <a:lstStyle/>
-          <a:p>
-            <a:fld id="{5FB0F42B-CAA9-4D4F-86CF-07230423CC99}" type="slidenum">
-              <a:rPr lang="en-US" smtClean="0"/>
-              <a:t>17</a:t>
-            </a:fld>
-            <a:endParaRPr lang="en-US" dirty="0"/>
-          </a:p>
-        </p:txBody>
-      </p:sp>
-    </p:spTree>
-    <p:extLst>
-      <p:ext uri="{BB962C8B-B14F-4D97-AF65-F5344CB8AC3E}">
-        <p14:creationId xmlns:p14="http://schemas.microsoft.com/office/powerpoint/2010/main" val="2311186588"/>
-      </p:ext>
-    </p:extLst>
-  </p:cSld>
-  <p:clrMapOvr>
-    <a:masterClrMapping/>
-  </p:clrMapOvr>
-</p:sld>
-</file>
-
-<file path=ppt/slides/slide18.xml><?xml version="1.0" encoding="utf-8"?>
-<p:sld xmlns:a="http://schemas.openxmlformats.org/drawingml/2006/main" xmlns:r="http://schemas.openxmlformats.org/officeDocument/2006/relationships" xmlns:p="http://schemas.openxmlformats.org/presentationml/2006/main">
-  <p:cSld>
-    <p:spTree>
-      <p:nvGrpSpPr>
-        <p:cNvPr id="1" name=""/>
-        <p:cNvGrpSpPr/>
-        <p:nvPr/>
-      </p:nvGrpSpPr>
-      <p:grpSpPr>
-        <a:xfrm>
-          <a:off x="0" y="0"/>
-          <a:ext cx="0" cy="0"/>
-          <a:chOff x="0" y="0"/>
-          <a:chExt cx="0" cy="0"/>
-        </a:xfrm>
-      </p:grpSpPr>
-      <p:sp>
-        <p:nvSpPr>
-          <p:cNvPr id="2" name="Title 1">
-            <a:extLst>
-              <a:ext uri="{FF2B5EF4-FFF2-40B4-BE49-F238E27FC236}">
                 <a16:creationId xmlns:a16="http://schemas.microsoft.com/office/drawing/2014/main" id="{FFFE89ED-01E5-4E1B-9201-12C93870AD80}"/>
               </a:ext>
             </a:extLst>
@@ -10639,7 +10456,7 @@
           <a:p>
             <a:fld id="{5FB0F42B-CAA9-4D4F-86CF-07230423CC99}" type="slidenum">
               <a:rPr lang="en-US" smtClean="0"/>
-              <a:t>18</a:t>
+              <a:t>17</a:t>
             </a:fld>
             <a:endParaRPr lang="en-US" dirty="0"/>
           </a:p>

</xml_diff>

<commit_message>
Pushing in changes to STAR UML, FSD and ppt.
</commit_message>
<xml_diff>
--- a/specifications/deliv3/SOS Deliverable Final Presentation.pptx
+++ b/specifications/deliv3/SOS Deliverable Final Presentation.pptx
@@ -134,7 +134,7 @@
 <file path=ppt/revisionInfo.xml><?xml version="1.0" encoding="utf-8"?>
 <p1510:revInfo xmlns:a="http://schemas.openxmlformats.org/drawingml/2006/main" xmlns:r="http://schemas.openxmlformats.org/officeDocument/2006/relationships" xmlns:p1510="http://schemas.microsoft.com/office/powerpoint/2015/10/main">
   <p1510:revLst>
-    <p1510:client id="{1E119CE9-B343-4265-9F4A-0864581E65E7}" v="39" dt="2019-12-02T03:47:03.506"/>
+    <p1510:client id="{EB57C4ED-9573-45D5-B8B3-0088FA578A1B}" v="27" dt="2019-12-03T09:31:41.158"/>
   </p1510:revLst>
 </p1510:revInfo>
 </file>
@@ -998,6 +998,228 @@
       </pc:sldChg>
     </pc:docChg>
   </pc:docChgLst>
+  <pc:docChgLst>
+    <pc:chgData name="Anthony Sanchez-Ayra" userId="6745e27f37c7945b" providerId="LiveId" clId="{EB57C4ED-9573-45D5-B8B3-0088FA578A1B}"/>
+    <pc:docChg chg="custSel modSld">
+      <pc:chgData name="Anthony Sanchez-Ayra" userId="6745e27f37c7945b" providerId="LiveId" clId="{EB57C4ED-9573-45D5-B8B3-0088FA578A1B}" dt="2019-12-03T09:31:41.158" v="125"/>
+      <pc:docMkLst>
+        <pc:docMk/>
+      </pc:docMkLst>
+      <pc:sldChg chg="addSp delSp modSp modAnim">
+        <pc:chgData name="Anthony Sanchez-Ayra" userId="6745e27f37c7945b" providerId="LiveId" clId="{EB57C4ED-9573-45D5-B8B3-0088FA578A1B}" dt="2019-12-03T09:31:41.158" v="125"/>
+        <pc:sldMkLst>
+          <pc:docMk/>
+          <pc:sldMk cId="2325763583" sldId="266"/>
+        </pc:sldMkLst>
+        <pc:spChg chg="mod">
+          <ac:chgData name="Anthony Sanchez-Ayra" userId="6745e27f37c7945b" providerId="LiveId" clId="{EB57C4ED-9573-45D5-B8B3-0088FA578A1B}" dt="2019-12-03T09:22:13.943" v="56" actId="1076"/>
+          <ac:spMkLst>
+            <pc:docMk/>
+            <pc:sldMk cId="2325763583" sldId="266"/>
+            <ac:spMk id="2" creationId="{720A8A7A-6888-46F3-9DD8-F9AA0F03F440}"/>
+          </ac:spMkLst>
+        </pc:spChg>
+        <pc:spChg chg="del">
+          <ac:chgData name="Anthony Sanchez-Ayra" userId="6745e27f37c7945b" providerId="LiveId" clId="{EB57C4ED-9573-45D5-B8B3-0088FA578A1B}" dt="2019-12-03T09:21:49.700" v="50" actId="478"/>
+          <ac:spMkLst>
+            <pc:docMk/>
+            <pc:sldMk cId="2325763583" sldId="266"/>
+            <ac:spMk id="7" creationId="{0D6E87CD-DD0E-4BA7-B0F4-A5D19BDA48EE}"/>
+          </ac:spMkLst>
+        </pc:spChg>
+        <pc:spChg chg="mod">
+          <ac:chgData name="Anthony Sanchez-Ayra" userId="6745e27f37c7945b" providerId="LiveId" clId="{EB57C4ED-9573-45D5-B8B3-0088FA578A1B}" dt="2019-12-03T09:21:46.617" v="49" actId="1076"/>
+          <ac:spMkLst>
+            <pc:docMk/>
+            <pc:sldMk cId="2325763583" sldId="266"/>
+            <ac:spMk id="8" creationId="{8BB129A2-12B4-4F8C-A89F-36658AAE7696}"/>
+          </ac:spMkLst>
+        </pc:spChg>
+        <pc:picChg chg="add del mod">
+          <ac:chgData name="Anthony Sanchez-Ayra" userId="6745e27f37c7945b" providerId="LiveId" clId="{EB57C4ED-9573-45D5-B8B3-0088FA578A1B}" dt="2019-12-03T09:21:32.432" v="45"/>
+          <ac:picMkLst>
+            <pc:docMk/>
+            <pc:sldMk cId="2325763583" sldId="266"/>
+            <ac:picMk id="5" creationId="{A85101FB-347C-40B5-A667-1F942A166DE9}"/>
+          </ac:picMkLst>
+        </pc:picChg>
+        <pc:picChg chg="add mod">
+          <ac:chgData name="Anthony Sanchez-Ayra" userId="6745e27f37c7945b" providerId="LiveId" clId="{EB57C4ED-9573-45D5-B8B3-0088FA578A1B}" dt="2019-12-03T09:22:16.463" v="57" actId="14100"/>
+          <ac:picMkLst>
+            <pc:docMk/>
+            <pc:sldMk cId="2325763583" sldId="266"/>
+            <ac:picMk id="9" creationId="{72F3A884-D96E-4D1F-8D80-49D76ABA4949}"/>
+          </ac:picMkLst>
+        </pc:picChg>
+        <pc:picChg chg="add mod ord">
+          <ac:chgData name="Anthony Sanchez-Ayra" userId="6745e27f37c7945b" providerId="LiveId" clId="{EB57C4ED-9573-45D5-B8B3-0088FA578A1B}" dt="2019-12-03T09:23:06.082" v="66" actId="171"/>
+          <ac:picMkLst>
+            <pc:docMk/>
+            <pc:sldMk cId="2325763583" sldId="266"/>
+            <ac:picMk id="10" creationId="{E67A8965-19AF-4B9D-AC9C-65043EB8E597}"/>
+          </ac:picMkLst>
+        </pc:picChg>
+        <pc:picChg chg="add mod ord">
+          <ac:chgData name="Anthony Sanchez-Ayra" userId="6745e27f37c7945b" providerId="LiveId" clId="{EB57C4ED-9573-45D5-B8B3-0088FA578A1B}" dt="2019-12-03T09:23:48.597" v="72" actId="171"/>
+          <ac:picMkLst>
+            <pc:docMk/>
+            <pc:sldMk cId="2325763583" sldId="266"/>
+            <ac:picMk id="11" creationId="{8DE7F996-1001-4983-9311-39325C332B62}"/>
+          </ac:picMkLst>
+        </pc:picChg>
+        <pc:picChg chg="add mod ord">
+          <ac:chgData name="Anthony Sanchez-Ayra" userId="6745e27f37c7945b" providerId="LiveId" clId="{EB57C4ED-9573-45D5-B8B3-0088FA578A1B}" dt="2019-12-03T09:24:23.286" v="80" actId="171"/>
+          <ac:picMkLst>
+            <pc:docMk/>
+            <pc:sldMk cId="2325763583" sldId="266"/>
+            <ac:picMk id="12" creationId="{9CFA8331-0146-4348-BB04-EC2C9B799185}"/>
+          </ac:picMkLst>
+        </pc:picChg>
+        <pc:picChg chg="add mod ord">
+          <ac:chgData name="Anthony Sanchez-Ayra" userId="6745e27f37c7945b" providerId="LiveId" clId="{EB57C4ED-9573-45D5-B8B3-0088FA578A1B}" dt="2019-12-03T09:24:53.977" v="88" actId="171"/>
+          <ac:picMkLst>
+            <pc:docMk/>
+            <pc:sldMk cId="2325763583" sldId="266"/>
+            <ac:picMk id="13" creationId="{7C4A6642-A3F6-4943-8DC9-36726F153A72}"/>
+          </ac:picMkLst>
+        </pc:picChg>
+        <pc:picChg chg="add mod ord">
+          <ac:chgData name="Anthony Sanchez-Ayra" userId="6745e27f37c7945b" providerId="LiveId" clId="{EB57C4ED-9573-45D5-B8B3-0088FA578A1B}" dt="2019-12-03T09:25:22.246" v="97" actId="171"/>
+          <ac:picMkLst>
+            <pc:docMk/>
+            <pc:sldMk cId="2325763583" sldId="266"/>
+            <ac:picMk id="14" creationId="{1BDE91A5-5B66-4D32-9283-383FA9D3317F}"/>
+          </ac:picMkLst>
+        </pc:picChg>
+        <pc:picChg chg="add mod ord">
+          <ac:chgData name="Anthony Sanchez-Ayra" userId="6745e27f37c7945b" providerId="LiveId" clId="{EB57C4ED-9573-45D5-B8B3-0088FA578A1B}" dt="2019-12-03T09:29:04.417" v="116" actId="171"/>
+          <ac:picMkLst>
+            <pc:docMk/>
+            <pc:sldMk cId="2325763583" sldId="266"/>
+            <ac:picMk id="15" creationId="{FE75D7B7-5301-442F-BF5D-80CDA634F868}"/>
+          </ac:picMkLst>
+        </pc:picChg>
+        <pc:picChg chg="add mod">
+          <ac:chgData name="Anthony Sanchez-Ayra" userId="6745e27f37c7945b" providerId="LiveId" clId="{EB57C4ED-9573-45D5-B8B3-0088FA578A1B}" dt="2019-12-03T09:31:23.681" v="123" actId="14100"/>
+          <ac:picMkLst>
+            <pc:docMk/>
+            <pc:sldMk cId="2325763583" sldId="266"/>
+            <ac:picMk id="16" creationId="{952C916D-DC20-4587-8A3B-EFA854F4B6B0}"/>
+          </ac:picMkLst>
+        </pc:picChg>
+        <pc:picChg chg="add mod">
+          <ac:chgData name="Anthony Sanchez-Ayra" userId="6745e27f37c7945b" providerId="LiveId" clId="{EB57C4ED-9573-45D5-B8B3-0088FA578A1B}" dt="2019-12-03T09:31:15.418" v="122" actId="14100"/>
+          <ac:picMkLst>
+            <pc:docMk/>
+            <pc:sldMk cId="2325763583" sldId="266"/>
+            <ac:picMk id="17" creationId="{105BD72F-BE1C-4F3A-9545-4296151A2C67}"/>
+          </ac:picMkLst>
+        </pc:picChg>
+      </pc:sldChg>
+      <pc:sldChg chg="addSp delSp modSp">
+        <pc:chgData name="Anthony Sanchez-Ayra" userId="6745e27f37c7945b" providerId="LiveId" clId="{EB57C4ED-9573-45D5-B8B3-0088FA578A1B}" dt="2019-12-03T09:20:41.073" v="43" actId="1076"/>
+        <pc:sldMkLst>
+          <pc:docMk/>
+          <pc:sldMk cId="1525650455" sldId="275"/>
+        </pc:sldMkLst>
+        <pc:spChg chg="mod">
+          <ac:chgData name="Anthony Sanchez-Ayra" userId="6745e27f37c7945b" providerId="LiveId" clId="{EB57C4ED-9573-45D5-B8B3-0088FA578A1B}" dt="2019-12-03T09:15:48.459" v="12" actId="1076"/>
+          <ac:spMkLst>
+            <pc:docMk/>
+            <pc:sldMk cId="1525650455" sldId="275"/>
+            <ac:spMk id="2" creationId="{717D8471-15FC-4996-8A4C-889387E36703}"/>
+          </ac:spMkLst>
+        </pc:spChg>
+        <pc:spChg chg="del">
+          <ac:chgData name="Anthony Sanchez-Ayra" userId="6745e27f37c7945b" providerId="LiveId" clId="{EB57C4ED-9573-45D5-B8B3-0088FA578A1B}" dt="2019-12-03T09:15:55.559" v="15" actId="478"/>
+          <ac:spMkLst>
+            <pc:docMk/>
+            <pc:sldMk cId="1525650455" sldId="275"/>
+            <ac:spMk id="4" creationId="{0BCE183C-8642-47C0-89C3-898897F145D2}"/>
+          </ac:spMkLst>
+        </pc:spChg>
+        <pc:spChg chg="mod">
+          <ac:chgData name="Anthony Sanchez-Ayra" userId="6745e27f37c7945b" providerId="LiveId" clId="{EB57C4ED-9573-45D5-B8B3-0088FA578A1B}" dt="2019-12-03T09:20:41.073" v="43" actId="1076"/>
+          <ac:spMkLst>
+            <pc:docMk/>
+            <pc:sldMk cId="1525650455" sldId="275"/>
+            <ac:spMk id="5" creationId="{86B7C9BC-A107-46D8-A882-BA5F973003D9}"/>
+          </ac:spMkLst>
+        </pc:spChg>
+        <pc:spChg chg="add del mod">
+          <ac:chgData name="Anthony Sanchez-Ayra" userId="6745e27f37c7945b" providerId="LiveId" clId="{EB57C4ED-9573-45D5-B8B3-0088FA578A1B}" dt="2019-12-03T09:15:19.932" v="5"/>
+          <ac:spMkLst>
+            <pc:docMk/>
+            <pc:sldMk cId="1525650455" sldId="275"/>
+            <ac:spMk id="7" creationId="{D78E2856-06DF-45A1-BDF7-4019380295AB}"/>
+          </ac:spMkLst>
+        </pc:spChg>
+        <pc:spChg chg="add del mod">
+          <ac:chgData name="Anthony Sanchez-Ayra" userId="6745e27f37c7945b" providerId="LiveId" clId="{EB57C4ED-9573-45D5-B8B3-0088FA578A1B}" dt="2019-12-03T09:20:11.686" v="33"/>
+          <ac:spMkLst>
+            <pc:docMk/>
+            <pc:sldMk cId="1525650455" sldId="275"/>
+            <ac:spMk id="10" creationId="{334AEA67-7AA6-46F6-9F49-CD3621B4ED27}"/>
+          </ac:spMkLst>
+        </pc:spChg>
+        <pc:picChg chg="del">
+          <ac:chgData name="Anthony Sanchez-Ayra" userId="6745e27f37c7945b" providerId="LiveId" clId="{EB57C4ED-9573-45D5-B8B3-0088FA578A1B}" dt="2019-12-03T09:15:17.301" v="4" actId="478"/>
+          <ac:picMkLst>
+            <pc:docMk/>
+            <pc:sldMk cId="1525650455" sldId="275"/>
+            <ac:picMk id="6" creationId="{C78C7FBE-B44B-427A-9E0A-70552505858C}"/>
+          </ac:picMkLst>
+        </pc:picChg>
+        <pc:picChg chg="add del mod modCrop">
+          <ac:chgData name="Anthony Sanchez-Ayra" userId="6745e27f37c7945b" providerId="LiveId" clId="{EB57C4ED-9573-45D5-B8B3-0088FA578A1B}" dt="2019-12-03T09:19:59.514" v="32" actId="478"/>
+          <ac:picMkLst>
+            <pc:docMk/>
+            <pc:sldMk cId="1525650455" sldId="275"/>
+            <ac:picMk id="8" creationId="{2439341C-2B81-4B49-AEB9-5B55B332CD67}"/>
+          </ac:picMkLst>
+        </pc:picChg>
+        <pc:picChg chg="add mod">
+          <ac:chgData name="Anthony Sanchez-Ayra" userId="6745e27f37c7945b" providerId="LiveId" clId="{EB57C4ED-9573-45D5-B8B3-0088FA578A1B}" dt="2019-12-03T09:20:34.197" v="41" actId="14100"/>
+          <ac:picMkLst>
+            <pc:docMk/>
+            <pc:sldMk cId="1525650455" sldId="275"/>
+            <ac:picMk id="11" creationId="{FE612BED-B5E0-4BFA-8068-D51E68AB6DBD}"/>
+          </ac:picMkLst>
+        </pc:picChg>
+      </pc:sldChg>
+      <pc:sldChg chg="addSp delSp modSp modNotesTx">
+        <pc:chgData name="Anthony Sanchez-Ayra" userId="6745e27f37c7945b" providerId="LiveId" clId="{EB57C4ED-9573-45D5-B8B3-0088FA578A1B}" dt="2019-12-03T07:33:10.042" v="3" actId="20577"/>
+        <pc:sldMkLst>
+          <pc:docMk/>
+          <pc:sldMk cId="1414546480" sldId="277"/>
+        </pc:sldMkLst>
+        <pc:spChg chg="add mod">
+          <ac:chgData name="Anthony Sanchez-Ayra" userId="6745e27f37c7945b" providerId="LiveId" clId="{EB57C4ED-9573-45D5-B8B3-0088FA578A1B}" dt="2019-12-03T07:32:18.900" v="0" actId="478"/>
+          <ac:spMkLst>
+            <pc:docMk/>
+            <pc:sldMk cId="1414546480" sldId="277"/>
+            <ac:spMk id="4" creationId="{82EBC6BA-3B7C-4D56-AD7E-5F47B72C890C}"/>
+          </ac:spMkLst>
+        </pc:spChg>
+        <pc:picChg chg="del">
+          <ac:chgData name="Anthony Sanchez-Ayra" userId="6745e27f37c7945b" providerId="LiveId" clId="{EB57C4ED-9573-45D5-B8B3-0088FA578A1B}" dt="2019-12-03T07:32:18.900" v="0" actId="478"/>
+          <ac:picMkLst>
+            <pc:docMk/>
+            <pc:sldMk cId="1414546480" sldId="277"/>
+            <ac:picMk id="6" creationId="{F33A5BF8-303C-4A6B-9885-04B49A1AEB1F}"/>
+          </ac:picMkLst>
+        </pc:picChg>
+        <pc:picChg chg="add mod">
+          <ac:chgData name="Anthony Sanchez-Ayra" userId="6745e27f37c7945b" providerId="LiveId" clId="{EB57C4ED-9573-45D5-B8B3-0088FA578A1B}" dt="2019-12-03T07:32:26.617" v="2" actId="14100"/>
+          <ac:picMkLst>
+            <pc:docMk/>
+            <pc:sldMk cId="1414546480" sldId="277"/>
+            <ac:picMk id="7" creationId="{CE91753D-4197-4DCB-9818-AD909A67EAFB}"/>
+          </ac:picMkLst>
+        </pc:picChg>
+      </pc:sldChg>
+    </pc:docChg>
+  </pc:docChgLst>
 </pc:chgInfo>
 </file>
 
@@ -1083,7 +1305,7 @@
           <a:p>
             <a:fld id="{25C7B18B-C095-4AA5-9AE6-44437B9B539E}" type="datetimeFigureOut">
               <a:rPr lang="en-US" smtClean="0"/>
-              <a:t>12/2/2019</a:t>
+              <a:t>12/3/2019</a:t>
             </a:fld>
             <a:endParaRPr lang="en-US"/>
           </a:p>
@@ -1663,12 +1885,6 @@
           <a:p>
             <a:r>
               <a:rPr lang="en-US" dirty="0"/>
-              <a:t>Needs to be updated</a:t>
-            </a:r>
-          </a:p>
-          <a:p>
-            <a:r>
-              <a:rPr lang="en-US" dirty="0"/>
               <a:t>Anthony</a:t>
             </a:r>
           </a:p>
@@ -2944,7 +3160,7 @@
           <a:p>
             <a:fld id="{33345273-357A-44F9-B829-B72290E01AB2}" type="datetime1">
               <a:rPr lang="en-US" smtClean="0"/>
-              <a:t>12/2/2019</a:t>
+              <a:t>12/3/2019</a:t>
             </a:fld>
             <a:endParaRPr lang="en-US"/>
           </a:p>
@@ -3245,7 +3461,7 @@
           <a:p>
             <a:fld id="{7F0CB7CC-F537-4FCF-8EE3-2660B59E7D7E}" type="datetime1">
               <a:rPr lang="en-US" smtClean="0"/>
-              <a:t>12/2/2019</a:t>
+              <a:t>12/3/2019</a:t>
             </a:fld>
             <a:endParaRPr lang="en-US"/>
           </a:p>
@@ -3440,7 +3656,7 @@
           <a:p>
             <a:fld id="{94D2ACA3-977D-484D-828B-64C3DA8A0D1F}" type="datetime1">
               <a:rPr lang="en-US" smtClean="0"/>
-              <a:t>12/2/2019</a:t>
+              <a:t>12/3/2019</a:t>
             </a:fld>
             <a:endParaRPr lang="en-US"/>
           </a:p>
@@ -3704,7 +3920,7 @@
           <a:p>
             <a:fld id="{3821FBE7-B412-4AB0-8661-9FC4C96AC7B4}" type="datetime1">
               <a:rPr lang="en-US" smtClean="0"/>
-              <a:t>12/2/2019</a:t>
+              <a:t>12/3/2019</a:t>
             </a:fld>
             <a:endParaRPr lang="en-US"/>
           </a:p>
@@ -4131,7 +4347,7 @@
           <a:p>
             <a:fld id="{E8F5201A-42EB-4D41-955A-8EFA9E91AF8B}" type="datetime1">
               <a:rPr lang="en-US" smtClean="0"/>
-              <a:t>12/2/2019</a:t>
+              <a:t>12/3/2019</a:t>
             </a:fld>
             <a:endParaRPr lang="en-US"/>
           </a:p>
@@ -4671,7 +4887,7 @@
           <a:p>
             <a:fld id="{72A3D8B7-B83B-4324-865E-70934BC03FCF}" type="datetime1">
               <a:rPr lang="en-US" smtClean="0"/>
-              <a:t>12/2/2019</a:t>
+              <a:t>12/3/2019</a:t>
             </a:fld>
             <a:endParaRPr lang="en-US"/>
           </a:p>
@@ -5538,7 +5754,7 @@
           <a:p>
             <a:fld id="{4052AA9B-C75E-4791-8567-4EDE615B769D}" type="datetime1">
               <a:rPr lang="en-US" smtClean="0"/>
-              <a:t>12/2/2019</a:t>
+              <a:t>12/3/2019</a:t>
             </a:fld>
             <a:endParaRPr lang="en-US"/>
           </a:p>
@@ -5711,7 +5927,7 @@
           <a:p>
             <a:fld id="{344A012C-49AE-4989-B2FD-51A0AC9516E3}" type="datetime1">
               <a:rPr lang="en-US" smtClean="0"/>
-              <a:t>12/2/2019</a:t>
+              <a:t>12/3/2019</a:t>
             </a:fld>
             <a:endParaRPr lang="en-US"/>
           </a:p>
@@ -5898,7 +6114,7 @@
           <a:p>
             <a:fld id="{CBD5F2A9-CE86-4D42-82B1-47CB1757B2B3}" type="datetime1">
               <a:rPr lang="en-US" smtClean="0"/>
-              <a:t>12/2/2019</a:t>
+              <a:t>12/3/2019</a:t>
             </a:fld>
             <a:endParaRPr lang="en-US"/>
           </a:p>
@@ -6071,7 +6287,7 @@
           <a:p>
             <a:fld id="{F86D78C3-82B7-4DE0-B1B3-D1939DFFF1F4}" type="datetime1">
               <a:rPr lang="en-US" smtClean="0"/>
-              <a:t>12/2/2019</a:t>
+              <a:t>12/3/2019</a:t>
             </a:fld>
             <a:endParaRPr lang="en-US"/>
           </a:p>
@@ -6318,7 +6534,7 @@
           <a:p>
             <a:fld id="{4BE43EF6-EB37-44C6-92F7-AC45C74D32BC}" type="datetime1">
               <a:rPr lang="en-US" smtClean="0"/>
-              <a:t>12/2/2019</a:t>
+              <a:t>12/3/2019</a:t>
             </a:fld>
             <a:endParaRPr lang="en-US"/>
           </a:p>
@@ -6557,7 +6773,7 @@
           <a:p>
             <a:fld id="{648C393F-9384-45D4-805C-1CB7173B9356}" type="datetime1">
               <a:rPr lang="en-US" smtClean="0"/>
-              <a:t>12/2/2019</a:t>
+              <a:t>12/3/2019</a:t>
             </a:fld>
             <a:endParaRPr lang="en-US"/>
           </a:p>
@@ -7026,7 +7242,7 @@
           <a:p>
             <a:fld id="{DCC6C747-2714-4C59-95F8-D2ADB42E4758}" type="datetime1">
               <a:rPr lang="en-US" smtClean="0"/>
-              <a:t>12/2/2019</a:t>
+              <a:t>12/3/2019</a:t>
             </a:fld>
             <a:endParaRPr lang="en-US"/>
           </a:p>
@@ -7147,7 +7363,7 @@
           <a:p>
             <a:fld id="{AB6F47D7-5DC3-4299-85C9-582A2E817B7A}" type="datetime1">
               <a:rPr lang="en-US" smtClean="0"/>
-              <a:t>12/2/2019</a:t>
+              <a:t>12/3/2019</a:t>
             </a:fld>
             <a:endParaRPr lang="en-US"/>
           </a:p>
@@ -7245,7 +7461,7 @@
           <a:p>
             <a:fld id="{B3B8CD37-62FF-42A3-A691-171206154C73}" type="datetime1">
               <a:rPr lang="en-US" smtClean="0"/>
-              <a:t>12/2/2019</a:t>
+              <a:t>12/3/2019</a:t>
             </a:fld>
             <a:endParaRPr lang="en-US"/>
           </a:p>
@@ -7503,7 +7719,7 @@
           <a:p>
             <a:fld id="{1754C931-F50A-4573-B734-FF52839C32AE}" type="datetime1">
               <a:rPr lang="en-US" smtClean="0"/>
-              <a:t>12/2/2019</a:t>
+              <a:t>12/3/2019</a:t>
             </a:fld>
             <a:endParaRPr lang="en-US"/>
           </a:p>
@@ -7806,7 +8022,7 @@
           <a:p>
             <a:fld id="{0352B9FF-F800-40E0-9194-0C193CB23E31}" type="datetime1">
               <a:rPr lang="en-US" smtClean="0"/>
-              <a:t>12/2/2019</a:t>
+              <a:t>12/3/2019</a:t>
             </a:fld>
             <a:endParaRPr lang="en-US"/>
           </a:p>
@@ -8043,7 +8259,7 @@
           <a:p>
             <a:fld id="{66A336FE-01EE-4B21-B377-78359BC384C2}" type="datetime1">
               <a:rPr lang="en-US" smtClean="0"/>
-              <a:t>12/2/2019</a:t>
+              <a:t>12/3/2019</a:t>
             </a:fld>
             <a:endParaRPr lang="en-US"/>
           </a:p>
@@ -9099,7 +9315,7 @@
         </p:nvSpPr>
         <p:spPr>
           <a:xfrm>
-            <a:off x="919119" y="124375"/>
+            <a:off x="919119" y="-259083"/>
             <a:ext cx="10353762" cy="970450"/>
           </a:xfrm>
         </p:spPr>
@@ -9114,12 +9330,46 @@
           </a:p>
         </p:txBody>
       </p:sp>
+      <p:sp>
+        <p:nvSpPr>
+          <p:cNvPr id="5" name="Slide Number Placeholder 4">
+            <a:extLst>
+              <a:ext uri="{FF2B5EF4-FFF2-40B4-BE49-F238E27FC236}">
+                <a16:creationId xmlns:a16="http://schemas.microsoft.com/office/drawing/2014/main" id="{86B7C9BC-A107-46D8-A882-BA5F973003D9}"/>
+              </a:ext>
+            </a:extLst>
+          </p:cNvPr>
+          <p:cNvSpPr>
+            <a:spLocks noGrp="1"/>
+          </p:cNvSpPr>
+          <p:nvPr>
+            <p:ph type="sldNum" sz="quarter" idx="12"/>
+          </p:nvPr>
+        </p:nvSpPr>
+        <p:spPr>
+          <a:xfrm>
+            <a:off x="11272881" y="6571765"/>
+            <a:ext cx="753545" cy="365125"/>
+          </a:xfrm>
+        </p:spPr>
+        <p:txBody>
+          <a:bodyPr/>
+          <a:lstStyle/>
+          <a:p>
+            <a:fld id="{5FB0F42B-CAA9-4D4F-86CF-07230423CC99}" type="slidenum">
+              <a:rPr lang="en-US" smtClean="0"/>
+              <a:t>11</a:t>
+            </a:fld>
+            <a:endParaRPr lang="en-US" dirty="0"/>
+          </a:p>
+        </p:txBody>
+      </p:sp>
       <p:pic>
         <p:nvPicPr>
-          <p:cNvPr id="6" name="Content Placeholder 5">
+          <p:cNvPr id="11" name="Content Placeholder 10">
             <a:extLst>
               <a:ext uri="{FF2B5EF4-FFF2-40B4-BE49-F238E27FC236}">
-                <a16:creationId xmlns:a16="http://schemas.microsoft.com/office/drawing/2014/main" id="{C78C7FBE-B44B-427A-9E0A-70552505858C}"/>
+                <a16:creationId xmlns:a16="http://schemas.microsoft.com/office/drawing/2014/main" id="{FE612BED-B5E0-4BFA-8068-D51E68AB6DBD}"/>
               </a:ext>
             </a:extLst>
           </p:cNvPr>
@@ -9138,81 +9388,14 @@
         </p:blipFill>
         <p:spPr>
           <a:xfrm>
-            <a:off x="0" y="1192490"/>
-            <a:ext cx="12192000" cy="5085564"/>
+            <a:off x="0" y="527914"/>
+            <a:ext cx="12192000" cy="6128525"/>
           </a:xfrm>
           <a:prstGeom prst="rect">
             <a:avLst/>
           </a:prstGeom>
         </p:spPr>
       </p:pic>
-      <p:sp>
-        <p:nvSpPr>
-          <p:cNvPr id="4" name="Footer Placeholder 3">
-            <a:extLst>
-              <a:ext uri="{FF2B5EF4-FFF2-40B4-BE49-F238E27FC236}">
-                <a16:creationId xmlns:a16="http://schemas.microsoft.com/office/drawing/2014/main" id="{0BCE183C-8642-47C0-89C3-898897F145D2}"/>
-              </a:ext>
-            </a:extLst>
-          </p:cNvPr>
-          <p:cNvSpPr>
-            <a:spLocks noGrp="1"/>
-          </p:cNvSpPr>
-          <p:nvPr>
-            <p:ph type="ftr" sz="quarter" idx="11"/>
-          </p:nvPr>
-        </p:nvSpPr>
-        <p:spPr>
-          <a:xfrm>
-            <a:off x="919119" y="6401481"/>
-            <a:ext cx="6672865" cy="365125"/>
-          </a:xfrm>
-        </p:spPr>
-        <p:txBody>
-          <a:bodyPr/>
-          <a:lstStyle/>
-          <a:p>
-            <a:r>
-              <a:rPr lang="en-US" dirty="0"/>
-              <a:t>Student Organization System – Final Systems Document</a:t>
-            </a:r>
-          </a:p>
-        </p:txBody>
-      </p:sp>
-      <p:sp>
-        <p:nvSpPr>
-          <p:cNvPr id="5" name="Slide Number Placeholder 4">
-            <a:extLst>
-              <a:ext uri="{FF2B5EF4-FFF2-40B4-BE49-F238E27FC236}">
-                <a16:creationId xmlns:a16="http://schemas.microsoft.com/office/drawing/2014/main" id="{86B7C9BC-A107-46D8-A882-BA5F973003D9}"/>
-              </a:ext>
-            </a:extLst>
-          </p:cNvPr>
-          <p:cNvSpPr>
-            <a:spLocks noGrp="1"/>
-          </p:cNvSpPr>
-          <p:nvPr>
-            <p:ph type="sldNum" sz="quarter" idx="12"/>
-          </p:nvPr>
-        </p:nvSpPr>
-        <p:spPr>
-          <a:xfrm>
-            <a:off x="10519336" y="6401481"/>
-            <a:ext cx="753545" cy="365125"/>
-          </a:xfrm>
-        </p:spPr>
-        <p:txBody>
-          <a:bodyPr/>
-          <a:lstStyle/>
-          <a:p>
-            <a:fld id="{5FB0F42B-CAA9-4D4F-86CF-07230423CC99}" type="slidenum">
-              <a:rPr lang="en-US" smtClean="0"/>
-              <a:t>11</a:t>
-            </a:fld>
-            <a:endParaRPr lang="en-US" dirty="0"/>
-          </a:p>
-        </p:txBody>
-      </p:sp>
     </p:spTree>
     <p:extLst>
       <p:ext uri="{BB962C8B-B14F-4D97-AF65-F5344CB8AC3E}">
@@ -9251,6 +9434,34 @@
           <a:chExt cx="0" cy="0"/>
         </a:xfrm>
       </p:grpSpPr>
+      <p:pic>
+        <p:nvPicPr>
+          <p:cNvPr id="15" name="Picture 14">
+            <a:extLst>
+              <a:ext uri="{FF2B5EF4-FFF2-40B4-BE49-F238E27FC236}">
+                <a16:creationId xmlns:a16="http://schemas.microsoft.com/office/drawing/2014/main" id="{FE75D7B7-5301-442F-BF5D-80CDA634F868}"/>
+              </a:ext>
+            </a:extLst>
+          </p:cNvPr>
+          <p:cNvPicPr/>
+          <p:nvPr/>
+        </p:nvPicPr>
+        <p:blipFill>
+          <a:blip r:embed="rId3"/>
+          <a:stretch>
+            <a:fillRect/>
+          </a:stretch>
+        </p:blipFill>
+        <p:spPr>
+          <a:xfrm>
+            <a:off x="35866" y="840255"/>
+            <a:ext cx="12156131" cy="5526101"/>
+          </a:xfrm>
+          <a:prstGeom prst="rect">
+            <a:avLst/>
+          </a:prstGeom>
+        </p:spPr>
+      </p:pic>
       <p:sp>
         <p:nvSpPr>
           <p:cNvPr id="2" name="Title 1">
@@ -9269,7 +9480,7 @@
         </p:nvSpPr>
         <p:spPr>
           <a:xfrm>
-            <a:off x="554115" y="95514"/>
+            <a:off x="715953" y="-258763"/>
             <a:ext cx="10515600" cy="1325563"/>
           </a:xfrm>
         </p:spPr>
@@ -9319,34 +9530,6 @@
       </p:sp>
       <p:sp>
         <p:nvSpPr>
-          <p:cNvPr id="7" name="Footer Placeholder 6">
-            <a:extLst>
-              <a:ext uri="{FF2B5EF4-FFF2-40B4-BE49-F238E27FC236}">
-                <a16:creationId xmlns:a16="http://schemas.microsoft.com/office/drawing/2014/main" id="{0D6E87CD-DD0E-4BA7-B0F4-A5D19BDA48EE}"/>
-              </a:ext>
-            </a:extLst>
-          </p:cNvPr>
-          <p:cNvSpPr>
-            <a:spLocks noGrp="1"/>
-          </p:cNvSpPr>
-          <p:nvPr>
-            <p:ph type="ftr" sz="quarter" idx="11"/>
-          </p:nvPr>
-        </p:nvSpPr>
-        <p:spPr/>
-        <p:txBody>
-          <a:bodyPr/>
-          <a:lstStyle/>
-          <a:p>
-            <a:r>
-              <a:rPr lang="en-US"/>
-              <a:t>Student Organization System - Software Requirements Document</a:t>
-            </a:r>
-          </a:p>
-        </p:txBody>
-      </p:sp>
-      <p:sp>
-        <p:nvSpPr>
           <p:cNvPr id="8" name="Slide Number Placeholder 7">
             <a:extLst>
               <a:ext uri="{FF2B5EF4-FFF2-40B4-BE49-F238E27FC236}">
@@ -9361,7 +9544,12 @@
             <p:ph type="sldNum" sz="quarter" idx="12"/>
           </p:nvPr>
         </p:nvSpPr>
-        <p:spPr/>
+        <p:spPr>
+          <a:xfrm>
+            <a:off x="11290331" y="6366360"/>
+            <a:ext cx="753545" cy="365125"/>
+          </a:xfrm>
+        </p:spPr>
         <p:txBody>
           <a:bodyPr/>
           <a:lstStyle/>
@@ -9370,10 +9558,289 @@
               <a:rPr lang="en-US" smtClean="0"/>
               <a:t>12</a:t>
             </a:fld>
-            <a:endParaRPr lang="en-US"/>
-          </a:p>
-        </p:txBody>
-      </p:sp>
+            <a:endParaRPr lang="en-US" dirty="0"/>
+          </a:p>
+        </p:txBody>
+      </p:sp>
+      <p:pic>
+        <p:nvPicPr>
+          <p:cNvPr id="14" name="Picture 13">
+            <a:extLst>
+              <a:ext uri="{FF2B5EF4-FFF2-40B4-BE49-F238E27FC236}">
+                <a16:creationId xmlns:a16="http://schemas.microsoft.com/office/drawing/2014/main" id="{1BDE91A5-5B66-4D32-9283-383FA9D3317F}"/>
+              </a:ext>
+            </a:extLst>
+          </p:cNvPr>
+          <p:cNvPicPr/>
+          <p:nvPr/>
+        </p:nvPicPr>
+        <p:blipFill>
+          <a:blip r:embed="rId4">
+            <a:extLst>
+              <a:ext uri="{28A0092B-C50C-407E-A947-70E740481C1C}">
+                <a14:useLocalDpi xmlns:a14="http://schemas.microsoft.com/office/drawing/2010/main" val="0"/>
+              </a:ext>
+            </a:extLst>
+          </a:blip>
+          <a:srcRect/>
+          <a:stretch>
+            <a:fillRect/>
+          </a:stretch>
+        </p:blipFill>
+        <p:spPr bwMode="auto">
+          <a:xfrm>
+            <a:off x="35868" y="840256"/>
+            <a:ext cx="12156131" cy="5526101"/>
+          </a:xfrm>
+          <a:prstGeom prst="rect">
+            <a:avLst/>
+          </a:prstGeom>
+          <a:noFill/>
+          <a:ln>
+            <a:noFill/>
+          </a:ln>
+        </p:spPr>
+      </p:pic>
+      <p:pic>
+        <p:nvPicPr>
+          <p:cNvPr id="13" name="Picture 12">
+            <a:extLst>
+              <a:ext uri="{FF2B5EF4-FFF2-40B4-BE49-F238E27FC236}">
+                <a16:creationId xmlns:a16="http://schemas.microsoft.com/office/drawing/2014/main" id="{7C4A6642-A3F6-4943-8DC9-36726F153A72}"/>
+              </a:ext>
+            </a:extLst>
+          </p:cNvPr>
+          <p:cNvPicPr/>
+          <p:nvPr/>
+        </p:nvPicPr>
+        <p:blipFill>
+          <a:blip r:embed="rId5">
+            <a:extLst>
+              <a:ext uri="{28A0092B-C50C-407E-A947-70E740481C1C}">
+                <a14:useLocalDpi xmlns:a14="http://schemas.microsoft.com/office/drawing/2010/main" val="0"/>
+              </a:ext>
+            </a:extLst>
+          </a:blip>
+          <a:srcRect/>
+          <a:stretch>
+            <a:fillRect/>
+          </a:stretch>
+        </p:blipFill>
+        <p:spPr bwMode="auto">
+          <a:xfrm>
+            <a:off x="0" y="840257"/>
+            <a:ext cx="12191999" cy="5526101"/>
+          </a:xfrm>
+          <a:prstGeom prst="rect">
+            <a:avLst/>
+          </a:prstGeom>
+          <a:noFill/>
+          <a:ln>
+            <a:noFill/>
+          </a:ln>
+        </p:spPr>
+      </p:pic>
+      <p:pic>
+        <p:nvPicPr>
+          <p:cNvPr id="12" name="Picture 11">
+            <a:extLst>
+              <a:ext uri="{FF2B5EF4-FFF2-40B4-BE49-F238E27FC236}">
+                <a16:creationId xmlns:a16="http://schemas.microsoft.com/office/drawing/2014/main" id="{9CFA8331-0146-4348-BB04-EC2C9B799185}"/>
+              </a:ext>
+            </a:extLst>
+          </p:cNvPr>
+          <p:cNvPicPr/>
+          <p:nvPr/>
+        </p:nvPicPr>
+        <p:blipFill>
+          <a:blip r:embed="rId6">
+            <a:extLst>
+              <a:ext uri="{28A0092B-C50C-407E-A947-70E740481C1C}">
+                <a14:useLocalDpi xmlns:a14="http://schemas.microsoft.com/office/drawing/2010/main" val="0"/>
+              </a:ext>
+            </a:extLst>
+          </a:blip>
+          <a:srcRect/>
+          <a:stretch>
+            <a:fillRect/>
+          </a:stretch>
+        </p:blipFill>
+        <p:spPr bwMode="auto">
+          <a:xfrm>
+            <a:off x="0" y="840258"/>
+            <a:ext cx="12192000" cy="5526101"/>
+          </a:xfrm>
+          <a:prstGeom prst="rect">
+            <a:avLst/>
+          </a:prstGeom>
+          <a:noFill/>
+          <a:ln>
+            <a:noFill/>
+          </a:ln>
+        </p:spPr>
+      </p:pic>
+      <p:pic>
+        <p:nvPicPr>
+          <p:cNvPr id="11" name="Picture 10">
+            <a:extLst>
+              <a:ext uri="{FF2B5EF4-FFF2-40B4-BE49-F238E27FC236}">
+                <a16:creationId xmlns:a16="http://schemas.microsoft.com/office/drawing/2014/main" id="{8DE7F996-1001-4983-9311-39325C332B62}"/>
+              </a:ext>
+            </a:extLst>
+          </p:cNvPr>
+          <p:cNvPicPr/>
+          <p:nvPr/>
+        </p:nvPicPr>
+        <p:blipFill>
+          <a:blip r:embed="rId7">
+            <a:extLst>
+              <a:ext uri="{28A0092B-C50C-407E-A947-70E740481C1C}">
+                <a14:useLocalDpi xmlns:a14="http://schemas.microsoft.com/office/drawing/2010/main" val="0"/>
+              </a:ext>
+            </a:extLst>
+          </a:blip>
+          <a:srcRect/>
+          <a:stretch>
+            <a:fillRect/>
+          </a:stretch>
+        </p:blipFill>
+        <p:spPr bwMode="auto">
+          <a:xfrm>
+            <a:off x="0" y="840259"/>
+            <a:ext cx="12192000" cy="5526101"/>
+          </a:xfrm>
+          <a:prstGeom prst="rect">
+            <a:avLst/>
+          </a:prstGeom>
+          <a:noFill/>
+          <a:ln>
+            <a:noFill/>
+          </a:ln>
+        </p:spPr>
+      </p:pic>
+      <p:pic>
+        <p:nvPicPr>
+          <p:cNvPr id="10" name="Picture 9">
+            <a:extLst>
+              <a:ext uri="{FF2B5EF4-FFF2-40B4-BE49-F238E27FC236}">
+                <a16:creationId xmlns:a16="http://schemas.microsoft.com/office/drawing/2014/main" id="{E67A8965-19AF-4B9D-AC9C-65043EB8E597}"/>
+              </a:ext>
+            </a:extLst>
+          </p:cNvPr>
+          <p:cNvPicPr/>
+          <p:nvPr/>
+        </p:nvPicPr>
+        <p:blipFill>
+          <a:blip r:embed="rId8"/>
+          <a:stretch>
+            <a:fillRect/>
+          </a:stretch>
+        </p:blipFill>
+        <p:spPr>
+          <a:xfrm>
+            <a:off x="0" y="840259"/>
+            <a:ext cx="12192000" cy="5526101"/>
+          </a:xfrm>
+          <a:prstGeom prst="rect">
+            <a:avLst/>
+          </a:prstGeom>
+        </p:spPr>
+      </p:pic>
+      <p:pic>
+        <p:nvPicPr>
+          <p:cNvPr id="9" name="Picture 8">
+            <a:extLst>
+              <a:ext uri="{FF2B5EF4-FFF2-40B4-BE49-F238E27FC236}">
+                <a16:creationId xmlns:a16="http://schemas.microsoft.com/office/drawing/2014/main" id="{72F3A884-D96E-4D1F-8D80-49D76ABA4949}"/>
+              </a:ext>
+            </a:extLst>
+          </p:cNvPr>
+          <p:cNvPicPr/>
+          <p:nvPr/>
+        </p:nvPicPr>
+        <p:blipFill>
+          <a:blip r:embed="rId9">
+            <a:extLst>
+              <a:ext uri="{28A0092B-C50C-407E-A947-70E740481C1C}">
+                <a14:useLocalDpi xmlns:a14="http://schemas.microsoft.com/office/drawing/2010/main" val="0"/>
+              </a:ext>
+            </a:extLst>
+          </a:blip>
+          <a:srcRect/>
+          <a:stretch>
+            <a:fillRect/>
+          </a:stretch>
+        </p:blipFill>
+        <p:spPr bwMode="auto">
+          <a:xfrm>
+            <a:off x="0" y="840259"/>
+            <a:ext cx="12192000" cy="5526101"/>
+          </a:xfrm>
+          <a:prstGeom prst="rect">
+            <a:avLst/>
+          </a:prstGeom>
+          <a:noFill/>
+          <a:ln>
+            <a:noFill/>
+          </a:ln>
+        </p:spPr>
+      </p:pic>
+      <p:pic>
+        <p:nvPicPr>
+          <p:cNvPr id="16" name="Picture 15">
+            <a:extLst>
+              <a:ext uri="{FF2B5EF4-FFF2-40B4-BE49-F238E27FC236}">
+                <a16:creationId xmlns:a16="http://schemas.microsoft.com/office/drawing/2014/main" id="{952C916D-DC20-4587-8A3B-EFA854F4B6B0}"/>
+              </a:ext>
+            </a:extLst>
+          </p:cNvPr>
+          <p:cNvPicPr/>
+          <p:nvPr/>
+        </p:nvPicPr>
+        <p:blipFill>
+          <a:blip r:embed="rId10"/>
+          <a:stretch>
+            <a:fillRect/>
+          </a:stretch>
+        </p:blipFill>
+        <p:spPr>
+          <a:xfrm>
+            <a:off x="0" y="840252"/>
+            <a:ext cx="6471170" cy="5526101"/>
+          </a:xfrm>
+          <a:prstGeom prst="rect">
+            <a:avLst/>
+          </a:prstGeom>
+        </p:spPr>
+      </p:pic>
+      <p:pic>
+        <p:nvPicPr>
+          <p:cNvPr id="17" name="Picture 16">
+            <a:extLst>
+              <a:ext uri="{FF2B5EF4-FFF2-40B4-BE49-F238E27FC236}">
+                <a16:creationId xmlns:a16="http://schemas.microsoft.com/office/drawing/2014/main" id="{105BD72F-BE1C-4F3A-9545-4296151A2C67}"/>
+              </a:ext>
+            </a:extLst>
+          </p:cNvPr>
+          <p:cNvPicPr/>
+          <p:nvPr/>
+        </p:nvPicPr>
+        <p:blipFill>
+          <a:blip r:embed="rId11"/>
+          <a:stretch>
+            <a:fillRect/>
+          </a:stretch>
+        </p:blipFill>
+        <p:spPr>
+          <a:xfrm>
+            <a:off x="6471173" y="840252"/>
+            <a:ext cx="5684960" cy="5526101"/>
+          </a:xfrm>
+          <a:prstGeom prst="rect">
+            <a:avLst/>
+          </a:prstGeom>
+        </p:spPr>
+      </p:pic>
     </p:spTree>
     <p:extLst>
       <p:ext uri="{BB962C8B-B14F-4D97-AF65-F5344CB8AC3E}">
@@ -9384,6 +9851,442 @@
   <p:clrMapOvr>
     <a:masterClrMapping/>
   </p:clrMapOvr>
+  <p:timing>
+    <p:tnLst>
+      <p:par>
+        <p:cTn id="1" dur="indefinite" restart="never" nodeType="tmRoot">
+          <p:childTnLst>
+            <p:seq concurrent="1" nextAc="seek">
+              <p:cTn id="2" dur="indefinite" nodeType="mainSeq">
+                <p:childTnLst>
+                  <p:par>
+                    <p:cTn id="3" fill="hold">
+                      <p:stCondLst>
+                        <p:cond delay="indefinite"/>
+                      </p:stCondLst>
+                      <p:childTnLst>
+                        <p:par>
+                          <p:cTn id="4" fill="hold">
+                            <p:stCondLst>
+                              <p:cond delay="0"/>
+                            </p:stCondLst>
+                            <p:childTnLst>
+                              <p:par>
+                                <p:cTn id="5" presetID="10" presetClass="exit" presetSubtype="0" fill="hold" nodeType="clickEffect">
+                                  <p:stCondLst>
+                                    <p:cond delay="0"/>
+                                  </p:stCondLst>
+                                  <p:childTnLst>
+                                    <p:animEffect transition="out" filter="fade">
+                                      <p:cBhvr>
+                                        <p:cTn id="6" dur="500"/>
+                                        <p:tgtEl>
+                                          <p:spTgt spid="17"/>
+                                        </p:tgtEl>
+                                      </p:cBhvr>
+                                    </p:animEffect>
+                                    <p:set>
+                                      <p:cBhvr>
+                                        <p:cTn id="7" dur="1" fill="hold">
+                                          <p:stCondLst>
+                                            <p:cond delay="499"/>
+                                          </p:stCondLst>
+                                        </p:cTn>
+                                        <p:tgtEl>
+                                          <p:spTgt spid="17"/>
+                                        </p:tgtEl>
+                                        <p:attrNameLst>
+                                          <p:attrName>style.visibility</p:attrName>
+                                        </p:attrNameLst>
+                                      </p:cBhvr>
+                                      <p:to>
+                                        <p:strVal val="hidden"/>
+                                      </p:to>
+                                    </p:set>
+                                  </p:childTnLst>
+                                </p:cTn>
+                              </p:par>
+                              <p:par>
+                                <p:cTn id="8" presetID="10" presetClass="exit" presetSubtype="0" fill="hold" nodeType="withEffect">
+                                  <p:stCondLst>
+                                    <p:cond delay="0"/>
+                                  </p:stCondLst>
+                                  <p:childTnLst>
+                                    <p:animEffect transition="out" filter="fade">
+                                      <p:cBhvr>
+                                        <p:cTn id="9" dur="500"/>
+                                        <p:tgtEl>
+                                          <p:spTgt spid="16"/>
+                                        </p:tgtEl>
+                                      </p:cBhvr>
+                                    </p:animEffect>
+                                    <p:set>
+                                      <p:cBhvr>
+                                        <p:cTn id="10" dur="1" fill="hold">
+                                          <p:stCondLst>
+                                            <p:cond delay="499"/>
+                                          </p:stCondLst>
+                                        </p:cTn>
+                                        <p:tgtEl>
+                                          <p:spTgt spid="16"/>
+                                        </p:tgtEl>
+                                        <p:attrNameLst>
+                                          <p:attrName>style.visibility</p:attrName>
+                                        </p:attrNameLst>
+                                      </p:cBhvr>
+                                      <p:to>
+                                        <p:strVal val="hidden"/>
+                                      </p:to>
+                                    </p:set>
+                                  </p:childTnLst>
+                                </p:cTn>
+                              </p:par>
+                            </p:childTnLst>
+                          </p:cTn>
+                        </p:par>
+                      </p:childTnLst>
+                    </p:cTn>
+                  </p:par>
+                  <p:par>
+                    <p:cTn id="11" fill="hold">
+                      <p:stCondLst>
+                        <p:cond delay="indefinite"/>
+                      </p:stCondLst>
+                      <p:childTnLst>
+                        <p:par>
+                          <p:cTn id="12" fill="hold">
+                            <p:stCondLst>
+                              <p:cond delay="0"/>
+                            </p:stCondLst>
+                            <p:childTnLst>
+                              <p:par>
+                                <p:cTn id="13" presetID="10" presetClass="exit" presetSubtype="0" fill="hold" nodeType="clickEffect">
+                                  <p:stCondLst>
+                                    <p:cond delay="0"/>
+                                  </p:stCondLst>
+                                  <p:childTnLst>
+                                    <p:animEffect transition="out" filter="fade">
+                                      <p:cBhvr>
+                                        <p:cTn id="14" dur="500"/>
+                                        <p:tgtEl>
+                                          <p:spTgt spid="9"/>
+                                        </p:tgtEl>
+                                      </p:cBhvr>
+                                    </p:animEffect>
+                                    <p:set>
+                                      <p:cBhvr>
+                                        <p:cTn id="15" dur="1" fill="hold">
+                                          <p:stCondLst>
+                                            <p:cond delay="499"/>
+                                          </p:stCondLst>
+                                        </p:cTn>
+                                        <p:tgtEl>
+                                          <p:spTgt spid="9"/>
+                                        </p:tgtEl>
+                                        <p:attrNameLst>
+                                          <p:attrName>style.visibility</p:attrName>
+                                        </p:attrNameLst>
+                                      </p:cBhvr>
+                                      <p:to>
+                                        <p:strVal val="hidden"/>
+                                      </p:to>
+                                    </p:set>
+                                  </p:childTnLst>
+                                </p:cTn>
+                              </p:par>
+                            </p:childTnLst>
+                          </p:cTn>
+                        </p:par>
+                      </p:childTnLst>
+                    </p:cTn>
+                  </p:par>
+                  <p:par>
+                    <p:cTn id="16" fill="hold">
+                      <p:stCondLst>
+                        <p:cond delay="indefinite"/>
+                      </p:stCondLst>
+                      <p:childTnLst>
+                        <p:par>
+                          <p:cTn id="17" fill="hold">
+                            <p:stCondLst>
+                              <p:cond delay="0"/>
+                            </p:stCondLst>
+                            <p:childTnLst>
+                              <p:par>
+                                <p:cTn id="18" presetID="10" presetClass="exit" presetSubtype="0" fill="hold" nodeType="clickEffect">
+                                  <p:stCondLst>
+                                    <p:cond delay="0"/>
+                                  </p:stCondLst>
+                                  <p:childTnLst>
+                                    <p:animEffect transition="out" filter="fade">
+                                      <p:cBhvr>
+                                        <p:cTn id="19" dur="500"/>
+                                        <p:tgtEl>
+                                          <p:spTgt spid="10"/>
+                                        </p:tgtEl>
+                                      </p:cBhvr>
+                                    </p:animEffect>
+                                    <p:set>
+                                      <p:cBhvr>
+                                        <p:cTn id="20" dur="1" fill="hold">
+                                          <p:stCondLst>
+                                            <p:cond delay="499"/>
+                                          </p:stCondLst>
+                                        </p:cTn>
+                                        <p:tgtEl>
+                                          <p:spTgt spid="10"/>
+                                        </p:tgtEl>
+                                        <p:attrNameLst>
+                                          <p:attrName>style.visibility</p:attrName>
+                                        </p:attrNameLst>
+                                      </p:cBhvr>
+                                      <p:to>
+                                        <p:strVal val="hidden"/>
+                                      </p:to>
+                                    </p:set>
+                                  </p:childTnLst>
+                                </p:cTn>
+                              </p:par>
+                            </p:childTnLst>
+                          </p:cTn>
+                        </p:par>
+                      </p:childTnLst>
+                    </p:cTn>
+                  </p:par>
+                  <p:par>
+                    <p:cTn id="21" fill="hold">
+                      <p:stCondLst>
+                        <p:cond delay="indefinite"/>
+                      </p:stCondLst>
+                      <p:childTnLst>
+                        <p:par>
+                          <p:cTn id="22" fill="hold">
+                            <p:stCondLst>
+                              <p:cond delay="0"/>
+                            </p:stCondLst>
+                            <p:childTnLst>
+                              <p:par>
+                                <p:cTn id="23" presetID="10" presetClass="exit" presetSubtype="0" fill="hold" nodeType="clickEffect">
+                                  <p:stCondLst>
+                                    <p:cond delay="0"/>
+                                  </p:stCondLst>
+                                  <p:childTnLst>
+                                    <p:animEffect transition="out" filter="fade">
+                                      <p:cBhvr>
+                                        <p:cTn id="24" dur="500"/>
+                                        <p:tgtEl>
+                                          <p:spTgt spid="11"/>
+                                        </p:tgtEl>
+                                      </p:cBhvr>
+                                    </p:animEffect>
+                                    <p:set>
+                                      <p:cBhvr>
+                                        <p:cTn id="25" dur="1" fill="hold">
+                                          <p:stCondLst>
+                                            <p:cond delay="499"/>
+                                          </p:stCondLst>
+                                        </p:cTn>
+                                        <p:tgtEl>
+                                          <p:spTgt spid="11"/>
+                                        </p:tgtEl>
+                                        <p:attrNameLst>
+                                          <p:attrName>style.visibility</p:attrName>
+                                        </p:attrNameLst>
+                                      </p:cBhvr>
+                                      <p:to>
+                                        <p:strVal val="hidden"/>
+                                      </p:to>
+                                    </p:set>
+                                  </p:childTnLst>
+                                </p:cTn>
+                              </p:par>
+                            </p:childTnLst>
+                          </p:cTn>
+                        </p:par>
+                      </p:childTnLst>
+                    </p:cTn>
+                  </p:par>
+                  <p:par>
+                    <p:cTn id="26" fill="hold">
+                      <p:stCondLst>
+                        <p:cond delay="indefinite"/>
+                      </p:stCondLst>
+                      <p:childTnLst>
+                        <p:par>
+                          <p:cTn id="27" fill="hold">
+                            <p:stCondLst>
+                              <p:cond delay="0"/>
+                            </p:stCondLst>
+                            <p:childTnLst>
+                              <p:par>
+                                <p:cTn id="28" presetID="10" presetClass="exit" presetSubtype="0" fill="hold" nodeType="clickEffect">
+                                  <p:stCondLst>
+                                    <p:cond delay="0"/>
+                                  </p:stCondLst>
+                                  <p:childTnLst>
+                                    <p:animEffect transition="out" filter="fade">
+                                      <p:cBhvr>
+                                        <p:cTn id="29" dur="500"/>
+                                        <p:tgtEl>
+                                          <p:spTgt spid="12"/>
+                                        </p:tgtEl>
+                                      </p:cBhvr>
+                                    </p:animEffect>
+                                    <p:set>
+                                      <p:cBhvr>
+                                        <p:cTn id="30" dur="1" fill="hold">
+                                          <p:stCondLst>
+                                            <p:cond delay="499"/>
+                                          </p:stCondLst>
+                                        </p:cTn>
+                                        <p:tgtEl>
+                                          <p:spTgt spid="12"/>
+                                        </p:tgtEl>
+                                        <p:attrNameLst>
+                                          <p:attrName>style.visibility</p:attrName>
+                                        </p:attrNameLst>
+                                      </p:cBhvr>
+                                      <p:to>
+                                        <p:strVal val="hidden"/>
+                                      </p:to>
+                                    </p:set>
+                                  </p:childTnLst>
+                                </p:cTn>
+                              </p:par>
+                            </p:childTnLst>
+                          </p:cTn>
+                        </p:par>
+                      </p:childTnLst>
+                    </p:cTn>
+                  </p:par>
+                  <p:par>
+                    <p:cTn id="31" fill="hold">
+                      <p:stCondLst>
+                        <p:cond delay="indefinite"/>
+                      </p:stCondLst>
+                      <p:childTnLst>
+                        <p:par>
+                          <p:cTn id="32" fill="hold">
+                            <p:stCondLst>
+                              <p:cond delay="0"/>
+                            </p:stCondLst>
+                            <p:childTnLst>
+                              <p:par>
+                                <p:cTn id="33" presetID="10" presetClass="exit" presetSubtype="0" fill="hold" nodeType="clickEffect">
+                                  <p:stCondLst>
+                                    <p:cond delay="0"/>
+                                  </p:stCondLst>
+                                  <p:childTnLst>
+                                    <p:animEffect transition="out" filter="fade">
+                                      <p:cBhvr>
+                                        <p:cTn id="34" dur="500"/>
+                                        <p:tgtEl>
+                                          <p:spTgt spid="13"/>
+                                        </p:tgtEl>
+                                      </p:cBhvr>
+                                    </p:animEffect>
+                                    <p:set>
+                                      <p:cBhvr>
+                                        <p:cTn id="35" dur="1" fill="hold">
+                                          <p:stCondLst>
+                                            <p:cond delay="499"/>
+                                          </p:stCondLst>
+                                        </p:cTn>
+                                        <p:tgtEl>
+                                          <p:spTgt spid="13"/>
+                                        </p:tgtEl>
+                                        <p:attrNameLst>
+                                          <p:attrName>style.visibility</p:attrName>
+                                        </p:attrNameLst>
+                                      </p:cBhvr>
+                                      <p:to>
+                                        <p:strVal val="hidden"/>
+                                      </p:to>
+                                    </p:set>
+                                  </p:childTnLst>
+                                </p:cTn>
+                              </p:par>
+                            </p:childTnLst>
+                          </p:cTn>
+                        </p:par>
+                      </p:childTnLst>
+                    </p:cTn>
+                  </p:par>
+                  <p:par>
+                    <p:cTn id="36" fill="hold">
+                      <p:stCondLst>
+                        <p:cond delay="indefinite"/>
+                      </p:stCondLst>
+                      <p:childTnLst>
+                        <p:par>
+                          <p:cTn id="37" fill="hold">
+                            <p:stCondLst>
+                              <p:cond delay="0"/>
+                            </p:stCondLst>
+                            <p:childTnLst>
+                              <p:par>
+                                <p:cTn id="38" presetID="10" presetClass="exit" presetSubtype="0" fill="hold" nodeType="clickEffect">
+                                  <p:stCondLst>
+                                    <p:cond delay="0"/>
+                                  </p:stCondLst>
+                                  <p:childTnLst>
+                                    <p:animEffect transition="out" filter="fade">
+                                      <p:cBhvr>
+                                        <p:cTn id="39" dur="500"/>
+                                        <p:tgtEl>
+                                          <p:spTgt spid="14"/>
+                                        </p:tgtEl>
+                                      </p:cBhvr>
+                                    </p:animEffect>
+                                    <p:set>
+                                      <p:cBhvr>
+                                        <p:cTn id="40" dur="1" fill="hold">
+                                          <p:stCondLst>
+                                            <p:cond delay="499"/>
+                                          </p:stCondLst>
+                                        </p:cTn>
+                                        <p:tgtEl>
+                                          <p:spTgt spid="14"/>
+                                        </p:tgtEl>
+                                        <p:attrNameLst>
+                                          <p:attrName>style.visibility</p:attrName>
+                                        </p:attrNameLst>
+                                      </p:cBhvr>
+                                      <p:to>
+                                        <p:strVal val="hidden"/>
+                                      </p:to>
+                                    </p:set>
+                                  </p:childTnLst>
+                                </p:cTn>
+                              </p:par>
+                            </p:childTnLst>
+                          </p:cTn>
+                        </p:par>
+                      </p:childTnLst>
+                    </p:cTn>
+                  </p:par>
+                </p:childTnLst>
+              </p:cTn>
+              <p:prevCondLst>
+                <p:cond evt="onPrev" delay="0">
+                  <p:tgtEl>
+                    <p:sldTgt/>
+                  </p:tgtEl>
+                </p:cond>
+              </p:prevCondLst>
+              <p:nextCondLst>
+                <p:cond evt="onNext" delay="0">
+                  <p:tgtEl>
+                    <p:sldTgt/>
+                  </p:tgtEl>
+                </p:cond>
+              </p:nextCondLst>
+            </p:seq>
+          </p:childTnLst>
+        </p:cTn>
+      </p:par>
+    </p:tnLst>
+  </p:timing>
 </p:sld>
 </file>
 
@@ -9471,21 +10374,44 @@
           </a:p>
         </p:txBody>
       </p:sp>
+      <p:sp>
+        <p:nvSpPr>
+          <p:cNvPr id="4" name="Content Placeholder 3">
+            <a:extLst>
+              <a:ext uri="{FF2B5EF4-FFF2-40B4-BE49-F238E27FC236}">
+                <a16:creationId xmlns:a16="http://schemas.microsoft.com/office/drawing/2014/main" id="{82EBC6BA-3B7C-4D56-AD7E-5F47B72C890C}"/>
+              </a:ext>
+            </a:extLst>
+          </p:cNvPr>
+          <p:cNvSpPr>
+            <a:spLocks noGrp="1"/>
+          </p:cNvSpPr>
+          <p:nvPr>
+            <p:ph idx="1"/>
+          </p:nvPr>
+        </p:nvSpPr>
+        <p:spPr/>
+        <p:txBody>
+          <a:bodyPr/>
+          <a:lstStyle/>
+          <a:p>
+            <a:endParaRPr lang="en-US"/>
+          </a:p>
+        </p:txBody>
+      </p:sp>
       <p:pic>
         <p:nvPicPr>
-          <p:cNvPr id="6" name="Content Placeholder 5">
+          <p:cNvPr id="7" name="Picture 6">
             <a:extLst>
               <a:ext uri="{FF2B5EF4-FFF2-40B4-BE49-F238E27FC236}">
-                <a16:creationId xmlns:a16="http://schemas.microsoft.com/office/drawing/2014/main" id="{F33A5BF8-303C-4A6B-9885-04B49A1AEB1F}"/>
+                <a16:creationId xmlns:a16="http://schemas.microsoft.com/office/drawing/2014/main" id="{CE91753D-4197-4DCB-9818-AD909A67EAFB}"/>
               </a:ext>
             </a:extLst>
           </p:cNvPr>
           <p:cNvPicPr>
-            <a:picLocks noGrp="1"/>
+            <a:picLocks noChangeAspect="1"/>
           </p:cNvPicPr>
-          <p:nvPr>
-            <p:ph idx="1"/>
-          </p:nvPr>
+          <p:nvPr/>
         </p:nvPicPr>
         <p:blipFill>
           <a:blip r:embed="rId3"/>
@@ -9495,8 +10421,8 @@
         </p:blipFill>
         <p:spPr>
           <a:xfrm>
-            <a:off x="0" y="561473"/>
-            <a:ext cx="12192000" cy="6112043"/>
+            <a:off x="0" y="459755"/>
+            <a:ext cx="12197248" cy="5941045"/>
           </a:xfrm>
           <a:prstGeom prst="rect">
             <a:avLst/>

</xml_diff>

<commit_message>
Powerpoint Formatting and UI Pictures
</commit_message>
<xml_diff>
--- a/specifications/deliv3/SOS Deliverable Final Presentation.pptx
+++ b/specifications/deliv3/SOS Deliverable Final Presentation.pptx
@@ -141,6 +141,228 @@
 
 <file path=ppt/changesInfos/changesInfo1.xml><?xml version="1.0" encoding="utf-8"?>
 <pc:chgInfo xmlns:a="http://schemas.openxmlformats.org/drawingml/2006/main" xmlns:r="http://schemas.openxmlformats.org/officeDocument/2006/relationships" xmlns:ac="http://schemas.microsoft.com/office/drawing/2013/main/command" xmlns:pc="http://schemas.microsoft.com/office/powerpoint/2013/main/command">
+  <pc:docChgLst>
+    <pc:chgData name="Anthony Sanchez-Ayra" userId="6745e27f37c7945b" providerId="LiveId" clId="{EB57C4ED-9573-45D5-B8B3-0088FA578A1B}"/>
+    <pc:docChg chg="custSel modSld">
+      <pc:chgData name="Anthony Sanchez-Ayra" userId="6745e27f37c7945b" providerId="LiveId" clId="{EB57C4ED-9573-45D5-B8B3-0088FA578A1B}" dt="2019-12-03T09:31:41.158" v="125"/>
+      <pc:docMkLst>
+        <pc:docMk/>
+      </pc:docMkLst>
+      <pc:sldChg chg="addSp delSp modSp modAnim">
+        <pc:chgData name="Anthony Sanchez-Ayra" userId="6745e27f37c7945b" providerId="LiveId" clId="{EB57C4ED-9573-45D5-B8B3-0088FA578A1B}" dt="2019-12-03T09:31:41.158" v="125"/>
+        <pc:sldMkLst>
+          <pc:docMk/>
+          <pc:sldMk cId="2325763583" sldId="266"/>
+        </pc:sldMkLst>
+        <pc:spChg chg="mod">
+          <ac:chgData name="Anthony Sanchez-Ayra" userId="6745e27f37c7945b" providerId="LiveId" clId="{EB57C4ED-9573-45D5-B8B3-0088FA578A1B}" dt="2019-12-03T09:22:13.943" v="56" actId="1076"/>
+          <ac:spMkLst>
+            <pc:docMk/>
+            <pc:sldMk cId="2325763583" sldId="266"/>
+            <ac:spMk id="2" creationId="{720A8A7A-6888-46F3-9DD8-F9AA0F03F440}"/>
+          </ac:spMkLst>
+        </pc:spChg>
+        <pc:spChg chg="del">
+          <ac:chgData name="Anthony Sanchez-Ayra" userId="6745e27f37c7945b" providerId="LiveId" clId="{EB57C4ED-9573-45D5-B8B3-0088FA578A1B}" dt="2019-12-03T09:21:49.700" v="50" actId="478"/>
+          <ac:spMkLst>
+            <pc:docMk/>
+            <pc:sldMk cId="2325763583" sldId="266"/>
+            <ac:spMk id="7" creationId="{0D6E87CD-DD0E-4BA7-B0F4-A5D19BDA48EE}"/>
+          </ac:spMkLst>
+        </pc:spChg>
+        <pc:spChg chg="mod">
+          <ac:chgData name="Anthony Sanchez-Ayra" userId="6745e27f37c7945b" providerId="LiveId" clId="{EB57C4ED-9573-45D5-B8B3-0088FA578A1B}" dt="2019-12-03T09:21:46.617" v="49" actId="1076"/>
+          <ac:spMkLst>
+            <pc:docMk/>
+            <pc:sldMk cId="2325763583" sldId="266"/>
+            <ac:spMk id="8" creationId="{8BB129A2-12B4-4F8C-A89F-36658AAE7696}"/>
+          </ac:spMkLst>
+        </pc:spChg>
+        <pc:picChg chg="add del mod">
+          <ac:chgData name="Anthony Sanchez-Ayra" userId="6745e27f37c7945b" providerId="LiveId" clId="{EB57C4ED-9573-45D5-B8B3-0088FA578A1B}" dt="2019-12-03T09:21:32.432" v="45"/>
+          <ac:picMkLst>
+            <pc:docMk/>
+            <pc:sldMk cId="2325763583" sldId="266"/>
+            <ac:picMk id="5" creationId="{A85101FB-347C-40B5-A667-1F942A166DE9}"/>
+          </ac:picMkLst>
+        </pc:picChg>
+        <pc:picChg chg="add mod">
+          <ac:chgData name="Anthony Sanchez-Ayra" userId="6745e27f37c7945b" providerId="LiveId" clId="{EB57C4ED-9573-45D5-B8B3-0088FA578A1B}" dt="2019-12-03T09:22:16.463" v="57" actId="14100"/>
+          <ac:picMkLst>
+            <pc:docMk/>
+            <pc:sldMk cId="2325763583" sldId="266"/>
+            <ac:picMk id="9" creationId="{72F3A884-D96E-4D1F-8D80-49D76ABA4949}"/>
+          </ac:picMkLst>
+        </pc:picChg>
+        <pc:picChg chg="add mod ord">
+          <ac:chgData name="Anthony Sanchez-Ayra" userId="6745e27f37c7945b" providerId="LiveId" clId="{EB57C4ED-9573-45D5-B8B3-0088FA578A1B}" dt="2019-12-03T09:23:06.082" v="66" actId="171"/>
+          <ac:picMkLst>
+            <pc:docMk/>
+            <pc:sldMk cId="2325763583" sldId="266"/>
+            <ac:picMk id="10" creationId="{E67A8965-19AF-4B9D-AC9C-65043EB8E597}"/>
+          </ac:picMkLst>
+        </pc:picChg>
+        <pc:picChg chg="add mod ord">
+          <ac:chgData name="Anthony Sanchez-Ayra" userId="6745e27f37c7945b" providerId="LiveId" clId="{EB57C4ED-9573-45D5-B8B3-0088FA578A1B}" dt="2019-12-03T09:23:48.597" v="72" actId="171"/>
+          <ac:picMkLst>
+            <pc:docMk/>
+            <pc:sldMk cId="2325763583" sldId="266"/>
+            <ac:picMk id="11" creationId="{8DE7F996-1001-4983-9311-39325C332B62}"/>
+          </ac:picMkLst>
+        </pc:picChg>
+        <pc:picChg chg="add mod ord">
+          <ac:chgData name="Anthony Sanchez-Ayra" userId="6745e27f37c7945b" providerId="LiveId" clId="{EB57C4ED-9573-45D5-B8B3-0088FA578A1B}" dt="2019-12-03T09:24:23.286" v="80" actId="171"/>
+          <ac:picMkLst>
+            <pc:docMk/>
+            <pc:sldMk cId="2325763583" sldId="266"/>
+            <ac:picMk id="12" creationId="{9CFA8331-0146-4348-BB04-EC2C9B799185}"/>
+          </ac:picMkLst>
+        </pc:picChg>
+        <pc:picChg chg="add mod ord">
+          <ac:chgData name="Anthony Sanchez-Ayra" userId="6745e27f37c7945b" providerId="LiveId" clId="{EB57C4ED-9573-45D5-B8B3-0088FA578A1B}" dt="2019-12-03T09:24:53.977" v="88" actId="171"/>
+          <ac:picMkLst>
+            <pc:docMk/>
+            <pc:sldMk cId="2325763583" sldId="266"/>
+            <ac:picMk id="13" creationId="{7C4A6642-A3F6-4943-8DC9-36726F153A72}"/>
+          </ac:picMkLst>
+        </pc:picChg>
+        <pc:picChg chg="add mod ord">
+          <ac:chgData name="Anthony Sanchez-Ayra" userId="6745e27f37c7945b" providerId="LiveId" clId="{EB57C4ED-9573-45D5-B8B3-0088FA578A1B}" dt="2019-12-03T09:25:22.246" v="97" actId="171"/>
+          <ac:picMkLst>
+            <pc:docMk/>
+            <pc:sldMk cId="2325763583" sldId="266"/>
+            <ac:picMk id="14" creationId="{1BDE91A5-5B66-4D32-9283-383FA9D3317F}"/>
+          </ac:picMkLst>
+        </pc:picChg>
+        <pc:picChg chg="add mod ord">
+          <ac:chgData name="Anthony Sanchez-Ayra" userId="6745e27f37c7945b" providerId="LiveId" clId="{EB57C4ED-9573-45D5-B8B3-0088FA578A1B}" dt="2019-12-03T09:29:04.417" v="116" actId="171"/>
+          <ac:picMkLst>
+            <pc:docMk/>
+            <pc:sldMk cId="2325763583" sldId="266"/>
+            <ac:picMk id="15" creationId="{FE75D7B7-5301-442F-BF5D-80CDA634F868}"/>
+          </ac:picMkLst>
+        </pc:picChg>
+        <pc:picChg chg="add mod">
+          <ac:chgData name="Anthony Sanchez-Ayra" userId="6745e27f37c7945b" providerId="LiveId" clId="{EB57C4ED-9573-45D5-B8B3-0088FA578A1B}" dt="2019-12-03T09:31:23.681" v="123" actId="14100"/>
+          <ac:picMkLst>
+            <pc:docMk/>
+            <pc:sldMk cId="2325763583" sldId="266"/>
+            <ac:picMk id="16" creationId="{952C916D-DC20-4587-8A3B-EFA854F4B6B0}"/>
+          </ac:picMkLst>
+        </pc:picChg>
+        <pc:picChg chg="add mod">
+          <ac:chgData name="Anthony Sanchez-Ayra" userId="6745e27f37c7945b" providerId="LiveId" clId="{EB57C4ED-9573-45D5-B8B3-0088FA578A1B}" dt="2019-12-03T09:31:15.418" v="122" actId="14100"/>
+          <ac:picMkLst>
+            <pc:docMk/>
+            <pc:sldMk cId="2325763583" sldId="266"/>
+            <ac:picMk id="17" creationId="{105BD72F-BE1C-4F3A-9545-4296151A2C67}"/>
+          </ac:picMkLst>
+        </pc:picChg>
+      </pc:sldChg>
+      <pc:sldChg chg="addSp delSp modSp">
+        <pc:chgData name="Anthony Sanchez-Ayra" userId="6745e27f37c7945b" providerId="LiveId" clId="{EB57C4ED-9573-45D5-B8B3-0088FA578A1B}" dt="2019-12-03T09:20:41.073" v="43" actId="1076"/>
+        <pc:sldMkLst>
+          <pc:docMk/>
+          <pc:sldMk cId="1525650455" sldId="275"/>
+        </pc:sldMkLst>
+        <pc:spChg chg="mod">
+          <ac:chgData name="Anthony Sanchez-Ayra" userId="6745e27f37c7945b" providerId="LiveId" clId="{EB57C4ED-9573-45D5-B8B3-0088FA578A1B}" dt="2019-12-03T09:15:48.459" v="12" actId="1076"/>
+          <ac:spMkLst>
+            <pc:docMk/>
+            <pc:sldMk cId="1525650455" sldId="275"/>
+            <ac:spMk id="2" creationId="{717D8471-15FC-4996-8A4C-889387E36703}"/>
+          </ac:spMkLst>
+        </pc:spChg>
+        <pc:spChg chg="del">
+          <ac:chgData name="Anthony Sanchez-Ayra" userId="6745e27f37c7945b" providerId="LiveId" clId="{EB57C4ED-9573-45D5-B8B3-0088FA578A1B}" dt="2019-12-03T09:15:55.559" v="15" actId="478"/>
+          <ac:spMkLst>
+            <pc:docMk/>
+            <pc:sldMk cId="1525650455" sldId="275"/>
+            <ac:spMk id="4" creationId="{0BCE183C-8642-47C0-89C3-898897F145D2}"/>
+          </ac:spMkLst>
+        </pc:spChg>
+        <pc:spChg chg="mod">
+          <ac:chgData name="Anthony Sanchez-Ayra" userId="6745e27f37c7945b" providerId="LiveId" clId="{EB57C4ED-9573-45D5-B8B3-0088FA578A1B}" dt="2019-12-03T09:20:41.073" v="43" actId="1076"/>
+          <ac:spMkLst>
+            <pc:docMk/>
+            <pc:sldMk cId="1525650455" sldId="275"/>
+            <ac:spMk id="5" creationId="{86B7C9BC-A107-46D8-A882-BA5F973003D9}"/>
+          </ac:spMkLst>
+        </pc:spChg>
+        <pc:spChg chg="add del mod">
+          <ac:chgData name="Anthony Sanchez-Ayra" userId="6745e27f37c7945b" providerId="LiveId" clId="{EB57C4ED-9573-45D5-B8B3-0088FA578A1B}" dt="2019-12-03T09:15:19.932" v="5"/>
+          <ac:spMkLst>
+            <pc:docMk/>
+            <pc:sldMk cId="1525650455" sldId="275"/>
+            <ac:spMk id="7" creationId="{D78E2856-06DF-45A1-BDF7-4019380295AB}"/>
+          </ac:spMkLst>
+        </pc:spChg>
+        <pc:spChg chg="add del mod">
+          <ac:chgData name="Anthony Sanchez-Ayra" userId="6745e27f37c7945b" providerId="LiveId" clId="{EB57C4ED-9573-45D5-B8B3-0088FA578A1B}" dt="2019-12-03T09:20:11.686" v="33"/>
+          <ac:spMkLst>
+            <pc:docMk/>
+            <pc:sldMk cId="1525650455" sldId="275"/>
+            <ac:spMk id="10" creationId="{334AEA67-7AA6-46F6-9F49-CD3621B4ED27}"/>
+          </ac:spMkLst>
+        </pc:spChg>
+        <pc:picChg chg="del">
+          <ac:chgData name="Anthony Sanchez-Ayra" userId="6745e27f37c7945b" providerId="LiveId" clId="{EB57C4ED-9573-45D5-B8B3-0088FA578A1B}" dt="2019-12-03T09:15:17.301" v="4" actId="478"/>
+          <ac:picMkLst>
+            <pc:docMk/>
+            <pc:sldMk cId="1525650455" sldId="275"/>
+            <ac:picMk id="6" creationId="{C78C7FBE-B44B-427A-9E0A-70552505858C}"/>
+          </ac:picMkLst>
+        </pc:picChg>
+        <pc:picChg chg="add del mod modCrop">
+          <ac:chgData name="Anthony Sanchez-Ayra" userId="6745e27f37c7945b" providerId="LiveId" clId="{EB57C4ED-9573-45D5-B8B3-0088FA578A1B}" dt="2019-12-03T09:19:59.514" v="32" actId="478"/>
+          <ac:picMkLst>
+            <pc:docMk/>
+            <pc:sldMk cId="1525650455" sldId="275"/>
+            <ac:picMk id="8" creationId="{2439341C-2B81-4B49-AEB9-5B55B332CD67}"/>
+          </ac:picMkLst>
+        </pc:picChg>
+        <pc:picChg chg="add mod">
+          <ac:chgData name="Anthony Sanchez-Ayra" userId="6745e27f37c7945b" providerId="LiveId" clId="{EB57C4ED-9573-45D5-B8B3-0088FA578A1B}" dt="2019-12-03T09:20:34.197" v="41" actId="14100"/>
+          <ac:picMkLst>
+            <pc:docMk/>
+            <pc:sldMk cId="1525650455" sldId="275"/>
+            <ac:picMk id="11" creationId="{FE612BED-B5E0-4BFA-8068-D51E68AB6DBD}"/>
+          </ac:picMkLst>
+        </pc:picChg>
+      </pc:sldChg>
+      <pc:sldChg chg="addSp delSp modSp modNotesTx">
+        <pc:chgData name="Anthony Sanchez-Ayra" userId="6745e27f37c7945b" providerId="LiveId" clId="{EB57C4ED-9573-45D5-B8B3-0088FA578A1B}" dt="2019-12-03T07:33:10.042" v="3" actId="20577"/>
+        <pc:sldMkLst>
+          <pc:docMk/>
+          <pc:sldMk cId="1414546480" sldId="277"/>
+        </pc:sldMkLst>
+        <pc:spChg chg="add mod">
+          <ac:chgData name="Anthony Sanchez-Ayra" userId="6745e27f37c7945b" providerId="LiveId" clId="{EB57C4ED-9573-45D5-B8B3-0088FA578A1B}" dt="2019-12-03T07:32:18.900" v="0" actId="478"/>
+          <ac:spMkLst>
+            <pc:docMk/>
+            <pc:sldMk cId="1414546480" sldId="277"/>
+            <ac:spMk id="4" creationId="{82EBC6BA-3B7C-4D56-AD7E-5F47B72C890C}"/>
+          </ac:spMkLst>
+        </pc:spChg>
+        <pc:picChg chg="del">
+          <ac:chgData name="Anthony Sanchez-Ayra" userId="6745e27f37c7945b" providerId="LiveId" clId="{EB57C4ED-9573-45D5-B8B3-0088FA578A1B}" dt="2019-12-03T07:32:18.900" v="0" actId="478"/>
+          <ac:picMkLst>
+            <pc:docMk/>
+            <pc:sldMk cId="1414546480" sldId="277"/>
+            <ac:picMk id="6" creationId="{F33A5BF8-303C-4A6B-9885-04B49A1AEB1F}"/>
+          </ac:picMkLst>
+        </pc:picChg>
+        <pc:picChg chg="add mod">
+          <ac:chgData name="Anthony Sanchez-Ayra" userId="6745e27f37c7945b" providerId="LiveId" clId="{EB57C4ED-9573-45D5-B8B3-0088FA578A1B}" dt="2019-12-03T07:32:26.617" v="2" actId="14100"/>
+          <ac:picMkLst>
+            <pc:docMk/>
+            <pc:sldMk cId="1414546480" sldId="277"/>
+            <ac:picMk id="7" creationId="{CE91753D-4197-4DCB-9818-AD909A67EAFB}"/>
+          </ac:picMkLst>
+        </pc:picChg>
+      </pc:sldChg>
+    </pc:docChg>
+  </pc:docChgLst>
   <pc:docChgLst>
     <pc:chgData name="Anthony Sanchez-Ayra" userId="6745e27f37c7945b" providerId="LiveId" clId="{1E119CE9-B343-4265-9F4A-0864581E65E7}"/>
     <pc:docChg chg="undo custSel addSld delSld modSld sldOrd">
@@ -998,228 +1220,6 @@
       </pc:sldChg>
     </pc:docChg>
   </pc:docChgLst>
-  <pc:docChgLst>
-    <pc:chgData name="Anthony Sanchez-Ayra" userId="6745e27f37c7945b" providerId="LiveId" clId="{EB57C4ED-9573-45D5-B8B3-0088FA578A1B}"/>
-    <pc:docChg chg="custSel modSld">
-      <pc:chgData name="Anthony Sanchez-Ayra" userId="6745e27f37c7945b" providerId="LiveId" clId="{EB57C4ED-9573-45D5-B8B3-0088FA578A1B}" dt="2019-12-03T09:31:41.158" v="125"/>
-      <pc:docMkLst>
-        <pc:docMk/>
-      </pc:docMkLst>
-      <pc:sldChg chg="addSp delSp modSp modAnim">
-        <pc:chgData name="Anthony Sanchez-Ayra" userId="6745e27f37c7945b" providerId="LiveId" clId="{EB57C4ED-9573-45D5-B8B3-0088FA578A1B}" dt="2019-12-03T09:31:41.158" v="125"/>
-        <pc:sldMkLst>
-          <pc:docMk/>
-          <pc:sldMk cId="2325763583" sldId="266"/>
-        </pc:sldMkLst>
-        <pc:spChg chg="mod">
-          <ac:chgData name="Anthony Sanchez-Ayra" userId="6745e27f37c7945b" providerId="LiveId" clId="{EB57C4ED-9573-45D5-B8B3-0088FA578A1B}" dt="2019-12-03T09:22:13.943" v="56" actId="1076"/>
-          <ac:spMkLst>
-            <pc:docMk/>
-            <pc:sldMk cId="2325763583" sldId="266"/>
-            <ac:spMk id="2" creationId="{720A8A7A-6888-46F3-9DD8-F9AA0F03F440}"/>
-          </ac:spMkLst>
-        </pc:spChg>
-        <pc:spChg chg="del">
-          <ac:chgData name="Anthony Sanchez-Ayra" userId="6745e27f37c7945b" providerId="LiveId" clId="{EB57C4ED-9573-45D5-B8B3-0088FA578A1B}" dt="2019-12-03T09:21:49.700" v="50" actId="478"/>
-          <ac:spMkLst>
-            <pc:docMk/>
-            <pc:sldMk cId="2325763583" sldId="266"/>
-            <ac:spMk id="7" creationId="{0D6E87CD-DD0E-4BA7-B0F4-A5D19BDA48EE}"/>
-          </ac:spMkLst>
-        </pc:spChg>
-        <pc:spChg chg="mod">
-          <ac:chgData name="Anthony Sanchez-Ayra" userId="6745e27f37c7945b" providerId="LiveId" clId="{EB57C4ED-9573-45D5-B8B3-0088FA578A1B}" dt="2019-12-03T09:21:46.617" v="49" actId="1076"/>
-          <ac:spMkLst>
-            <pc:docMk/>
-            <pc:sldMk cId="2325763583" sldId="266"/>
-            <ac:spMk id="8" creationId="{8BB129A2-12B4-4F8C-A89F-36658AAE7696}"/>
-          </ac:spMkLst>
-        </pc:spChg>
-        <pc:picChg chg="add del mod">
-          <ac:chgData name="Anthony Sanchez-Ayra" userId="6745e27f37c7945b" providerId="LiveId" clId="{EB57C4ED-9573-45D5-B8B3-0088FA578A1B}" dt="2019-12-03T09:21:32.432" v="45"/>
-          <ac:picMkLst>
-            <pc:docMk/>
-            <pc:sldMk cId="2325763583" sldId="266"/>
-            <ac:picMk id="5" creationId="{A85101FB-347C-40B5-A667-1F942A166DE9}"/>
-          </ac:picMkLst>
-        </pc:picChg>
-        <pc:picChg chg="add mod">
-          <ac:chgData name="Anthony Sanchez-Ayra" userId="6745e27f37c7945b" providerId="LiveId" clId="{EB57C4ED-9573-45D5-B8B3-0088FA578A1B}" dt="2019-12-03T09:22:16.463" v="57" actId="14100"/>
-          <ac:picMkLst>
-            <pc:docMk/>
-            <pc:sldMk cId="2325763583" sldId="266"/>
-            <ac:picMk id="9" creationId="{72F3A884-D96E-4D1F-8D80-49D76ABA4949}"/>
-          </ac:picMkLst>
-        </pc:picChg>
-        <pc:picChg chg="add mod ord">
-          <ac:chgData name="Anthony Sanchez-Ayra" userId="6745e27f37c7945b" providerId="LiveId" clId="{EB57C4ED-9573-45D5-B8B3-0088FA578A1B}" dt="2019-12-03T09:23:06.082" v="66" actId="171"/>
-          <ac:picMkLst>
-            <pc:docMk/>
-            <pc:sldMk cId="2325763583" sldId="266"/>
-            <ac:picMk id="10" creationId="{E67A8965-19AF-4B9D-AC9C-65043EB8E597}"/>
-          </ac:picMkLst>
-        </pc:picChg>
-        <pc:picChg chg="add mod ord">
-          <ac:chgData name="Anthony Sanchez-Ayra" userId="6745e27f37c7945b" providerId="LiveId" clId="{EB57C4ED-9573-45D5-B8B3-0088FA578A1B}" dt="2019-12-03T09:23:48.597" v="72" actId="171"/>
-          <ac:picMkLst>
-            <pc:docMk/>
-            <pc:sldMk cId="2325763583" sldId="266"/>
-            <ac:picMk id="11" creationId="{8DE7F996-1001-4983-9311-39325C332B62}"/>
-          </ac:picMkLst>
-        </pc:picChg>
-        <pc:picChg chg="add mod ord">
-          <ac:chgData name="Anthony Sanchez-Ayra" userId="6745e27f37c7945b" providerId="LiveId" clId="{EB57C4ED-9573-45D5-B8B3-0088FA578A1B}" dt="2019-12-03T09:24:23.286" v="80" actId="171"/>
-          <ac:picMkLst>
-            <pc:docMk/>
-            <pc:sldMk cId="2325763583" sldId="266"/>
-            <ac:picMk id="12" creationId="{9CFA8331-0146-4348-BB04-EC2C9B799185}"/>
-          </ac:picMkLst>
-        </pc:picChg>
-        <pc:picChg chg="add mod ord">
-          <ac:chgData name="Anthony Sanchez-Ayra" userId="6745e27f37c7945b" providerId="LiveId" clId="{EB57C4ED-9573-45D5-B8B3-0088FA578A1B}" dt="2019-12-03T09:24:53.977" v="88" actId="171"/>
-          <ac:picMkLst>
-            <pc:docMk/>
-            <pc:sldMk cId="2325763583" sldId="266"/>
-            <ac:picMk id="13" creationId="{7C4A6642-A3F6-4943-8DC9-36726F153A72}"/>
-          </ac:picMkLst>
-        </pc:picChg>
-        <pc:picChg chg="add mod ord">
-          <ac:chgData name="Anthony Sanchez-Ayra" userId="6745e27f37c7945b" providerId="LiveId" clId="{EB57C4ED-9573-45D5-B8B3-0088FA578A1B}" dt="2019-12-03T09:25:22.246" v="97" actId="171"/>
-          <ac:picMkLst>
-            <pc:docMk/>
-            <pc:sldMk cId="2325763583" sldId="266"/>
-            <ac:picMk id="14" creationId="{1BDE91A5-5B66-4D32-9283-383FA9D3317F}"/>
-          </ac:picMkLst>
-        </pc:picChg>
-        <pc:picChg chg="add mod ord">
-          <ac:chgData name="Anthony Sanchez-Ayra" userId="6745e27f37c7945b" providerId="LiveId" clId="{EB57C4ED-9573-45D5-B8B3-0088FA578A1B}" dt="2019-12-03T09:29:04.417" v="116" actId="171"/>
-          <ac:picMkLst>
-            <pc:docMk/>
-            <pc:sldMk cId="2325763583" sldId="266"/>
-            <ac:picMk id="15" creationId="{FE75D7B7-5301-442F-BF5D-80CDA634F868}"/>
-          </ac:picMkLst>
-        </pc:picChg>
-        <pc:picChg chg="add mod">
-          <ac:chgData name="Anthony Sanchez-Ayra" userId="6745e27f37c7945b" providerId="LiveId" clId="{EB57C4ED-9573-45D5-B8B3-0088FA578A1B}" dt="2019-12-03T09:31:23.681" v="123" actId="14100"/>
-          <ac:picMkLst>
-            <pc:docMk/>
-            <pc:sldMk cId="2325763583" sldId="266"/>
-            <ac:picMk id="16" creationId="{952C916D-DC20-4587-8A3B-EFA854F4B6B0}"/>
-          </ac:picMkLst>
-        </pc:picChg>
-        <pc:picChg chg="add mod">
-          <ac:chgData name="Anthony Sanchez-Ayra" userId="6745e27f37c7945b" providerId="LiveId" clId="{EB57C4ED-9573-45D5-B8B3-0088FA578A1B}" dt="2019-12-03T09:31:15.418" v="122" actId="14100"/>
-          <ac:picMkLst>
-            <pc:docMk/>
-            <pc:sldMk cId="2325763583" sldId="266"/>
-            <ac:picMk id="17" creationId="{105BD72F-BE1C-4F3A-9545-4296151A2C67}"/>
-          </ac:picMkLst>
-        </pc:picChg>
-      </pc:sldChg>
-      <pc:sldChg chg="addSp delSp modSp">
-        <pc:chgData name="Anthony Sanchez-Ayra" userId="6745e27f37c7945b" providerId="LiveId" clId="{EB57C4ED-9573-45D5-B8B3-0088FA578A1B}" dt="2019-12-03T09:20:41.073" v="43" actId="1076"/>
-        <pc:sldMkLst>
-          <pc:docMk/>
-          <pc:sldMk cId="1525650455" sldId="275"/>
-        </pc:sldMkLst>
-        <pc:spChg chg="mod">
-          <ac:chgData name="Anthony Sanchez-Ayra" userId="6745e27f37c7945b" providerId="LiveId" clId="{EB57C4ED-9573-45D5-B8B3-0088FA578A1B}" dt="2019-12-03T09:15:48.459" v="12" actId="1076"/>
-          <ac:spMkLst>
-            <pc:docMk/>
-            <pc:sldMk cId="1525650455" sldId="275"/>
-            <ac:spMk id="2" creationId="{717D8471-15FC-4996-8A4C-889387E36703}"/>
-          </ac:spMkLst>
-        </pc:spChg>
-        <pc:spChg chg="del">
-          <ac:chgData name="Anthony Sanchez-Ayra" userId="6745e27f37c7945b" providerId="LiveId" clId="{EB57C4ED-9573-45D5-B8B3-0088FA578A1B}" dt="2019-12-03T09:15:55.559" v="15" actId="478"/>
-          <ac:spMkLst>
-            <pc:docMk/>
-            <pc:sldMk cId="1525650455" sldId="275"/>
-            <ac:spMk id="4" creationId="{0BCE183C-8642-47C0-89C3-898897F145D2}"/>
-          </ac:spMkLst>
-        </pc:spChg>
-        <pc:spChg chg="mod">
-          <ac:chgData name="Anthony Sanchez-Ayra" userId="6745e27f37c7945b" providerId="LiveId" clId="{EB57C4ED-9573-45D5-B8B3-0088FA578A1B}" dt="2019-12-03T09:20:41.073" v="43" actId="1076"/>
-          <ac:spMkLst>
-            <pc:docMk/>
-            <pc:sldMk cId="1525650455" sldId="275"/>
-            <ac:spMk id="5" creationId="{86B7C9BC-A107-46D8-A882-BA5F973003D9}"/>
-          </ac:spMkLst>
-        </pc:spChg>
-        <pc:spChg chg="add del mod">
-          <ac:chgData name="Anthony Sanchez-Ayra" userId="6745e27f37c7945b" providerId="LiveId" clId="{EB57C4ED-9573-45D5-B8B3-0088FA578A1B}" dt="2019-12-03T09:15:19.932" v="5"/>
-          <ac:spMkLst>
-            <pc:docMk/>
-            <pc:sldMk cId="1525650455" sldId="275"/>
-            <ac:spMk id="7" creationId="{D78E2856-06DF-45A1-BDF7-4019380295AB}"/>
-          </ac:spMkLst>
-        </pc:spChg>
-        <pc:spChg chg="add del mod">
-          <ac:chgData name="Anthony Sanchez-Ayra" userId="6745e27f37c7945b" providerId="LiveId" clId="{EB57C4ED-9573-45D5-B8B3-0088FA578A1B}" dt="2019-12-03T09:20:11.686" v="33"/>
-          <ac:spMkLst>
-            <pc:docMk/>
-            <pc:sldMk cId="1525650455" sldId="275"/>
-            <ac:spMk id="10" creationId="{334AEA67-7AA6-46F6-9F49-CD3621B4ED27}"/>
-          </ac:spMkLst>
-        </pc:spChg>
-        <pc:picChg chg="del">
-          <ac:chgData name="Anthony Sanchez-Ayra" userId="6745e27f37c7945b" providerId="LiveId" clId="{EB57C4ED-9573-45D5-B8B3-0088FA578A1B}" dt="2019-12-03T09:15:17.301" v="4" actId="478"/>
-          <ac:picMkLst>
-            <pc:docMk/>
-            <pc:sldMk cId="1525650455" sldId="275"/>
-            <ac:picMk id="6" creationId="{C78C7FBE-B44B-427A-9E0A-70552505858C}"/>
-          </ac:picMkLst>
-        </pc:picChg>
-        <pc:picChg chg="add del mod modCrop">
-          <ac:chgData name="Anthony Sanchez-Ayra" userId="6745e27f37c7945b" providerId="LiveId" clId="{EB57C4ED-9573-45D5-B8B3-0088FA578A1B}" dt="2019-12-03T09:19:59.514" v="32" actId="478"/>
-          <ac:picMkLst>
-            <pc:docMk/>
-            <pc:sldMk cId="1525650455" sldId="275"/>
-            <ac:picMk id="8" creationId="{2439341C-2B81-4B49-AEB9-5B55B332CD67}"/>
-          </ac:picMkLst>
-        </pc:picChg>
-        <pc:picChg chg="add mod">
-          <ac:chgData name="Anthony Sanchez-Ayra" userId="6745e27f37c7945b" providerId="LiveId" clId="{EB57C4ED-9573-45D5-B8B3-0088FA578A1B}" dt="2019-12-03T09:20:34.197" v="41" actId="14100"/>
-          <ac:picMkLst>
-            <pc:docMk/>
-            <pc:sldMk cId="1525650455" sldId="275"/>
-            <ac:picMk id="11" creationId="{FE612BED-B5E0-4BFA-8068-D51E68AB6DBD}"/>
-          </ac:picMkLst>
-        </pc:picChg>
-      </pc:sldChg>
-      <pc:sldChg chg="addSp delSp modSp modNotesTx">
-        <pc:chgData name="Anthony Sanchez-Ayra" userId="6745e27f37c7945b" providerId="LiveId" clId="{EB57C4ED-9573-45D5-B8B3-0088FA578A1B}" dt="2019-12-03T07:33:10.042" v="3" actId="20577"/>
-        <pc:sldMkLst>
-          <pc:docMk/>
-          <pc:sldMk cId="1414546480" sldId="277"/>
-        </pc:sldMkLst>
-        <pc:spChg chg="add mod">
-          <ac:chgData name="Anthony Sanchez-Ayra" userId="6745e27f37c7945b" providerId="LiveId" clId="{EB57C4ED-9573-45D5-B8B3-0088FA578A1B}" dt="2019-12-03T07:32:18.900" v="0" actId="478"/>
-          <ac:spMkLst>
-            <pc:docMk/>
-            <pc:sldMk cId="1414546480" sldId="277"/>
-            <ac:spMk id="4" creationId="{82EBC6BA-3B7C-4D56-AD7E-5F47B72C890C}"/>
-          </ac:spMkLst>
-        </pc:spChg>
-        <pc:picChg chg="del">
-          <ac:chgData name="Anthony Sanchez-Ayra" userId="6745e27f37c7945b" providerId="LiveId" clId="{EB57C4ED-9573-45D5-B8B3-0088FA578A1B}" dt="2019-12-03T07:32:18.900" v="0" actId="478"/>
-          <ac:picMkLst>
-            <pc:docMk/>
-            <pc:sldMk cId="1414546480" sldId="277"/>
-            <ac:picMk id="6" creationId="{F33A5BF8-303C-4A6B-9885-04B49A1AEB1F}"/>
-          </ac:picMkLst>
-        </pc:picChg>
-        <pc:picChg chg="add mod">
-          <ac:chgData name="Anthony Sanchez-Ayra" userId="6745e27f37c7945b" providerId="LiveId" clId="{EB57C4ED-9573-45D5-B8B3-0088FA578A1B}" dt="2019-12-03T07:32:26.617" v="2" actId="14100"/>
-          <ac:picMkLst>
-            <pc:docMk/>
-            <pc:sldMk cId="1414546480" sldId="277"/>
-            <ac:picMk id="7" creationId="{CE91753D-4197-4DCB-9818-AD909A67EAFB}"/>
-          </ac:picMkLst>
-        </pc:picChg>
-      </pc:sldChg>
-    </pc:docChg>
-  </pc:docChgLst>
 </pc:chgInfo>
 </file>
 
@@ -9202,8 +9202,8 @@
         </p:blipFill>
         <p:spPr>
           <a:xfrm>
-            <a:off x="73157" y="1345589"/>
-            <a:ext cx="12035037" cy="4537686"/>
+            <a:off x="1911638" y="1167834"/>
+            <a:ext cx="8379375" cy="3159356"/>
           </a:xfrm>
           <a:prstGeom prst="rect">
             <a:avLst/>
@@ -9264,6 +9264,48 @@
               <a:t>10</a:t>
             </a:fld>
             <a:endParaRPr lang="en-US"/>
+          </a:p>
+        </p:txBody>
+      </p:sp>
+      <p:sp>
+        <p:nvSpPr>
+          <p:cNvPr id="3" name="TextBox 2">
+            <a:extLst>
+              <a:ext uri="{FF2B5EF4-FFF2-40B4-BE49-F238E27FC236}">
+                <a16:creationId xmlns:a16="http://schemas.microsoft.com/office/drawing/2014/main" id="{0F241470-91A9-4FD6-9C52-FF1A55FF48FE}"/>
+              </a:ext>
+            </a:extLst>
+          </p:cNvPr>
+          <p:cNvSpPr txBox="1"/>
+          <p:nvPr/>
+        </p:nvSpPr>
+        <p:spPr>
+          <a:xfrm>
+            <a:off x="1849167" y="4429665"/>
+            <a:ext cx="8504316" cy="1200329"/>
+          </a:xfrm>
+          <a:prstGeom prst="rect">
+            <a:avLst/>
+          </a:prstGeom>
+          <a:noFill/>
+        </p:spPr>
+        <p:txBody>
+          <a:bodyPr wrap="square" rtlCol="0">
+            <a:spAutoFit/>
+          </a:bodyPr>
+          <a:lstStyle/>
+          <a:p>
+            <a:pPr algn="ctr"/>
+            <a:r>
+              <a:rPr lang="en-US" dirty="0"/>
+              <a:t>Access Matrix for SOS. </a:t>
+            </a:r>
+          </a:p>
+          <a:p>
+            <a:r>
+              <a:rPr lang="en-US" dirty="0"/>
+              <a:t>Access Management is implemented by the front-end as part of the website are not presented if certain conditions aren’t met, i.e., Users can only see the “Edit Profile” button if they are logged in and on their own User Page.</a:t>
+            </a:r>
           </a:p>
         </p:txBody>
       </p:sp>
@@ -9315,7 +9357,7 @@
         </p:nvSpPr>
         <p:spPr>
           <a:xfrm>
-            <a:off x="919119" y="-259083"/>
+            <a:off x="919119" y="0"/>
             <a:ext cx="10353762" cy="970450"/>
           </a:xfrm>
         </p:spPr>
@@ -9388,14 +9430,56 @@
         </p:blipFill>
         <p:spPr>
           <a:xfrm>
-            <a:off x="0" y="527914"/>
-            <a:ext cx="12192000" cy="6128525"/>
+            <a:off x="2008493" y="970450"/>
+            <a:ext cx="8175014" cy="4109316"/>
           </a:xfrm>
           <a:prstGeom prst="rect">
             <a:avLst/>
           </a:prstGeom>
         </p:spPr>
       </p:pic>
+      <p:sp>
+        <p:nvSpPr>
+          <p:cNvPr id="7" name="TextBox 6">
+            <a:extLst>
+              <a:ext uri="{FF2B5EF4-FFF2-40B4-BE49-F238E27FC236}">
+                <a16:creationId xmlns:a16="http://schemas.microsoft.com/office/drawing/2014/main" id="{DF27AABA-B2E9-47F9-8DC1-4C1642CFF3EA}"/>
+              </a:ext>
+            </a:extLst>
+          </p:cNvPr>
+          <p:cNvSpPr txBox="1"/>
+          <p:nvPr/>
+        </p:nvSpPr>
+        <p:spPr>
+          <a:xfrm>
+            <a:off x="1843842" y="5079766"/>
+            <a:ext cx="8504316" cy="1200329"/>
+          </a:xfrm>
+          <a:prstGeom prst="rect">
+            <a:avLst/>
+          </a:prstGeom>
+          <a:noFill/>
+        </p:spPr>
+        <p:txBody>
+          <a:bodyPr wrap="square" rtlCol="0">
+            <a:spAutoFit/>
+          </a:bodyPr>
+          <a:lstStyle/>
+          <a:p>
+            <a:pPr algn="ctr"/>
+            <a:r>
+              <a:rPr lang="en-US" dirty="0"/>
+              <a:t>Hybrid AES/RSA Schema for Data Exchange.</a:t>
+            </a:r>
+          </a:p>
+          <a:p>
+            <a:r>
+              <a:rPr lang="en-US" dirty="0"/>
+              <a:t>Transfer Management is implemented in both the backend and the frontend by means of hybrid encryption. Messages are sent as cyphers which only the intended receiver can decode. </a:t>
+            </a:r>
+          </a:p>
+        </p:txBody>
+      </p:sp>
     </p:spTree>
     <p:extLst>
       <p:ext uri="{BB962C8B-B14F-4D97-AF65-F5344CB8AC3E}">
@@ -10447,9 +10531,21 @@
   <p:cSld>
     <p:bg>
       <p:bgPr>
-        <a:solidFill>
-          <a:schemeClr val="bg1"/>
-        </a:solidFill>
+        <a:blipFill rotWithShape="1">
+          <a:blip r:embed="rId3">
+            <a:duotone>
+              <a:schemeClr val="bg2">
+                <a:shade val="80000"/>
+                <a:lumMod val="80000"/>
+              </a:schemeClr>
+              <a:schemeClr val="bg2">
+                <a:tint val="98000"/>
+              </a:schemeClr>
+            </a:duotone>
+            <a:extLst/>
+          </a:blip>
+          <a:stretch/>
+        </a:blipFill>
         <a:effectLst/>
       </p:bgPr>
     </p:bg>
@@ -10467,6 +10563,66 @@
           <a:chExt cx="0" cy="0"/>
         </a:xfrm>
       </p:grpSpPr>
+      <p:sp useBgFill="1">
+        <p:nvSpPr>
+          <p:cNvPr id="12" name="Rectangle 11">
+            <a:extLst>
+              <a:ext uri="{FF2B5EF4-FFF2-40B4-BE49-F238E27FC236}">
+                <a16:creationId xmlns:a16="http://schemas.microsoft.com/office/drawing/2014/main" id="{9A6C2C86-63BF-47D5-AA3F-905111A238E2}"/>
+              </a:ext>
+              <a:ext uri="{C183D7F6-B498-43B3-948B-1728B52AA6E4}">
+                <adec:decorative xmlns:adec="http://schemas.microsoft.com/office/drawing/2017/decorative" val="1"/>
+              </a:ext>
+            </a:extLst>
+          </p:cNvPr>
+          <p:cNvSpPr>
+            <a:spLocks noGrp="1" noRot="1" noChangeAspect="1" noMove="1" noResize="1" noEditPoints="1" noAdjustHandles="1" noChangeArrowheads="1" noChangeShapeType="1" noTextEdit="1"/>
+          </p:cNvSpPr>
+          <p:nvPr>
+            <p:extLst>
+              <p:ext uri="{386F3935-93C4-4BCD-93E2-E3B085C9AB24}">
+                <p16:designElem xmlns:p16="http://schemas.microsoft.com/office/powerpoint/2015/main" val="1"/>
+              </p:ext>
+            </p:extLst>
+          </p:nvPr>
+        </p:nvSpPr>
+        <p:spPr>
+          <a:xfrm>
+            <a:off x="0" y="0"/>
+            <a:ext cx="12192000" cy="6858000"/>
+          </a:xfrm>
+          <a:prstGeom prst="rect">
+            <a:avLst/>
+          </a:prstGeom>
+          <a:ln>
+            <a:noFill/>
+          </a:ln>
+        </p:spPr>
+        <p:style>
+          <a:lnRef idx="2">
+            <a:schemeClr val="accent1">
+              <a:shade val="50000"/>
+            </a:schemeClr>
+          </a:lnRef>
+          <a:fillRef idx="1">
+            <a:schemeClr val="accent1"/>
+          </a:fillRef>
+          <a:effectRef idx="0">
+            <a:schemeClr val="accent1"/>
+          </a:effectRef>
+          <a:fontRef idx="minor">
+            <a:schemeClr val="lt1"/>
+          </a:fontRef>
+        </p:style>
+        <p:txBody>
+          <a:bodyPr rtlCol="0" anchor="ctr"/>
+          <a:lstStyle/>
+          <a:p>
+            <a:pPr algn="ctr"/>
+            <a:endParaRPr lang="en-US"/>
+          </a:p>
+        </p:txBody>
+      </p:sp>
       <p:sp>
         <p:nvSpPr>
           <p:cNvPr id="2" name="Title 1">
@@ -10485,19 +10641,204 @@
         </p:nvSpPr>
         <p:spPr>
           <a:xfrm>
-            <a:off x="787893" y="-310032"/>
-            <a:ext cx="10515600" cy="1325563"/>
+            <a:off x="834013" y="1115568"/>
+            <a:ext cx="3949002" cy="4626864"/>
           </a:xfrm>
         </p:spPr>
         <p:txBody>
-          <a:bodyPr/>
+          <a:bodyPr>
+            <a:normAutofit/>
+          </a:bodyPr>
           <a:lstStyle/>
           <a:p>
-            <a:pPr algn="ctr"/>
-            <a:r>
-              <a:rPr lang="en-US" dirty="0"/>
-              <a:t>Test Case: SOS07-System-**-Sunny**</a:t>
-            </a:r>
+            <a:pPr algn="l"/>
+            <a:r>
+              <a:rPr lang="en-US" sz="3600" dirty="0"/>
+              <a:t>Test Case: </a:t>
+            </a:r>
+            <a:br>
+              <a:rPr lang="en-US" sz="3600" dirty="0"/>
+            </a:br>
+            <a:r>
+              <a:rPr lang="en-US" sz="3600" dirty="0"/>
+              <a:t>SOS07-System-017-Sunny-09</a:t>
+            </a:r>
+          </a:p>
+        </p:txBody>
+      </p:sp>
+      <p:cxnSp>
+        <p:nvCxnSpPr>
+          <p:cNvPr id="14" name="Straight Connector 13">
+            <a:extLst>
+              <a:ext uri="{FF2B5EF4-FFF2-40B4-BE49-F238E27FC236}">
+                <a16:creationId xmlns:a16="http://schemas.microsoft.com/office/drawing/2014/main" id="{425A0768-3044-4AA9-A889-D2CAA68C517A}"/>
+              </a:ext>
+              <a:ext uri="{C183D7F6-B498-43B3-948B-1728B52AA6E4}">
+                <adec:decorative xmlns:adec="http://schemas.microsoft.com/office/drawing/2017/decorative" val="1"/>
+              </a:ext>
+            </a:extLst>
+          </p:cNvPr>
+          <p:cNvCxnSpPr>
+            <a:cxnSpLocks noGrp="1" noRot="1" noChangeAspect="1" noMove="1" noResize="1" noEditPoints="1" noAdjustHandles="1" noChangeArrowheads="1" noChangeShapeType="1"/>
+          </p:cNvCxnSpPr>
+          <p:nvPr>
+            <p:extLst>
+              <p:ext uri="{386F3935-93C4-4BCD-93E2-E3B085C9AB24}">
+                <p16:designElem xmlns:p16="http://schemas.microsoft.com/office/powerpoint/2015/main" val="1"/>
+              </p:ext>
+            </p:extLst>
+          </p:nvPr>
+        </p:nvCxnSpPr>
+        <p:spPr>
+          <a:xfrm>
+            <a:off x="4654605" y="2057400"/>
+            <a:ext cx="0" cy="2743200"/>
+          </a:xfrm>
+          <a:prstGeom prst="line">
+            <a:avLst/>
+          </a:prstGeom>
+          <a:ln w="19050">
+            <a:solidFill>
+              <a:schemeClr val="tx2"/>
+            </a:solidFill>
+          </a:ln>
+        </p:spPr>
+        <p:style>
+          <a:lnRef idx="1">
+            <a:schemeClr val="accent1"/>
+          </a:lnRef>
+          <a:fillRef idx="0">
+            <a:schemeClr val="accent1"/>
+          </a:fillRef>
+          <a:effectRef idx="0">
+            <a:schemeClr val="accent1"/>
+          </a:effectRef>
+          <a:fontRef idx="minor">
+            <a:schemeClr val="tx1"/>
+          </a:fontRef>
+        </p:style>
+      </p:cxnSp>
+      <p:sp>
+        <p:nvSpPr>
+          <p:cNvPr id="5" name="Content Placeholder 4">
+            <a:extLst>
+              <a:ext uri="{FF2B5EF4-FFF2-40B4-BE49-F238E27FC236}">
+                <a16:creationId xmlns:a16="http://schemas.microsoft.com/office/drawing/2014/main" id="{4EDCAB97-38A8-4D96-8012-A3D8C87B9F15}"/>
+              </a:ext>
+            </a:extLst>
+          </p:cNvPr>
+          <p:cNvSpPr>
+            <a:spLocks noGrp="1"/>
+          </p:cNvSpPr>
+          <p:nvPr>
+            <p:ph idx="1"/>
+          </p:nvPr>
+        </p:nvSpPr>
+        <p:spPr>
+          <a:xfrm>
+            <a:off x="5105398" y="1115568"/>
+            <a:ext cx="6245352" cy="4626864"/>
+          </a:xfrm>
+        </p:spPr>
+        <p:txBody>
+          <a:bodyPr anchor="ctr">
+            <a:normAutofit/>
+          </a:bodyPr>
+          <a:lstStyle/>
+          <a:p>
+            <a:r>
+              <a:rPr lang="en-US" b="1" dirty="0">
+                <a:effectLst/>
+              </a:rPr>
+              <a:t>Purpose</a:t>
+            </a:r>
+            <a:r>
+              <a:rPr lang="en-US" dirty="0">
+                <a:effectLst/>
+              </a:rPr>
+              <a:t>: Ensure that a User can change her email.</a:t>
+            </a:r>
+          </a:p>
+          <a:p>
+            <a:r>
+              <a:rPr lang="en-US" b="1" dirty="0">
+                <a:effectLst/>
+              </a:rPr>
+              <a:t>Test set-up</a:t>
+            </a:r>
+            <a:r>
+              <a:rPr lang="en-US" dirty="0">
+                <a:effectLst/>
+              </a:rPr>
+              <a:t>: User exists in the System.</a:t>
+            </a:r>
+          </a:p>
+          <a:p>
+            <a:r>
+              <a:rPr lang="en-US" b="1" dirty="0">
+                <a:effectLst/>
+              </a:rPr>
+              <a:t>Input:</a:t>
+            </a:r>
+          </a:p>
+          <a:p>
+            <a:pPr marL="871200" lvl="1" indent="-457200">
+              <a:buAutoNum type="arabicPeriod"/>
+            </a:pPr>
+            <a:r>
+              <a:rPr lang="en-US" dirty="0">
+                <a:effectLst/>
+              </a:rPr>
+              <a:t>From profile page the user will click on ‘Edit Profile’.</a:t>
+            </a:r>
+          </a:p>
+          <a:p>
+            <a:pPr marL="871200" lvl="1" indent="-457200">
+              <a:buAutoNum type="arabicPeriod"/>
+            </a:pPr>
+            <a:r>
+              <a:rPr lang="en-US" dirty="0">
+                <a:effectLst/>
+              </a:rPr>
+              <a:t>A form pops-up with the current information. </a:t>
+            </a:r>
+          </a:p>
+          <a:p>
+            <a:pPr marL="871200" lvl="1" indent="-457200">
+              <a:buAutoNum type="arabicPeriod"/>
+            </a:pPr>
+            <a:r>
+              <a:rPr lang="en-US" dirty="0">
+                <a:effectLst/>
+              </a:rPr>
+              <a:t>The email field is changed to fab@gmail.com.</a:t>
+            </a:r>
+          </a:p>
+          <a:p>
+            <a:pPr marL="871200" lvl="1" indent="-457200">
+              <a:buAutoNum type="arabicPeriod"/>
+            </a:pPr>
+            <a:r>
+              <a:rPr lang="en-US" dirty="0">
+                <a:effectLst/>
+              </a:rPr>
+              <a:t>She will click the “submit” button and enters her password.</a:t>
+            </a:r>
+          </a:p>
+          <a:p>
+            <a:r>
+              <a:rPr lang="en-US" b="1" dirty="0">
+                <a:effectLst/>
+              </a:rPr>
+              <a:t>Expected Output</a:t>
+            </a:r>
+            <a:r>
+              <a:rPr lang="en-US" dirty="0">
+                <a:effectLst/>
+              </a:rPr>
+              <a:t>: The SOS system display a success pop-up and displays the new email to the user.</a:t>
+            </a:r>
+            <a:endParaRPr lang="en-US" dirty="0"/>
           </a:p>
         </p:txBody>
       </p:sp>
@@ -10519,42 +10860,8 @@
         </p:nvSpPr>
         <p:spPr>
           <a:xfrm>
-            <a:off x="11171739" y="6392779"/>
+            <a:off x="10514011" y="5883275"/>
             <a:ext cx="753545" cy="365125"/>
-          </a:xfrm>
-        </p:spPr>
-        <p:txBody>
-          <a:bodyPr/>
-          <a:lstStyle/>
-          <a:p>
-            <a:fld id="{5FB0F42B-CAA9-4D4F-86CF-07230423CC99}" type="slidenum">
-              <a:rPr lang="en-US" smtClean="0"/>
-              <a:t>14</a:t>
-            </a:fld>
-            <a:endParaRPr lang="en-US" dirty="0"/>
-          </a:p>
-        </p:txBody>
-      </p:sp>
-      <p:sp>
-        <p:nvSpPr>
-          <p:cNvPr id="5" name="Content Placeholder 4">
-            <a:extLst>
-              <a:ext uri="{FF2B5EF4-FFF2-40B4-BE49-F238E27FC236}">
-                <a16:creationId xmlns:a16="http://schemas.microsoft.com/office/drawing/2014/main" id="{4EDCAB97-38A8-4D96-8012-A3D8C87B9F15}"/>
-              </a:ext>
-            </a:extLst>
-          </p:cNvPr>
-          <p:cNvSpPr>
-            <a:spLocks noGrp="1"/>
-          </p:cNvSpPr>
-          <p:nvPr>
-            <p:ph idx="1"/>
-          </p:nvPr>
-        </p:nvSpPr>
-        <p:spPr>
-          <a:xfrm>
-            <a:off x="0" y="952247"/>
-            <a:ext cx="12192001" cy="5805657"/>
           </a:xfrm>
         </p:spPr>
         <p:txBody>
@@ -10563,110 +10870,21 @@
           </a:bodyPr>
           <a:lstStyle/>
           <a:p>
-            <a:r>
-              <a:rPr lang="en-US" sz="2200" b="1" dirty="0">
-                <a:effectLst/>
-              </a:rPr>
-              <a:t>Purpose</a:t>
-            </a:r>
-            <a:r>
-              <a:rPr lang="en-US" sz="2200" dirty="0">
-                <a:effectLst/>
-              </a:rPr>
-              <a:t>: Ensure that a Profile that exists in SOS is able to have its email address changed.</a:t>
-            </a:r>
-          </a:p>
-          <a:p>
-            <a:r>
-              <a:rPr lang="en-US" sz="2200" b="1" dirty="0">
-                <a:effectLst/>
-              </a:rPr>
-              <a:t>Test set-up</a:t>
-            </a:r>
-            <a:r>
-              <a:rPr lang="en-US" sz="2200" dirty="0">
-                <a:effectLst/>
-              </a:rPr>
-              <a:t>: There is already a user who has made a profile within the system. </a:t>
-            </a:r>
-          </a:p>
-          <a:p>
-            <a:r>
-              <a:rPr lang="en-US" sz="2200" b="1" dirty="0">
-                <a:effectLst/>
-              </a:rPr>
-              <a:t>Input:</a:t>
-            </a:r>
-          </a:p>
-          <a:p>
-            <a:pPr marL="494100" indent="-457200">
-              <a:buAutoNum type="arabicPeriod"/>
+            <a:pPr>
+              <a:spcAft>
+                <a:spcPts val="600"/>
+              </a:spcAft>
             </a:pPr>
-            <a:r>
-              <a:rPr lang="en-US" sz="2200" dirty="0">
-                <a:effectLst/>
-              </a:rPr>
-              <a:t>From profile page the user will click on the ‘edit profile’ button. </a:t>
-            </a:r>
-          </a:p>
-          <a:p>
-            <a:pPr marL="494100" indent="-457200">
-              <a:buAutoNum type="arabicPeriod"/>
-            </a:pPr>
-            <a:r>
-              <a:rPr lang="en-US" sz="2200" dirty="0">
-                <a:effectLst/>
-              </a:rPr>
-              <a:t>Then a form will pop up that has information she had already inserted before.</a:t>
-            </a:r>
-          </a:p>
-          <a:p>
-            <a:pPr marL="494100" indent="-457200">
-              <a:buAutoNum type="arabicPeriod"/>
-            </a:pPr>
-            <a:r>
-              <a:rPr lang="en-US" sz="2200" dirty="0">
-                <a:effectLst/>
-              </a:rPr>
-              <a:t>She inserts the change into the email field, erasing style@hotmail.com and typing in fab@gmail.com</a:t>
-            </a:r>
-          </a:p>
-          <a:p>
-            <a:pPr marL="494100" indent="-457200">
-              <a:buAutoNum type="arabicPeriod"/>
-            </a:pPr>
-            <a:r>
-              <a:rPr lang="en-US" sz="2200" dirty="0">
-                <a:effectLst/>
-              </a:rPr>
-              <a:t>She will click the “submit” button.</a:t>
-            </a:r>
-          </a:p>
-          <a:p>
-            <a:pPr marL="494100" indent="-457200">
-              <a:buAutoNum type="arabicPeriod"/>
-            </a:pPr>
-            <a:r>
-              <a:rPr lang="en-US" sz="2200" dirty="0">
-                <a:effectLst/>
-              </a:rPr>
-              <a:t>She will enter her password.</a:t>
-            </a:r>
-          </a:p>
-          <a:p>
-            <a:r>
-              <a:rPr lang="en-US" sz="2200" b="1" dirty="0">
-                <a:effectLst/>
-              </a:rPr>
-              <a:t>Expected Output</a:t>
-            </a:r>
-            <a:r>
-              <a:rPr lang="en-US" sz="2200" dirty="0">
-                <a:effectLst/>
-              </a:rPr>
-              <a:t>: The SOS system display a success pop-up and displays the new email to the user.</a:t>
-            </a:r>
-            <a:endParaRPr lang="en-US" sz="2200" dirty="0"/>
+            <a:fld id="{5FB0F42B-CAA9-4D4F-86CF-07230423CC99}" type="slidenum">
+              <a:rPr lang="en-US" smtClean="0"/>
+              <a:pPr>
+                <a:spcAft>
+                  <a:spcPts val="600"/>
+                </a:spcAft>
+              </a:pPr>
+              <a:t>14</a:t>
+            </a:fld>
+            <a:endParaRPr lang="en-US"/>
           </a:p>
         </p:txBody>
       </p:sp>
@@ -10688,9 +10906,21 @@
   <p:cSld>
     <p:bg>
       <p:bgPr>
-        <a:solidFill>
-          <a:schemeClr val="bg1"/>
-        </a:solidFill>
+        <a:blipFill rotWithShape="1">
+          <a:blip r:embed="rId3">
+            <a:duotone>
+              <a:schemeClr val="bg2">
+                <a:shade val="80000"/>
+                <a:lumMod val="80000"/>
+              </a:schemeClr>
+              <a:schemeClr val="bg2">
+                <a:tint val="98000"/>
+              </a:schemeClr>
+            </a:duotone>
+            <a:extLst/>
+          </a:blip>
+          <a:stretch/>
+        </a:blipFill>
         <a:effectLst/>
       </p:bgPr>
     </p:bg>
@@ -10708,6 +10938,66 @@
           <a:chExt cx="0" cy="0"/>
         </a:xfrm>
       </p:grpSpPr>
+      <p:sp useBgFill="1">
+        <p:nvSpPr>
+          <p:cNvPr id="11" name="Rectangle 10">
+            <a:extLst>
+              <a:ext uri="{FF2B5EF4-FFF2-40B4-BE49-F238E27FC236}">
+                <a16:creationId xmlns:a16="http://schemas.microsoft.com/office/drawing/2014/main" id="{9A6C2C86-63BF-47D5-AA3F-905111A238E2}"/>
+              </a:ext>
+              <a:ext uri="{C183D7F6-B498-43B3-948B-1728B52AA6E4}">
+                <adec:decorative xmlns:adec="http://schemas.microsoft.com/office/drawing/2017/decorative" val="1"/>
+              </a:ext>
+            </a:extLst>
+          </p:cNvPr>
+          <p:cNvSpPr>
+            <a:spLocks noGrp="1" noRot="1" noChangeAspect="1" noMove="1" noResize="1" noEditPoints="1" noAdjustHandles="1" noChangeArrowheads="1" noChangeShapeType="1" noTextEdit="1"/>
+          </p:cNvSpPr>
+          <p:nvPr>
+            <p:extLst>
+              <p:ext uri="{386F3935-93C4-4BCD-93E2-E3B085C9AB24}">
+                <p16:designElem xmlns:p16="http://schemas.microsoft.com/office/powerpoint/2015/main" val="1"/>
+              </p:ext>
+            </p:extLst>
+          </p:nvPr>
+        </p:nvSpPr>
+        <p:spPr>
+          <a:xfrm>
+            <a:off x="0" y="0"/>
+            <a:ext cx="12192000" cy="6858000"/>
+          </a:xfrm>
+          <a:prstGeom prst="rect">
+            <a:avLst/>
+          </a:prstGeom>
+          <a:ln>
+            <a:noFill/>
+          </a:ln>
+        </p:spPr>
+        <p:style>
+          <a:lnRef idx="2">
+            <a:schemeClr val="accent1">
+              <a:shade val="50000"/>
+            </a:schemeClr>
+          </a:lnRef>
+          <a:fillRef idx="1">
+            <a:schemeClr val="accent1"/>
+          </a:fillRef>
+          <a:effectRef idx="0">
+            <a:schemeClr val="accent1"/>
+          </a:effectRef>
+          <a:fontRef idx="minor">
+            <a:schemeClr val="lt1"/>
+          </a:fontRef>
+        </p:style>
+        <p:txBody>
+          <a:bodyPr rtlCol="0" anchor="ctr"/>
+          <a:lstStyle/>
+          <a:p>
+            <a:pPr algn="ctr"/>
+            <a:endParaRPr lang="en-US"/>
+          </a:p>
+        </p:txBody>
+      </p:sp>
       <p:sp>
         <p:nvSpPr>
           <p:cNvPr id="2" name="Title 1">
@@ -10726,18 +11016,246 @@
         </p:nvSpPr>
         <p:spPr>
           <a:xfrm>
-            <a:off x="838199" y="-251196"/>
-            <a:ext cx="10515600" cy="1325563"/>
+            <a:off x="834013" y="1115568"/>
+            <a:ext cx="3487616" cy="4626864"/>
           </a:xfrm>
         </p:spPr>
         <p:txBody>
-          <a:bodyPr/>
+          <a:bodyPr>
+            <a:normAutofit/>
+          </a:bodyPr>
           <a:lstStyle/>
           <a:p>
-            <a:r>
-              <a:rPr lang="en-US" dirty="0"/>
-              <a:t>Test Case: SOS07-System-**-Rainy**</a:t>
-            </a:r>
+            <a:pPr algn="l"/>
+            <a:r>
+              <a:rPr lang="en-US" sz="3600" dirty="0"/>
+              <a:t>Test Case: SOS07-System-019-Rainy-09</a:t>
+            </a:r>
+          </a:p>
+        </p:txBody>
+      </p:sp>
+      <p:cxnSp>
+        <p:nvCxnSpPr>
+          <p:cNvPr id="13" name="Straight Connector 12">
+            <a:extLst>
+              <a:ext uri="{FF2B5EF4-FFF2-40B4-BE49-F238E27FC236}">
+                <a16:creationId xmlns:a16="http://schemas.microsoft.com/office/drawing/2014/main" id="{425A0768-3044-4AA9-A889-D2CAA68C517A}"/>
+              </a:ext>
+              <a:ext uri="{C183D7F6-B498-43B3-948B-1728B52AA6E4}">
+                <adec:decorative xmlns:adec="http://schemas.microsoft.com/office/drawing/2017/decorative" val="1"/>
+              </a:ext>
+            </a:extLst>
+          </p:cNvPr>
+          <p:cNvCxnSpPr>
+            <a:cxnSpLocks noGrp="1" noRot="1" noChangeAspect="1" noMove="1" noResize="1" noEditPoints="1" noAdjustHandles="1" noChangeArrowheads="1" noChangeShapeType="1"/>
+          </p:cNvCxnSpPr>
+          <p:nvPr>
+            <p:extLst>
+              <p:ext uri="{386F3935-93C4-4BCD-93E2-E3B085C9AB24}">
+                <p16:designElem xmlns:p16="http://schemas.microsoft.com/office/powerpoint/2015/main" val="1"/>
+              </p:ext>
+            </p:extLst>
+          </p:nvPr>
+        </p:nvCxnSpPr>
+        <p:spPr>
+          <a:xfrm>
+            <a:off x="4654605" y="2057400"/>
+            <a:ext cx="0" cy="2743200"/>
+          </a:xfrm>
+          <a:prstGeom prst="line">
+            <a:avLst/>
+          </a:prstGeom>
+          <a:ln w="19050">
+            <a:solidFill>
+              <a:schemeClr val="tx2"/>
+            </a:solidFill>
+          </a:ln>
+        </p:spPr>
+        <p:style>
+          <a:lnRef idx="1">
+            <a:schemeClr val="accent1"/>
+          </a:lnRef>
+          <a:fillRef idx="0">
+            <a:schemeClr val="accent1"/>
+          </a:fillRef>
+          <a:effectRef idx="0">
+            <a:schemeClr val="accent1"/>
+          </a:effectRef>
+          <a:fontRef idx="minor">
+            <a:schemeClr val="tx1"/>
+          </a:fontRef>
+        </p:style>
+      </p:cxnSp>
+      <p:sp>
+        <p:nvSpPr>
+          <p:cNvPr id="4" name="Content Placeholder 3">
+            <a:extLst>
+              <a:ext uri="{FF2B5EF4-FFF2-40B4-BE49-F238E27FC236}">
+                <a16:creationId xmlns:a16="http://schemas.microsoft.com/office/drawing/2014/main" id="{C0FE504E-29EC-4DEB-B0E6-E6B15FCFE32E}"/>
+              </a:ext>
+            </a:extLst>
+          </p:cNvPr>
+          <p:cNvSpPr>
+            <a:spLocks noGrp="1"/>
+          </p:cNvSpPr>
+          <p:nvPr>
+            <p:ph idx="1"/>
+          </p:nvPr>
+        </p:nvSpPr>
+        <p:spPr>
+          <a:xfrm>
+            <a:off x="5105398" y="1115568"/>
+            <a:ext cx="6245352" cy="4626864"/>
+          </a:xfrm>
+        </p:spPr>
+        <p:txBody>
+          <a:bodyPr anchor="ctr">
+            <a:normAutofit/>
+          </a:bodyPr>
+          <a:lstStyle/>
+          <a:p>
+            <a:pPr>
+              <a:lnSpc>
+                <a:spcPct val="90000"/>
+              </a:lnSpc>
+            </a:pPr>
+            <a:r>
+              <a:rPr lang="en-US" sz="1900" b="1" dirty="0">
+                <a:effectLst/>
+              </a:rPr>
+              <a:t>Purpose: </a:t>
+            </a:r>
+            <a:r>
+              <a:rPr lang="en-US" sz="1900" dirty="0">
+                <a:effectLst/>
+              </a:rPr>
+              <a:t>Test Cancel on the Edit Profile sequence. </a:t>
+            </a:r>
+          </a:p>
+          <a:p>
+            <a:r>
+              <a:rPr lang="en-US" sz="1900" b="1" dirty="0">
+                <a:effectLst/>
+              </a:rPr>
+              <a:t>Test set-up:</a:t>
+            </a:r>
+            <a:r>
+              <a:rPr lang="en-US" sz="1900" dirty="0">
+                <a:effectLst/>
+              </a:rPr>
+              <a:t> </a:t>
+            </a:r>
+            <a:r>
+              <a:rPr lang="en-US" sz="1800" dirty="0">
+                <a:effectLst/>
+              </a:rPr>
+              <a:t>User exists in the System.</a:t>
+            </a:r>
+          </a:p>
+          <a:p>
+            <a:pPr>
+              <a:lnSpc>
+                <a:spcPct val="90000"/>
+              </a:lnSpc>
+            </a:pPr>
+            <a:r>
+              <a:rPr lang="en-US" sz="1900" b="1" dirty="0">
+                <a:effectLst/>
+              </a:rPr>
+              <a:t>Input:</a:t>
+            </a:r>
+            <a:endParaRPr lang="en-US" sz="1900" dirty="0">
+              <a:effectLst/>
+            </a:endParaRPr>
+          </a:p>
+          <a:p>
+            <a:pPr marL="414000" lvl="1" indent="0">
+              <a:lnSpc>
+                <a:spcPct val="90000"/>
+              </a:lnSpc>
+              <a:buNone/>
+            </a:pPr>
+            <a:r>
+              <a:rPr lang="en-US" sz="1700" dirty="0">
+                <a:effectLst/>
+              </a:rPr>
+              <a:t>1. Clicks on “Edit profile”.</a:t>
+            </a:r>
+          </a:p>
+          <a:p>
+            <a:pPr marL="414000" lvl="1" indent="0">
+              <a:lnSpc>
+                <a:spcPct val="90000"/>
+              </a:lnSpc>
+              <a:buNone/>
+            </a:pPr>
+            <a:r>
+              <a:rPr lang="en-US" sz="1700" dirty="0">
+                <a:effectLst/>
+              </a:rPr>
+              <a:t>2. </a:t>
+            </a:r>
+            <a:r>
+              <a:rPr lang="en-US" dirty="0">
+                <a:effectLst/>
+              </a:rPr>
+              <a:t>A form pops-up with the current information.</a:t>
+            </a:r>
+          </a:p>
+          <a:p>
+            <a:pPr marL="414000" lvl="1" indent="0">
+              <a:lnSpc>
+                <a:spcPct val="90000"/>
+              </a:lnSpc>
+              <a:buNone/>
+            </a:pPr>
+            <a:r>
+              <a:rPr lang="en-US" sz="1700" dirty="0">
+                <a:effectLst/>
+              </a:rPr>
+              <a:t>3. User realizes she no longer wishes to change her information.</a:t>
+            </a:r>
+          </a:p>
+          <a:p>
+            <a:pPr marL="414000" lvl="1" indent="0">
+              <a:lnSpc>
+                <a:spcPct val="90000"/>
+              </a:lnSpc>
+              <a:buNone/>
+            </a:pPr>
+            <a:r>
+              <a:rPr lang="en-US" sz="1700" dirty="0">
+                <a:effectLst/>
+              </a:rPr>
+              <a:t>4. She presses the Cancel button to close the form.</a:t>
+            </a:r>
+          </a:p>
+          <a:p>
+            <a:pPr>
+              <a:lnSpc>
+                <a:spcPct val="90000"/>
+              </a:lnSpc>
+            </a:pPr>
+            <a:r>
+              <a:rPr lang="en-US" sz="1900" b="1" dirty="0">
+                <a:effectLst/>
+              </a:rPr>
+              <a:t>Expected Output:</a:t>
+            </a:r>
+            <a:r>
+              <a:rPr lang="en-US" sz="1900" dirty="0">
+                <a:effectLst/>
+              </a:rPr>
+              <a:t> No changes have occurred to profile information. User is back on profile page.</a:t>
+            </a:r>
+          </a:p>
+          <a:p>
+            <a:pPr>
+              <a:lnSpc>
+                <a:spcPct val="90000"/>
+              </a:lnSpc>
+            </a:pPr>
+            <a:endParaRPr lang="en-US" sz="1900" dirty="0"/>
           </a:p>
         </p:txBody>
       </p:sp>
@@ -10759,42 +11277,8 @@
         </p:nvSpPr>
         <p:spPr>
           <a:xfrm>
-            <a:off x="10806974" y="6108006"/>
+            <a:off x="10514011" y="5883275"/>
             <a:ext cx="753545" cy="365125"/>
-          </a:xfrm>
-        </p:spPr>
-        <p:txBody>
-          <a:bodyPr/>
-          <a:lstStyle/>
-          <a:p>
-            <a:fld id="{5FB0F42B-CAA9-4D4F-86CF-07230423CC99}" type="slidenum">
-              <a:rPr lang="en-US" smtClean="0"/>
-              <a:t>15</a:t>
-            </a:fld>
-            <a:endParaRPr lang="en-US" dirty="0"/>
-          </a:p>
-        </p:txBody>
-      </p:sp>
-      <p:sp>
-        <p:nvSpPr>
-          <p:cNvPr id="4" name="Content Placeholder 3">
-            <a:extLst>
-              <a:ext uri="{FF2B5EF4-FFF2-40B4-BE49-F238E27FC236}">
-                <a16:creationId xmlns:a16="http://schemas.microsoft.com/office/drawing/2014/main" id="{C0FE504E-29EC-4DEB-B0E6-E6B15FCFE32E}"/>
-              </a:ext>
-            </a:extLst>
-          </p:cNvPr>
-          <p:cNvSpPr>
-            <a:spLocks noGrp="1"/>
-          </p:cNvSpPr>
-          <p:nvPr>
-            <p:ph idx="1"/>
-          </p:nvPr>
-        </p:nvSpPr>
-        <p:spPr>
-          <a:xfrm>
-            <a:off x="192349" y="1256929"/>
-            <a:ext cx="11694851" cy="5216201"/>
           </a:xfrm>
         </p:spPr>
         <p:txBody>
@@ -10803,104 +11287,21 @@
           </a:bodyPr>
           <a:lstStyle/>
           <a:p>
-            <a:r>
-              <a:rPr lang="en-US" sz="2200" b="1" dirty="0">
-                <a:effectLst/>
-              </a:rPr>
-              <a:t>Purpose: </a:t>
-            </a:r>
-            <a:r>
-              <a:rPr lang="en-US" sz="2200" dirty="0">
-                <a:effectLst/>
-              </a:rPr>
-              <a:t>Test how the system will react to user attempting to edit their profile but instead cancels from the form.</a:t>
-            </a:r>
-          </a:p>
-          <a:p>
-            <a:r>
-              <a:rPr lang="en-US" sz="2200" b="1" dirty="0">
-                <a:effectLst/>
-              </a:rPr>
-              <a:t>Test set-up:</a:t>
-            </a:r>
-            <a:r>
-              <a:rPr lang="en-US" sz="2200" dirty="0">
-                <a:effectLst/>
-              </a:rPr>
-              <a:t> User already has a profile on the account. </a:t>
-            </a:r>
-          </a:p>
-          <a:p>
-            <a:r>
-              <a:rPr lang="en-US" sz="2200" b="1" dirty="0">
-                <a:effectLst/>
-              </a:rPr>
-              <a:t>Input:</a:t>
-            </a:r>
-            <a:endParaRPr lang="en-US" sz="2200" dirty="0">
-              <a:effectLst/>
-            </a:endParaRPr>
-          </a:p>
-          <a:p>
-            <a:pPr marL="36900" lvl="0" indent="0">
-              <a:buNone/>
+            <a:pPr>
+              <a:spcAft>
+                <a:spcPts val="600"/>
+              </a:spcAft>
             </a:pPr>
-            <a:r>
-              <a:rPr lang="en-US" sz="2200" dirty="0">
-                <a:effectLst/>
-              </a:rPr>
-              <a:t>1. Clicks on “edit profile” button.</a:t>
-            </a:r>
-          </a:p>
-          <a:p>
-            <a:pPr marL="36900" lvl="0" indent="0">
-              <a:buNone/>
-            </a:pPr>
-            <a:r>
-              <a:rPr lang="en-US" sz="2200" dirty="0">
-                <a:effectLst/>
-              </a:rPr>
-              <a:t>2. Form pops up to shown information that has been inserted before.</a:t>
-            </a:r>
-          </a:p>
-          <a:p>
-            <a:pPr marL="36900" lvl="0" indent="0">
-              <a:buNone/>
-            </a:pPr>
-            <a:r>
-              <a:rPr lang="en-US" sz="2200" dirty="0">
-                <a:effectLst/>
-              </a:rPr>
-              <a:t>3. User realizes that there is actually no mistake and he did enter his number correctly.</a:t>
-            </a:r>
-          </a:p>
-          <a:p>
-            <a:pPr marL="36900" lvl="0" indent="0">
-              <a:buNone/>
-            </a:pPr>
-            <a:r>
-              <a:rPr lang="en-US" sz="2200" dirty="0">
-                <a:effectLst/>
-              </a:rPr>
-              <a:t>4. they presses the “x” button at the upper right corner of the form to close it.</a:t>
-            </a:r>
-          </a:p>
-          <a:p>
-            <a:r>
-              <a:rPr lang="en-US" sz="2200" b="1" dirty="0">
-                <a:effectLst/>
-              </a:rPr>
-              <a:t>Expected Output:</a:t>
-            </a:r>
-            <a:r>
-              <a:rPr lang="en-US" sz="2200" dirty="0">
-                <a:effectLst/>
-              </a:rPr>
-              <a:t> No changes have occurred to profile information. User is back on profile page.</a:t>
-            </a:r>
-          </a:p>
-          <a:p>
-            <a:endParaRPr lang="en-US" sz="2200" dirty="0"/>
+            <a:fld id="{5FB0F42B-CAA9-4D4F-86CF-07230423CC99}" type="slidenum">
+              <a:rPr lang="en-US" smtClean="0"/>
+              <a:pPr>
+                <a:spcAft>
+                  <a:spcPts val="600"/>
+                </a:spcAft>
+              </a:pPr>
+              <a:t>15</a:t>
+            </a:fld>
+            <a:endParaRPr lang="en-US"/>
           </a:p>
         </p:txBody>
       </p:sp>
@@ -10920,6 +11321,26 @@
 <file path=ppt/slides/slide16.xml><?xml version="1.0" encoding="utf-8"?>
 <p:sld xmlns:a="http://schemas.openxmlformats.org/drawingml/2006/main" xmlns:r="http://schemas.openxmlformats.org/officeDocument/2006/relationships" xmlns:p="http://schemas.openxmlformats.org/presentationml/2006/main">
   <p:cSld>
+    <p:bg>
+      <p:bgPr>
+        <a:blipFill rotWithShape="1">
+          <a:blip r:embed="rId3">
+            <a:duotone>
+              <a:schemeClr val="bg2">
+                <a:shade val="80000"/>
+                <a:lumMod val="80000"/>
+              </a:schemeClr>
+              <a:schemeClr val="bg2">
+                <a:tint val="98000"/>
+              </a:schemeClr>
+            </a:duotone>
+            <a:extLst/>
+          </a:blip>
+          <a:stretch/>
+        </a:blipFill>
+        <a:effectLst/>
+      </p:bgPr>
+    </p:bg>
     <p:spTree>
       <p:nvGrpSpPr>
         <p:cNvPr id="1" name=""/>
@@ -10934,6 +11355,66 @@
           <a:chExt cx="0" cy="0"/>
         </a:xfrm>
       </p:grpSpPr>
+      <p:sp useBgFill="1">
+        <p:nvSpPr>
+          <p:cNvPr id="10" name="Rectangle 9">
+            <a:extLst>
+              <a:ext uri="{FF2B5EF4-FFF2-40B4-BE49-F238E27FC236}">
+                <a16:creationId xmlns:a16="http://schemas.microsoft.com/office/drawing/2014/main" id="{9A6C2C86-63BF-47D5-AA3F-905111A238E2}"/>
+              </a:ext>
+              <a:ext uri="{C183D7F6-B498-43B3-948B-1728B52AA6E4}">
+                <adec:decorative xmlns:adec="http://schemas.microsoft.com/office/drawing/2017/decorative" val="1"/>
+              </a:ext>
+            </a:extLst>
+          </p:cNvPr>
+          <p:cNvSpPr>
+            <a:spLocks noGrp="1" noRot="1" noChangeAspect="1" noMove="1" noResize="1" noEditPoints="1" noAdjustHandles="1" noChangeArrowheads="1" noChangeShapeType="1" noTextEdit="1"/>
+          </p:cNvSpPr>
+          <p:nvPr>
+            <p:extLst>
+              <p:ext uri="{386F3935-93C4-4BCD-93E2-E3B085C9AB24}">
+                <p16:designElem xmlns:p16="http://schemas.microsoft.com/office/powerpoint/2015/main" val="1"/>
+              </p:ext>
+            </p:extLst>
+          </p:nvPr>
+        </p:nvSpPr>
+        <p:spPr>
+          <a:xfrm>
+            <a:off x="0" y="0"/>
+            <a:ext cx="12192000" cy="6858000"/>
+          </a:xfrm>
+          <a:prstGeom prst="rect">
+            <a:avLst/>
+          </a:prstGeom>
+          <a:ln>
+            <a:noFill/>
+          </a:ln>
+        </p:spPr>
+        <p:style>
+          <a:lnRef idx="2">
+            <a:schemeClr val="accent1">
+              <a:shade val="50000"/>
+            </a:schemeClr>
+          </a:lnRef>
+          <a:fillRef idx="1">
+            <a:schemeClr val="accent1"/>
+          </a:fillRef>
+          <a:effectRef idx="0">
+            <a:schemeClr val="accent1"/>
+          </a:effectRef>
+          <a:fontRef idx="minor">
+            <a:schemeClr val="lt1"/>
+          </a:fontRef>
+        </p:style>
+        <p:txBody>
+          <a:bodyPr rtlCol="0" anchor="ctr"/>
+          <a:lstStyle/>
+          <a:p>
+            <a:pPr algn="ctr"/>
+            <a:endParaRPr lang="en-US"/>
+          </a:p>
+        </p:txBody>
+      </p:sp>
       <p:sp>
         <p:nvSpPr>
           <p:cNvPr id="2" name="Title 1">
@@ -10952,28 +11433,83 @@
         </p:nvSpPr>
         <p:spPr>
           <a:xfrm>
-            <a:off x="838200" y="-160421"/>
-            <a:ext cx="10515600" cy="1325563"/>
+            <a:off x="834013" y="1115568"/>
+            <a:ext cx="3487616" cy="4626864"/>
           </a:xfrm>
         </p:spPr>
         <p:txBody>
-          <a:bodyPr/>
+          <a:bodyPr>
+            <a:normAutofit/>
+          </a:bodyPr>
           <a:lstStyle/>
           <a:p>
-            <a:r>
-              <a:rPr lang="en-US" dirty="0"/>
+            <a:pPr algn="l"/>
+            <a:r>
+              <a:rPr lang="en-US" sz="3600" dirty="0"/>
               <a:t>Test Case: </a:t>
             </a:r>
             <a:r>
-              <a:rPr lang="en-US" dirty="0">
+              <a:rPr lang="en-US" sz="3600" dirty="0">
                 <a:effectLst/>
               </a:rPr>
-              <a:t>SOS16-System-**-Sunny**</a:t>
-            </a:r>
-            <a:endParaRPr lang="en-US" dirty="0"/>
-          </a:p>
-        </p:txBody>
-      </p:sp>
+              <a:t>SOS16-System-021-Sunny-12</a:t>
+            </a:r>
+            <a:endParaRPr lang="en-US" sz="3600" dirty="0"/>
+          </a:p>
+        </p:txBody>
+      </p:sp>
+      <p:cxnSp>
+        <p:nvCxnSpPr>
+          <p:cNvPr id="12" name="Straight Connector 11">
+            <a:extLst>
+              <a:ext uri="{FF2B5EF4-FFF2-40B4-BE49-F238E27FC236}">
+                <a16:creationId xmlns:a16="http://schemas.microsoft.com/office/drawing/2014/main" id="{425A0768-3044-4AA9-A889-D2CAA68C517A}"/>
+              </a:ext>
+              <a:ext uri="{C183D7F6-B498-43B3-948B-1728B52AA6E4}">
+                <adec:decorative xmlns:adec="http://schemas.microsoft.com/office/drawing/2017/decorative" val="1"/>
+              </a:ext>
+            </a:extLst>
+          </p:cNvPr>
+          <p:cNvCxnSpPr>
+            <a:cxnSpLocks noGrp="1" noRot="1" noChangeAspect="1" noMove="1" noResize="1" noEditPoints="1" noAdjustHandles="1" noChangeArrowheads="1" noChangeShapeType="1"/>
+          </p:cNvCxnSpPr>
+          <p:nvPr>
+            <p:extLst>
+              <p:ext uri="{386F3935-93C4-4BCD-93E2-E3B085C9AB24}">
+                <p16:designElem xmlns:p16="http://schemas.microsoft.com/office/powerpoint/2015/main" val="1"/>
+              </p:ext>
+            </p:extLst>
+          </p:nvPr>
+        </p:nvCxnSpPr>
+        <p:spPr>
+          <a:xfrm>
+            <a:off x="4654605" y="2057400"/>
+            <a:ext cx="0" cy="2743200"/>
+          </a:xfrm>
+          <a:prstGeom prst="line">
+            <a:avLst/>
+          </a:prstGeom>
+          <a:ln w="19050">
+            <a:solidFill>
+              <a:schemeClr val="tx2"/>
+            </a:solidFill>
+          </a:ln>
+        </p:spPr>
+        <p:style>
+          <a:lnRef idx="1">
+            <a:schemeClr val="accent1"/>
+          </a:lnRef>
+          <a:fillRef idx="0">
+            <a:schemeClr val="accent1"/>
+          </a:fillRef>
+          <a:effectRef idx="0">
+            <a:schemeClr val="accent1"/>
+          </a:effectRef>
+          <a:fontRef idx="minor">
+            <a:schemeClr val="tx1"/>
+          </a:fontRef>
+        </p:style>
+      </p:cxnSp>
       <p:sp>
         <p:nvSpPr>
           <p:cNvPr id="4" name="Content Placeholder 3">
@@ -10992,124 +11528,142 @@
         </p:nvSpPr>
         <p:spPr>
           <a:xfrm>
-            <a:off x="0" y="937590"/>
-            <a:ext cx="12192000" cy="5635487"/>
+            <a:off x="5105398" y="1115568"/>
+            <a:ext cx="6245352" cy="4626864"/>
           </a:xfrm>
         </p:spPr>
         <p:txBody>
-          <a:bodyPr>
-            <a:noAutofit/>
+          <a:bodyPr anchor="ctr">
+            <a:normAutofit/>
           </a:bodyPr>
           <a:lstStyle/>
           <a:p>
-            <a:pPr marL="36900" indent="0">
-              <a:buNone/>
+            <a:pPr>
+              <a:lnSpc>
+                <a:spcPct val="90000"/>
+              </a:lnSpc>
             </a:pPr>
             <a:r>
-              <a:rPr lang="en-US" sz="2200" b="1" dirty="0">
+              <a:rPr lang="en-US" b="1" dirty="0">
                 <a:effectLst/>
               </a:rPr>
               <a:t>Purpose</a:t>
             </a:r>
             <a:r>
-              <a:rPr lang="en-US" sz="2200" dirty="0">
+              <a:rPr lang="en-US" dirty="0">
                 <a:effectLst/>
               </a:rPr>
-              <a:t>: Ensure that a user can successfully create an organization on the website</a:t>
-            </a:r>
-          </a:p>
-          <a:p>
-            <a:pPr marL="36900" indent="0">
-              <a:buNone/>
-            </a:pPr>
-            <a:r>
-              <a:rPr lang="en-US" sz="2200" b="1" dirty="0">
+              <a:t>: Ensure that a User can create an Organization.</a:t>
+            </a:r>
+          </a:p>
+          <a:p>
+            <a:r>
+              <a:rPr lang="en-US" b="1" dirty="0">
                 <a:effectLst/>
               </a:rPr>
               <a:t>Test set-up</a:t>
             </a:r>
             <a:r>
-              <a:rPr lang="en-US" sz="2200" dirty="0">
+              <a:rPr lang="en-US" dirty="0">
                 <a:effectLst/>
               </a:rPr>
-              <a:t>: User is logged into her account.</a:t>
-            </a:r>
-          </a:p>
-          <a:p>
-            <a:pPr marL="36900" indent="0">
-              <a:buNone/>
+              <a:t>: User exists in the System and is logged in.</a:t>
+            </a:r>
+          </a:p>
+          <a:p>
+            <a:pPr>
+              <a:lnSpc>
+                <a:spcPct val="90000"/>
+              </a:lnSpc>
             </a:pPr>
             <a:r>
-              <a:rPr lang="en-US" sz="2200" b="1" dirty="0">
+              <a:rPr lang="en-US" b="1" dirty="0">
                 <a:effectLst/>
               </a:rPr>
               <a:t>Input</a:t>
             </a:r>
             <a:r>
-              <a:rPr lang="en-US" sz="2200" dirty="0">
+              <a:rPr lang="en-US" dirty="0">
                 <a:effectLst/>
               </a:rPr>
               <a:t>:</a:t>
             </a:r>
           </a:p>
           <a:p>
-            <a:pPr marL="36900" lvl="0" indent="0">
+            <a:pPr marL="414000" lvl="1" indent="0">
+              <a:lnSpc>
+                <a:spcPct val="90000"/>
+              </a:lnSpc>
               <a:buNone/>
             </a:pPr>
             <a:r>
-              <a:rPr lang="en-US" sz="2200" dirty="0">
+              <a:rPr lang="en-US" dirty="0">
                 <a:effectLst/>
               </a:rPr>
-              <a:t>1. User clicks on “Create Organization” button</a:t>
-            </a:r>
-          </a:p>
-          <a:p>
-            <a:pPr marL="36900" lvl="0" indent="0">
+              <a:t>1. User clicks on “Create Organization”.</a:t>
+            </a:r>
+          </a:p>
+          <a:p>
+            <a:pPr marL="414000" lvl="1" indent="0">
+              <a:lnSpc>
+                <a:spcPct val="90000"/>
+              </a:lnSpc>
               <a:buNone/>
             </a:pPr>
             <a:r>
-              <a:rPr lang="en-US" sz="2200" dirty="0">
+              <a:rPr lang="en-US" dirty="0">
                 <a:effectLst/>
               </a:rPr>
-              <a:t>2. A form will pop up in front of the screen to enter information</a:t>
-            </a:r>
-          </a:p>
-          <a:p>
-            <a:pPr marL="36900" lvl="0" indent="0">
+              <a:t>2. The corresponding input form is generated.</a:t>
+            </a:r>
+          </a:p>
+          <a:p>
+            <a:pPr marL="414000" lvl="1" indent="0">
+              <a:lnSpc>
+                <a:spcPct val="90000"/>
+              </a:lnSpc>
               <a:buNone/>
             </a:pPr>
             <a:r>
-              <a:rPr lang="en-US" sz="2200" dirty="0">
+              <a:rPr lang="en-US" dirty="0">
                 <a:effectLst/>
               </a:rPr>
-              <a:t>3. User enters data in respective fields: Organization Name = “QRT” ; Description = “Lets study” ; Requirements for Joining = none ; Privacy = “public”</a:t>
-            </a:r>
-          </a:p>
-          <a:p>
-            <a:pPr marL="36900" lvl="0" indent="0">
+              <a:t>3. User enters data in respective fields: Organization Name = “QRT” ; Description = “Lets study” ; Requirements for Joining = none ; Privacy = “public”.</a:t>
+            </a:r>
+          </a:p>
+          <a:p>
+            <a:pPr marL="414000" lvl="1" indent="0">
+              <a:lnSpc>
+                <a:spcPct val="90000"/>
+              </a:lnSpc>
               <a:buNone/>
             </a:pPr>
             <a:r>
-              <a:rPr lang="en-US" sz="2200" dirty="0">
+              <a:rPr lang="en-US" dirty="0">
                 <a:effectLst/>
               </a:rPr>
-              <a:t>4. She then clicks on the “submit” button</a:t>
-            </a:r>
-          </a:p>
-          <a:p>
-            <a:r>
-              <a:rPr lang="en-US" sz="2200" b="1" dirty="0">
+              <a:t>4. She then clicks on the “Submit”.</a:t>
+            </a:r>
+          </a:p>
+          <a:p>
+            <a:pPr>
+              <a:lnSpc>
+                <a:spcPct val="90000"/>
+              </a:lnSpc>
+            </a:pPr>
+            <a:r>
+              <a:rPr lang="en-US" b="1" dirty="0">
                 <a:effectLst/>
               </a:rPr>
               <a:t>Expected Output</a:t>
             </a:r>
             <a:r>
-              <a:rPr lang="en-US" sz="2200" dirty="0">
+              <a:rPr lang="en-US" dirty="0">
                 <a:effectLst/>
               </a:rPr>
-              <a:t>: The request is submitted and a pop up about the Organization will appear before the user. </a:t>
-            </a:r>
-            <a:endParaRPr lang="en-US" sz="2200" dirty="0"/>
+              <a:t>: The request is submitted and the Organization will appear before the User. </a:t>
+            </a:r>
+            <a:endParaRPr lang="en-US" dirty="0"/>
           </a:p>
         </p:txBody>
       </p:sp>
@@ -11131,19 +11685,31 @@
         </p:nvSpPr>
         <p:spPr>
           <a:xfrm>
-            <a:off x="10779055" y="6132717"/>
+            <a:off x="10514011" y="5883275"/>
             <a:ext cx="753545" cy="365125"/>
           </a:xfrm>
         </p:spPr>
         <p:txBody>
-          <a:bodyPr/>
+          <a:bodyPr>
+            <a:normAutofit/>
+          </a:bodyPr>
           <a:lstStyle/>
           <a:p>
+            <a:pPr>
+              <a:spcAft>
+                <a:spcPts val="600"/>
+              </a:spcAft>
+            </a:pPr>
             <a:fld id="{5FB0F42B-CAA9-4D4F-86CF-07230423CC99}" type="slidenum">
               <a:rPr lang="en-US" smtClean="0"/>
+              <a:pPr>
+                <a:spcAft>
+                  <a:spcPts val="600"/>
+                </a:spcAft>
+              </a:pPr>
               <a:t>16</a:t>
             </a:fld>
-            <a:endParaRPr lang="en-US" dirty="0"/>
+            <a:endParaRPr lang="en-US"/>
           </a:p>
         </p:txBody>
       </p:sp>
@@ -11163,6 +11729,26 @@
 <file path=ppt/slides/slide17.xml><?xml version="1.0" encoding="utf-8"?>
 <p:sld xmlns:a="http://schemas.openxmlformats.org/drawingml/2006/main" xmlns:r="http://schemas.openxmlformats.org/officeDocument/2006/relationships" xmlns:p="http://schemas.openxmlformats.org/presentationml/2006/main">
   <p:cSld>
+    <p:bg>
+      <p:bgPr>
+        <a:blipFill rotWithShape="1">
+          <a:blip r:embed="rId3">
+            <a:duotone>
+              <a:schemeClr val="bg2">
+                <a:shade val="80000"/>
+                <a:lumMod val="80000"/>
+              </a:schemeClr>
+              <a:schemeClr val="bg2">
+                <a:tint val="98000"/>
+              </a:schemeClr>
+            </a:duotone>
+            <a:extLst/>
+          </a:blip>
+          <a:stretch/>
+        </a:blipFill>
+        <a:effectLst/>
+      </p:bgPr>
+    </p:bg>
     <p:spTree>
       <p:nvGrpSpPr>
         <p:cNvPr id="1" name=""/>
@@ -11177,6 +11763,66 @@
           <a:chExt cx="0" cy="0"/>
         </a:xfrm>
       </p:grpSpPr>
+      <p:sp useBgFill="1">
+        <p:nvSpPr>
+          <p:cNvPr id="10" name="Rectangle 9">
+            <a:extLst>
+              <a:ext uri="{FF2B5EF4-FFF2-40B4-BE49-F238E27FC236}">
+                <a16:creationId xmlns:a16="http://schemas.microsoft.com/office/drawing/2014/main" id="{9A6C2C86-63BF-47D5-AA3F-905111A238E2}"/>
+              </a:ext>
+              <a:ext uri="{C183D7F6-B498-43B3-948B-1728B52AA6E4}">
+                <adec:decorative xmlns:adec="http://schemas.microsoft.com/office/drawing/2017/decorative" val="1"/>
+              </a:ext>
+            </a:extLst>
+          </p:cNvPr>
+          <p:cNvSpPr>
+            <a:spLocks noGrp="1" noRot="1" noChangeAspect="1" noMove="1" noResize="1" noEditPoints="1" noAdjustHandles="1" noChangeArrowheads="1" noChangeShapeType="1" noTextEdit="1"/>
+          </p:cNvSpPr>
+          <p:nvPr>
+            <p:extLst>
+              <p:ext uri="{386F3935-93C4-4BCD-93E2-E3B085C9AB24}">
+                <p16:designElem xmlns:p16="http://schemas.microsoft.com/office/powerpoint/2015/main" val="1"/>
+              </p:ext>
+            </p:extLst>
+          </p:nvPr>
+        </p:nvSpPr>
+        <p:spPr>
+          <a:xfrm>
+            <a:off x="0" y="0"/>
+            <a:ext cx="12192000" cy="6858000"/>
+          </a:xfrm>
+          <a:prstGeom prst="rect">
+            <a:avLst/>
+          </a:prstGeom>
+          <a:ln>
+            <a:noFill/>
+          </a:ln>
+        </p:spPr>
+        <p:style>
+          <a:lnRef idx="2">
+            <a:schemeClr val="accent1">
+              <a:shade val="50000"/>
+            </a:schemeClr>
+          </a:lnRef>
+          <a:fillRef idx="1">
+            <a:schemeClr val="accent1"/>
+          </a:fillRef>
+          <a:effectRef idx="0">
+            <a:schemeClr val="accent1"/>
+          </a:effectRef>
+          <a:fontRef idx="minor">
+            <a:schemeClr val="lt1"/>
+          </a:fontRef>
+        </p:style>
+        <p:txBody>
+          <a:bodyPr rtlCol="0" anchor="ctr"/>
+          <a:lstStyle/>
+          <a:p>
+            <a:pPr algn="ctr"/>
+            <a:endParaRPr lang="en-US"/>
+          </a:p>
+        </p:txBody>
+      </p:sp>
       <p:sp>
         <p:nvSpPr>
           <p:cNvPr id="2" name="Title 1">
@@ -11195,35 +11841,88 @@
         </p:nvSpPr>
         <p:spPr>
           <a:xfrm>
-            <a:off x="919119" y="98812"/>
-            <a:ext cx="10353762" cy="970450"/>
+            <a:off x="834013" y="1115568"/>
+            <a:ext cx="3487616" cy="4626864"/>
           </a:xfrm>
         </p:spPr>
         <p:txBody>
           <a:bodyPr>
-            <a:normAutofit fontScale="90000"/>
+            <a:normAutofit/>
           </a:bodyPr>
           <a:lstStyle/>
           <a:p>
-            <a:r>
-              <a:rPr lang="en-US" dirty="0"/>
+            <a:pPr algn="l"/>
+            <a:r>
+              <a:rPr lang="en-US" sz="3600" dirty="0"/>
               <a:t>Test Case: </a:t>
             </a:r>
             <a:r>
-              <a:rPr lang="en-US" dirty="0">
+              <a:rPr lang="en-US" sz="3600" dirty="0">
                 <a:effectLst/>
               </a:rPr>
-              <a:t>SOS16-System-**-Rainy**</a:t>
+              <a:t>SOS16-System-023-Rainy-11</a:t>
             </a:r>
             <a:br>
-              <a:rPr lang="en-US" dirty="0">
+              <a:rPr lang="en-US" sz="3600" dirty="0">
                 <a:effectLst/>
               </a:rPr>
             </a:br>
-            <a:endParaRPr lang="en-US" dirty="0"/>
-          </a:p>
-        </p:txBody>
-      </p:sp>
+            <a:endParaRPr lang="en-US" sz="3600" dirty="0"/>
+          </a:p>
+        </p:txBody>
+      </p:sp>
+      <p:cxnSp>
+        <p:nvCxnSpPr>
+          <p:cNvPr id="12" name="Straight Connector 11">
+            <a:extLst>
+              <a:ext uri="{FF2B5EF4-FFF2-40B4-BE49-F238E27FC236}">
+                <a16:creationId xmlns:a16="http://schemas.microsoft.com/office/drawing/2014/main" id="{425A0768-3044-4AA9-A889-D2CAA68C517A}"/>
+              </a:ext>
+              <a:ext uri="{C183D7F6-B498-43B3-948B-1728B52AA6E4}">
+                <adec:decorative xmlns:adec="http://schemas.microsoft.com/office/drawing/2017/decorative" val="1"/>
+              </a:ext>
+            </a:extLst>
+          </p:cNvPr>
+          <p:cNvCxnSpPr>
+            <a:cxnSpLocks noGrp="1" noRot="1" noChangeAspect="1" noMove="1" noResize="1" noEditPoints="1" noAdjustHandles="1" noChangeArrowheads="1" noChangeShapeType="1"/>
+          </p:cNvCxnSpPr>
+          <p:nvPr>
+            <p:extLst>
+              <p:ext uri="{386F3935-93C4-4BCD-93E2-E3B085C9AB24}">
+                <p16:designElem xmlns:p16="http://schemas.microsoft.com/office/powerpoint/2015/main" val="1"/>
+              </p:ext>
+            </p:extLst>
+          </p:nvPr>
+        </p:nvCxnSpPr>
+        <p:spPr>
+          <a:xfrm>
+            <a:off x="4654605" y="2057400"/>
+            <a:ext cx="0" cy="2743200"/>
+          </a:xfrm>
+          <a:prstGeom prst="line">
+            <a:avLst/>
+          </a:prstGeom>
+          <a:ln w="19050">
+            <a:solidFill>
+              <a:schemeClr val="tx2"/>
+            </a:solidFill>
+          </a:ln>
+        </p:spPr>
+        <p:style>
+          <a:lnRef idx="1">
+            <a:schemeClr val="accent1"/>
+          </a:lnRef>
+          <a:fillRef idx="0">
+            <a:schemeClr val="accent1"/>
+          </a:fillRef>
+          <a:effectRef idx="0">
+            <a:schemeClr val="accent1"/>
+          </a:effectRef>
+          <a:fontRef idx="minor">
+            <a:schemeClr val="tx1"/>
+          </a:fontRef>
+        </p:style>
+      </p:cxnSp>
       <p:sp>
         <p:nvSpPr>
           <p:cNvPr id="3" name="Content Placeholder 2">
@@ -11242,115 +11941,153 @@
         </p:nvSpPr>
         <p:spPr>
           <a:xfrm>
-            <a:off x="0" y="725283"/>
-            <a:ext cx="12192000" cy="5741778"/>
+            <a:off x="5105397" y="1115568"/>
+            <a:ext cx="6410007" cy="4626864"/>
           </a:xfrm>
         </p:spPr>
         <p:txBody>
-          <a:bodyPr>
+          <a:bodyPr anchor="ctr">
             <a:normAutofit/>
           </a:bodyPr>
           <a:lstStyle/>
           <a:p>
-            <a:r>
-              <a:rPr lang="en-US" sz="2400" b="1" dirty="0">
+            <a:pPr>
+              <a:lnSpc>
+                <a:spcPct val="90000"/>
+              </a:lnSpc>
+            </a:pPr>
+            <a:r>
+              <a:rPr lang="en-US" b="1" dirty="0">
                 <a:effectLst/>
               </a:rPr>
               <a:t>Purpose</a:t>
             </a:r>
             <a:r>
-              <a:rPr lang="en-US" sz="2400" dirty="0">
+              <a:rPr lang="en-US" dirty="0">
                 <a:effectLst/>
               </a:rPr>
-              <a:t>: Test to ensure that all Organization details must be filled out to be stored in SOS.</a:t>
-            </a:r>
-          </a:p>
-          <a:p>
-            <a:r>
-              <a:rPr lang="en-US" sz="2400" b="1" dirty="0">
+              <a:t>: Ensure that Org. Create has all relevant inputs.</a:t>
+            </a:r>
+          </a:p>
+          <a:p>
+            <a:pPr>
+              <a:lnSpc>
+                <a:spcPct val="90000"/>
+              </a:lnSpc>
+            </a:pPr>
+            <a:r>
+              <a:rPr lang="en-US" b="1" dirty="0">
                 <a:effectLst/>
               </a:rPr>
               <a:t>Test set-up</a:t>
             </a:r>
             <a:r>
-              <a:rPr lang="en-US" sz="2400" dirty="0">
+              <a:rPr lang="en-US" dirty="0">
                 <a:effectLst/>
               </a:rPr>
-              <a:t>: User has an account and is on the organization page.</a:t>
-            </a:r>
-          </a:p>
-          <a:p>
-            <a:r>
-              <a:rPr lang="en-US" sz="2400" b="1" dirty="0">
+              <a:t>: User exists in the System and is logged in.</a:t>
+            </a:r>
+          </a:p>
+          <a:p>
+            <a:pPr>
+              <a:lnSpc>
+                <a:spcPct val="90000"/>
+              </a:lnSpc>
+            </a:pPr>
+            <a:r>
+              <a:rPr lang="en-US" dirty="0">
+                <a:effectLst/>
+              </a:rPr>
+              <a:t> </a:t>
+            </a:r>
+            <a:r>
+              <a:rPr lang="en-US" b="1" dirty="0">
                 <a:effectLst/>
               </a:rPr>
               <a:t>Input</a:t>
             </a:r>
             <a:r>
-              <a:rPr lang="en-US" sz="2400" dirty="0">
+              <a:rPr lang="en-US" dirty="0">
                 <a:effectLst/>
               </a:rPr>
               <a:t>:</a:t>
             </a:r>
           </a:p>
           <a:p>
-            <a:pPr marL="36900" lvl="0" indent="0">
+            <a:pPr marL="414000" lvl="1" indent="0">
+              <a:lnSpc>
+                <a:spcPct val="90000"/>
+              </a:lnSpc>
               <a:buNone/>
             </a:pPr>
             <a:r>
-              <a:rPr lang="en-US" sz="2400" dirty="0">
+              <a:rPr lang="en-US" dirty="0">
                 <a:effectLst/>
               </a:rPr>
-              <a:t>1. They click on the “Create Organization” button</a:t>
-            </a:r>
-          </a:p>
-          <a:p>
-            <a:pPr marL="36900" lvl="0" indent="0">
+              <a:t>1. They click on the “Create Organization”.</a:t>
+            </a:r>
+          </a:p>
+          <a:p>
+            <a:pPr marL="414000" lvl="1" indent="0">
+              <a:lnSpc>
+                <a:spcPct val="90000"/>
+              </a:lnSpc>
               <a:buNone/>
             </a:pPr>
             <a:r>
-              <a:rPr lang="en-US" sz="2400" dirty="0">
+              <a:rPr lang="en-US" dirty="0">
                 <a:effectLst/>
               </a:rPr>
-              <a:t>2. A form pops up to fill out required information</a:t>
-            </a:r>
-          </a:p>
-          <a:p>
-            <a:pPr marL="36900" lvl="0" indent="0">
+              <a:t>2. The corresponding input form is generated.</a:t>
+            </a:r>
+          </a:p>
+          <a:p>
+            <a:pPr marL="414000" lvl="1" indent="0">
+              <a:lnSpc>
+                <a:spcPct val="90000"/>
+              </a:lnSpc>
               <a:buNone/>
             </a:pPr>
             <a:r>
-              <a:rPr lang="en-US" sz="2400" dirty="0">
+              <a:rPr lang="en-US" dirty="0">
                 <a:effectLst/>
               </a:rPr>
-              <a:t>3. She enters the following data: Organization Name = “My special club”</a:t>
-            </a:r>
-          </a:p>
-          <a:p>
-            <a:pPr marL="36900" lvl="0" indent="0">
+              <a:t>3. She enters the following data: Organization Name = “My special club”.</a:t>
+            </a:r>
+          </a:p>
+          <a:p>
+            <a:pPr marL="414000" lvl="1" indent="0">
+              <a:lnSpc>
+                <a:spcPct val="90000"/>
+              </a:lnSpc>
               <a:buNone/>
             </a:pPr>
             <a:r>
-              <a:rPr lang="en-US" sz="2400" dirty="0">
+              <a:rPr lang="en-US" dirty="0">
                 <a:effectLst/>
               </a:rPr>
-              <a:t>4. Then she clicks the “submit” button</a:t>
-            </a:r>
-          </a:p>
-          <a:p>
-            <a:r>
-              <a:rPr lang="en-US" sz="2400" b="1" dirty="0">
+              <a:t>4. Then she clicks on “Submit”.</a:t>
+            </a:r>
+          </a:p>
+          <a:p>
+            <a:pPr>
+              <a:lnSpc>
+                <a:spcPct val="90000"/>
+              </a:lnSpc>
+            </a:pPr>
+            <a:r>
+              <a:rPr lang="en-US" b="1" dirty="0">
                 <a:effectLst/>
               </a:rPr>
               <a:t>Expected Output</a:t>
             </a:r>
             <a:r>
-              <a:rPr lang="en-US" sz="2400" dirty="0">
+              <a:rPr lang="en-US" dirty="0">
                 <a:effectLst/>
               </a:rPr>
               <a:t>: A pop up message will appear in front of the user saying that some of the required fields have not been filled out. </a:t>
             </a:r>
-            <a:endParaRPr lang="en-US" sz="1800" dirty="0"/>
+            <a:endParaRPr lang="en-US" dirty="0"/>
           </a:p>
         </p:txBody>
       </p:sp>
@@ -11372,19 +12109,31 @@
         </p:nvSpPr>
         <p:spPr>
           <a:xfrm>
-            <a:off x="10779055" y="6132717"/>
+            <a:off x="10514011" y="5883275"/>
             <a:ext cx="753545" cy="365125"/>
           </a:xfrm>
         </p:spPr>
         <p:txBody>
-          <a:bodyPr/>
+          <a:bodyPr>
+            <a:normAutofit/>
+          </a:bodyPr>
           <a:lstStyle/>
           <a:p>
+            <a:pPr>
+              <a:spcAft>
+                <a:spcPts val="600"/>
+              </a:spcAft>
+            </a:pPr>
             <a:fld id="{5FB0F42B-CAA9-4D4F-86CF-07230423CC99}" type="slidenum">
               <a:rPr lang="en-US" smtClean="0"/>
+              <a:pPr>
+                <a:spcAft>
+                  <a:spcPts val="600"/>
+                </a:spcAft>
+              </a:pPr>
               <a:t>17</a:t>
             </a:fld>
-            <a:endParaRPr lang="en-US" dirty="0"/>
+            <a:endParaRPr lang="en-US"/>
           </a:p>
         </p:txBody>
       </p:sp>
@@ -11889,8 +12638,8 @@
         </p:blipFill>
         <p:spPr bwMode="auto">
           <a:xfrm>
-            <a:off x="1" y="-1"/>
-            <a:ext cx="7296149" cy="6553199"/>
+            <a:off x="486095" y="1015212"/>
+            <a:ext cx="6216161" cy="5310555"/>
           </a:xfrm>
           <a:prstGeom prst="rect">
             <a:avLst/>
@@ -11923,8 +12672,8 @@
         </p:blipFill>
         <p:spPr>
           <a:xfrm>
-            <a:off x="7285502" y="0"/>
-            <a:ext cx="4895849" cy="6553200"/>
+            <a:off x="7210880" y="262005"/>
+            <a:ext cx="4530194" cy="6063762"/>
           </a:xfrm>
           <a:prstGeom prst="rect">
             <a:avLst/>
@@ -11967,13 +12716,48 @@
       </p:sp>
       <p:sp>
         <p:nvSpPr>
-          <p:cNvPr id="15" name="Title 14">
+          <p:cNvPr id="2" name="TextBox 1">
             <a:extLst>
               <a:ext uri="{FF2B5EF4-FFF2-40B4-BE49-F238E27FC236}">
-                <a16:creationId xmlns:a16="http://schemas.microsoft.com/office/drawing/2014/main" id="{206F24A0-C55C-4716-A361-E64C277A6D43}"/>
+                <a16:creationId xmlns:a16="http://schemas.microsoft.com/office/drawing/2014/main" id="{8F9A552C-76F8-4A59-8DD5-4F1E0C1BFA8E}"/>
               </a:ext>
             </a:extLst>
           </p:cNvPr>
+          <p:cNvSpPr txBox="1"/>
+          <p:nvPr/>
+        </p:nvSpPr>
+        <p:spPr>
+          <a:xfrm>
+            <a:off x="450926" y="6290597"/>
+            <a:ext cx="6180992" cy="369332"/>
+          </a:xfrm>
+          <a:prstGeom prst="rect">
+            <a:avLst/>
+          </a:prstGeom>
+          <a:noFill/>
+        </p:spPr>
+        <p:txBody>
+          <a:bodyPr wrap="square" rtlCol="0">
+            <a:spAutoFit/>
+          </a:bodyPr>
+          <a:lstStyle/>
+          <a:p>
+            <a:r>
+              <a:rPr lang="en-US" dirty="0"/>
+              <a:t>Gant chart for the SOS Schedule. </a:t>
+            </a:r>
+          </a:p>
+        </p:txBody>
+      </p:sp>
+      <p:sp>
+        <p:nvSpPr>
+          <p:cNvPr id="7" name="Title 1">
+            <a:extLst>
+              <a:ext uri="{FF2B5EF4-FFF2-40B4-BE49-F238E27FC236}">
+                <a16:creationId xmlns:a16="http://schemas.microsoft.com/office/drawing/2014/main" id="{4D8768B0-09CD-41AB-8D6E-661DAD62D938}"/>
+              </a:ext>
+            </a:extLst>
+          </p:cNvPr>
           <p:cNvSpPr>
             <a:spLocks noGrp="1"/>
           </p:cNvSpPr>
@@ -11981,12 +12765,23 @@
             <p:ph type="title"/>
           </p:nvPr>
         </p:nvSpPr>
-        <p:spPr/>
-        <p:txBody>
-          <a:bodyPr/>
+        <p:spPr>
+          <a:xfrm>
+            <a:off x="1850367" y="307501"/>
+            <a:ext cx="3487616" cy="449463"/>
+          </a:xfrm>
+        </p:spPr>
+        <p:txBody>
+          <a:bodyPr>
+            <a:normAutofit fontScale="90000"/>
+          </a:bodyPr>
           <a:lstStyle/>
           <a:p>
-            <a:endParaRPr lang="en-US"/>
+            <a:pPr algn="l"/>
+            <a:r>
+              <a:rPr lang="en-US" sz="3600" dirty="0"/>
+              <a:t>Project Schedule</a:t>
+            </a:r>
           </a:p>
         </p:txBody>
       </p:sp>
@@ -13955,8 +14750,8 @@
         </p:blipFill>
         <p:spPr>
           <a:xfrm>
-            <a:off x="46892" y="586154"/>
-            <a:ext cx="12098215" cy="5906721"/>
+            <a:off x="662353" y="705612"/>
+            <a:ext cx="4481145" cy="5906721"/>
           </a:xfrm>
           <a:prstGeom prst="rect">
             <a:avLst/>
@@ -14027,6 +14822,431 @@
               <a:t>9</a:t>
             </a:fld>
             <a:endParaRPr lang="en-US" dirty="0"/>
+          </a:p>
+        </p:txBody>
+      </p:sp>
+      <p:sp>
+        <p:nvSpPr>
+          <p:cNvPr id="7" name="Content Placeholder 2">
+            <a:extLst>
+              <a:ext uri="{FF2B5EF4-FFF2-40B4-BE49-F238E27FC236}">
+                <a16:creationId xmlns:a16="http://schemas.microsoft.com/office/drawing/2014/main" id="{76ADCA5D-C3AC-4499-828D-85157664209C}"/>
+              </a:ext>
+            </a:extLst>
+          </p:cNvPr>
+          <p:cNvSpPr txBox="1">
+            <a:spLocks/>
+          </p:cNvSpPr>
+          <p:nvPr/>
+        </p:nvSpPr>
+        <p:spPr>
+          <a:xfrm>
+            <a:off x="5562598" y="1115568"/>
+            <a:ext cx="6245352" cy="4626864"/>
+          </a:xfrm>
+          <a:prstGeom prst="rect">
+            <a:avLst/>
+          </a:prstGeom>
+          <a:effectLst>
+            <a:outerShdw blurRad="25400" dir="17880000">
+              <a:srgbClr val="000000">
+                <a:alpha val="46000"/>
+              </a:srgbClr>
+            </a:outerShdw>
+          </a:effectLst>
+        </p:spPr>
+        <p:txBody>
+          <a:bodyPr vert="horz" lIns="91440" tIns="45720" rIns="91440" bIns="45720" rtlCol="0" anchor="ctr">
+            <a:noAutofit/>
+          </a:bodyPr>
+          <a:lstStyle>
+            <a:lvl1pPr marL="342900" indent="-306000" algn="l" defTabSz="457200" rtl="0" eaLnBrk="1" latinLnBrk="0" hangingPunct="1">
+              <a:spcBef>
+                <a:spcPct val="20000"/>
+              </a:spcBef>
+              <a:spcAft>
+                <a:spcPts val="600"/>
+              </a:spcAft>
+              <a:buClr>
+                <a:schemeClr val="tx2"/>
+              </a:buClr>
+              <a:buSzPct val="70000"/>
+              <a:buFont typeface="Wingdings 2" charset="2"/>
+              <a:buChar char=""/>
+              <a:defRPr sz="2000" kern="1200">
+                <a:ln>
+                  <a:solidFill>
+                    <a:schemeClr val="bg1">
+                      <a:lumMod val="75000"/>
+                      <a:lumOff val="25000"/>
+                      <a:alpha val="10000"/>
+                    </a:schemeClr>
+                  </a:solidFill>
+                </a:ln>
+                <a:solidFill>
+                  <a:schemeClr val="tx2"/>
+                </a:solidFill>
+                <a:effectLst>
+                  <a:outerShdw blurRad="9525" dist="25400" dir="14640000" algn="tl" rotWithShape="0">
+                    <a:schemeClr val="bg1">
+                      <a:alpha val="30000"/>
+                    </a:schemeClr>
+                  </a:outerShdw>
+                </a:effectLst>
+                <a:latin typeface="+mn-lt"/>
+                <a:ea typeface="+mn-ea"/>
+                <a:cs typeface="+mn-cs"/>
+              </a:defRPr>
+            </a:lvl1pPr>
+            <a:lvl2pPr marL="720000" indent="-270000" algn="l" defTabSz="457200" rtl="0" eaLnBrk="1" latinLnBrk="0" hangingPunct="1">
+              <a:spcBef>
+                <a:spcPct val="20000"/>
+              </a:spcBef>
+              <a:spcAft>
+                <a:spcPts val="600"/>
+              </a:spcAft>
+              <a:buClr>
+                <a:schemeClr val="tx2"/>
+              </a:buClr>
+              <a:buSzPct val="70000"/>
+              <a:buFont typeface="Wingdings 2" charset="2"/>
+              <a:buChar char=""/>
+              <a:defRPr sz="1800" kern="1200">
+                <a:ln>
+                  <a:solidFill>
+                    <a:schemeClr val="bg1">
+                      <a:lumMod val="75000"/>
+                      <a:lumOff val="25000"/>
+                      <a:alpha val="10000"/>
+                    </a:schemeClr>
+                  </a:solidFill>
+                </a:ln>
+                <a:solidFill>
+                  <a:schemeClr val="tx2"/>
+                </a:solidFill>
+                <a:effectLst>
+                  <a:outerShdw blurRad="9525" dist="25400" dir="14640000" algn="tl" rotWithShape="0">
+                    <a:schemeClr val="bg1">
+                      <a:alpha val="30000"/>
+                    </a:schemeClr>
+                  </a:outerShdw>
+                </a:effectLst>
+                <a:latin typeface="+mn-lt"/>
+                <a:ea typeface="+mn-ea"/>
+                <a:cs typeface="+mn-cs"/>
+              </a:defRPr>
+            </a:lvl2pPr>
+            <a:lvl3pPr marL="1026000" indent="-216000" algn="l" defTabSz="457200" rtl="0" eaLnBrk="1" latinLnBrk="0" hangingPunct="1">
+              <a:spcBef>
+                <a:spcPct val="20000"/>
+              </a:spcBef>
+              <a:spcAft>
+                <a:spcPts val="600"/>
+              </a:spcAft>
+              <a:buClr>
+                <a:schemeClr val="tx2"/>
+              </a:buClr>
+              <a:buSzPct val="70000"/>
+              <a:buFont typeface="Wingdings 2" charset="2"/>
+              <a:buChar char=""/>
+              <a:defRPr sz="1600" kern="1200">
+                <a:ln>
+                  <a:solidFill>
+                    <a:schemeClr val="bg1">
+                      <a:lumMod val="75000"/>
+                      <a:lumOff val="25000"/>
+                      <a:alpha val="10000"/>
+                    </a:schemeClr>
+                  </a:solidFill>
+                </a:ln>
+                <a:solidFill>
+                  <a:schemeClr val="tx2"/>
+                </a:solidFill>
+                <a:effectLst>
+                  <a:outerShdw blurRad="9525" dist="25400" dir="14640000" algn="tl" rotWithShape="0">
+                    <a:schemeClr val="bg1">
+                      <a:alpha val="30000"/>
+                    </a:schemeClr>
+                  </a:outerShdw>
+                </a:effectLst>
+                <a:latin typeface="+mn-lt"/>
+                <a:ea typeface="+mn-ea"/>
+                <a:cs typeface="+mn-cs"/>
+              </a:defRPr>
+            </a:lvl3pPr>
+            <a:lvl4pPr marL="1386000" indent="-216000" algn="l" defTabSz="457200" rtl="0" eaLnBrk="1" latinLnBrk="0" hangingPunct="1">
+              <a:spcBef>
+                <a:spcPct val="20000"/>
+              </a:spcBef>
+              <a:spcAft>
+                <a:spcPts val="600"/>
+              </a:spcAft>
+              <a:buClr>
+                <a:schemeClr val="tx2"/>
+              </a:buClr>
+              <a:buSzPct val="70000"/>
+              <a:buFont typeface="Wingdings 2" charset="2"/>
+              <a:buChar char=""/>
+              <a:defRPr sz="1400" kern="1200">
+                <a:ln>
+                  <a:solidFill>
+                    <a:schemeClr val="bg1">
+                      <a:lumMod val="75000"/>
+                      <a:lumOff val="25000"/>
+                      <a:alpha val="10000"/>
+                    </a:schemeClr>
+                  </a:solidFill>
+                </a:ln>
+                <a:solidFill>
+                  <a:schemeClr val="tx2"/>
+                </a:solidFill>
+                <a:effectLst>
+                  <a:outerShdw blurRad="9525" dist="25400" dir="14640000" algn="tl" rotWithShape="0">
+                    <a:schemeClr val="bg1">
+                      <a:alpha val="30000"/>
+                    </a:schemeClr>
+                  </a:outerShdw>
+                </a:effectLst>
+                <a:latin typeface="+mn-lt"/>
+                <a:ea typeface="+mn-ea"/>
+                <a:cs typeface="+mn-cs"/>
+              </a:defRPr>
+            </a:lvl4pPr>
+            <a:lvl5pPr marL="1674000" indent="-216000" algn="l" defTabSz="457200" rtl="0" eaLnBrk="1" latinLnBrk="0" hangingPunct="1">
+              <a:spcBef>
+                <a:spcPct val="20000"/>
+              </a:spcBef>
+              <a:spcAft>
+                <a:spcPts val="600"/>
+              </a:spcAft>
+              <a:buClr>
+                <a:schemeClr val="tx2"/>
+              </a:buClr>
+              <a:buSzPct val="70000"/>
+              <a:buFont typeface="Wingdings 2" charset="2"/>
+              <a:buChar char=""/>
+              <a:defRPr sz="1400" kern="1200">
+                <a:ln>
+                  <a:solidFill>
+                    <a:schemeClr val="bg1">
+                      <a:lumMod val="75000"/>
+                      <a:lumOff val="25000"/>
+                      <a:alpha val="10000"/>
+                    </a:schemeClr>
+                  </a:solidFill>
+                </a:ln>
+                <a:solidFill>
+                  <a:schemeClr val="tx2"/>
+                </a:solidFill>
+                <a:effectLst>
+                  <a:outerShdw blurRad="9525" dist="25400" dir="14640000" algn="tl" rotWithShape="0">
+                    <a:schemeClr val="bg1">
+                      <a:alpha val="30000"/>
+                    </a:schemeClr>
+                  </a:outerShdw>
+                </a:effectLst>
+                <a:latin typeface="+mn-lt"/>
+                <a:ea typeface="+mn-ea"/>
+                <a:cs typeface="+mn-cs"/>
+              </a:defRPr>
+            </a:lvl5pPr>
+            <a:lvl6pPr marL="2014600" indent="-228600" algn="l" defTabSz="457200" rtl="0" eaLnBrk="1" latinLnBrk="0" hangingPunct="1">
+              <a:spcBef>
+                <a:spcPct val="20000"/>
+              </a:spcBef>
+              <a:spcAft>
+                <a:spcPts val="600"/>
+              </a:spcAft>
+              <a:buClr>
+                <a:schemeClr val="tx2"/>
+              </a:buClr>
+              <a:buSzPct val="70000"/>
+              <a:buFont typeface="Wingdings 2" charset="2"/>
+              <a:buChar char=""/>
+              <a:defRPr sz="1400" kern="1200">
+                <a:ln>
+                  <a:solidFill>
+                    <a:schemeClr val="bg1">
+                      <a:lumMod val="75000"/>
+                      <a:lumOff val="25000"/>
+                      <a:alpha val="10000"/>
+                    </a:schemeClr>
+                  </a:solidFill>
+                </a:ln>
+                <a:solidFill>
+                  <a:schemeClr val="tx2"/>
+                </a:solidFill>
+                <a:effectLst>
+                  <a:outerShdw blurRad="9525" dist="25400" dir="14640000" algn="tl" rotWithShape="0">
+                    <a:schemeClr val="bg1">
+                      <a:alpha val="30000"/>
+                    </a:schemeClr>
+                  </a:outerShdw>
+                </a:effectLst>
+                <a:latin typeface="+mn-lt"/>
+                <a:ea typeface="+mn-ea"/>
+                <a:cs typeface="+mn-cs"/>
+              </a:defRPr>
+            </a:lvl6pPr>
+            <a:lvl7pPr marL="2401800" indent="-228600" algn="l" defTabSz="457200" rtl="0" eaLnBrk="1" latinLnBrk="0" hangingPunct="1">
+              <a:spcBef>
+                <a:spcPct val="20000"/>
+              </a:spcBef>
+              <a:spcAft>
+                <a:spcPts val="600"/>
+              </a:spcAft>
+              <a:buClr>
+                <a:schemeClr val="tx2"/>
+              </a:buClr>
+              <a:buSzPct val="70000"/>
+              <a:buFont typeface="Wingdings 2" charset="2"/>
+              <a:buChar char=""/>
+              <a:defRPr sz="1400" kern="1200">
+                <a:ln>
+                  <a:solidFill>
+                    <a:schemeClr val="bg1">
+                      <a:lumMod val="75000"/>
+                      <a:lumOff val="25000"/>
+                      <a:alpha val="10000"/>
+                    </a:schemeClr>
+                  </a:solidFill>
+                </a:ln>
+                <a:solidFill>
+                  <a:schemeClr val="tx2"/>
+                </a:solidFill>
+                <a:effectLst>
+                  <a:outerShdw blurRad="9525" dist="25400" dir="14640000" algn="tl" rotWithShape="0">
+                    <a:schemeClr val="bg1">
+                      <a:alpha val="30000"/>
+                    </a:schemeClr>
+                  </a:outerShdw>
+                </a:effectLst>
+                <a:latin typeface="+mn-lt"/>
+                <a:ea typeface="+mn-ea"/>
+                <a:cs typeface="+mn-cs"/>
+              </a:defRPr>
+            </a:lvl7pPr>
+            <a:lvl8pPr marL="2789000" indent="-228600" algn="l" defTabSz="457200" rtl="0" eaLnBrk="1" latinLnBrk="0" hangingPunct="1">
+              <a:spcBef>
+                <a:spcPct val="20000"/>
+              </a:spcBef>
+              <a:spcAft>
+                <a:spcPts val="600"/>
+              </a:spcAft>
+              <a:buClr>
+                <a:schemeClr val="tx2"/>
+              </a:buClr>
+              <a:buSzPct val="70000"/>
+              <a:buFont typeface="Wingdings 2" charset="2"/>
+              <a:buChar char=""/>
+              <a:defRPr sz="1400" kern="1200">
+                <a:ln>
+                  <a:solidFill>
+                    <a:schemeClr val="bg1">
+                      <a:lumMod val="75000"/>
+                      <a:lumOff val="25000"/>
+                      <a:alpha val="10000"/>
+                    </a:schemeClr>
+                  </a:solidFill>
+                </a:ln>
+                <a:solidFill>
+                  <a:schemeClr val="tx2"/>
+                </a:solidFill>
+                <a:effectLst>
+                  <a:outerShdw blurRad="9525" dist="25400" dir="14640000" algn="tl" rotWithShape="0">
+                    <a:schemeClr val="bg1">
+                      <a:alpha val="30000"/>
+                    </a:schemeClr>
+                  </a:outerShdw>
+                </a:effectLst>
+                <a:latin typeface="+mn-lt"/>
+                <a:ea typeface="+mn-ea"/>
+                <a:cs typeface="+mn-cs"/>
+              </a:defRPr>
+            </a:lvl8pPr>
+            <a:lvl9pPr marL="3106200" indent="-228600" algn="l" defTabSz="457200" rtl="0" eaLnBrk="1" latinLnBrk="0" hangingPunct="1">
+              <a:spcBef>
+                <a:spcPct val="20000"/>
+              </a:spcBef>
+              <a:spcAft>
+                <a:spcPts val="600"/>
+              </a:spcAft>
+              <a:buClr>
+                <a:schemeClr val="tx2"/>
+              </a:buClr>
+              <a:buSzPct val="70000"/>
+              <a:buFont typeface="Wingdings 2" charset="2"/>
+              <a:buChar char=""/>
+              <a:defRPr sz="1400" kern="1200">
+                <a:ln>
+                  <a:solidFill>
+                    <a:schemeClr val="bg1">
+                      <a:lumMod val="75000"/>
+                      <a:lumOff val="25000"/>
+                      <a:alpha val="10000"/>
+                    </a:schemeClr>
+                  </a:solidFill>
+                </a:ln>
+                <a:solidFill>
+                  <a:schemeClr val="tx2"/>
+                </a:solidFill>
+                <a:effectLst>
+                  <a:outerShdw blurRad="9525" dist="25400" dir="14640000" algn="tl" rotWithShape="0">
+                    <a:schemeClr val="bg1">
+                      <a:alpha val="30000"/>
+                    </a:schemeClr>
+                  </a:outerShdw>
+                </a:effectLst>
+                <a:latin typeface="+mn-lt"/>
+                <a:ea typeface="+mn-ea"/>
+                <a:cs typeface="+mn-cs"/>
+              </a:defRPr>
+            </a:lvl9pPr>
+          </a:lstStyle>
+          <a:p>
+            <a:pPr marL="36900" indent="0">
+              <a:lnSpc>
+                <a:spcPct val="90000"/>
+              </a:lnSpc>
+              <a:buNone/>
+            </a:pPr>
+            <a:r>
+              <a:rPr lang="en-US" sz="2200" dirty="0"/>
+              <a:t>The following tables are particularly relevant:</a:t>
+            </a:r>
+          </a:p>
+          <a:p>
+            <a:pPr>
+              <a:lnSpc>
+                <a:spcPct val="90000"/>
+              </a:lnSpc>
+            </a:pPr>
+            <a:r>
+              <a:rPr lang="en-US" sz="2200" dirty="0"/>
+              <a:t>Users, which represent Actors for the Systems.</a:t>
+            </a:r>
+          </a:p>
+          <a:p>
+            <a:pPr>
+              <a:lnSpc>
+                <a:spcPct val="90000"/>
+              </a:lnSpc>
+            </a:pPr>
+            <a:r>
+              <a:rPr lang="en-US" sz="2200" dirty="0"/>
+              <a:t>Organizations, which are groups of Users.</a:t>
+            </a:r>
+          </a:p>
+          <a:p>
+            <a:pPr>
+              <a:lnSpc>
+                <a:spcPct val="90000"/>
+              </a:lnSpc>
+            </a:pPr>
+            <a:r>
+              <a:rPr lang="en-US" sz="2200" dirty="0"/>
+              <a:t>Events which are, hosted by Organizations and Attended by Users.</a:t>
+            </a:r>
           </a:p>
         </p:txBody>
       </p:sp>

</xml_diff>